<commit_message>
Second commit - main
update pom.xml
</commit_message>
<xml_diff>
--- a/src/main/webapp/asset/descriptionfor web/TechZone.pptx
+++ b/src/main/webapp/asset/descriptionfor web/TechZone.pptx
@@ -11,6 +11,8 @@
     <p:sldId id="259" r:id="rId5"/>
     <p:sldId id="260" r:id="rId6"/>
     <p:sldId id="261" r:id="rId7"/>
+    <p:sldId id="262" r:id="rId8"/>
+    <p:sldId id="263" r:id="rId9"/>
   </p:sldIdLst>
   <p:sldSz cx="12192000" cy="6858000"/>
   <p:notesSz cx="6858000" cy="9144000"/>
@@ -264,7 +266,7 @@
           <a:p>
             <a:fld id="{B9911F21-AB9B-4E47-BFED-F9E6E1164517}" type="datetimeFigureOut">
               <a:rPr lang="en-US" smtClean="0"/>
-              <a:t>4/9/2024</a:t>
+              <a:t>6/9/2024</a:t>
             </a:fld>
             <a:endParaRPr lang="en-US"/>
           </a:p>
@@ -462,7 +464,7 @@
           <a:p>
             <a:fld id="{B9911F21-AB9B-4E47-BFED-F9E6E1164517}" type="datetimeFigureOut">
               <a:rPr lang="en-US" smtClean="0"/>
-              <a:t>4/9/2024</a:t>
+              <a:t>6/9/2024</a:t>
             </a:fld>
             <a:endParaRPr lang="en-US"/>
           </a:p>
@@ -670,7 +672,7 @@
           <a:p>
             <a:fld id="{B9911F21-AB9B-4E47-BFED-F9E6E1164517}" type="datetimeFigureOut">
               <a:rPr lang="en-US" smtClean="0"/>
-              <a:t>4/9/2024</a:t>
+              <a:t>6/9/2024</a:t>
             </a:fld>
             <a:endParaRPr lang="en-US"/>
           </a:p>
@@ -868,7 +870,7 @@
           <a:p>
             <a:fld id="{B9911F21-AB9B-4E47-BFED-F9E6E1164517}" type="datetimeFigureOut">
               <a:rPr lang="en-US" smtClean="0"/>
-              <a:t>4/9/2024</a:t>
+              <a:t>6/9/2024</a:t>
             </a:fld>
             <a:endParaRPr lang="en-US"/>
           </a:p>
@@ -1143,7 +1145,7 @@
           <a:p>
             <a:fld id="{B9911F21-AB9B-4E47-BFED-F9E6E1164517}" type="datetimeFigureOut">
               <a:rPr lang="en-US" smtClean="0"/>
-              <a:t>4/9/2024</a:t>
+              <a:t>6/9/2024</a:t>
             </a:fld>
             <a:endParaRPr lang="en-US"/>
           </a:p>
@@ -1408,7 +1410,7 @@
           <a:p>
             <a:fld id="{B9911F21-AB9B-4E47-BFED-F9E6E1164517}" type="datetimeFigureOut">
               <a:rPr lang="en-US" smtClean="0"/>
-              <a:t>4/9/2024</a:t>
+              <a:t>6/9/2024</a:t>
             </a:fld>
             <a:endParaRPr lang="en-US"/>
           </a:p>
@@ -1820,7 +1822,7 @@
           <a:p>
             <a:fld id="{B9911F21-AB9B-4E47-BFED-F9E6E1164517}" type="datetimeFigureOut">
               <a:rPr lang="en-US" smtClean="0"/>
-              <a:t>4/9/2024</a:t>
+              <a:t>6/9/2024</a:t>
             </a:fld>
             <a:endParaRPr lang="en-US"/>
           </a:p>
@@ -1961,7 +1963,7 @@
           <a:p>
             <a:fld id="{B9911F21-AB9B-4E47-BFED-F9E6E1164517}" type="datetimeFigureOut">
               <a:rPr lang="en-US" smtClean="0"/>
-              <a:t>4/9/2024</a:t>
+              <a:t>6/9/2024</a:t>
             </a:fld>
             <a:endParaRPr lang="en-US"/>
           </a:p>
@@ -2074,7 +2076,7 @@
           <a:p>
             <a:fld id="{B9911F21-AB9B-4E47-BFED-F9E6E1164517}" type="datetimeFigureOut">
               <a:rPr lang="en-US" smtClean="0"/>
-              <a:t>4/9/2024</a:t>
+              <a:t>6/9/2024</a:t>
             </a:fld>
             <a:endParaRPr lang="en-US"/>
           </a:p>
@@ -2385,7 +2387,7 @@
           <a:p>
             <a:fld id="{B9911F21-AB9B-4E47-BFED-F9E6E1164517}" type="datetimeFigureOut">
               <a:rPr lang="en-US" smtClean="0"/>
-              <a:t>4/9/2024</a:t>
+              <a:t>6/9/2024</a:t>
             </a:fld>
             <a:endParaRPr lang="en-US"/>
           </a:p>
@@ -2673,7 +2675,7 @@
           <a:p>
             <a:fld id="{B9911F21-AB9B-4E47-BFED-F9E6E1164517}" type="datetimeFigureOut">
               <a:rPr lang="en-US" smtClean="0"/>
-              <a:t>4/9/2024</a:t>
+              <a:t>6/9/2024</a:t>
             </a:fld>
             <a:endParaRPr lang="en-US"/>
           </a:p>
@@ -2770,10 +2772,10 @@
       </p:grpSpPr>
       <p:sp>
         <p:nvSpPr>
-          <p:cNvPr id="7" name="9Slide.vn - 2019">
-            <a:extLst>
-              <a:ext uri="{FF2B5EF4-FFF2-40B4-BE49-F238E27FC236}">
-                <a16:creationId xmlns:a16="http://schemas.microsoft.com/office/drawing/2014/main" id="{92D9216C-A77B-E42F-B1A6-2274BF2E5F7F}"/>
+          <p:cNvPr id="8" name="9Slide.vn - 2019">
+            <a:extLst>
+              <a:ext uri="{FF2B5EF4-FFF2-40B4-BE49-F238E27FC236}">
+                <a16:creationId xmlns:a16="http://schemas.microsoft.com/office/drawing/2014/main" id="{F669A366-9398-E6C9-F0FC-D9634BFF0925}"/>
               </a:ext>
             </a:extLst>
           </p:cNvPr>
@@ -2954,7 +2956,7 @@
           <a:p>
             <a:fld id="{B9911F21-AB9B-4E47-BFED-F9E6E1164517}" type="datetimeFigureOut">
               <a:rPr lang="en-US" smtClean="0"/>
-              <a:t>4/9/2024</a:t>
+              <a:t>6/9/2024</a:t>
             </a:fld>
             <a:endParaRPr lang="en-US"/>
           </a:p>
@@ -5164,6 +5166,261 @@
 </p:sld>
 </file>
 
+<file path=ppt/slides/slide7.xml><?xml version="1.0" encoding="utf-8"?>
+<p:sld xmlns:a="http://schemas.openxmlformats.org/drawingml/2006/main" xmlns:r="http://schemas.openxmlformats.org/officeDocument/2006/relationships" xmlns:p="http://schemas.openxmlformats.org/presentationml/2006/main">
+  <p:cSld>
+    <p:bg>
+      <p:bgPr>
+        <a:solidFill>
+          <a:srgbClr val="F1F1F1"/>
+        </a:solidFill>
+        <a:effectLst/>
+      </p:bgPr>
+    </p:bg>
+    <p:spTree>
+      <p:nvGrpSpPr>
+        <p:cNvPr id="1" name=""/>
+        <p:cNvGrpSpPr/>
+        <p:nvPr/>
+      </p:nvGrpSpPr>
+      <p:grpSpPr>
+        <a:xfrm>
+          <a:off x="0" y="0"/>
+          <a:ext cx="0" cy="0"/>
+          <a:chOff x="0" y="0"/>
+          <a:chExt cx="0" cy="0"/>
+        </a:xfrm>
+      </p:grpSpPr>
+      <p:pic>
+        <p:nvPicPr>
+          <p:cNvPr id="3" name="Picture 2">
+            <a:extLst>
+              <a:ext uri="{FF2B5EF4-FFF2-40B4-BE49-F238E27FC236}">
+                <a16:creationId xmlns:a16="http://schemas.microsoft.com/office/drawing/2014/main" id="{E6E44495-8731-93A8-AB0D-F8B4FA507DD1}"/>
+              </a:ext>
+            </a:extLst>
+          </p:cNvPr>
+          <p:cNvPicPr>
+            <a:picLocks noChangeAspect="1"/>
+          </p:cNvPicPr>
+          <p:nvPr/>
+        </p:nvPicPr>
+        <p:blipFill>
+          <a:blip r:embed="rId2"/>
+          <a:stretch>
+            <a:fillRect/>
+          </a:stretch>
+        </p:blipFill>
+        <p:spPr>
+          <a:xfrm>
+            <a:off x="3414712" y="1652587"/>
+            <a:ext cx="5362575" cy="3552825"/>
+          </a:xfrm>
+          <a:prstGeom prst="rect">
+            <a:avLst/>
+          </a:prstGeom>
+        </p:spPr>
+      </p:pic>
+      <p:sp>
+        <p:nvSpPr>
+          <p:cNvPr id="5" name="Rectangle 4">
+            <a:extLst>
+              <a:ext uri="{FF2B5EF4-FFF2-40B4-BE49-F238E27FC236}">
+                <a16:creationId xmlns:a16="http://schemas.microsoft.com/office/drawing/2014/main" id="{ADFF3A91-4295-9C52-3061-E78CAA08800E}"/>
+              </a:ext>
+            </a:extLst>
+          </p:cNvPr>
+          <p:cNvSpPr/>
+          <p:nvPr/>
+        </p:nvSpPr>
+        <p:spPr>
+          <a:xfrm>
+            <a:off x="2590800" y="1167769"/>
+            <a:ext cx="6377306" cy="4623431"/>
+          </a:xfrm>
+          <a:prstGeom prst="rect">
+            <a:avLst/>
+          </a:prstGeom>
+          <a:noFill/>
+          <a:ln w="57150"/>
+        </p:spPr>
+        <p:style>
+          <a:lnRef idx="2">
+            <a:schemeClr val="accent1">
+              <a:shade val="15000"/>
+            </a:schemeClr>
+          </a:lnRef>
+          <a:fillRef idx="1">
+            <a:schemeClr val="accent1"/>
+          </a:fillRef>
+          <a:effectRef idx="0">
+            <a:schemeClr val="accent1"/>
+          </a:effectRef>
+          <a:fontRef idx="minor">
+            <a:schemeClr val="lt1"/>
+          </a:fontRef>
+        </p:style>
+        <p:txBody>
+          <a:bodyPr rtlCol="0" anchor="ctr"/>
+          <a:lstStyle/>
+          <a:p>
+            <a:pPr algn="ctr"/>
+            <a:endParaRPr lang="en-US"/>
+          </a:p>
+        </p:txBody>
+      </p:sp>
+    </p:spTree>
+    <p:extLst>
+      <p:ext uri="{BB962C8B-B14F-4D97-AF65-F5344CB8AC3E}">
+        <p14:creationId xmlns:p14="http://schemas.microsoft.com/office/powerpoint/2010/main" val="1373490809"/>
+      </p:ext>
+    </p:extLst>
+  </p:cSld>
+  <p:clrMapOvr>
+    <a:masterClrMapping/>
+  </p:clrMapOvr>
+  <p:transition>
+    <p:fade/>
+  </p:transition>
+</p:sld>
+</file>
+
+<file path=ppt/slides/slide8.xml><?xml version="1.0" encoding="utf-8"?>
+<p:sld xmlns:a="http://schemas.openxmlformats.org/drawingml/2006/main" xmlns:r="http://schemas.openxmlformats.org/officeDocument/2006/relationships" xmlns:p="http://schemas.openxmlformats.org/presentationml/2006/main">
+  <p:cSld>
+    <p:bg>
+      <p:bgPr>
+        <a:solidFill>
+          <a:srgbClr val="F8F8F8"/>
+        </a:solidFill>
+        <a:effectLst/>
+      </p:bgPr>
+    </p:bg>
+    <p:spTree>
+      <p:nvGrpSpPr>
+        <p:cNvPr id="1" name=""/>
+        <p:cNvGrpSpPr/>
+        <p:nvPr/>
+      </p:nvGrpSpPr>
+      <p:grpSpPr>
+        <a:xfrm>
+          <a:off x="0" y="0"/>
+          <a:ext cx="0" cy="0"/>
+          <a:chOff x="0" y="0"/>
+          <a:chExt cx="0" cy="0"/>
+        </a:xfrm>
+      </p:grpSpPr>
+      <p:sp>
+        <p:nvSpPr>
+          <p:cNvPr id="5" name="Rectangle 4">
+            <a:extLst>
+              <a:ext uri="{FF2B5EF4-FFF2-40B4-BE49-F238E27FC236}">
+                <a16:creationId xmlns:a16="http://schemas.microsoft.com/office/drawing/2014/main" id="{ADFF3A91-4295-9C52-3061-E78CAA08800E}"/>
+              </a:ext>
+            </a:extLst>
+          </p:cNvPr>
+          <p:cNvSpPr/>
+          <p:nvPr/>
+        </p:nvSpPr>
+        <p:spPr>
+          <a:xfrm>
+            <a:off x="2590800" y="1167769"/>
+            <a:ext cx="6377306" cy="4623431"/>
+          </a:xfrm>
+          <a:prstGeom prst="rect">
+            <a:avLst/>
+          </a:prstGeom>
+          <a:noFill/>
+          <a:ln w="57150"/>
+        </p:spPr>
+        <p:style>
+          <a:lnRef idx="2">
+            <a:schemeClr val="accent1">
+              <a:shade val="15000"/>
+            </a:schemeClr>
+          </a:lnRef>
+          <a:fillRef idx="1">
+            <a:schemeClr val="accent1"/>
+          </a:fillRef>
+          <a:effectRef idx="0">
+            <a:schemeClr val="accent1"/>
+          </a:effectRef>
+          <a:fontRef idx="minor">
+            <a:schemeClr val="lt1"/>
+          </a:fontRef>
+        </p:style>
+        <p:txBody>
+          <a:bodyPr rtlCol="0" anchor="ctr"/>
+          <a:lstStyle/>
+          <a:p>
+            <a:pPr algn="ctr"/>
+            <a:endParaRPr lang="en-US"/>
+          </a:p>
+        </p:txBody>
+      </p:sp>
+      <p:pic>
+        <p:nvPicPr>
+          <p:cNvPr id="1026" name="Picture 2">
+            <a:extLst>
+              <a:ext uri="{FF2B5EF4-FFF2-40B4-BE49-F238E27FC236}">
+                <a16:creationId xmlns:a16="http://schemas.microsoft.com/office/drawing/2014/main" id="{5168C581-D69C-5F41-8134-A4C4ABE2BEB5}"/>
+              </a:ext>
+            </a:extLst>
+          </p:cNvPr>
+          <p:cNvPicPr>
+            <a:picLocks noChangeAspect="1" noChangeArrowheads="1"/>
+          </p:cNvPicPr>
+          <p:nvPr/>
+        </p:nvPicPr>
+        <p:blipFill>
+          <a:blip r:embed="rId2">
+            <a:extLst>
+              <a:ext uri="{28A0092B-C50C-407E-A947-70E740481C1C}">
+                <a14:useLocalDpi xmlns:a14="http://schemas.microsoft.com/office/drawing/2010/main" val="0"/>
+              </a:ext>
+            </a:extLst>
+          </a:blip>
+          <a:srcRect/>
+          <a:stretch>
+            <a:fillRect/>
+          </a:stretch>
+        </p:blipFill>
+        <p:spPr bwMode="auto">
+          <a:xfrm>
+            <a:off x="3093403" y="1633537"/>
+            <a:ext cx="5372100" cy="3590925"/>
+          </a:xfrm>
+          <a:prstGeom prst="rect">
+            <a:avLst/>
+          </a:prstGeom>
+          <a:noFill/>
+          <a:extLst>
+            <a:ext uri="{909E8E84-426E-40DD-AFC4-6F175D3DCCD1}">
+              <a14:hiddenFill xmlns:a14="http://schemas.microsoft.com/office/drawing/2010/main">
+                <a:solidFill>
+                  <a:srgbClr val="FFFFFF"/>
+                </a:solidFill>
+              </a14:hiddenFill>
+            </a:ext>
+          </a:extLst>
+        </p:spPr>
+      </p:pic>
+    </p:spTree>
+    <p:extLst>
+      <p:ext uri="{BB962C8B-B14F-4D97-AF65-F5344CB8AC3E}">
+        <p14:creationId xmlns:p14="http://schemas.microsoft.com/office/powerpoint/2010/main" val="94104684"/>
+      </p:ext>
+    </p:extLst>
+  </p:cSld>
+  <p:clrMapOvr>
+    <a:masterClrMapping/>
+  </p:clrMapOvr>
+  <p:transition>
+    <p:fade/>
+  </p:transition>
+</p:sld>
+</file>
+
 <file path=ppt/theme/theme1.xml><?xml version="1.0" encoding="utf-8"?>
 <a:theme xmlns:a="http://schemas.openxmlformats.org/drawingml/2006/main" name="Office Theme">
   <a:themeElements>

</xml_diff>

<commit_message>
Seventh Commit - BE
Add page from FE
</commit_message>
<xml_diff>
--- a/src/main/webapp/asset/descriptionfor web/TechZone.pptx
+++ b/src/main/webapp/asset/descriptionfor web/TechZone.pptx
@@ -11,6 +11,9 @@
     <p:sldId id="259" r:id="rId5"/>
     <p:sldId id="260" r:id="rId6"/>
     <p:sldId id="261" r:id="rId7"/>
+    <p:sldId id="262" r:id="rId8"/>
+    <p:sldId id="263" r:id="rId9"/>
+    <p:sldId id="264" r:id="rId10"/>
   </p:sldIdLst>
   <p:sldSz cx="12192000" cy="6858000"/>
   <p:notesSz cx="6858000" cy="9144000"/>
@@ -264,7 +267,7 @@
           <a:p>
             <a:fld id="{B9911F21-AB9B-4E47-BFED-F9E6E1164517}" type="datetimeFigureOut">
               <a:rPr lang="en-US" smtClean="0"/>
-              <a:t>4/9/2024</a:t>
+              <a:t>9/9/2024</a:t>
             </a:fld>
             <a:endParaRPr lang="en-US"/>
           </a:p>
@@ -462,7 +465,7 @@
           <a:p>
             <a:fld id="{B9911F21-AB9B-4E47-BFED-F9E6E1164517}" type="datetimeFigureOut">
               <a:rPr lang="en-US" smtClean="0"/>
-              <a:t>4/9/2024</a:t>
+              <a:t>9/9/2024</a:t>
             </a:fld>
             <a:endParaRPr lang="en-US"/>
           </a:p>
@@ -670,7 +673,7 @@
           <a:p>
             <a:fld id="{B9911F21-AB9B-4E47-BFED-F9E6E1164517}" type="datetimeFigureOut">
               <a:rPr lang="en-US" smtClean="0"/>
-              <a:t>4/9/2024</a:t>
+              <a:t>9/9/2024</a:t>
             </a:fld>
             <a:endParaRPr lang="en-US"/>
           </a:p>
@@ -868,7 +871,7 @@
           <a:p>
             <a:fld id="{B9911F21-AB9B-4E47-BFED-F9E6E1164517}" type="datetimeFigureOut">
               <a:rPr lang="en-US" smtClean="0"/>
-              <a:t>4/9/2024</a:t>
+              <a:t>9/9/2024</a:t>
             </a:fld>
             <a:endParaRPr lang="en-US"/>
           </a:p>
@@ -1143,7 +1146,7 @@
           <a:p>
             <a:fld id="{B9911F21-AB9B-4E47-BFED-F9E6E1164517}" type="datetimeFigureOut">
               <a:rPr lang="en-US" smtClean="0"/>
-              <a:t>4/9/2024</a:t>
+              <a:t>9/9/2024</a:t>
             </a:fld>
             <a:endParaRPr lang="en-US"/>
           </a:p>
@@ -1408,7 +1411,7 @@
           <a:p>
             <a:fld id="{B9911F21-AB9B-4E47-BFED-F9E6E1164517}" type="datetimeFigureOut">
               <a:rPr lang="en-US" smtClean="0"/>
-              <a:t>4/9/2024</a:t>
+              <a:t>9/9/2024</a:t>
             </a:fld>
             <a:endParaRPr lang="en-US"/>
           </a:p>
@@ -1820,7 +1823,7 @@
           <a:p>
             <a:fld id="{B9911F21-AB9B-4E47-BFED-F9E6E1164517}" type="datetimeFigureOut">
               <a:rPr lang="en-US" smtClean="0"/>
-              <a:t>4/9/2024</a:t>
+              <a:t>9/9/2024</a:t>
             </a:fld>
             <a:endParaRPr lang="en-US"/>
           </a:p>
@@ -1961,7 +1964,7 @@
           <a:p>
             <a:fld id="{B9911F21-AB9B-4E47-BFED-F9E6E1164517}" type="datetimeFigureOut">
               <a:rPr lang="en-US" smtClean="0"/>
-              <a:t>4/9/2024</a:t>
+              <a:t>9/9/2024</a:t>
             </a:fld>
             <a:endParaRPr lang="en-US"/>
           </a:p>
@@ -2074,7 +2077,7 @@
           <a:p>
             <a:fld id="{B9911F21-AB9B-4E47-BFED-F9E6E1164517}" type="datetimeFigureOut">
               <a:rPr lang="en-US" smtClean="0"/>
-              <a:t>4/9/2024</a:t>
+              <a:t>9/9/2024</a:t>
             </a:fld>
             <a:endParaRPr lang="en-US"/>
           </a:p>
@@ -2385,7 +2388,7 @@
           <a:p>
             <a:fld id="{B9911F21-AB9B-4E47-BFED-F9E6E1164517}" type="datetimeFigureOut">
               <a:rPr lang="en-US" smtClean="0"/>
-              <a:t>4/9/2024</a:t>
+              <a:t>9/9/2024</a:t>
             </a:fld>
             <a:endParaRPr lang="en-US"/>
           </a:p>
@@ -2673,7 +2676,7 @@
           <a:p>
             <a:fld id="{B9911F21-AB9B-4E47-BFED-F9E6E1164517}" type="datetimeFigureOut">
               <a:rPr lang="en-US" smtClean="0"/>
-              <a:t>4/9/2024</a:t>
+              <a:t>9/9/2024</a:t>
             </a:fld>
             <a:endParaRPr lang="en-US"/>
           </a:p>
@@ -2773,7 +2776,7 @@
           <p:cNvPr id="7" name="9Slide.vn - 2019">
             <a:extLst>
               <a:ext uri="{FF2B5EF4-FFF2-40B4-BE49-F238E27FC236}">
-                <a16:creationId xmlns:a16="http://schemas.microsoft.com/office/drawing/2014/main" id="{92D9216C-A77B-E42F-B1A6-2274BF2E5F7F}"/>
+                <a16:creationId xmlns:a16="http://schemas.microsoft.com/office/drawing/2014/main" id="{8CD8093B-7E96-17BC-0F05-BC1E55D93566}"/>
               </a:ext>
             </a:extLst>
           </p:cNvPr>
@@ -2954,7 +2957,7 @@
           <a:p>
             <a:fld id="{B9911F21-AB9B-4E47-BFED-F9E6E1164517}" type="datetimeFigureOut">
               <a:rPr lang="en-US" smtClean="0"/>
-              <a:t>4/9/2024</a:t>
+              <a:t>9/9/2024</a:t>
             </a:fld>
             <a:endParaRPr lang="en-US"/>
           </a:p>
@@ -5164,6 +5167,590 @@
 </p:sld>
 </file>
 
+<file path=ppt/slides/slide7.xml><?xml version="1.0" encoding="utf-8"?>
+<p:sld xmlns:a="http://schemas.openxmlformats.org/drawingml/2006/main" xmlns:r="http://schemas.openxmlformats.org/officeDocument/2006/relationships" xmlns:p="http://schemas.openxmlformats.org/presentationml/2006/main">
+  <p:cSld>
+    <p:bg>
+      <p:bgPr>
+        <a:solidFill>
+          <a:srgbClr val="F1F1F1"/>
+        </a:solidFill>
+        <a:effectLst/>
+      </p:bgPr>
+    </p:bg>
+    <p:spTree>
+      <p:nvGrpSpPr>
+        <p:cNvPr id="1" name=""/>
+        <p:cNvGrpSpPr/>
+        <p:nvPr/>
+      </p:nvGrpSpPr>
+      <p:grpSpPr>
+        <a:xfrm>
+          <a:off x="0" y="0"/>
+          <a:ext cx="0" cy="0"/>
+          <a:chOff x="0" y="0"/>
+          <a:chExt cx="0" cy="0"/>
+        </a:xfrm>
+      </p:grpSpPr>
+      <p:pic>
+        <p:nvPicPr>
+          <p:cNvPr id="3" name="Picture 2">
+            <a:extLst>
+              <a:ext uri="{FF2B5EF4-FFF2-40B4-BE49-F238E27FC236}">
+                <a16:creationId xmlns:a16="http://schemas.microsoft.com/office/drawing/2014/main" id="{E6E44495-8731-93A8-AB0D-F8B4FA507DD1}"/>
+              </a:ext>
+            </a:extLst>
+          </p:cNvPr>
+          <p:cNvPicPr>
+            <a:picLocks noChangeAspect="1"/>
+          </p:cNvPicPr>
+          <p:nvPr/>
+        </p:nvPicPr>
+        <p:blipFill>
+          <a:blip r:embed="rId2"/>
+          <a:stretch>
+            <a:fillRect/>
+          </a:stretch>
+        </p:blipFill>
+        <p:spPr>
+          <a:xfrm>
+            <a:off x="3414712" y="1652587"/>
+            <a:ext cx="5362575" cy="3552825"/>
+          </a:xfrm>
+          <a:prstGeom prst="rect">
+            <a:avLst/>
+          </a:prstGeom>
+        </p:spPr>
+      </p:pic>
+      <p:sp>
+        <p:nvSpPr>
+          <p:cNvPr id="5" name="Rectangle 4">
+            <a:extLst>
+              <a:ext uri="{FF2B5EF4-FFF2-40B4-BE49-F238E27FC236}">
+                <a16:creationId xmlns:a16="http://schemas.microsoft.com/office/drawing/2014/main" id="{ADFF3A91-4295-9C52-3061-E78CAA08800E}"/>
+              </a:ext>
+            </a:extLst>
+          </p:cNvPr>
+          <p:cNvSpPr/>
+          <p:nvPr/>
+        </p:nvSpPr>
+        <p:spPr>
+          <a:xfrm>
+            <a:off x="2590800" y="1167769"/>
+            <a:ext cx="6377306" cy="4623431"/>
+          </a:xfrm>
+          <a:prstGeom prst="rect">
+            <a:avLst/>
+          </a:prstGeom>
+          <a:noFill/>
+          <a:ln w="57150"/>
+        </p:spPr>
+        <p:style>
+          <a:lnRef idx="2">
+            <a:schemeClr val="accent1">
+              <a:shade val="15000"/>
+            </a:schemeClr>
+          </a:lnRef>
+          <a:fillRef idx="1">
+            <a:schemeClr val="accent1"/>
+          </a:fillRef>
+          <a:effectRef idx="0">
+            <a:schemeClr val="accent1"/>
+          </a:effectRef>
+          <a:fontRef idx="minor">
+            <a:schemeClr val="lt1"/>
+          </a:fontRef>
+        </p:style>
+        <p:txBody>
+          <a:bodyPr rtlCol="0" anchor="ctr"/>
+          <a:lstStyle/>
+          <a:p>
+            <a:pPr algn="ctr"/>
+            <a:endParaRPr lang="en-US"/>
+          </a:p>
+        </p:txBody>
+      </p:sp>
+    </p:spTree>
+    <p:extLst>
+      <p:ext uri="{BB962C8B-B14F-4D97-AF65-F5344CB8AC3E}">
+        <p14:creationId xmlns:p14="http://schemas.microsoft.com/office/powerpoint/2010/main" val="1373490809"/>
+      </p:ext>
+    </p:extLst>
+  </p:cSld>
+  <p:clrMapOvr>
+    <a:masterClrMapping/>
+  </p:clrMapOvr>
+  <p:transition>
+    <p:fade/>
+  </p:transition>
+</p:sld>
+</file>
+
+<file path=ppt/slides/slide8.xml><?xml version="1.0" encoding="utf-8"?>
+<p:sld xmlns:a="http://schemas.openxmlformats.org/drawingml/2006/main" xmlns:r="http://schemas.openxmlformats.org/officeDocument/2006/relationships" xmlns:p="http://schemas.openxmlformats.org/presentationml/2006/main">
+  <p:cSld>
+    <p:bg>
+      <p:bgPr>
+        <a:solidFill>
+          <a:srgbClr val="F8F8F8"/>
+        </a:solidFill>
+        <a:effectLst/>
+      </p:bgPr>
+    </p:bg>
+    <p:spTree>
+      <p:nvGrpSpPr>
+        <p:cNvPr id="1" name=""/>
+        <p:cNvGrpSpPr/>
+        <p:nvPr/>
+      </p:nvGrpSpPr>
+      <p:grpSpPr>
+        <a:xfrm>
+          <a:off x="0" y="0"/>
+          <a:ext cx="0" cy="0"/>
+          <a:chOff x="0" y="0"/>
+          <a:chExt cx="0" cy="0"/>
+        </a:xfrm>
+      </p:grpSpPr>
+      <p:sp>
+        <p:nvSpPr>
+          <p:cNvPr id="5" name="Rectangle 4">
+            <a:extLst>
+              <a:ext uri="{FF2B5EF4-FFF2-40B4-BE49-F238E27FC236}">
+                <a16:creationId xmlns:a16="http://schemas.microsoft.com/office/drawing/2014/main" id="{ADFF3A91-4295-9C52-3061-E78CAA08800E}"/>
+              </a:ext>
+            </a:extLst>
+          </p:cNvPr>
+          <p:cNvSpPr/>
+          <p:nvPr/>
+        </p:nvSpPr>
+        <p:spPr>
+          <a:xfrm>
+            <a:off x="2590800" y="1167769"/>
+            <a:ext cx="6377306" cy="4623431"/>
+          </a:xfrm>
+          <a:prstGeom prst="rect">
+            <a:avLst/>
+          </a:prstGeom>
+          <a:noFill/>
+          <a:ln w="57150"/>
+        </p:spPr>
+        <p:style>
+          <a:lnRef idx="2">
+            <a:schemeClr val="accent1">
+              <a:shade val="15000"/>
+            </a:schemeClr>
+          </a:lnRef>
+          <a:fillRef idx="1">
+            <a:schemeClr val="accent1"/>
+          </a:fillRef>
+          <a:effectRef idx="0">
+            <a:schemeClr val="accent1"/>
+          </a:effectRef>
+          <a:fontRef idx="minor">
+            <a:schemeClr val="lt1"/>
+          </a:fontRef>
+        </p:style>
+        <p:txBody>
+          <a:bodyPr rtlCol="0" anchor="ctr"/>
+          <a:lstStyle/>
+          <a:p>
+            <a:pPr algn="ctr"/>
+            <a:endParaRPr lang="en-US"/>
+          </a:p>
+        </p:txBody>
+      </p:sp>
+      <p:pic>
+        <p:nvPicPr>
+          <p:cNvPr id="1026" name="Picture 2">
+            <a:extLst>
+              <a:ext uri="{FF2B5EF4-FFF2-40B4-BE49-F238E27FC236}">
+                <a16:creationId xmlns:a16="http://schemas.microsoft.com/office/drawing/2014/main" id="{5168C581-D69C-5F41-8134-A4C4ABE2BEB5}"/>
+              </a:ext>
+            </a:extLst>
+          </p:cNvPr>
+          <p:cNvPicPr>
+            <a:picLocks noChangeAspect="1" noChangeArrowheads="1"/>
+          </p:cNvPicPr>
+          <p:nvPr/>
+        </p:nvPicPr>
+        <p:blipFill>
+          <a:blip r:embed="rId2">
+            <a:extLst>
+              <a:ext uri="{28A0092B-C50C-407E-A947-70E740481C1C}">
+                <a14:useLocalDpi xmlns:a14="http://schemas.microsoft.com/office/drawing/2010/main" val="0"/>
+              </a:ext>
+            </a:extLst>
+          </a:blip>
+          <a:srcRect/>
+          <a:stretch>
+            <a:fillRect/>
+          </a:stretch>
+        </p:blipFill>
+        <p:spPr bwMode="auto">
+          <a:xfrm>
+            <a:off x="3093403" y="1633537"/>
+            <a:ext cx="5372100" cy="3590925"/>
+          </a:xfrm>
+          <a:prstGeom prst="rect">
+            <a:avLst/>
+          </a:prstGeom>
+          <a:noFill/>
+          <a:extLst>
+            <a:ext uri="{909E8E84-426E-40DD-AFC4-6F175D3DCCD1}">
+              <a14:hiddenFill xmlns:a14="http://schemas.microsoft.com/office/drawing/2010/main">
+                <a:solidFill>
+                  <a:srgbClr val="FFFFFF"/>
+                </a:solidFill>
+              </a14:hiddenFill>
+            </a:ext>
+          </a:extLst>
+        </p:spPr>
+      </p:pic>
+    </p:spTree>
+    <p:extLst>
+      <p:ext uri="{BB962C8B-B14F-4D97-AF65-F5344CB8AC3E}">
+        <p14:creationId xmlns:p14="http://schemas.microsoft.com/office/powerpoint/2010/main" val="94104684"/>
+      </p:ext>
+    </p:extLst>
+  </p:cSld>
+  <p:clrMapOvr>
+    <a:masterClrMapping/>
+  </p:clrMapOvr>
+  <p:transition>
+    <p:fade/>
+  </p:transition>
+</p:sld>
+</file>
+
+<file path=ppt/slides/slide9.xml><?xml version="1.0" encoding="utf-8"?>
+<p:sld xmlns:a="http://schemas.openxmlformats.org/drawingml/2006/main" xmlns:r="http://schemas.openxmlformats.org/officeDocument/2006/relationships" xmlns:p="http://schemas.openxmlformats.org/presentationml/2006/main">
+  <p:cSld>
+    <p:bg>
+      <p:bgPr>
+        <a:solidFill>
+          <a:schemeClr val="bg1"/>
+        </a:solidFill>
+        <a:effectLst/>
+      </p:bgPr>
+    </p:bg>
+    <p:spTree>
+      <p:nvGrpSpPr>
+        <p:cNvPr id="1" name=""/>
+        <p:cNvGrpSpPr/>
+        <p:nvPr/>
+      </p:nvGrpSpPr>
+      <p:grpSpPr>
+        <a:xfrm>
+          <a:off x="0" y="0"/>
+          <a:ext cx="0" cy="0"/>
+          <a:chOff x="0" y="0"/>
+          <a:chExt cx="0" cy="0"/>
+        </a:xfrm>
+      </p:grpSpPr>
+      <p:pic>
+        <p:nvPicPr>
+          <p:cNvPr id="3" name="Picture 2">
+            <a:extLst>
+              <a:ext uri="{FF2B5EF4-FFF2-40B4-BE49-F238E27FC236}">
+                <a16:creationId xmlns:a16="http://schemas.microsoft.com/office/drawing/2014/main" id="{3AEBD9AA-1EF1-3BDE-68C9-6F338E7E6D31}"/>
+              </a:ext>
+            </a:extLst>
+          </p:cNvPr>
+          <p:cNvPicPr>
+            <a:picLocks noChangeAspect="1"/>
+          </p:cNvPicPr>
+          <p:nvPr/>
+        </p:nvPicPr>
+        <p:blipFill>
+          <a:blip r:embed="rId2">
+            <a:extLst>
+              <a:ext uri="{BEBA8EAE-BF5A-486C-A8C5-ECC9F3942E4B}">
+                <a14:imgProps xmlns:a14="http://schemas.microsoft.com/office/drawing/2010/main">
+                  <a14:imgLayer r:embed="rId3">
+                    <a14:imgEffect>
+                      <a14:backgroundRemoval t="10000" b="92167" l="7000" r="93111">
+                        <a14:foregroundMark x1="12222" y1="21833" x2="28889" y2="24333"/>
+                        <a14:foregroundMark x1="28889" y1="24333" x2="29667" y2="24833"/>
+                        <a14:foregroundMark x1="47111" y1="34667" x2="56778" y2="36667"/>
+                        <a14:foregroundMark x1="56778" y1="36667" x2="67667" y2="31667"/>
+                        <a14:foregroundMark x1="67667" y1="31667" x2="67889" y2="29833"/>
+                        <a14:foregroundMark x1="17222" y1="22833" x2="38222" y2="22167"/>
+                        <a14:foregroundMark x1="38222" y1="22167" x2="50111" y2="22500"/>
+                        <a14:foregroundMark x1="51889" y1="24833" x2="63556" y2="37333"/>
+                        <a14:foregroundMark x1="29444" y1="17333" x2="25111" y2="23833"/>
+                        <a14:foregroundMark x1="25111" y1="23833" x2="23444" y2="29000"/>
+                        <a14:foregroundMark x1="14778" y1="26833" x2="9111" y2="31833"/>
+                        <a14:foregroundMark x1="9667" y1="22833" x2="12222" y2="28000"/>
+                        <a14:foregroundMark x1="10667" y1="15833" x2="11111" y2="31000"/>
+                        <a14:foregroundMark x1="11556" y1="29833" x2="12556" y2="36333"/>
+                        <a14:foregroundMark x1="10111" y1="61667" x2="8889" y2="73833"/>
+                        <a14:foregroundMark x1="8889" y1="73833" x2="37000" y2="70500"/>
+                        <a14:foregroundMark x1="37000" y1="70500" x2="77000" y2="78000"/>
+                        <a14:foregroundMark x1="77000" y1="78000" x2="21111" y2="84333"/>
+                        <a14:foregroundMark x1="21111" y1="84333" x2="71222" y2="86000"/>
+                        <a14:foregroundMark x1="71222" y1="86000" x2="81111" y2="85500"/>
+                        <a14:foregroundMark x1="81111" y1="85500" x2="85667" y2="78167"/>
+                        <a14:foregroundMark x1="85667" y1="78167" x2="86778" y2="67833"/>
+                        <a14:foregroundMark x1="86778" y1="67833" x2="22000" y2="60167"/>
+                        <a14:foregroundMark x1="22000" y1="60167" x2="65111" y2="58000"/>
+                        <a14:foregroundMark x1="65111" y1="58000" x2="85111" y2="59000"/>
+                        <a14:foregroundMark x1="85111" y1="59000" x2="88667" y2="69833"/>
+                        <a14:foregroundMark x1="88667" y1="69833" x2="89444" y2="85833"/>
+                        <a14:foregroundMark x1="89778" y1="85833" x2="90444" y2="63667"/>
+                        <a14:foregroundMark x1="90444" y1="63667" x2="90111" y2="61500"/>
+                        <a14:foregroundMark x1="88111" y1="59333" x2="93222" y2="67833"/>
+                        <a14:foregroundMark x1="93222" y1="67833" x2="93333" y2="71833"/>
+                        <a14:foregroundMark x1="93000" y1="78000" x2="92333" y2="85000"/>
+                        <a14:foregroundMark x1="91111" y1="88667" x2="21333" y2="92333"/>
+                        <a14:foregroundMark x1="21333" y1="92333" x2="10556" y2="86667"/>
+                        <a14:foregroundMark x1="10556" y1="86667" x2="9111" y2="70333"/>
+                        <a14:foregroundMark x1="9111" y1="70333" x2="9889" y2="67500"/>
+                        <a14:foregroundMark x1="7000" y1="72500" x2="7778" y2="80000"/>
+                        <a14:foregroundMark x1="8444" y1="64500" x2="18778" y2="63000"/>
+                        <a14:foregroundMark x1="18778" y1="63000" x2="28778" y2="63000"/>
+                        <a14:foregroundMark x1="25556" y1="62667" x2="57222" y2="62000"/>
+                        <a14:foregroundMark x1="57222" y1="62000" x2="73111" y2="64833"/>
+                        <a14:foregroundMark x1="75889" y1="68833" x2="80667" y2="74500"/>
+                        <a14:foregroundMark x1="80667" y1="74500" x2="82222" y2="75000"/>
+                        <a14:foregroundMark x1="63222" y1="72833" x2="70222" y2="75167"/>
+                        <a14:foregroundMark x1="70222" y1="75167" x2="75111" y2="73500"/>
+                        <a14:foregroundMark x1="64889" y1="75167" x2="71000" y2="76667"/>
+                        <a14:foregroundMark x1="71000" y1="76667" x2="74333" y2="71167"/>
+                        <a14:foregroundMark x1="51444" y1="70000" x2="58556" y2="73167"/>
+                        <a14:foregroundMark x1="15111" y1="59167" x2="9556" y2="61000"/>
+                        <a14:foregroundMark x1="17333" y1="57500" x2="24333" y2="58500"/>
+                        <a14:foregroundMark x1="16778" y1="63000" x2="30333" y2="72833"/>
+                        <a14:foregroundMark x1="42222" y1="76500" x2="71889" y2="76500"/>
+                        <a14:foregroundMark x1="72000" y1="76500" x2="74556" y2="73833"/>
+                        <a14:foregroundMark x1="76000" y1="73500" x2="76222" y2="68833"/>
+                        <a14:foregroundMark x1="7556" y1="13833" x2="16111" y2="24333"/>
+                        <a14:foregroundMark x1="16111" y1="24333" x2="86889" y2="33333"/>
+                        <a14:foregroundMark x1="84778" y1="35333" x2="31444" y2="35667"/>
+                        <a14:foregroundMark x1="16889" y1="37333" x2="56667" y2="39833"/>
+                        <a14:foregroundMark x1="75333" y1="40667" x2="85778" y2="38500"/>
+                        <a14:foregroundMark x1="88333" y1="36167" x2="87000" y2="26333"/>
+                        <a14:foregroundMark x1="87000" y1="26333" x2="67111" y2="20333"/>
+                        <a14:foregroundMark x1="67111" y1="20333" x2="32667" y2="25167"/>
+                        <a14:foregroundMark x1="14111" y1="11500" x2="52000" y2="13000"/>
+                        <a14:foregroundMark x1="52000" y1="13000" x2="70000" y2="11333"/>
+                        <a14:foregroundMark x1="70000" y1="11333" x2="74556" y2="11500"/>
+                        <a14:foregroundMark x1="78000" y1="13333" x2="83333" y2="16833"/>
+                        <a14:foregroundMark x1="83333" y1="16833" x2="87667" y2="22167"/>
+                        <a14:foregroundMark x1="90444" y1="29000" x2="91444" y2="36833"/>
+                        <a14:foregroundMark x1="91667" y1="21333" x2="89444" y2="14333"/>
+                        <a14:foregroundMark x1="86778" y1="13333" x2="65778" y2="12000"/>
+                        <a14:foregroundMark x1="51444" y1="14333" x2="30556" y2="16500"/>
+                        <a14:foregroundMark x1="29889" y1="16500" x2="36333" y2="19167"/>
+                        <a14:foregroundMark x1="41889" y1="23833" x2="24556" y2="29167"/>
+                        <a14:foregroundMark x1="22333" y1="25500" x2="18778" y2="17167"/>
+                        <a14:foregroundMark x1="16111" y1="23000" x2="14444" y2="26833"/>
+                        <a14:foregroundMark x1="7778" y1="13000" x2="7111" y2="34333"/>
+                        <a14:foregroundMark x1="7111" y1="34333" x2="17556" y2="42500"/>
+                        <a14:foregroundMark x1="17556" y1="42500" x2="74444" y2="40000"/>
+                        <a14:foregroundMark x1="74444" y1="40000" x2="81000" y2="40000"/>
+                        <a14:foregroundMark x1="81000" y1="40000" x2="89000" y2="39333"/>
+                        <a14:foregroundMark x1="89000" y1="39333" x2="90889" y2="22667"/>
+                        <a14:foregroundMark x1="90889" y1="22667" x2="82111" y2="17167"/>
+                        <a14:foregroundMark x1="82111" y1="17167" x2="28778" y2="32333"/>
+                        <a14:foregroundMark x1="33667" y1="33667" x2="62889" y2="34500"/>
+                        <a14:foregroundMark x1="53000" y1="32500" x2="34333" y2="30000"/>
+                        <a14:foregroundMark x1="40000" y1="32500" x2="52222" y2="33167"/>
+                        <a14:foregroundMark x1="60222" y1="33000" x2="74444" y2="24500"/>
+                        <a14:foregroundMark x1="74444" y1="23833" x2="76333" y2="27000"/>
+                        <a14:foregroundMark x1="70333" y1="22000" x2="78444" y2="32833"/>
+                        <a14:foregroundMark x1="78889" y1="32833" x2="84111" y2="36500"/>
+                        <a14:foregroundMark x1="86333" y1="38333" x2="86000" y2="38833"/>
+                        <a14:foregroundMark x1="79111" y1="42667" x2="89333" y2="42167"/>
+                        <a14:foregroundMark x1="89333" y1="42167" x2="92333" y2="33000"/>
+                        <a14:foregroundMark x1="92333" y1="33000" x2="91000" y2="16333"/>
+                        <a14:foregroundMark x1="91000" y1="16333" x2="83333" y2="11000"/>
+                        <a14:foregroundMark x1="83333" y1="11000" x2="83000" y2="11000"/>
+                        <a14:foregroundMark x1="60222" y1="14833" x2="26778" y2="13833"/>
+                        <a14:foregroundMark x1="28222" y1="11000" x2="55667" y2="11500"/>
+                        <a14:foregroundMark x1="8556" y1="33833" x2="12111" y2="42333"/>
+                        <a14:foregroundMark x1="18111" y1="31833" x2="21556" y2="37167"/>
+                        <a14:foregroundMark x1="21000" y1="31500" x2="15444" y2="38333"/>
+                        <a14:backgroundMark x1="12778" y1="50500" x2="21000" y2="50333"/>
+                      </a14:backgroundRemoval>
+                    </a14:imgEffect>
+                  </a14:imgLayer>
+                </a14:imgProps>
+              </a:ext>
+            </a:extLst>
+          </a:blip>
+          <a:srcRect t="48000"/>
+          <a:stretch/>
+        </p:blipFill>
+        <p:spPr>
+          <a:xfrm>
+            <a:off x="5924550" y="2197101"/>
+            <a:ext cx="6191250" cy="2146299"/>
+          </a:xfrm>
+          <a:prstGeom prst="rect">
+            <a:avLst/>
+          </a:prstGeom>
+        </p:spPr>
+      </p:pic>
+      <p:pic>
+        <p:nvPicPr>
+          <p:cNvPr id="4" name="Picture 3">
+            <a:extLst>
+              <a:ext uri="{FF2B5EF4-FFF2-40B4-BE49-F238E27FC236}">
+                <a16:creationId xmlns:a16="http://schemas.microsoft.com/office/drawing/2014/main" id="{52840018-4FE4-20DE-00E8-AE7D4A9D814A}"/>
+              </a:ext>
+            </a:extLst>
+          </p:cNvPr>
+          <p:cNvPicPr>
+            <a:picLocks noChangeAspect="1"/>
+          </p:cNvPicPr>
+          <p:nvPr/>
+        </p:nvPicPr>
+        <p:blipFill>
+          <a:blip r:embed="rId2">
+            <a:extLst>
+              <a:ext uri="{BEBA8EAE-BF5A-486C-A8C5-ECC9F3942E4B}">
+                <a14:imgProps xmlns:a14="http://schemas.microsoft.com/office/drawing/2010/main">
+                  <a14:imgLayer r:embed="rId3">
+                    <a14:imgEffect>
+                      <a14:backgroundRemoval t="10000" b="92167" l="7000" r="93111">
+                        <a14:foregroundMark x1="12222" y1="21833" x2="28889" y2="24333"/>
+                        <a14:foregroundMark x1="28889" y1="24333" x2="29667" y2="24833"/>
+                        <a14:foregroundMark x1="47111" y1="34667" x2="56778" y2="36667"/>
+                        <a14:foregroundMark x1="56778" y1="36667" x2="67667" y2="31667"/>
+                        <a14:foregroundMark x1="67667" y1="31667" x2="67889" y2="29833"/>
+                        <a14:foregroundMark x1="17222" y1="22833" x2="38222" y2="22167"/>
+                        <a14:foregroundMark x1="38222" y1="22167" x2="50111" y2="22500"/>
+                        <a14:foregroundMark x1="51889" y1="24833" x2="63556" y2="37333"/>
+                        <a14:foregroundMark x1="29444" y1="17333" x2="25111" y2="23833"/>
+                        <a14:foregroundMark x1="25111" y1="23833" x2="23444" y2="29000"/>
+                        <a14:foregroundMark x1="14778" y1="26833" x2="9111" y2="31833"/>
+                        <a14:foregroundMark x1="9667" y1="22833" x2="12222" y2="28000"/>
+                        <a14:foregroundMark x1="10667" y1="15833" x2="11111" y2="31000"/>
+                        <a14:foregroundMark x1="11556" y1="29833" x2="12556" y2="36333"/>
+                        <a14:foregroundMark x1="10111" y1="61667" x2="8889" y2="73833"/>
+                        <a14:foregroundMark x1="8889" y1="73833" x2="37000" y2="70500"/>
+                        <a14:foregroundMark x1="37000" y1="70500" x2="77000" y2="78000"/>
+                        <a14:foregroundMark x1="77000" y1="78000" x2="21111" y2="84333"/>
+                        <a14:foregroundMark x1="21111" y1="84333" x2="71222" y2="86000"/>
+                        <a14:foregroundMark x1="71222" y1="86000" x2="81111" y2="85500"/>
+                        <a14:foregroundMark x1="81111" y1="85500" x2="85667" y2="78167"/>
+                        <a14:foregroundMark x1="85667" y1="78167" x2="86778" y2="67833"/>
+                        <a14:foregroundMark x1="86778" y1="67833" x2="22000" y2="60167"/>
+                        <a14:foregroundMark x1="22000" y1="60167" x2="65111" y2="58000"/>
+                        <a14:foregroundMark x1="65111" y1="58000" x2="85111" y2="59000"/>
+                        <a14:foregroundMark x1="85111" y1="59000" x2="88667" y2="69833"/>
+                        <a14:foregroundMark x1="88667" y1="69833" x2="89444" y2="85833"/>
+                        <a14:foregroundMark x1="89778" y1="85833" x2="90444" y2="63667"/>
+                        <a14:foregroundMark x1="90444" y1="63667" x2="90111" y2="61500"/>
+                        <a14:foregroundMark x1="88111" y1="59333" x2="93222" y2="67833"/>
+                        <a14:foregroundMark x1="93222" y1="67833" x2="93333" y2="71833"/>
+                        <a14:foregroundMark x1="93000" y1="78000" x2="92333" y2="85000"/>
+                        <a14:foregroundMark x1="91111" y1="88667" x2="21333" y2="92333"/>
+                        <a14:foregroundMark x1="21333" y1="92333" x2="10556" y2="86667"/>
+                        <a14:foregroundMark x1="10556" y1="86667" x2="9111" y2="70333"/>
+                        <a14:foregroundMark x1="9111" y1="70333" x2="9889" y2="67500"/>
+                        <a14:foregroundMark x1="7000" y1="72500" x2="7778" y2="80000"/>
+                        <a14:foregroundMark x1="8444" y1="64500" x2="18778" y2="63000"/>
+                        <a14:foregroundMark x1="18778" y1="63000" x2="28778" y2="63000"/>
+                        <a14:foregroundMark x1="25556" y1="62667" x2="57222" y2="62000"/>
+                        <a14:foregroundMark x1="57222" y1="62000" x2="73111" y2="64833"/>
+                        <a14:foregroundMark x1="75889" y1="68833" x2="80667" y2="74500"/>
+                        <a14:foregroundMark x1="80667" y1="74500" x2="82222" y2="75000"/>
+                        <a14:foregroundMark x1="63222" y1="72833" x2="70222" y2="75167"/>
+                        <a14:foregroundMark x1="70222" y1="75167" x2="75111" y2="73500"/>
+                        <a14:foregroundMark x1="64889" y1="75167" x2="71000" y2="76667"/>
+                        <a14:foregroundMark x1="71000" y1="76667" x2="74333" y2="71167"/>
+                        <a14:foregroundMark x1="51444" y1="70000" x2="58556" y2="73167"/>
+                        <a14:foregroundMark x1="15111" y1="59167" x2="9556" y2="61000"/>
+                        <a14:foregroundMark x1="17333" y1="57500" x2="24333" y2="58500"/>
+                        <a14:foregroundMark x1="16778" y1="63000" x2="30333" y2="72833"/>
+                        <a14:foregroundMark x1="42222" y1="76500" x2="71889" y2="76500"/>
+                        <a14:foregroundMark x1="72000" y1="76500" x2="74556" y2="73833"/>
+                        <a14:foregroundMark x1="76000" y1="73500" x2="76222" y2="68833"/>
+                        <a14:foregroundMark x1="7556" y1="13833" x2="16111" y2="24333"/>
+                        <a14:foregroundMark x1="16111" y1="24333" x2="86889" y2="33333"/>
+                        <a14:foregroundMark x1="84778" y1="35333" x2="31444" y2="35667"/>
+                        <a14:foregroundMark x1="16889" y1="37333" x2="56667" y2="39833"/>
+                        <a14:foregroundMark x1="75333" y1="40667" x2="85778" y2="38500"/>
+                        <a14:foregroundMark x1="88333" y1="36167" x2="87000" y2="26333"/>
+                        <a14:foregroundMark x1="87000" y1="26333" x2="67111" y2="20333"/>
+                        <a14:foregroundMark x1="67111" y1="20333" x2="32667" y2="25167"/>
+                        <a14:foregroundMark x1="14111" y1="11500" x2="52000" y2="13000"/>
+                        <a14:foregroundMark x1="52000" y1="13000" x2="70000" y2="11333"/>
+                        <a14:foregroundMark x1="70000" y1="11333" x2="74556" y2="11500"/>
+                        <a14:foregroundMark x1="78000" y1="13333" x2="83333" y2="16833"/>
+                        <a14:foregroundMark x1="83333" y1="16833" x2="87667" y2="22167"/>
+                        <a14:foregroundMark x1="90444" y1="29000" x2="91444" y2="36833"/>
+                        <a14:foregroundMark x1="91667" y1="21333" x2="89444" y2="14333"/>
+                        <a14:foregroundMark x1="86778" y1="13333" x2="65778" y2="12000"/>
+                        <a14:foregroundMark x1="51444" y1="14333" x2="30556" y2="16500"/>
+                        <a14:foregroundMark x1="29889" y1="16500" x2="36333" y2="19167"/>
+                        <a14:foregroundMark x1="41889" y1="23833" x2="24556" y2="29167"/>
+                        <a14:foregroundMark x1="22333" y1="25500" x2="18778" y2="17167"/>
+                        <a14:foregroundMark x1="16111" y1="23000" x2="14444" y2="26833"/>
+                        <a14:foregroundMark x1="7778" y1="13000" x2="7111" y2="34333"/>
+                        <a14:foregroundMark x1="7111" y1="34333" x2="17556" y2="42500"/>
+                        <a14:foregroundMark x1="17556" y1="42500" x2="74444" y2="40000"/>
+                        <a14:foregroundMark x1="74444" y1="40000" x2="81000" y2="40000"/>
+                        <a14:foregroundMark x1="81000" y1="40000" x2="89000" y2="39333"/>
+                        <a14:foregroundMark x1="89000" y1="39333" x2="90889" y2="22667"/>
+                        <a14:foregroundMark x1="90889" y1="22667" x2="82111" y2="17167"/>
+                        <a14:foregroundMark x1="82111" y1="17167" x2="28778" y2="32333"/>
+                        <a14:foregroundMark x1="33667" y1="33667" x2="62889" y2="34500"/>
+                        <a14:foregroundMark x1="53000" y1="32500" x2="34333" y2="30000"/>
+                        <a14:foregroundMark x1="40000" y1="32500" x2="52222" y2="33167"/>
+                        <a14:foregroundMark x1="60222" y1="33000" x2="74444" y2="24500"/>
+                        <a14:foregroundMark x1="74444" y1="23833" x2="76333" y2="27000"/>
+                        <a14:foregroundMark x1="70333" y1="22000" x2="78444" y2="32833"/>
+                        <a14:foregroundMark x1="78889" y1="32833" x2="84111" y2="36500"/>
+                        <a14:foregroundMark x1="86333" y1="38333" x2="86000" y2="38833"/>
+                        <a14:foregroundMark x1="79111" y1="42667" x2="89333" y2="42167"/>
+                        <a14:foregroundMark x1="89333" y1="42167" x2="92333" y2="33000"/>
+                        <a14:foregroundMark x1="92333" y1="33000" x2="91000" y2="16333"/>
+                        <a14:foregroundMark x1="91000" y1="16333" x2="83333" y2="11000"/>
+                        <a14:foregroundMark x1="83333" y1="11000" x2="83000" y2="11000"/>
+                        <a14:foregroundMark x1="60222" y1="14833" x2="26778" y2="13833"/>
+                        <a14:foregroundMark x1="28222" y1="11000" x2="55667" y2="11500"/>
+                        <a14:foregroundMark x1="8556" y1="33833" x2="12111" y2="42333"/>
+                        <a14:foregroundMark x1="18111" y1="31833" x2="21556" y2="37167"/>
+                        <a14:foregroundMark x1="21000" y1="31500" x2="15444" y2="38333"/>
+                        <a14:backgroundMark x1="12778" y1="50500" x2="21000" y2="50333"/>
+                      </a14:backgroundRemoval>
+                    </a14:imgEffect>
+                  </a14:imgLayer>
+                </a14:imgProps>
+              </a:ext>
+            </a:extLst>
+          </a:blip>
+          <a:srcRect b="50154"/>
+          <a:stretch/>
+        </p:blipFill>
+        <p:spPr>
+          <a:xfrm>
+            <a:off x="76200" y="2155189"/>
+            <a:ext cx="6191250" cy="2057400"/>
+          </a:xfrm>
+          <a:prstGeom prst="rect">
+            <a:avLst/>
+          </a:prstGeom>
+        </p:spPr>
+      </p:pic>
+    </p:spTree>
+    <p:extLst>
+      <p:ext uri="{BB962C8B-B14F-4D97-AF65-F5344CB8AC3E}">
+        <p14:creationId xmlns:p14="http://schemas.microsoft.com/office/powerpoint/2010/main" val="3827809617"/>
+      </p:ext>
+    </p:extLst>
+  </p:cSld>
+  <p:clrMapOvr>
+    <a:masterClrMapping/>
+  </p:clrMapOvr>
+  <p:transition>
+    <p:fade/>
+  </p:transition>
+</p:sld>
+</file>
+
 <file path=ppt/theme/theme1.xml><?xml version="1.0" encoding="utf-8"?>
 <a:theme xmlns:a="http://schemas.openxmlformats.org/drawingml/2006/main" name="Office Theme">
   <a:themeElements>

</xml_diff>

<commit_message>
Eighth Commit - BE
Add page from FE
</commit_message>
<xml_diff>
--- a/src/main/webapp/asset/descriptionfor web/TechZone.pptx
+++ b/src/main/webapp/asset/descriptionfor web/TechZone.pptx
@@ -13,7 +13,8 @@
     <p:sldId id="261" r:id="rId7"/>
     <p:sldId id="262" r:id="rId8"/>
     <p:sldId id="263" r:id="rId9"/>
-    <p:sldId id="264" r:id="rId10"/>
+    <p:sldId id="265" r:id="rId10"/>
+    <p:sldId id="264" r:id="rId11"/>
   </p:sldIdLst>
   <p:sldSz cx="12192000" cy="6858000"/>
   <p:notesSz cx="6858000" cy="9144000"/>
@@ -267,7 +268,7 @@
           <a:p>
             <a:fld id="{B9911F21-AB9B-4E47-BFED-F9E6E1164517}" type="datetimeFigureOut">
               <a:rPr lang="en-US" smtClean="0"/>
-              <a:t>9/9/2024</a:t>
+              <a:t>18/9/2024</a:t>
             </a:fld>
             <a:endParaRPr lang="en-US"/>
           </a:p>
@@ -465,7 +466,7 @@
           <a:p>
             <a:fld id="{B9911F21-AB9B-4E47-BFED-F9E6E1164517}" type="datetimeFigureOut">
               <a:rPr lang="en-US" smtClean="0"/>
-              <a:t>9/9/2024</a:t>
+              <a:t>18/9/2024</a:t>
             </a:fld>
             <a:endParaRPr lang="en-US"/>
           </a:p>
@@ -673,7 +674,7 @@
           <a:p>
             <a:fld id="{B9911F21-AB9B-4E47-BFED-F9E6E1164517}" type="datetimeFigureOut">
               <a:rPr lang="en-US" smtClean="0"/>
-              <a:t>9/9/2024</a:t>
+              <a:t>18/9/2024</a:t>
             </a:fld>
             <a:endParaRPr lang="en-US"/>
           </a:p>
@@ -871,7 +872,7 @@
           <a:p>
             <a:fld id="{B9911F21-AB9B-4E47-BFED-F9E6E1164517}" type="datetimeFigureOut">
               <a:rPr lang="en-US" smtClean="0"/>
-              <a:t>9/9/2024</a:t>
+              <a:t>18/9/2024</a:t>
             </a:fld>
             <a:endParaRPr lang="en-US"/>
           </a:p>
@@ -1146,7 +1147,7 @@
           <a:p>
             <a:fld id="{B9911F21-AB9B-4E47-BFED-F9E6E1164517}" type="datetimeFigureOut">
               <a:rPr lang="en-US" smtClean="0"/>
-              <a:t>9/9/2024</a:t>
+              <a:t>18/9/2024</a:t>
             </a:fld>
             <a:endParaRPr lang="en-US"/>
           </a:p>
@@ -1411,7 +1412,7 @@
           <a:p>
             <a:fld id="{B9911F21-AB9B-4E47-BFED-F9E6E1164517}" type="datetimeFigureOut">
               <a:rPr lang="en-US" smtClean="0"/>
-              <a:t>9/9/2024</a:t>
+              <a:t>18/9/2024</a:t>
             </a:fld>
             <a:endParaRPr lang="en-US"/>
           </a:p>
@@ -1823,7 +1824,7 @@
           <a:p>
             <a:fld id="{B9911F21-AB9B-4E47-BFED-F9E6E1164517}" type="datetimeFigureOut">
               <a:rPr lang="en-US" smtClean="0"/>
-              <a:t>9/9/2024</a:t>
+              <a:t>18/9/2024</a:t>
             </a:fld>
             <a:endParaRPr lang="en-US"/>
           </a:p>
@@ -1964,7 +1965,7 @@
           <a:p>
             <a:fld id="{B9911F21-AB9B-4E47-BFED-F9E6E1164517}" type="datetimeFigureOut">
               <a:rPr lang="en-US" smtClean="0"/>
-              <a:t>9/9/2024</a:t>
+              <a:t>18/9/2024</a:t>
             </a:fld>
             <a:endParaRPr lang="en-US"/>
           </a:p>
@@ -2077,7 +2078,7 @@
           <a:p>
             <a:fld id="{B9911F21-AB9B-4E47-BFED-F9E6E1164517}" type="datetimeFigureOut">
               <a:rPr lang="en-US" smtClean="0"/>
-              <a:t>9/9/2024</a:t>
+              <a:t>18/9/2024</a:t>
             </a:fld>
             <a:endParaRPr lang="en-US"/>
           </a:p>
@@ -2388,7 +2389,7 @@
           <a:p>
             <a:fld id="{B9911F21-AB9B-4E47-BFED-F9E6E1164517}" type="datetimeFigureOut">
               <a:rPr lang="en-US" smtClean="0"/>
-              <a:t>9/9/2024</a:t>
+              <a:t>18/9/2024</a:t>
             </a:fld>
             <a:endParaRPr lang="en-US"/>
           </a:p>
@@ -2676,7 +2677,7 @@
           <a:p>
             <a:fld id="{B9911F21-AB9B-4E47-BFED-F9E6E1164517}" type="datetimeFigureOut">
               <a:rPr lang="en-US" smtClean="0"/>
-              <a:t>9/9/2024</a:t>
+              <a:t>18/9/2024</a:t>
             </a:fld>
             <a:endParaRPr lang="en-US"/>
           </a:p>
@@ -2773,10 +2774,10 @@
       </p:grpSpPr>
       <p:sp>
         <p:nvSpPr>
-          <p:cNvPr id="7" name="9Slide.vn - 2019">
-            <a:extLst>
-              <a:ext uri="{FF2B5EF4-FFF2-40B4-BE49-F238E27FC236}">
-                <a16:creationId xmlns:a16="http://schemas.microsoft.com/office/drawing/2014/main" id="{8CD8093B-7E96-17BC-0F05-BC1E55D93566}"/>
+          <p:cNvPr id="8" name="9Slide.vn - 2019">
+            <a:extLst>
+              <a:ext uri="{FF2B5EF4-FFF2-40B4-BE49-F238E27FC236}">
+                <a16:creationId xmlns:a16="http://schemas.microsoft.com/office/drawing/2014/main" id="{6AE071FF-2697-5DB1-11A4-C7EFA658BA0D}"/>
               </a:ext>
             </a:extLst>
           </p:cNvPr>
@@ -2957,7 +2958,7 @@
           <a:p>
             <a:fld id="{B9911F21-AB9B-4E47-BFED-F9E6E1164517}" type="datetimeFigureOut">
               <a:rPr lang="en-US" smtClean="0"/>
-              <a:t>9/9/2024</a:t>
+              <a:t>18/9/2024</a:t>
             </a:fld>
             <a:endParaRPr lang="en-US"/>
           </a:p>
@@ -3611,1818 +3612,7 @@
 </p:sld>
 </file>
 
-<file path=ppt/slides/slide2.xml><?xml version="1.0" encoding="utf-8"?>
-<p:sld xmlns:a="http://schemas.openxmlformats.org/drawingml/2006/main" xmlns:r="http://schemas.openxmlformats.org/officeDocument/2006/relationships" xmlns:p="http://schemas.openxmlformats.org/presentationml/2006/main">
-  <p:cSld>
-    <p:bg>
-      <p:bgPr>
-        <a:solidFill>
-          <a:srgbClr val="FDC62E"/>
-        </a:solidFill>
-        <a:effectLst/>
-      </p:bgPr>
-    </p:bg>
-    <p:spTree>
-      <p:nvGrpSpPr>
-        <p:cNvPr id="1" name=""/>
-        <p:cNvGrpSpPr/>
-        <p:nvPr/>
-      </p:nvGrpSpPr>
-      <p:grpSpPr>
-        <a:xfrm>
-          <a:off x="0" y="0"/>
-          <a:ext cx="0" cy="0"/>
-          <a:chOff x="0" y="0"/>
-          <a:chExt cx="0" cy="0"/>
-        </a:xfrm>
-      </p:grpSpPr>
-      <p:sp>
-        <p:nvSpPr>
-          <p:cNvPr id="8" name="TextBox 7">
-            <a:extLst>
-              <a:ext uri="{FF2B5EF4-FFF2-40B4-BE49-F238E27FC236}">
-                <a16:creationId xmlns:a16="http://schemas.microsoft.com/office/drawing/2014/main" id="{353E4F0D-BFFE-6C18-B38E-8C617031EC35}"/>
-              </a:ext>
-            </a:extLst>
-          </p:cNvPr>
-          <p:cNvSpPr txBox="1"/>
-          <p:nvPr/>
-        </p:nvSpPr>
-        <p:spPr>
-          <a:xfrm>
-            <a:off x="3504623" y="2791361"/>
-            <a:ext cx="2896177" cy="1323439"/>
-          </a:xfrm>
-          <a:prstGeom prst="rect">
-            <a:avLst/>
-          </a:prstGeom>
-          <a:noFill/>
-        </p:spPr>
-        <p:txBody>
-          <a:bodyPr wrap="none" rtlCol="0">
-            <a:spAutoFit/>
-          </a:bodyPr>
-          <a:lstStyle/>
-          <a:p>
-            <a:r>
-              <a:rPr lang="en-US" sz="8000" b="1">
-                <a:solidFill>
-                  <a:schemeClr val="accent4">
-                    <a:lumMod val="50000"/>
-                  </a:schemeClr>
-                </a:solidFill>
-              </a:rPr>
-              <a:t>Watch</a:t>
-            </a:r>
-          </a:p>
-        </p:txBody>
-      </p:sp>
-      <p:sp>
-        <p:nvSpPr>
-          <p:cNvPr id="7" name="TextBox 6">
-            <a:extLst>
-              <a:ext uri="{FF2B5EF4-FFF2-40B4-BE49-F238E27FC236}">
-                <a16:creationId xmlns:a16="http://schemas.microsoft.com/office/drawing/2014/main" id="{50102003-AB3D-F1A7-B8D1-C16B59A8E312}"/>
-              </a:ext>
-            </a:extLst>
-          </p:cNvPr>
-          <p:cNvSpPr txBox="1"/>
-          <p:nvPr/>
-        </p:nvSpPr>
-        <p:spPr>
-          <a:xfrm>
-            <a:off x="3998796" y="2110773"/>
-            <a:ext cx="2237279" cy="1200329"/>
-          </a:xfrm>
-          <a:prstGeom prst="rect">
-            <a:avLst/>
-          </a:prstGeom>
-          <a:noFill/>
-        </p:spPr>
-        <p:txBody>
-          <a:bodyPr wrap="none" rtlCol="0">
-            <a:spAutoFit/>
-          </a:bodyPr>
-          <a:lstStyle/>
-          <a:p>
-            <a:r>
-              <a:rPr lang="en-US" sz="7200" b="1">
-                <a:solidFill>
-                  <a:schemeClr val="accent4">
-                    <a:lumMod val="20000"/>
-                    <a:lumOff val="80000"/>
-                  </a:schemeClr>
-                </a:solidFill>
-              </a:rPr>
-              <a:t>Wear</a:t>
-            </a:r>
-            <a:endParaRPr lang="en-US" sz="8800" b="1">
-              <a:solidFill>
-                <a:schemeClr val="accent4">
-                  <a:lumMod val="20000"/>
-                  <a:lumOff val="80000"/>
-                </a:schemeClr>
-              </a:solidFill>
-            </a:endParaRPr>
-          </a:p>
-        </p:txBody>
-      </p:sp>
-      <p:sp>
-        <p:nvSpPr>
-          <p:cNvPr id="6" name="TextBox 5">
-            <a:extLst>
-              <a:ext uri="{FF2B5EF4-FFF2-40B4-BE49-F238E27FC236}">
-                <a16:creationId xmlns:a16="http://schemas.microsoft.com/office/drawing/2014/main" id="{386F93B7-8598-88AC-AC80-7B9180BE846C}"/>
-              </a:ext>
-            </a:extLst>
-          </p:cNvPr>
-          <p:cNvSpPr txBox="1"/>
-          <p:nvPr/>
-        </p:nvSpPr>
-        <p:spPr>
-          <a:xfrm>
-            <a:off x="4351707" y="1600200"/>
-            <a:ext cx="1802738" cy="1015663"/>
-          </a:xfrm>
-          <a:prstGeom prst="rect">
-            <a:avLst/>
-          </a:prstGeom>
-          <a:noFill/>
-        </p:spPr>
-        <p:txBody>
-          <a:bodyPr wrap="none" rtlCol="0">
-            <a:spAutoFit/>
-          </a:bodyPr>
-          <a:lstStyle/>
-          <a:p>
-            <a:r>
-              <a:rPr lang="en-US" sz="6000" b="1">
-                <a:solidFill>
-                  <a:schemeClr val="bg1"/>
-                </a:solidFill>
-              </a:rPr>
-              <a:t>want</a:t>
-            </a:r>
-            <a:endParaRPr lang="en-US" sz="5400" b="1">
-              <a:solidFill>
-                <a:schemeClr val="bg1"/>
-              </a:solidFill>
-            </a:endParaRPr>
-          </a:p>
-        </p:txBody>
-      </p:sp>
-      <p:pic>
-        <p:nvPicPr>
-          <p:cNvPr id="3" name="Picture 2">
-            <a:extLst>
-              <a:ext uri="{FF2B5EF4-FFF2-40B4-BE49-F238E27FC236}">
-                <a16:creationId xmlns:a16="http://schemas.microsoft.com/office/drawing/2014/main" id="{3C414805-8991-6485-D786-B1183421DAF0}"/>
-              </a:ext>
-            </a:extLst>
-          </p:cNvPr>
-          <p:cNvPicPr>
-            <a:picLocks noChangeAspect="1"/>
-          </p:cNvPicPr>
-          <p:nvPr/>
-        </p:nvPicPr>
-        <p:blipFill>
-          <a:blip r:embed="rId2">
-            <a:extLst>
-              <a:ext uri="{28A0092B-C50C-407E-A947-70E740481C1C}">
-                <a14:useLocalDpi xmlns:a14="http://schemas.microsoft.com/office/drawing/2010/main" val="0"/>
-              </a:ext>
-            </a:extLst>
-          </a:blip>
-          <a:stretch>
-            <a:fillRect/>
-          </a:stretch>
-        </p:blipFill>
-        <p:spPr>
-          <a:xfrm>
-            <a:off x="5943600" y="1022730"/>
-            <a:ext cx="2742011" cy="3662362"/>
-          </a:xfrm>
-          <a:prstGeom prst="rect">
-            <a:avLst/>
-          </a:prstGeom>
-        </p:spPr>
-      </p:pic>
-      <p:sp>
-        <p:nvSpPr>
-          <p:cNvPr id="4" name="Rectangle 3">
-            <a:extLst>
-              <a:ext uri="{FF2B5EF4-FFF2-40B4-BE49-F238E27FC236}">
-                <a16:creationId xmlns:a16="http://schemas.microsoft.com/office/drawing/2014/main" id="{6B1146AE-003A-4DF7-D65A-C995D09D51C9}"/>
-              </a:ext>
-            </a:extLst>
-          </p:cNvPr>
-          <p:cNvSpPr/>
-          <p:nvPr/>
-        </p:nvSpPr>
-        <p:spPr>
-          <a:xfrm>
-            <a:off x="4648200" y="6172200"/>
-            <a:ext cx="3518195" cy="896788"/>
-          </a:xfrm>
-          <a:prstGeom prst="rect">
-            <a:avLst/>
-          </a:prstGeom>
-        </p:spPr>
-        <p:style>
-          <a:lnRef idx="2">
-            <a:schemeClr val="accent1">
-              <a:shade val="15000"/>
-            </a:schemeClr>
-          </a:lnRef>
-          <a:fillRef idx="1">
-            <a:schemeClr val="accent1"/>
-          </a:fillRef>
-          <a:effectRef idx="0">
-            <a:schemeClr val="accent1"/>
-          </a:effectRef>
-          <a:fontRef idx="minor">
-            <a:schemeClr val="lt1"/>
-          </a:fontRef>
-        </p:style>
-        <p:txBody>
-          <a:bodyPr rtlCol="0" anchor="ctr"/>
-          <a:lstStyle/>
-          <a:p>
-            <a:pPr algn="ctr"/>
-            <a:endParaRPr lang="en-US"/>
-          </a:p>
-        </p:txBody>
-      </p:sp>
-      <p:sp>
-        <p:nvSpPr>
-          <p:cNvPr id="9" name="Rectangle 8">
-            <a:extLst>
-              <a:ext uri="{FF2B5EF4-FFF2-40B4-BE49-F238E27FC236}">
-                <a16:creationId xmlns:a16="http://schemas.microsoft.com/office/drawing/2014/main" id="{D07B64A4-683D-918E-1344-22DFF1F000F1}"/>
-              </a:ext>
-            </a:extLst>
-          </p:cNvPr>
-          <p:cNvSpPr/>
-          <p:nvPr/>
-        </p:nvSpPr>
-        <p:spPr>
-          <a:xfrm>
-            <a:off x="4641702" y="-403767"/>
-            <a:ext cx="3518195" cy="896788"/>
-          </a:xfrm>
-          <a:prstGeom prst="rect">
-            <a:avLst/>
-          </a:prstGeom>
-        </p:spPr>
-        <p:style>
-          <a:lnRef idx="2">
-            <a:schemeClr val="accent1">
-              <a:shade val="15000"/>
-            </a:schemeClr>
-          </a:lnRef>
-          <a:fillRef idx="1">
-            <a:schemeClr val="accent1"/>
-          </a:fillRef>
-          <a:effectRef idx="0">
-            <a:schemeClr val="accent1"/>
-          </a:effectRef>
-          <a:fontRef idx="minor">
-            <a:schemeClr val="lt1"/>
-          </a:fontRef>
-        </p:style>
-        <p:txBody>
-          <a:bodyPr rtlCol="0" anchor="ctr"/>
-          <a:lstStyle/>
-          <a:p>
-            <a:pPr algn="ctr"/>
-            <a:endParaRPr lang="en-US"/>
-          </a:p>
-        </p:txBody>
-      </p:sp>
-    </p:spTree>
-    <p:extLst>
-      <p:ext uri="{BB962C8B-B14F-4D97-AF65-F5344CB8AC3E}">
-        <p14:creationId xmlns:p14="http://schemas.microsoft.com/office/powerpoint/2010/main" val="1756301127"/>
-      </p:ext>
-    </p:extLst>
-  </p:cSld>
-  <p:clrMapOvr>
-    <a:masterClrMapping/>
-  </p:clrMapOvr>
-  <p:transition>
-    <p:fade/>
-  </p:transition>
-</p:sld>
-</file>
-
-<file path=ppt/slides/slide3.xml><?xml version="1.0" encoding="utf-8"?>
-<p:sld xmlns:a="http://schemas.openxmlformats.org/drawingml/2006/main" xmlns:r="http://schemas.openxmlformats.org/officeDocument/2006/relationships" xmlns:p="http://schemas.openxmlformats.org/presentationml/2006/main">
-  <p:cSld>
-    <p:bg>
-      <p:bgPr>
-        <a:solidFill>
-          <a:srgbClr val="F42C37"/>
-        </a:solidFill>
-        <a:effectLst/>
-      </p:bgPr>
-    </p:bg>
-    <p:spTree>
-      <p:nvGrpSpPr>
-        <p:cNvPr id="1" name=""/>
-        <p:cNvGrpSpPr/>
-        <p:nvPr/>
-      </p:nvGrpSpPr>
-      <p:grpSpPr>
-        <a:xfrm>
-          <a:off x="0" y="0"/>
-          <a:ext cx="0" cy="0"/>
-          <a:chOff x="0" y="0"/>
-          <a:chExt cx="0" cy="0"/>
-        </a:xfrm>
-      </p:grpSpPr>
-      <p:sp>
-        <p:nvSpPr>
-          <p:cNvPr id="8" name="TextBox 7">
-            <a:extLst>
-              <a:ext uri="{FF2B5EF4-FFF2-40B4-BE49-F238E27FC236}">
-                <a16:creationId xmlns:a16="http://schemas.microsoft.com/office/drawing/2014/main" id="{353E4F0D-BFFE-6C18-B38E-8C617031EC35}"/>
-              </a:ext>
-            </a:extLst>
-          </p:cNvPr>
-          <p:cNvSpPr txBox="1"/>
-          <p:nvPr/>
-        </p:nvSpPr>
-        <p:spPr>
-          <a:xfrm>
-            <a:off x="4191000" y="1956375"/>
-            <a:ext cx="2673681" cy="1015663"/>
-          </a:xfrm>
-          <a:prstGeom prst="rect">
-            <a:avLst/>
-          </a:prstGeom>
-          <a:noFill/>
-        </p:spPr>
-        <p:txBody>
-          <a:bodyPr wrap="none" rtlCol="0">
-            <a:spAutoFit/>
-          </a:bodyPr>
-          <a:lstStyle/>
-          <a:p>
-            <a:r>
-              <a:rPr lang="en-US" sz="6000" b="1">
-                <a:solidFill>
-                  <a:srgbClr val="FF7D7D"/>
-                </a:solidFill>
-              </a:rPr>
-              <a:t>LAPTOP</a:t>
-            </a:r>
-            <a:endParaRPr lang="en-US" sz="7200" b="1">
-              <a:solidFill>
-                <a:srgbClr val="FF7D7D"/>
-              </a:solidFill>
-            </a:endParaRPr>
-          </a:p>
-        </p:txBody>
-      </p:sp>
-      <p:sp>
-        <p:nvSpPr>
-          <p:cNvPr id="7" name="TextBox 6">
-            <a:extLst>
-              <a:ext uri="{FF2B5EF4-FFF2-40B4-BE49-F238E27FC236}">
-                <a16:creationId xmlns:a16="http://schemas.microsoft.com/office/drawing/2014/main" id="{50102003-AB3D-F1A7-B8D1-C16B59A8E312}"/>
-              </a:ext>
-            </a:extLst>
-          </p:cNvPr>
-          <p:cNvSpPr txBox="1"/>
-          <p:nvPr/>
-        </p:nvSpPr>
-        <p:spPr>
-          <a:xfrm>
-            <a:off x="4589983" y="1553289"/>
-            <a:ext cx="1810817" cy="707886"/>
-          </a:xfrm>
-          <a:prstGeom prst="rect">
-            <a:avLst/>
-          </a:prstGeom>
-          <a:noFill/>
-        </p:spPr>
-        <p:txBody>
-          <a:bodyPr wrap="none" rtlCol="0">
-            <a:spAutoFit/>
-          </a:bodyPr>
-          <a:lstStyle/>
-          <a:p>
-            <a:r>
-              <a:rPr lang="en-US" sz="4000" b="1">
-                <a:solidFill>
-                  <a:schemeClr val="bg1"/>
-                </a:solidFill>
-              </a:rPr>
-              <a:t>Devices</a:t>
-            </a:r>
-            <a:endParaRPr lang="en-US" sz="6000" b="1">
-              <a:solidFill>
-                <a:schemeClr val="bg1"/>
-              </a:solidFill>
-            </a:endParaRPr>
-          </a:p>
-        </p:txBody>
-      </p:sp>
-      <p:sp>
-        <p:nvSpPr>
-          <p:cNvPr id="6" name="TextBox 5">
-            <a:extLst>
-              <a:ext uri="{FF2B5EF4-FFF2-40B4-BE49-F238E27FC236}">
-                <a16:creationId xmlns:a16="http://schemas.microsoft.com/office/drawing/2014/main" id="{386F93B7-8598-88AC-AC80-7B9180BE846C}"/>
-              </a:ext>
-            </a:extLst>
-          </p:cNvPr>
-          <p:cNvSpPr txBox="1"/>
-          <p:nvPr/>
-        </p:nvSpPr>
-        <p:spPr>
-          <a:xfrm>
-            <a:off x="4979322" y="1143000"/>
-            <a:ext cx="1040478" cy="584775"/>
-          </a:xfrm>
-          <a:prstGeom prst="rect">
-            <a:avLst/>
-          </a:prstGeom>
-          <a:noFill/>
-        </p:spPr>
-        <p:txBody>
-          <a:bodyPr wrap="none" rtlCol="0">
-            <a:spAutoFit/>
-          </a:bodyPr>
-          <a:lstStyle/>
-          <a:p>
-            <a:r>
-              <a:rPr lang="en-US" sz="3200" b="1">
-                <a:solidFill>
-                  <a:schemeClr val="bg1"/>
-                </a:solidFill>
-              </a:rPr>
-              <a:t>Tried</a:t>
-            </a:r>
-            <a:endParaRPr lang="en-US" sz="4400" b="1">
-              <a:solidFill>
-                <a:schemeClr val="bg1"/>
-              </a:solidFill>
-            </a:endParaRPr>
-          </a:p>
-        </p:txBody>
-      </p:sp>
-      <p:sp>
-        <p:nvSpPr>
-          <p:cNvPr id="4" name="Rectangle 3">
-            <a:extLst>
-              <a:ext uri="{FF2B5EF4-FFF2-40B4-BE49-F238E27FC236}">
-                <a16:creationId xmlns:a16="http://schemas.microsoft.com/office/drawing/2014/main" id="{6B1146AE-003A-4DF7-D65A-C995D09D51C9}"/>
-              </a:ext>
-            </a:extLst>
-          </p:cNvPr>
-          <p:cNvSpPr/>
-          <p:nvPr/>
-        </p:nvSpPr>
-        <p:spPr>
-          <a:xfrm>
-            <a:off x="4648200" y="6172200"/>
-            <a:ext cx="3518195" cy="896788"/>
-          </a:xfrm>
-          <a:prstGeom prst="rect">
-            <a:avLst/>
-          </a:prstGeom>
-        </p:spPr>
-        <p:style>
-          <a:lnRef idx="2">
-            <a:schemeClr val="accent1">
-              <a:shade val="15000"/>
-            </a:schemeClr>
-          </a:lnRef>
-          <a:fillRef idx="1">
-            <a:schemeClr val="accent1"/>
-          </a:fillRef>
-          <a:effectRef idx="0">
-            <a:schemeClr val="accent1"/>
-          </a:effectRef>
-          <a:fontRef idx="minor">
-            <a:schemeClr val="lt1"/>
-          </a:fontRef>
-        </p:style>
-        <p:txBody>
-          <a:bodyPr rtlCol="0" anchor="ctr"/>
-          <a:lstStyle/>
-          <a:p>
-            <a:pPr algn="ctr"/>
-            <a:endParaRPr lang="en-US"/>
-          </a:p>
-        </p:txBody>
-      </p:sp>
-      <p:sp>
-        <p:nvSpPr>
-          <p:cNvPr id="9" name="Rectangle 8">
-            <a:extLst>
-              <a:ext uri="{FF2B5EF4-FFF2-40B4-BE49-F238E27FC236}">
-                <a16:creationId xmlns:a16="http://schemas.microsoft.com/office/drawing/2014/main" id="{D07B64A4-683D-918E-1344-22DFF1F000F1}"/>
-              </a:ext>
-            </a:extLst>
-          </p:cNvPr>
-          <p:cNvSpPr/>
-          <p:nvPr/>
-        </p:nvSpPr>
-        <p:spPr>
-          <a:xfrm>
-            <a:off x="4641702" y="-403767"/>
-            <a:ext cx="3518195" cy="896788"/>
-          </a:xfrm>
-          <a:prstGeom prst="rect">
-            <a:avLst/>
-          </a:prstGeom>
-        </p:spPr>
-        <p:style>
-          <a:lnRef idx="2">
-            <a:schemeClr val="accent1">
-              <a:shade val="15000"/>
-            </a:schemeClr>
-          </a:lnRef>
-          <a:fillRef idx="1">
-            <a:schemeClr val="accent1"/>
-          </a:fillRef>
-          <a:effectRef idx="0">
-            <a:schemeClr val="accent1"/>
-          </a:effectRef>
-          <a:fontRef idx="minor">
-            <a:schemeClr val="lt1"/>
-          </a:fontRef>
-        </p:style>
-        <p:txBody>
-          <a:bodyPr rtlCol="0" anchor="ctr"/>
-          <a:lstStyle/>
-          <a:p>
-            <a:pPr algn="ctr"/>
-            <a:endParaRPr lang="en-US"/>
-          </a:p>
-        </p:txBody>
-      </p:sp>
-      <p:pic>
-        <p:nvPicPr>
-          <p:cNvPr id="11" name="Picture 10">
-            <a:extLst>
-              <a:ext uri="{FF2B5EF4-FFF2-40B4-BE49-F238E27FC236}">
-                <a16:creationId xmlns:a16="http://schemas.microsoft.com/office/drawing/2014/main" id="{F25FC69B-3FE4-12DA-9E38-90BE27F11F5C}"/>
-              </a:ext>
-            </a:extLst>
-          </p:cNvPr>
-          <p:cNvPicPr>
-            <a:picLocks noChangeAspect="1"/>
-          </p:cNvPicPr>
-          <p:nvPr/>
-        </p:nvPicPr>
-        <p:blipFill>
-          <a:blip r:embed="rId2">
-            <a:extLst>
-              <a:ext uri="{28A0092B-C50C-407E-A947-70E740481C1C}">
-                <a14:useLocalDpi xmlns:a14="http://schemas.microsoft.com/office/drawing/2010/main" val="0"/>
-              </a:ext>
-            </a:extLst>
-          </a:blip>
-          <a:stretch>
-            <a:fillRect/>
-          </a:stretch>
-        </p:blipFill>
-        <p:spPr>
-          <a:xfrm>
-            <a:off x="6781800" y="877179"/>
-            <a:ext cx="3276600" cy="2170821"/>
-          </a:xfrm>
-          <a:prstGeom prst="rect">
-            <a:avLst/>
-          </a:prstGeom>
-        </p:spPr>
-      </p:pic>
-      <p:pic>
-        <p:nvPicPr>
-          <p:cNvPr id="13" name="Picture 12">
-            <a:extLst>
-              <a:ext uri="{FF2B5EF4-FFF2-40B4-BE49-F238E27FC236}">
-                <a16:creationId xmlns:a16="http://schemas.microsoft.com/office/drawing/2014/main" id="{D88C3B45-B9BC-E201-B2FA-546931CCAEAF}"/>
-              </a:ext>
-            </a:extLst>
-          </p:cNvPr>
-          <p:cNvPicPr>
-            <a:picLocks noChangeAspect="1"/>
-          </p:cNvPicPr>
-          <p:nvPr/>
-        </p:nvPicPr>
-        <p:blipFill>
-          <a:blip r:embed="rId3">
-            <a:extLst>
-              <a:ext uri="{28A0092B-C50C-407E-A947-70E740481C1C}">
-                <a14:useLocalDpi xmlns:a14="http://schemas.microsoft.com/office/drawing/2010/main" val="0"/>
-              </a:ext>
-            </a:extLst>
-          </a:blip>
-          <a:stretch>
-            <a:fillRect/>
-          </a:stretch>
-        </p:blipFill>
-        <p:spPr>
-          <a:xfrm>
-            <a:off x="1261318" y="766454"/>
-            <a:ext cx="2415332" cy="1824346"/>
-          </a:xfrm>
-          <a:prstGeom prst="rect">
-            <a:avLst/>
-          </a:prstGeom>
-        </p:spPr>
-      </p:pic>
-    </p:spTree>
-    <p:extLst>
-      <p:ext uri="{BB962C8B-B14F-4D97-AF65-F5344CB8AC3E}">
-        <p14:creationId xmlns:p14="http://schemas.microsoft.com/office/powerpoint/2010/main" val="1881749533"/>
-      </p:ext>
-    </p:extLst>
-  </p:cSld>
-  <p:clrMapOvr>
-    <a:masterClrMapping/>
-  </p:clrMapOvr>
-  <p:transition>
-    <p:fade/>
-  </p:transition>
-</p:sld>
-</file>
-
-<file path=ppt/slides/slide4.xml><?xml version="1.0" encoding="utf-8"?>
-<p:sld xmlns:a="http://schemas.openxmlformats.org/drawingml/2006/main" xmlns:r="http://schemas.openxmlformats.org/officeDocument/2006/relationships" xmlns:p="http://schemas.openxmlformats.org/presentationml/2006/main">
-  <p:cSld>
-    <p:bg>
-      <p:bgPr>
-        <a:solidFill>
-          <a:srgbClr val="D9D9D9"/>
-        </a:solidFill>
-        <a:effectLst/>
-      </p:bgPr>
-    </p:bg>
-    <p:spTree>
-      <p:nvGrpSpPr>
-        <p:cNvPr id="1" name=""/>
-        <p:cNvGrpSpPr/>
-        <p:nvPr/>
-      </p:nvGrpSpPr>
-      <p:grpSpPr>
-        <a:xfrm>
-          <a:off x="0" y="0"/>
-          <a:ext cx="0" cy="0"/>
-          <a:chOff x="0" y="0"/>
-          <a:chExt cx="0" cy="0"/>
-        </a:xfrm>
-      </p:grpSpPr>
-      <p:sp>
-        <p:nvSpPr>
-          <p:cNvPr id="8" name="TextBox 7">
-            <a:extLst>
-              <a:ext uri="{FF2B5EF4-FFF2-40B4-BE49-F238E27FC236}">
-                <a16:creationId xmlns:a16="http://schemas.microsoft.com/office/drawing/2014/main" id="{353E4F0D-BFFE-6C18-B38E-8C617031EC35}"/>
-              </a:ext>
-            </a:extLst>
-          </p:cNvPr>
-          <p:cNvSpPr txBox="1"/>
-          <p:nvPr/>
-        </p:nvSpPr>
-        <p:spPr>
-          <a:xfrm>
-            <a:off x="3146996" y="762000"/>
-            <a:ext cx="4776681" cy="1569660"/>
-          </a:xfrm>
-          <a:prstGeom prst="rect">
-            <a:avLst/>
-          </a:prstGeom>
-          <a:noFill/>
-        </p:spPr>
-        <p:txBody>
-          <a:bodyPr wrap="square" rtlCol="0">
-            <a:spAutoFit/>
-          </a:bodyPr>
-          <a:lstStyle/>
-          <a:p>
-            <a:r>
-              <a:rPr lang="en-US" sz="9600" b="1">
-                <a:solidFill>
-                  <a:schemeClr val="accent3">
-                    <a:lumMod val="20000"/>
-                    <a:lumOff val="80000"/>
-                  </a:schemeClr>
-                </a:solidFill>
-              </a:rPr>
-              <a:t>Console</a:t>
-            </a:r>
-            <a:endParaRPr lang="en-US" sz="7200" b="1">
-              <a:solidFill>
-                <a:schemeClr val="accent3">
-                  <a:lumMod val="20000"/>
-                  <a:lumOff val="80000"/>
-                </a:schemeClr>
-              </a:solidFill>
-            </a:endParaRPr>
-          </a:p>
-        </p:txBody>
-      </p:sp>
-      <p:sp>
-        <p:nvSpPr>
-          <p:cNvPr id="7" name="TextBox 6">
-            <a:extLst>
-              <a:ext uri="{FF2B5EF4-FFF2-40B4-BE49-F238E27FC236}">
-                <a16:creationId xmlns:a16="http://schemas.microsoft.com/office/drawing/2014/main" id="{50102003-AB3D-F1A7-B8D1-C16B59A8E312}"/>
-              </a:ext>
-            </a:extLst>
-          </p:cNvPr>
-          <p:cNvSpPr txBox="1"/>
-          <p:nvPr/>
-        </p:nvSpPr>
-        <p:spPr>
-          <a:xfrm>
-            <a:off x="1300620" y="1437759"/>
-            <a:ext cx="1989647" cy="769441"/>
-          </a:xfrm>
-          <a:prstGeom prst="rect">
-            <a:avLst/>
-          </a:prstGeom>
-          <a:noFill/>
-        </p:spPr>
-        <p:txBody>
-          <a:bodyPr wrap="none" rtlCol="0">
-            <a:spAutoFit/>
-          </a:bodyPr>
-          <a:lstStyle/>
-          <a:p>
-            <a:r>
-              <a:rPr lang="en-US" sz="4400" b="1">
-                <a:solidFill>
-                  <a:sysClr val="windowText" lastClr="000000"/>
-                </a:solidFill>
-              </a:rPr>
-              <a:t>Gaming</a:t>
-            </a:r>
-            <a:endParaRPr lang="en-US" sz="6600" b="1">
-              <a:solidFill>
-                <a:sysClr val="windowText" lastClr="000000"/>
-              </a:solidFill>
-            </a:endParaRPr>
-          </a:p>
-        </p:txBody>
-      </p:sp>
-      <p:sp>
-        <p:nvSpPr>
-          <p:cNvPr id="6" name="TextBox 5">
-            <a:extLst>
-              <a:ext uri="{FF2B5EF4-FFF2-40B4-BE49-F238E27FC236}">
-                <a16:creationId xmlns:a16="http://schemas.microsoft.com/office/drawing/2014/main" id="{386F93B7-8598-88AC-AC80-7B9180BE846C}"/>
-              </a:ext>
-            </a:extLst>
-          </p:cNvPr>
-          <p:cNvSpPr txBox="1"/>
-          <p:nvPr/>
-        </p:nvSpPr>
-        <p:spPr>
-          <a:xfrm>
-            <a:off x="1362157" y="1145371"/>
-            <a:ext cx="923843" cy="584775"/>
-          </a:xfrm>
-          <a:prstGeom prst="rect">
-            <a:avLst/>
-          </a:prstGeom>
-          <a:noFill/>
-        </p:spPr>
-        <p:txBody>
-          <a:bodyPr wrap="none" rtlCol="0">
-            <a:spAutoFit/>
-          </a:bodyPr>
-          <a:lstStyle/>
-          <a:p>
-            <a:r>
-              <a:rPr lang="en-US" sz="3200" b="1">
-                <a:solidFill>
-                  <a:sysClr val="windowText" lastClr="000000"/>
-                </a:solidFill>
-              </a:rPr>
-              <a:t>Best</a:t>
-            </a:r>
-            <a:endParaRPr lang="en-US" sz="4400" b="1">
-              <a:solidFill>
-                <a:sysClr val="windowText" lastClr="000000"/>
-              </a:solidFill>
-            </a:endParaRPr>
-          </a:p>
-        </p:txBody>
-      </p:sp>
-      <p:sp>
-        <p:nvSpPr>
-          <p:cNvPr id="4" name="Rectangle 3">
-            <a:extLst>
-              <a:ext uri="{FF2B5EF4-FFF2-40B4-BE49-F238E27FC236}">
-                <a16:creationId xmlns:a16="http://schemas.microsoft.com/office/drawing/2014/main" id="{6B1146AE-003A-4DF7-D65A-C995D09D51C9}"/>
-              </a:ext>
-            </a:extLst>
-          </p:cNvPr>
-          <p:cNvSpPr/>
-          <p:nvPr/>
-        </p:nvSpPr>
-        <p:spPr>
-          <a:xfrm>
-            <a:off x="4648200" y="6172200"/>
-            <a:ext cx="3518195" cy="896788"/>
-          </a:xfrm>
-          <a:prstGeom prst="rect">
-            <a:avLst/>
-          </a:prstGeom>
-        </p:spPr>
-        <p:style>
-          <a:lnRef idx="2">
-            <a:schemeClr val="accent1">
-              <a:shade val="15000"/>
-            </a:schemeClr>
-          </a:lnRef>
-          <a:fillRef idx="1">
-            <a:schemeClr val="accent1"/>
-          </a:fillRef>
-          <a:effectRef idx="0">
-            <a:schemeClr val="accent1"/>
-          </a:effectRef>
-          <a:fontRef idx="minor">
-            <a:schemeClr val="lt1"/>
-          </a:fontRef>
-        </p:style>
-        <p:txBody>
-          <a:bodyPr rtlCol="0" anchor="ctr"/>
-          <a:lstStyle/>
-          <a:p>
-            <a:pPr algn="ctr"/>
-            <a:endParaRPr lang="en-US"/>
-          </a:p>
-        </p:txBody>
-      </p:sp>
-      <p:sp>
-        <p:nvSpPr>
-          <p:cNvPr id="9" name="Rectangle 8">
-            <a:extLst>
-              <a:ext uri="{FF2B5EF4-FFF2-40B4-BE49-F238E27FC236}">
-                <a16:creationId xmlns:a16="http://schemas.microsoft.com/office/drawing/2014/main" id="{D07B64A4-683D-918E-1344-22DFF1F000F1}"/>
-              </a:ext>
-            </a:extLst>
-          </p:cNvPr>
-          <p:cNvSpPr/>
-          <p:nvPr/>
-        </p:nvSpPr>
-        <p:spPr>
-          <a:xfrm>
-            <a:off x="4641702" y="-403767"/>
-            <a:ext cx="3518195" cy="896788"/>
-          </a:xfrm>
-          <a:prstGeom prst="rect">
-            <a:avLst/>
-          </a:prstGeom>
-        </p:spPr>
-        <p:style>
-          <a:lnRef idx="2">
-            <a:schemeClr val="accent1">
-              <a:shade val="15000"/>
-            </a:schemeClr>
-          </a:lnRef>
-          <a:fillRef idx="1">
-            <a:schemeClr val="accent1"/>
-          </a:fillRef>
-          <a:effectRef idx="0">
-            <a:schemeClr val="accent1"/>
-          </a:effectRef>
-          <a:fontRef idx="minor">
-            <a:schemeClr val="lt1"/>
-          </a:fontRef>
-        </p:style>
-        <p:txBody>
-          <a:bodyPr rtlCol="0" anchor="ctr"/>
-          <a:lstStyle/>
-          <a:p>
-            <a:pPr algn="ctr"/>
-            <a:endParaRPr lang="en-US"/>
-          </a:p>
-        </p:txBody>
-      </p:sp>
-      <p:pic>
-        <p:nvPicPr>
-          <p:cNvPr id="5" name="Picture 4">
-            <a:extLst>
-              <a:ext uri="{FF2B5EF4-FFF2-40B4-BE49-F238E27FC236}">
-                <a16:creationId xmlns:a16="http://schemas.microsoft.com/office/drawing/2014/main" id="{DCF18345-BBA4-A07F-3D27-A0C879AF0A71}"/>
-              </a:ext>
-            </a:extLst>
-          </p:cNvPr>
-          <p:cNvPicPr>
-            <a:picLocks noChangeAspect="1"/>
-          </p:cNvPicPr>
-          <p:nvPr/>
-        </p:nvPicPr>
-        <p:blipFill>
-          <a:blip r:embed="rId2">
-            <a:extLst>
-              <a:ext uri="{28A0092B-C50C-407E-A947-70E740481C1C}">
-                <a14:useLocalDpi xmlns:a14="http://schemas.microsoft.com/office/drawing/2010/main" val="0"/>
-              </a:ext>
-            </a:extLst>
-          </a:blip>
-          <a:stretch>
-            <a:fillRect/>
-          </a:stretch>
-        </p:blipFill>
-        <p:spPr>
-          <a:xfrm>
-            <a:off x="8077200" y="1124536"/>
-            <a:ext cx="1837247" cy="2165327"/>
-          </a:xfrm>
-          <a:prstGeom prst="rect">
-            <a:avLst/>
-          </a:prstGeom>
-        </p:spPr>
-      </p:pic>
-    </p:spTree>
-    <p:extLst>
-      <p:ext uri="{BB962C8B-B14F-4D97-AF65-F5344CB8AC3E}">
-        <p14:creationId xmlns:p14="http://schemas.microsoft.com/office/powerpoint/2010/main" val="3503517702"/>
-      </p:ext>
-    </p:extLst>
-  </p:cSld>
-  <p:clrMapOvr>
-    <a:masterClrMapping/>
-  </p:clrMapOvr>
-  <p:transition>
-    <p:fade/>
-  </p:transition>
-</p:sld>
-</file>
-
-<file path=ppt/slides/slide5.xml><?xml version="1.0" encoding="utf-8"?>
-<p:sld xmlns:a="http://schemas.openxmlformats.org/drawingml/2006/main" xmlns:r="http://schemas.openxmlformats.org/officeDocument/2006/relationships" xmlns:p="http://schemas.openxmlformats.org/presentationml/2006/main">
-  <p:cSld>
-    <p:bg>
-      <p:bgPr>
-        <a:solidFill>
-          <a:srgbClr val="2ECE70"/>
-        </a:solidFill>
-        <a:effectLst/>
-      </p:bgPr>
-    </p:bg>
-    <p:spTree>
-      <p:nvGrpSpPr>
-        <p:cNvPr id="1" name=""/>
-        <p:cNvGrpSpPr/>
-        <p:nvPr/>
-      </p:nvGrpSpPr>
-      <p:grpSpPr>
-        <a:xfrm>
-          <a:off x="0" y="0"/>
-          <a:ext cx="0" cy="0"/>
-          <a:chOff x="0" y="0"/>
-          <a:chExt cx="0" cy="0"/>
-        </a:xfrm>
-      </p:grpSpPr>
-      <p:sp>
-        <p:nvSpPr>
-          <p:cNvPr id="8" name="TextBox 7">
-            <a:extLst>
-              <a:ext uri="{FF2B5EF4-FFF2-40B4-BE49-F238E27FC236}">
-                <a16:creationId xmlns:a16="http://schemas.microsoft.com/office/drawing/2014/main" id="{353E4F0D-BFFE-6C18-B38E-8C617031EC35}"/>
-              </a:ext>
-            </a:extLst>
-          </p:cNvPr>
-          <p:cNvSpPr txBox="1"/>
-          <p:nvPr/>
-        </p:nvSpPr>
-        <p:spPr>
-          <a:xfrm>
-            <a:off x="4641702" y="457200"/>
-            <a:ext cx="2228495" cy="2215991"/>
-          </a:xfrm>
-          <a:prstGeom prst="rect">
-            <a:avLst/>
-          </a:prstGeom>
-          <a:noFill/>
-        </p:spPr>
-        <p:txBody>
-          <a:bodyPr wrap="none" rtlCol="0">
-            <a:spAutoFit/>
-          </a:bodyPr>
-          <a:lstStyle/>
-          <a:p>
-            <a:r>
-              <a:rPr lang="en-US" sz="13800" b="1">
-                <a:solidFill>
-                  <a:srgbClr val="B1EDC9"/>
-                </a:solidFill>
-              </a:rPr>
-              <a:t>VR</a:t>
-            </a:r>
-          </a:p>
-        </p:txBody>
-      </p:sp>
-      <p:sp>
-        <p:nvSpPr>
-          <p:cNvPr id="7" name="TextBox 6">
-            <a:extLst>
-              <a:ext uri="{FF2B5EF4-FFF2-40B4-BE49-F238E27FC236}">
-                <a16:creationId xmlns:a16="http://schemas.microsoft.com/office/drawing/2014/main" id="{50102003-AB3D-F1A7-B8D1-C16B59A8E312}"/>
-              </a:ext>
-            </a:extLst>
-          </p:cNvPr>
-          <p:cNvSpPr txBox="1"/>
-          <p:nvPr/>
-        </p:nvSpPr>
-        <p:spPr>
-          <a:xfrm rot="5400000">
-            <a:off x="2311111" y="2275567"/>
-            <a:ext cx="3793026" cy="1862048"/>
-          </a:xfrm>
-          <a:prstGeom prst="rect">
-            <a:avLst/>
-          </a:prstGeom>
-          <a:noFill/>
-        </p:spPr>
-        <p:txBody>
-          <a:bodyPr wrap="none" rtlCol="0">
-            <a:spAutoFit/>
-          </a:bodyPr>
-          <a:lstStyle/>
-          <a:p>
-            <a:r>
-              <a:rPr lang="en-US" sz="11500" b="1">
-                <a:solidFill>
-                  <a:srgbClr val="155F33"/>
-                </a:solidFill>
-              </a:rPr>
-              <a:t>Game</a:t>
-            </a:r>
-            <a:endParaRPr lang="en-US" sz="16600" b="1">
-              <a:solidFill>
-                <a:srgbClr val="155F33"/>
-              </a:solidFill>
-            </a:endParaRPr>
-          </a:p>
-        </p:txBody>
-      </p:sp>
-      <p:sp>
-        <p:nvSpPr>
-          <p:cNvPr id="6" name="TextBox 5">
-            <a:extLst>
-              <a:ext uri="{FF2B5EF4-FFF2-40B4-BE49-F238E27FC236}">
-                <a16:creationId xmlns:a16="http://schemas.microsoft.com/office/drawing/2014/main" id="{386F93B7-8598-88AC-AC80-7B9180BE846C}"/>
-              </a:ext>
-            </a:extLst>
-          </p:cNvPr>
-          <p:cNvSpPr txBox="1"/>
-          <p:nvPr/>
-        </p:nvSpPr>
-        <p:spPr>
-          <a:xfrm>
-            <a:off x="3562479" y="719554"/>
-            <a:ext cx="1161921" cy="769441"/>
-          </a:xfrm>
-          <a:prstGeom prst="rect">
-            <a:avLst/>
-          </a:prstGeom>
-          <a:noFill/>
-        </p:spPr>
-        <p:txBody>
-          <a:bodyPr wrap="none" rtlCol="0">
-            <a:spAutoFit/>
-          </a:bodyPr>
-          <a:lstStyle/>
-          <a:p>
-            <a:r>
-              <a:rPr lang="en-US" sz="4400" b="1">
-                <a:solidFill>
-                  <a:schemeClr val="bg1"/>
-                </a:solidFill>
-              </a:rPr>
-              <a:t>play</a:t>
-            </a:r>
-          </a:p>
-        </p:txBody>
-      </p:sp>
-      <p:sp>
-        <p:nvSpPr>
-          <p:cNvPr id="4" name="Rectangle 3">
-            <a:extLst>
-              <a:ext uri="{FF2B5EF4-FFF2-40B4-BE49-F238E27FC236}">
-                <a16:creationId xmlns:a16="http://schemas.microsoft.com/office/drawing/2014/main" id="{6B1146AE-003A-4DF7-D65A-C995D09D51C9}"/>
-              </a:ext>
-            </a:extLst>
-          </p:cNvPr>
-          <p:cNvSpPr/>
-          <p:nvPr/>
-        </p:nvSpPr>
-        <p:spPr>
-          <a:xfrm>
-            <a:off x="4648200" y="6172200"/>
-            <a:ext cx="3518195" cy="896788"/>
-          </a:xfrm>
-          <a:prstGeom prst="rect">
-            <a:avLst/>
-          </a:prstGeom>
-        </p:spPr>
-        <p:style>
-          <a:lnRef idx="2">
-            <a:schemeClr val="accent1">
-              <a:shade val="15000"/>
-            </a:schemeClr>
-          </a:lnRef>
-          <a:fillRef idx="1">
-            <a:schemeClr val="accent1"/>
-          </a:fillRef>
-          <a:effectRef idx="0">
-            <a:schemeClr val="accent1"/>
-          </a:effectRef>
-          <a:fontRef idx="minor">
-            <a:schemeClr val="lt1"/>
-          </a:fontRef>
-        </p:style>
-        <p:txBody>
-          <a:bodyPr rtlCol="0" anchor="ctr"/>
-          <a:lstStyle/>
-          <a:p>
-            <a:pPr algn="ctr"/>
-            <a:endParaRPr lang="en-US"/>
-          </a:p>
-        </p:txBody>
-      </p:sp>
-      <p:sp>
-        <p:nvSpPr>
-          <p:cNvPr id="9" name="Rectangle 8">
-            <a:extLst>
-              <a:ext uri="{FF2B5EF4-FFF2-40B4-BE49-F238E27FC236}">
-                <a16:creationId xmlns:a16="http://schemas.microsoft.com/office/drawing/2014/main" id="{D07B64A4-683D-918E-1344-22DFF1F000F1}"/>
-              </a:ext>
-            </a:extLst>
-          </p:cNvPr>
-          <p:cNvSpPr/>
-          <p:nvPr/>
-        </p:nvSpPr>
-        <p:spPr>
-          <a:xfrm>
-            <a:off x="4641702" y="-403767"/>
-            <a:ext cx="3518195" cy="896788"/>
-          </a:xfrm>
-          <a:prstGeom prst="rect">
-            <a:avLst/>
-          </a:prstGeom>
-        </p:spPr>
-        <p:style>
-          <a:lnRef idx="2">
-            <a:schemeClr val="accent1">
-              <a:shade val="15000"/>
-            </a:schemeClr>
-          </a:lnRef>
-          <a:fillRef idx="1">
-            <a:schemeClr val="accent1"/>
-          </a:fillRef>
-          <a:effectRef idx="0">
-            <a:schemeClr val="accent1"/>
-          </a:effectRef>
-          <a:fontRef idx="minor">
-            <a:schemeClr val="lt1"/>
-          </a:fontRef>
-        </p:style>
-        <p:txBody>
-          <a:bodyPr rtlCol="0" anchor="ctr"/>
-          <a:lstStyle/>
-          <a:p>
-            <a:pPr algn="ctr"/>
-            <a:endParaRPr lang="en-US"/>
-          </a:p>
-        </p:txBody>
-      </p:sp>
-      <p:pic>
-        <p:nvPicPr>
-          <p:cNvPr id="10" name="Picture 9">
-            <a:extLst>
-              <a:ext uri="{FF2B5EF4-FFF2-40B4-BE49-F238E27FC236}">
-                <a16:creationId xmlns:a16="http://schemas.microsoft.com/office/drawing/2014/main" id="{9717C789-B87E-E805-A0B4-556E8448D35F}"/>
-              </a:ext>
-            </a:extLst>
-          </p:cNvPr>
-          <p:cNvPicPr>
-            <a:picLocks noChangeAspect="1"/>
-          </p:cNvPicPr>
-          <p:nvPr/>
-        </p:nvPicPr>
-        <p:blipFill>
-          <a:blip r:embed="rId2">
-            <a:extLst>
-              <a:ext uri="{28A0092B-C50C-407E-A947-70E740481C1C}">
-                <a14:useLocalDpi xmlns:a14="http://schemas.microsoft.com/office/drawing/2010/main" val="0"/>
-              </a:ext>
-            </a:extLst>
-          </a:blip>
-          <a:stretch>
-            <a:fillRect/>
-          </a:stretch>
-        </p:blipFill>
-        <p:spPr>
-          <a:xfrm>
-            <a:off x="4494540" y="2438400"/>
-            <a:ext cx="4941997" cy="3276600"/>
-          </a:xfrm>
-          <a:prstGeom prst="rect">
-            <a:avLst/>
-          </a:prstGeom>
-        </p:spPr>
-      </p:pic>
-    </p:spTree>
-    <p:extLst>
-      <p:ext uri="{BB962C8B-B14F-4D97-AF65-F5344CB8AC3E}">
-        <p14:creationId xmlns:p14="http://schemas.microsoft.com/office/powerpoint/2010/main" val="2579745969"/>
-      </p:ext>
-    </p:extLst>
-  </p:cSld>
-  <p:clrMapOvr>
-    <a:masterClrMapping/>
-  </p:clrMapOvr>
-  <p:transition>
-    <p:fade/>
-  </p:transition>
-</p:sld>
-</file>
-
-<file path=ppt/slides/slide6.xml><?xml version="1.0" encoding="utf-8"?>
-<p:sld xmlns:a="http://schemas.openxmlformats.org/drawingml/2006/main" xmlns:r="http://schemas.openxmlformats.org/officeDocument/2006/relationships" xmlns:p="http://schemas.openxmlformats.org/presentationml/2006/main">
-  <p:cSld>
-    <p:bg>
-      <p:bgPr>
-        <a:solidFill>
-          <a:srgbClr val="157CFF"/>
-        </a:solidFill>
-        <a:effectLst/>
-      </p:bgPr>
-    </p:bg>
-    <p:spTree>
-      <p:nvGrpSpPr>
-        <p:cNvPr id="1" name=""/>
-        <p:cNvGrpSpPr/>
-        <p:nvPr/>
-      </p:nvGrpSpPr>
-      <p:grpSpPr>
-        <a:xfrm>
-          <a:off x="0" y="0"/>
-          <a:ext cx="0" cy="0"/>
-          <a:chOff x="0" y="0"/>
-          <a:chExt cx="0" cy="0"/>
-        </a:xfrm>
-      </p:grpSpPr>
-      <p:sp>
-        <p:nvSpPr>
-          <p:cNvPr id="8" name="TextBox 7">
-            <a:extLst>
-              <a:ext uri="{FF2B5EF4-FFF2-40B4-BE49-F238E27FC236}">
-                <a16:creationId xmlns:a16="http://schemas.microsoft.com/office/drawing/2014/main" id="{353E4F0D-BFFE-6C18-B38E-8C617031EC35}"/>
-              </a:ext>
-            </a:extLst>
-          </p:cNvPr>
-          <p:cNvSpPr txBox="1"/>
-          <p:nvPr/>
-        </p:nvSpPr>
-        <p:spPr>
-          <a:xfrm>
-            <a:off x="4641702" y="457200"/>
-            <a:ext cx="2510624" cy="2215991"/>
-          </a:xfrm>
-          <a:prstGeom prst="rect">
-            <a:avLst/>
-          </a:prstGeom>
-          <a:noFill/>
-        </p:spPr>
-        <p:txBody>
-          <a:bodyPr wrap="none" rtlCol="0">
-            <a:spAutoFit/>
-          </a:bodyPr>
-          <a:lstStyle/>
-          <a:p>
-            <a:r>
-              <a:rPr lang="en-US" sz="13800" b="1">
-                <a:solidFill>
-                  <a:schemeClr val="accent5">
-                    <a:lumMod val="20000"/>
-                    <a:lumOff val="80000"/>
-                  </a:schemeClr>
-                </a:solidFill>
-              </a:rPr>
-              <a:t>JBL</a:t>
-            </a:r>
-          </a:p>
-        </p:txBody>
-      </p:sp>
-      <p:sp>
-        <p:nvSpPr>
-          <p:cNvPr id="7" name="TextBox 6">
-            <a:extLst>
-              <a:ext uri="{FF2B5EF4-FFF2-40B4-BE49-F238E27FC236}">
-                <a16:creationId xmlns:a16="http://schemas.microsoft.com/office/drawing/2014/main" id="{50102003-AB3D-F1A7-B8D1-C16B59A8E312}"/>
-              </a:ext>
-            </a:extLst>
-          </p:cNvPr>
-          <p:cNvSpPr txBox="1"/>
-          <p:nvPr/>
-        </p:nvSpPr>
-        <p:spPr>
-          <a:xfrm>
-            <a:off x="3436293" y="1847309"/>
-            <a:ext cx="5618461" cy="1862048"/>
-          </a:xfrm>
-          <a:prstGeom prst="rect">
-            <a:avLst/>
-          </a:prstGeom>
-          <a:noFill/>
-        </p:spPr>
-        <p:txBody>
-          <a:bodyPr wrap="none" rtlCol="0">
-            <a:spAutoFit/>
-          </a:bodyPr>
-          <a:lstStyle/>
-          <a:p>
-            <a:r>
-              <a:rPr lang="en-US" sz="11500" b="1">
-                <a:solidFill>
-                  <a:srgbClr val="8FBFFF"/>
-                </a:solidFill>
-              </a:rPr>
-              <a:t>SPEAKER</a:t>
-            </a:r>
-            <a:endParaRPr lang="en-US" sz="16600" b="1">
-              <a:solidFill>
-                <a:srgbClr val="8FBFFF"/>
-              </a:solidFill>
-            </a:endParaRPr>
-          </a:p>
-        </p:txBody>
-      </p:sp>
-      <p:sp>
-        <p:nvSpPr>
-          <p:cNvPr id="6" name="TextBox 5">
-            <a:extLst>
-              <a:ext uri="{FF2B5EF4-FFF2-40B4-BE49-F238E27FC236}">
-                <a16:creationId xmlns:a16="http://schemas.microsoft.com/office/drawing/2014/main" id="{386F93B7-8598-88AC-AC80-7B9180BE846C}"/>
-              </a:ext>
-            </a:extLst>
-          </p:cNvPr>
-          <p:cNvSpPr txBox="1"/>
-          <p:nvPr/>
-        </p:nvSpPr>
-        <p:spPr>
-          <a:xfrm>
-            <a:off x="3513621" y="1565195"/>
-            <a:ext cx="1278427" cy="769441"/>
-          </a:xfrm>
-          <a:prstGeom prst="rect">
-            <a:avLst/>
-          </a:prstGeom>
-          <a:noFill/>
-        </p:spPr>
-        <p:txBody>
-          <a:bodyPr wrap="none" rtlCol="0">
-            <a:spAutoFit/>
-          </a:bodyPr>
-          <a:lstStyle/>
-          <a:p>
-            <a:r>
-              <a:rPr lang="en-US" sz="4400" b="1">
-                <a:solidFill>
-                  <a:schemeClr val="bg1"/>
-                </a:solidFill>
-              </a:rPr>
-              <a:t>Now</a:t>
-            </a:r>
-          </a:p>
-        </p:txBody>
-      </p:sp>
-      <p:sp>
-        <p:nvSpPr>
-          <p:cNvPr id="4" name="Rectangle 3">
-            <a:extLst>
-              <a:ext uri="{FF2B5EF4-FFF2-40B4-BE49-F238E27FC236}">
-                <a16:creationId xmlns:a16="http://schemas.microsoft.com/office/drawing/2014/main" id="{6B1146AE-003A-4DF7-D65A-C995D09D51C9}"/>
-              </a:ext>
-            </a:extLst>
-          </p:cNvPr>
-          <p:cNvSpPr/>
-          <p:nvPr/>
-        </p:nvSpPr>
-        <p:spPr>
-          <a:xfrm>
-            <a:off x="4648200" y="6418412"/>
-            <a:ext cx="3518195" cy="896788"/>
-          </a:xfrm>
-          <a:prstGeom prst="rect">
-            <a:avLst/>
-          </a:prstGeom>
-        </p:spPr>
-        <p:style>
-          <a:lnRef idx="2">
-            <a:schemeClr val="accent1">
-              <a:shade val="15000"/>
-            </a:schemeClr>
-          </a:lnRef>
-          <a:fillRef idx="1">
-            <a:schemeClr val="accent1"/>
-          </a:fillRef>
-          <a:effectRef idx="0">
-            <a:schemeClr val="accent1"/>
-          </a:effectRef>
-          <a:fontRef idx="minor">
-            <a:schemeClr val="lt1"/>
-          </a:fontRef>
-        </p:style>
-        <p:txBody>
-          <a:bodyPr rtlCol="0" anchor="ctr"/>
-          <a:lstStyle/>
-          <a:p>
-            <a:pPr algn="ctr"/>
-            <a:endParaRPr lang="en-US"/>
-          </a:p>
-        </p:txBody>
-      </p:sp>
-      <p:sp>
-        <p:nvSpPr>
-          <p:cNvPr id="9" name="Rectangle 8">
-            <a:extLst>
-              <a:ext uri="{FF2B5EF4-FFF2-40B4-BE49-F238E27FC236}">
-                <a16:creationId xmlns:a16="http://schemas.microsoft.com/office/drawing/2014/main" id="{D07B64A4-683D-918E-1344-22DFF1F000F1}"/>
-              </a:ext>
-            </a:extLst>
-          </p:cNvPr>
-          <p:cNvSpPr/>
-          <p:nvPr/>
-        </p:nvSpPr>
-        <p:spPr>
-          <a:xfrm>
-            <a:off x="4641702" y="-403767"/>
-            <a:ext cx="3518195" cy="896788"/>
-          </a:xfrm>
-          <a:prstGeom prst="rect">
-            <a:avLst/>
-          </a:prstGeom>
-        </p:spPr>
-        <p:style>
-          <a:lnRef idx="2">
-            <a:schemeClr val="accent1">
-              <a:shade val="15000"/>
-            </a:schemeClr>
-          </a:lnRef>
-          <a:fillRef idx="1">
-            <a:schemeClr val="accent1"/>
-          </a:fillRef>
-          <a:effectRef idx="0">
-            <a:schemeClr val="accent1"/>
-          </a:effectRef>
-          <a:fontRef idx="minor">
-            <a:schemeClr val="lt1"/>
-          </a:fontRef>
-        </p:style>
-        <p:txBody>
-          <a:bodyPr rtlCol="0" anchor="ctr"/>
-          <a:lstStyle/>
-          <a:p>
-            <a:pPr algn="ctr"/>
-            <a:endParaRPr lang="en-US"/>
-          </a:p>
-        </p:txBody>
-      </p:sp>
-      <p:pic>
-        <p:nvPicPr>
-          <p:cNvPr id="2" name="Picture 1">
-            <a:extLst>
-              <a:ext uri="{FF2B5EF4-FFF2-40B4-BE49-F238E27FC236}">
-                <a16:creationId xmlns:a16="http://schemas.microsoft.com/office/drawing/2014/main" id="{1CC19AAE-B14A-F82D-4D4A-85D28E20DD8D}"/>
-              </a:ext>
-            </a:extLst>
-          </p:cNvPr>
-          <p:cNvPicPr>
-            <a:picLocks noChangeAspect="1"/>
-          </p:cNvPicPr>
-          <p:nvPr/>
-        </p:nvPicPr>
-        <p:blipFill>
-          <a:blip r:embed="rId2">
-            <a:extLst>
-              <a:ext uri="{BEBA8EAE-BF5A-486C-A8C5-ECC9F3942E4B}">
-                <a14:imgProps xmlns:a14="http://schemas.microsoft.com/office/drawing/2010/main">
-                  <a14:imgLayer r:embed="rId3">
-                    <a14:imgEffect>
-                      <a14:backgroundRemoval t="4348" b="89043" l="1905" r="92925">
-                        <a14:foregroundMark x1="5442" y1="32348" x2="8571" y2="53391"/>
-                        <a14:foregroundMark x1="8571" y1="53391" x2="8707" y2="53565"/>
-                        <a14:foregroundMark x1="6803" y1="48696" x2="63810" y2="17043"/>
-                        <a14:foregroundMark x1="64898" y1="17043" x2="87483" y2="29043"/>
-                        <a14:foregroundMark x1="87483" y1="30087" x2="88571" y2="37565"/>
-                        <a14:foregroundMark x1="79048" y1="34261" x2="76735" y2="36000"/>
-                        <a14:foregroundMark x1="78639" y1="39304" x2="79592" y2="38261"/>
-                        <a14:foregroundMark x1="87891" y1="29217" x2="92245" y2="32696"/>
-                        <a14:foregroundMark x1="93197" y1="27826" x2="91837" y2="36870"/>
-                        <a14:foregroundMark x1="46803" y1="9391" x2="77823" y2="4348"/>
-                        <a14:foregroundMark x1="80000" y1="4696" x2="45850" y2="12696"/>
-                        <a14:foregroundMark x1="45850" y1="12696" x2="45714" y2="13217"/>
-                        <a14:foregroundMark x1="66395" y1="6609" x2="63673" y2="11304"/>
-                        <a14:foregroundMark x1="41361" y1="22609" x2="29388" y2="34957"/>
-                        <a14:foregroundMark x1="36599" y1="40000" x2="56054" y2="44870"/>
-                        <a14:foregroundMark x1="32381" y1="44522" x2="30204" y2="45043"/>
-                        <a14:foregroundMark x1="3129" y1="37739" x2="1905" y2="52000"/>
-                      </a14:backgroundRemoval>
-                    </a14:imgEffect>
-                  </a14:imgLayer>
-                </a14:imgProps>
-              </a:ext>
-            </a:extLst>
-          </a:blip>
-          <a:srcRect b="24956"/>
-          <a:stretch/>
-        </p:blipFill>
-        <p:spPr>
-          <a:xfrm rot="19836989">
-            <a:off x="5407501" y="3160467"/>
-            <a:ext cx="3489650" cy="2048686"/>
-          </a:xfrm>
-          <a:prstGeom prst="rect">
-            <a:avLst/>
-          </a:prstGeom>
-        </p:spPr>
-      </p:pic>
-    </p:spTree>
-    <p:extLst>
-      <p:ext uri="{BB962C8B-B14F-4D97-AF65-F5344CB8AC3E}">
-        <p14:creationId xmlns:p14="http://schemas.microsoft.com/office/powerpoint/2010/main" val="3413669615"/>
-      </p:ext>
-    </p:extLst>
-  </p:cSld>
-  <p:clrMapOvr>
-    <a:masterClrMapping/>
-  </p:clrMapOvr>
-  <p:transition>
-    <p:fade/>
-  </p:transition>
-</p:sld>
-</file>
-
-<file path=ppt/slides/slide7.xml><?xml version="1.0" encoding="utf-8"?>
-<p:sld xmlns:a="http://schemas.openxmlformats.org/drawingml/2006/main" xmlns:r="http://schemas.openxmlformats.org/officeDocument/2006/relationships" xmlns:p="http://schemas.openxmlformats.org/presentationml/2006/main">
-  <p:cSld>
-    <p:bg>
-      <p:bgPr>
-        <a:solidFill>
-          <a:srgbClr val="F1F1F1"/>
-        </a:solidFill>
-        <a:effectLst/>
-      </p:bgPr>
-    </p:bg>
-    <p:spTree>
-      <p:nvGrpSpPr>
-        <p:cNvPr id="1" name=""/>
-        <p:cNvGrpSpPr/>
-        <p:nvPr/>
-      </p:nvGrpSpPr>
-      <p:grpSpPr>
-        <a:xfrm>
-          <a:off x="0" y="0"/>
-          <a:ext cx="0" cy="0"/>
-          <a:chOff x="0" y="0"/>
-          <a:chExt cx="0" cy="0"/>
-        </a:xfrm>
-      </p:grpSpPr>
-      <p:pic>
-        <p:nvPicPr>
-          <p:cNvPr id="3" name="Picture 2">
-            <a:extLst>
-              <a:ext uri="{FF2B5EF4-FFF2-40B4-BE49-F238E27FC236}">
-                <a16:creationId xmlns:a16="http://schemas.microsoft.com/office/drawing/2014/main" id="{E6E44495-8731-93A8-AB0D-F8B4FA507DD1}"/>
-              </a:ext>
-            </a:extLst>
-          </p:cNvPr>
-          <p:cNvPicPr>
-            <a:picLocks noChangeAspect="1"/>
-          </p:cNvPicPr>
-          <p:nvPr/>
-        </p:nvPicPr>
-        <p:blipFill>
-          <a:blip r:embed="rId2"/>
-          <a:stretch>
-            <a:fillRect/>
-          </a:stretch>
-        </p:blipFill>
-        <p:spPr>
-          <a:xfrm>
-            <a:off x="3414712" y="1652587"/>
-            <a:ext cx="5362575" cy="3552825"/>
-          </a:xfrm>
-          <a:prstGeom prst="rect">
-            <a:avLst/>
-          </a:prstGeom>
-        </p:spPr>
-      </p:pic>
-      <p:sp>
-        <p:nvSpPr>
-          <p:cNvPr id="5" name="Rectangle 4">
-            <a:extLst>
-              <a:ext uri="{FF2B5EF4-FFF2-40B4-BE49-F238E27FC236}">
-                <a16:creationId xmlns:a16="http://schemas.microsoft.com/office/drawing/2014/main" id="{ADFF3A91-4295-9C52-3061-E78CAA08800E}"/>
-              </a:ext>
-            </a:extLst>
-          </p:cNvPr>
-          <p:cNvSpPr/>
-          <p:nvPr/>
-        </p:nvSpPr>
-        <p:spPr>
-          <a:xfrm>
-            <a:off x="2590800" y="1167769"/>
-            <a:ext cx="6377306" cy="4623431"/>
-          </a:xfrm>
-          <a:prstGeom prst="rect">
-            <a:avLst/>
-          </a:prstGeom>
-          <a:noFill/>
-          <a:ln w="57150"/>
-        </p:spPr>
-        <p:style>
-          <a:lnRef idx="2">
-            <a:schemeClr val="accent1">
-              <a:shade val="15000"/>
-            </a:schemeClr>
-          </a:lnRef>
-          <a:fillRef idx="1">
-            <a:schemeClr val="accent1"/>
-          </a:fillRef>
-          <a:effectRef idx="0">
-            <a:schemeClr val="accent1"/>
-          </a:effectRef>
-          <a:fontRef idx="minor">
-            <a:schemeClr val="lt1"/>
-          </a:fontRef>
-        </p:style>
-        <p:txBody>
-          <a:bodyPr rtlCol="0" anchor="ctr"/>
-          <a:lstStyle/>
-          <a:p>
-            <a:pPr algn="ctr"/>
-            <a:endParaRPr lang="en-US"/>
-          </a:p>
-        </p:txBody>
-      </p:sp>
-    </p:spTree>
-    <p:extLst>
-      <p:ext uri="{BB962C8B-B14F-4D97-AF65-F5344CB8AC3E}">
-        <p14:creationId xmlns:p14="http://schemas.microsoft.com/office/powerpoint/2010/main" val="1373490809"/>
-      </p:ext>
-    </p:extLst>
-  </p:cSld>
-  <p:clrMapOvr>
-    <a:masterClrMapping/>
-  </p:clrMapOvr>
-  <p:transition>
-    <p:fade/>
-  </p:transition>
-</p:sld>
-</file>
-
-<file path=ppt/slides/slide8.xml><?xml version="1.0" encoding="utf-8"?>
-<p:sld xmlns:a="http://schemas.openxmlformats.org/drawingml/2006/main" xmlns:r="http://schemas.openxmlformats.org/officeDocument/2006/relationships" xmlns:p="http://schemas.openxmlformats.org/presentationml/2006/main">
-  <p:cSld>
-    <p:bg>
-      <p:bgPr>
-        <a:solidFill>
-          <a:srgbClr val="F8F8F8"/>
-        </a:solidFill>
-        <a:effectLst/>
-      </p:bgPr>
-    </p:bg>
-    <p:spTree>
-      <p:nvGrpSpPr>
-        <p:cNvPr id="1" name=""/>
-        <p:cNvGrpSpPr/>
-        <p:nvPr/>
-      </p:nvGrpSpPr>
-      <p:grpSpPr>
-        <a:xfrm>
-          <a:off x="0" y="0"/>
-          <a:ext cx="0" cy="0"/>
-          <a:chOff x="0" y="0"/>
-          <a:chExt cx="0" cy="0"/>
-        </a:xfrm>
-      </p:grpSpPr>
-      <p:sp>
-        <p:nvSpPr>
-          <p:cNvPr id="5" name="Rectangle 4">
-            <a:extLst>
-              <a:ext uri="{FF2B5EF4-FFF2-40B4-BE49-F238E27FC236}">
-                <a16:creationId xmlns:a16="http://schemas.microsoft.com/office/drawing/2014/main" id="{ADFF3A91-4295-9C52-3061-E78CAA08800E}"/>
-              </a:ext>
-            </a:extLst>
-          </p:cNvPr>
-          <p:cNvSpPr/>
-          <p:nvPr/>
-        </p:nvSpPr>
-        <p:spPr>
-          <a:xfrm>
-            <a:off x="2590800" y="1167769"/>
-            <a:ext cx="6377306" cy="4623431"/>
-          </a:xfrm>
-          <a:prstGeom prst="rect">
-            <a:avLst/>
-          </a:prstGeom>
-          <a:noFill/>
-          <a:ln w="57150"/>
-        </p:spPr>
-        <p:style>
-          <a:lnRef idx="2">
-            <a:schemeClr val="accent1">
-              <a:shade val="15000"/>
-            </a:schemeClr>
-          </a:lnRef>
-          <a:fillRef idx="1">
-            <a:schemeClr val="accent1"/>
-          </a:fillRef>
-          <a:effectRef idx="0">
-            <a:schemeClr val="accent1"/>
-          </a:effectRef>
-          <a:fontRef idx="minor">
-            <a:schemeClr val="lt1"/>
-          </a:fontRef>
-        </p:style>
-        <p:txBody>
-          <a:bodyPr rtlCol="0" anchor="ctr"/>
-          <a:lstStyle/>
-          <a:p>
-            <a:pPr algn="ctr"/>
-            <a:endParaRPr lang="en-US"/>
-          </a:p>
-        </p:txBody>
-      </p:sp>
-      <p:pic>
-        <p:nvPicPr>
-          <p:cNvPr id="1026" name="Picture 2">
-            <a:extLst>
-              <a:ext uri="{FF2B5EF4-FFF2-40B4-BE49-F238E27FC236}">
-                <a16:creationId xmlns:a16="http://schemas.microsoft.com/office/drawing/2014/main" id="{5168C581-D69C-5F41-8134-A4C4ABE2BEB5}"/>
-              </a:ext>
-            </a:extLst>
-          </p:cNvPr>
-          <p:cNvPicPr>
-            <a:picLocks noChangeAspect="1" noChangeArrowheads="1"/>
-          </p:cNvPicPr>
-          <p:nvPr/>
-        </p:nvPicPr>
-        <p:blipFill>
-          <a:blip r:embed="rId2">
-            <a:extLst>
-              <a:ext uri="{28A0092B-C50C-407E-A947-70E740481C1C}">
-                <a14:useLocalDpi xmlns:a14="http://schemas.microsoft.com/office/drawing/2010/main" val="0"/>
-              </a:ext>
-            </a:extLst>
-          </a:blip>
-          <a:srcRect/>
-          <a:stretch>
-            <a:fillRect/>
-          </a:stretch>
-        </p:blipFill>
-        <p:spPr bwMode="auto">
-          <a:xfrm>
-            <a:off x="3093403" y="1633537"/>
-            <a:ext cx="5372100" cy="3590925"/>
-          </a:xfrm>
-          <a:prstGeom prst="rect">
-            <a:avLst/>
-          </a:prstGeom>
-          <a:noFill/>
-          <a:extLst>
-            <a:ext uri="{909E8E84-426E-40DD-AFC4-6F175D3DCCD1}">
-              <a14:hiddenFill xmlns:a14="http://schemas.microsoft.com/office/drawing/2010/main">
-                <a:solidFill>
-                  <a:srgbClr val="FFFFFF"/>
-                </a:solidFill>
-              </a14:hiddenFill>
-            </a:ext>
-          </a:extLst>
-        </p:spPr>
-      </p:pic>
-    </p:spTree>
-    <p:extLst>
-      <p:ext uri="{BB962C8B-B14F-4D97-AF65-F5344CB8AC3E}">
-        <p14:creationId xmlns:p14="http://schemas.microsoft.com/office/powerpoint/2010/main" val="94104684"/>
-      </p:ext>
-    </p:extLst>
-  </p:cSld>
-  <p:clrMapOvr>
-    <a:masterClrMapping/>
-  </p:clrMapOvr>
-  <p:transition>
-    <p:fade/>
-  </p:transition>
-</p:sld>
-</file>
-
-<file path=ppt/slides/slide9.xml><?xml version="1.0" encoding="utf-8"?>
+<file path=ppt/slides/slide10.xml><?xml version="1.0" encoding="utf-8"?>
 <p:sld xmlns:a="http://schemas.openxmlformats.org/drawingml/2006/main" xmlns:r="http://schemas.openxmlformats.org/officeDocument/2006/relationships" xmlns:p="http://schemas.openxmlformats.org/presentationml/2006/main">
   <p:cSld>
     <p:bg>
@@ -5739,6 +3929,1953 @@
     <p:extLst>
       <p:ext uri="{BB962C8B-B14F-4D97-AF65-F5344CB8AC3E}">
         <p14:creationId xmlns:p14="http://schemas.microsoft.com/office/powerpoint/2010/main" val="3827809617"/>
+      </p:ext>
+    </p:extLst>
+  </p:cSld>
+  <p:clrMapOvr>
+    <a:masterClrMapping/>
+  </p:clrMapOvr>
+  <p:transition>
+    <p:fade/>
+  </p:transition>
+</p:sld>
+</file>
+
+<file path=ppt/slides/slide2.xml><?xml version="1.0" encoding="utf-8"?>
+<p:sld xmlns:a="http://schemas.openxmlformats.org/drawingml/2006/main" xmlns:r="http://schemas.openxmlformats.org/officeDocument/2006/relationships" xmlns:p="http://schemas.openxmlformats.org/presentationml/2006/main">
+  <p:cSld>
+    <p:bg>
+      <p:bgPr>
+        <a:solidFill>
+          <a:srgbClr val="FDC62E"/>
+        </a:solidFill>
+        <a:effectLst/>
+      </p:bgPr>
+    </p:bg>
+    <p:spTree>
+      <p:nvGrpSpPr>
+        <p:cNvPr id="1" name=""/>
+        <p:cNvGrpSpPr/>
+        <p:nvPr/>
+      </p:nvGrpSpPr>
+      <p:grpSpPr>
+        <a:xfrm>
+          <a:off x="0" y="0"/>
+          <a:ext cx="0" cy="0"/>
+          <a:chOff x="0" y="0"/>
+          <a:chExt cx="0" cy="0"/>
+        </a:xfrm>
+      </p:grpSpPr>
+      <p:sp>
+        <p:nvSpPr>
+          <p:cNvPr id="8" name="TextBox 7">
+            <a:extLst>
+              <a:ext uri="{FF2B5EF4-FFF2-40B4-BE49-F238E27FC236}">
+                <a16:creationId xmlns:a16="http://schemas.microsoft.com/office/drawing/2014/main" id="{353E4F0D-BFFE-6C18-B38E-8C617031EC35}"/>
+              </a:ext>
+            </a:extLst>
+          </p:cNvPr>
+          <p:cNvSpPr txBox="1"/>
+          <p:nvPr/>
+        </p:nvSpPr>
+        <p:spPr>
+          <a:xfrm>
+            <a:off x="3504623" y="2791361"/>
+            <a:ext cx="2896177" cy="1323439"/>
+          </a:xfrm>
+          <a:prstGeom prst="rect">
+            <a:avLst/>
+          </a:prstGeom>
+          <a:noFill/>
+        </p:spPr>
+        <p:txBody>
+          <a:bodyPr wrap="none" rtlCol="0">
+            <a:spAutoFit/>
+          </a:bodyPr>
+          <a:lstStyle/>
+          <a:p>
+            <a:r>
+              <a:rPr lang="en-US" sz="8000" b="1">
+                <a:solidFill>
+                  <a:schemeClr val="accent4">
+                    <a:lumMod val="50000"/>
+                  </a:schemeClr>
+                </a:solidFill>
+              </a:rPr>
+              <a:t>Watch</a:t>
+            </a:r>
+          </a:p>
+        </p:txBody>
+      </p:sp>
+      <p:sp>
+        <p:nvSpPr>
+          <p:cNvPr id="7" name="TextBox 6">
+            <a:extLst>
+              <a:ext uri="{FF2B5EF4-FFF2-40B4-BE49-F238E27FC236}">
+                <a16:creationId xmlns:a16="http://schemas.microsoft.com/office/drawing/2014/main" id="{50102003-AB3D-F1A7-B8D1-C16B59A8E312}"/>
+              </a:ext>
+            </a:extLst>
+          </p:cNvPr>
+          <p:cNvSpPr txBox="1"/>
+          <p:nvPr/>
+        </p:nvSpPr>
+        <p:spPr>
+          <a:xfrm>
+            <a:off x="3998796" y="2110773"/>
+            <a:ext cx="2237279" cy="1200329"/>
+          </a:xfrm>
+          <a:prstGeom prst="rect">
+            <a:avLst/>
+          </a:prstGeom>
+          <a:noFill/>
+        </p:spPr>
+        <p:txBody>
+          <a:bodyPr wrap="none" rtlCol="0">
+            <a:spAutoFit/>
+          </a:bodyPr>
+          <a:lstStyle/>
+          <a:p>
+            <a:r>
+              <a:rPr lang="en-US" sz="7200" b="1">
+                <a:solidFill>
+                  <a:schemeClr val="accent4">
+                    <a:lumMod val="20000"/>
+                    <a:lumOff val="80000"/>
+                  </a:schemeClr>
+                </a:solidFill>
+              </a:rPr>
+              <a:t>Wear</a:t>
+            </a:r>
+            <a:endParaRPr lang="en-US" sz="8800" b="1">
+              <a:solidFill>
+                <a:schemeClr val="accent4">
+                  <a:lumMod val="20000"/>
+                  <a:lumOff val="80000"/>
+                </a:schemeClr>
+              </a:solidFill>
+            </a:endParaRPr>
+          </a:p>
+        </p:txBody>
+      </p:sp>
+      <p:sp>
+        <p:nvSpPr>
+          <p:cNvPr id="6" name="TextBox 5">
+            <a:extLst>
+              <a:ext uri="{FF2B5EF4-FFF2-40B4-BE49-F238E27FC236}">
+                <a16:creationId xmlns:a16="http://schemas.microsoft.com/office/drawing/2014/main" id="{386F93B7-8598-88AC-AC80-7B9180BE846C}"/>
+              </a:ext>
+            </a:extLst>
+          </p:cNvPr>
+          <p:cNvSpPr txBox="1"/>
+          <p:nvPr/>
+        </p:nvSpPr>
+        <p:spPr>
+          <a:xfrm>
+            <a:off x="4351707" y="1600200"/>
+            <a:ext cx="1802738" cy="1015663"/>
+          </a:xfrm>
+          <a:prstGeom prst="rect">
+            <a:avLst/>
+          </a:prstGeom>
+          <a:noFill/>
+        </p:spPr>
+        <p:txBody>
+          <a:bodyPr wrap="none" rtlCol="0">
+            <a:spAutoFit/>
+          </a:bodyPr>
+          <a:lstStyle/>
+          <a:p>
+            <a:r>
+              <a:rPr lang="en-US" sz="6000" b="1">
+                <a:solidFill>
+                  <a:schemeClr val="bg1"/>
+                </a:solidFill>
+              </a:rPr>
+              <a:t>want</a:t>
+            </a:r>
+            <a:endParaRPr lang="en-US" sz="5400" b="1">
+              <a:solidFill>
+                <a:schemeClr val="bg1"/>
+              </a:solidFill>
+            </a:endParaRPr>
+          </a:p>
+        </p:txBody>
+      </p:sp>
+      <p:pic>
+        <p:nvPicPr>
+          <p:cNvPr id="3" name="Picture 2">
+            <a:extLst>
+              <a:ext uri="{FF2B5EF4-FFF2-40B4-BE49-F238E27FC236}">
+                <a16:creationId xmlns:a16="http://schemas.microsoft.com/office/drawing/2014/main" id="{3C414805-8991-6485-D786-B1183421DAF0}"/>
+              </a:ext>
+            </a:extLst>
+          </p:cNvPr>
+          <p:cNvPicPr>
+            <a:picLocks noChangeAspect="1"/>
+          </p:cNvPicPr>
+          <p:nvPr/>
+        </p:nvPicPr>
+        <p:blipFill>
+          <a:blip r:embed="rId2">
+            <a:extLst>
+              <a:ext uri="{28A0092B-C50C-407E-A947-70E740481C1C}">
+                <a14:useLocalDpi xmlns:a14="http://schemas.microsoft.com/office/drawing/2010/main" val="0"/>
+              </a:ext>
+            </a:extLst>
+          </a:blip>
+          <a:stretch>
+            <a:fillRect/>
+          </a:stretch>
+        </p:blipFill>
+        <p:spPr>
+          <a:xfrm>
+            <a:off x="5943600" y="1022730"/>
+            <a:ext cx="2742011" cy="3662362"/>
+          </a:xfrm>
+          <a:prstGeom prst="rect">
+            <a:avLst/>
+          </a:prstGeom>
+        </p:spPr>
+      </p:pic>
+      <p:sp>
+        <p:nvSpPr>
+          <p:cNvPr id="4" name="Rectangle 3">
+            <a:extLst>
+              <a:ext uri="{FF2B5EF4-FFF2-40B4-BE49-F238E27FC236}">
+                <a16:creationId xmlns:a16="http://schemas.microsoft.com/office/drawing/2014/main" id="{6B1146AE-003A-4DF7-D65A-C995D09D51C9}"/>
+              </a:ext>
+            </a:extLst>
+          </p:cNvPr>
+          <p:cNvSpPr/>
+          <p:nvPr/>
+        </p:nvSpPr>
+        <p:spPr>
+          <a:xfrm>
+            <a:off x="4648200" y="6172200"/>
+            <a:ext cx="3518195" cy="896788"/>
+          </a:xfrm>
+          <a:prstGeom prst="rect">
+            <a:avLst/>
+          </a:prstGeom>
+        </p:spPr>
+        <p:style>
+          <a:lnRef idx="2">
+            <a:schemeClr val="accent1">
+              <a:shade val="15000"/>
+            </a:schemeClr>
+          </a:lnRef>
+          <a:fillRef idx="1">
+            <a:schemeClr val="accent1"/>
+          </a:fillRef>
+          <a:effectRef idx="0">
+            <a:schemeClr val="accent1"/>
+          </a:effectRef>
+          <a:fontRef idx="minor">
+            <a:schemeClr val="lt1"/>
+          </a:fontRef>
+        </p:style>
+        <p:txBody>
+          <a:bodyPr rtlCol="0" anchor="ctr"/>
+          <a:lstStyle/>
+          <a:p>
+            <a:pPr algn="ctr"/>
+            <a:endParaRPr lang="en-US"/>
+          </a:p>
+        </p:txBody>
+      </p:sp>
+      <p:sp>
+        <p:nvSpPr>
+          <p:cNvPr id="9" name="Rectangle 8">
+            <a:extLst>
+              <a:ext uri="{FF2B5EF4-FFF2-40B4-BE49-F238E27FC236}">
+                <a16:creationId xmlns:a16="http://schemas.microsoft.com/office/drawing/2014/main" id="{D07B64A4-683D-918E-1344-22DFF1F000F1}"/>
+              </a:ext>
+            </a:extLst>
+          </p:cNvPr>
+          <p:cNvSpPr/>
+          <p:nvPr/>
+        </p:nvSpPr>
+        <p:spPr>
+          <a:xfrm>
+            <a:off x="4641702" y="-403767"/>
+            <a:ext cx="3518195" cy="896788"/>
+          </a:xfrm>
+          <a:prstGeom prst="rect">
+            <a:avLst/>
+          </a:prstGeom>
+        </p:spPr>
+        <p:style>
+          <a:lnRef idx="2">
+            <a:schemeClr val="accent1">
+              <a:shade val="15000"/>
+            </a:schemeClr>
+          </a:lnRef>
+          <a:fillRef idx="1">
+            <a:schemeClr val="accent1"/>
+          </a:fillRef>
+          <a:effectRef idx="0">
+            <a:schemeClr val="accent1"/>
+          </a:effectRef>
+          <a:fontRef idx="minor">
+            <a:schemeClr val="lt1"/>
+          </a:fontRef>
+        </p:style>
+        <p:txBody>
+          <a:bodyPr rtlCol="0" anchor="ctr"/>
+          <a:lstStyle/>
+          <a:p>
+            <a:pPr algn="ctr"/>
+            <a:endParaRPr lang="en-US"/>
+          </a:p>
+        </p:txBody>
+      </p:sp>
+    </p:spTree>
+    <p:extLst>
+      <p:ext uri="{BB962C8B-B14F-4D97-AF65-F5344CB8AC3E}">
+        <p14:creationId xmlns:p14="http://schemas.microsoft.com/office/powerpoint/2010/main" val="1756301127"/>
+      </p:ext>
+    </p:extLst>
+  </p:cSld>
+  <p:clrMapOvr>
+    <a:masterClrMapping/>
+  </p:clrMapOvr>
+  <p:transition>
+    <p:fade/>
+  </p:transition>
+</p:sld>
+</file>
+
+<file path=ppt/slides/slide3.xml><?xml version="1.0" encoding="utf-8"?>
+<p:sld xmlns:a="http://schemas.openxmlformats.org/drawingml/2006/main" xmlns:r="http://schemas.openxmlformats.org/officeDocument/2006/relationships" xmlns:p="http://schemas.openxmlformats.org/presentationml/2006/main">
+  <p:cSld>
+    <p:bg>
+      <p:bgPr>
+        <a:solidFill>
+          <a:srgbClr val="F42C37"/>
+        </a:solidFill>
+        <a:effectLst/>
+      </p:bgPr>
+    </p:bg>
+    <p:spTree>
+      <p:nvGrpSpPr>
+        <p:cNvPr id="1" name=""/>
+        <p:cNvGrpSpPr/>
+        <p:nvPr/>
+      </p:nvGrpSpPr>
+      <p:grpSpPr>
+        <a:xfrm>
+          <a:off x="0" y="0"/>
+          <a:ext cx="0" cy="0"/>
+          <a:chOff x="0" y="0"/>
+          <a:chExt cx="0" cy="0"/>
+        </a:xfrm>
+      </p:grpSpPr>
+      <p:sp>
+        <p:nvSpPr>
+          <p:cNvPr id="8" name="TextBox 7">
+            <a:extLst>
+              <a:ext uri="{FF2B5EF4-FFF2-40B4-BE49-F238E27FC236}">
+                <a16:creationId xmlns:a16="http://schemas.microsoft.com/office/drawing/2014/main" id="{353E4F0D-BFFE-6C18-B38E-8C617031EC35}"/>
+              </a:ext>
+            </a:extLst>
+          </p:cNvPr>
+          <p:cNvSpPr txBox="1"/>
+          <p:nvPr/>
+        </p:nvSpPr>
+        <p:spPr>
+          <a:xfrm>
+            <a:off x="4191000" y="1956375"/>
+            <a:ext cx="2673681" cy="1015663"/>
+          </a:xfrm>
+          <a:prstGeom prst="rect">
+            <a:avLst/>
+          </a:prstGeom>
+          <a:noFill/>
+        </p:spPr>
+        <p:txBody>
+          <a:bodyPr wrap="none" rtlCol="0">
+            <a:spAutoFit/>
+          </a:bodyPr>
+          <a:lstStyle/>
+          <a:p>
+            <a:r>
+              <a:rPr lang="en-US" sz="6000" b="1">
+                <a:solidFill>
+                  <a:srgbClr val="FF7D7D"/>
+                </a:solidFill>
+              </a:rPr>
+              <a:t>LAPTOP</a:t>
+            </a:r>
+            <a:endParaRPr lang="en-US" sz="7200" b="1">
+              <a:solidFill>
+                <a:srgbClr val="FF7D7D"/>
+              </a:solidFill>
+            </a:endParaRPr>
+          </a:p>
+        </p:txBody>
+      </p:sp>
+      <p:sp>
+        <p:nvSpPr>
+          <p:cNvPr id="7" name="TextBox 6">
+            <a:extLst>
+              <a:ext uri="{FF2B5EF4-FFF2-40B4-BE49-F238E27FC236}">
+                <a16:creationId xmlns:a16="http://schemas.microsoft.com/office/drawing/2014/main" id="{50102003-AB3D-F1A7-B8D1-C16B59A8E312}"/>
+              </a:ext>
+            </a:extLst>
+          </p:cNvPr>
+          <p:cNvSpPr txBox="1"/>
+          <p:nvPr/>
+        </p:nvSpPr>
+        <p:spPr>
+          <a:xfrm>
+            <a:off x="4589983" y="1553289"/>
+            <a:ext cx="1810817" cy="707886"/>
+          </a:xfrm>
+          <a:prstGeom prst="rect">
+            <a:avLst/>
+          </a:prstGeom>
+          <a:noFill/>
+        </p:spPr>
+        <p:txBody>
+          <a:bodyPr wrap="none" rtlCol="0">
+            <a:spAutoFit/>
+          </a:bodyPr>
+          <a:lstStyle/>
+          <a:p>
+            <a:r>
+              <a:rPr lang="en-US" sz="4000" b="1">
+                <a:solidFill>
+                  <a:schemeClr val="bg1"/>
+                </a:solidFill>
+              </a:rPr>
+              <a:t>Devices</a:t>
+            </a:r>
+            <a:endParaRPr lang="en-US" sz="6000" b="1">
+              <a:solidFill>
+                <a:schemeClr val="bg1"/>
+              </a:solidFill>
+            </a:endParaRPr>
+          </a:p>
+        </p:txBody>
+      </p:sp>
+      <p:sp>
+        <p:nvSpPr>
+          <p:cNvPr id="6" name="TextBox 5">
+            <a:extLst>
+              <a:ext uri="{FF2B5EF4-FFF2-40B4-BE49-F238E27FC236}">
+                <a16:creationId xmlns:a16="http://schemas.microsoft.com/office/drawing/2014/main" id="{386F93B7-8598-88AC-AC80-7B9180BE846C}"/>
+              </a:ext>
+            </a:extLst>
+          </p:cNvPr>
+          <p:cNvSpPr txBox="1"/>
+          <p:nvPr/>
+        </p:nvSpPr>
+        <p:spPr>
+          <a:xfrm>
+            <a:off x="4979322" y="1143000"/>
+            <a:ext cx="1040478" cy="584775"/>
+          </a:xfrm>
+          <a:prstGeom prst="rect">
+            <a:avLst/>
+          </a:prstGeom>
+          <a:noFill/>
+        </p:spPr>
+        <p:txBody>
+          <a:bodyPr wrap="none" rtlCol="0">
+            <a:spAutoFit/>
+          </a:bodyPr>
+          <a:lstStyle/>
+          <a:p>
+            <a:r>
+              <a:rPr lang="en-US" sz="3200" b="1">
+                <a:solidFill>
+                  <a:schemeClr val="bg1"/>
+                </a:solidFill>
+              </a:rPr>
+              <a:t>Tried</a:t>
+            </a:r>
+            <a:endParaRPr lang="en-US" sz="4400" b="1">
+              <a:solidFill>
+                <a:schemeClr val="bg1"/>
+              </a:solidFill>
+            </a:endParaRPr>
+          </a:p>
+        </p:txBody>
+      </p:sp>
+      <p:sp>
+        <p:nvSpPr>
+          <p:cNvPr id="4" name="Rectangle 3">
+            <a:extLst>
+              <a:ext uri="{FF2B5EF4-FFF2-40B4-BE49-F238E27FC236}">
+                <a16:creationId xmlns:a16="http://schemas.microsoft.com/office/drawing/2014/main" id="{6B1146AE-003A-4DF7-D65A-C995D09D51C9}"/>
+              </a:ext>
+            </a:extLst>
+          </p:cNvPr>
+          <p:cNvSpPr/>
+          <p:nvPr/>
+        </p:nvSpPr>
+        <p:spPr>
+          <a:xfrm>
+            <a:off x="4648200" y="6172200"/>
+            <a:ext cx="3518195" cy="896788"/>
+          </a:xfrm>
+          <a:prstGeom prst="rect">
+            <a:avLst/>
+          </a:prstGeom>
+        </p:spPr>
+        <p:style>
+          <a:lnRef idx="2">
+            <a:schemeClr val="accent1">
+              <a:shade val="15000"/>
+            </a:schemeClr>
+          </a:lnRef>
+          <a:fillRef idx="1">
+            <a:schemeClr val="accent1"/>
+          </a:fillRef>
+          <a:effectRef idx="0">
+            <a:schemeClr val="accent1"/>
+          </a:effectRef>
+          <a:fontRef idx="minor">
+            <a:schemeClr val="lt1"/>
+          </a:fontRef>
+        </p:style>
+        <p:txBody>
+          <a:bodyPr rtlCol="0" anchor="ctr"/>
+          <a:lstStyle/>
+          <a:p>
+            <a:pPr algn="ctr"/>
+            <a:endParaRPr lang="en-US"/>
+          </a:p>
+        </p:txBody>
+      </p:sp>
+      <p:sp>
+        <p:nvSpPr>
+          <p:cNvPr id="9" name="Rectangle 8">
+            <a:extLst>
+              <a:ext uri="{FF2B5EF4-FFF2-40B4-BE49-F238E27FC236}">
+                <a16:creationId xmlns:a16="http://schemas.microsoft.com/office/drawing/2014/main" id="{D07B64A4-683D-918E-1344-22DFF1F000F1}"/>
+              </a:ext>
+            </a:extLst>
+          </p:cNvPr>
+          <p:cNvSpPr/>
+          <p:nvPr/>
+        </p:nvSpPr>
+        <p:spPr>
+          <a:xfrm>
+            <a:off x="4641702" y="-403767"/>
+            <a:ext cx="3518195" cy="896788"/>
+          </a:xfrm>
+          <a:prstGeom prst="rect">
+            <a:avLst/>
+          </a:prstGeom>
+        </p:spPr>
+        <p:style>
+          <a:lnRef idx="2">
+            <a:schemeClr val="accent1">
+              <a:shade val="15000"/>
+            </a:schemeClr>
+          </a:lnRef>
+          <a:fillRef idx="1">
+            <a:schemeClr val="accent1"/>
+          </a:fillRef>
+          <a:effectRef idx="0">
+            <a:schemeClr val="accent1"/>
+          </a:effectRef>
+          <a:fontRef idx="minor">
+            <a:schemeClr val="lt1"/>
+          </a:fontRef>
+        </p:style>
+        <p:txBody>
+          <a:bodyPr rtlCol="0" anchor="ctr"/>
+          <a:lstStyle/>
+          <a:p>
+            <a:pPr algn="ctr"/>
+            <a:endParaRPr lang="en-US"/>
+          </a:p>
+        </p:txBody>
+      </p:sp>
+      <p:pic>
+        <p:nvPicPr>
+          <p:cNvPr id="11" name="Picture 10">
+            <a:extLst>
+              <a:ext uri="{FF2B5EF4-FFF2-40B4-BE49-F238E27FC236}">
+                <a16:creationId xmlns:a16="http://schemas.microsoft.com/office/drawing/2014/main" id="{F25FC69B-3FE4-12DA-9E38-90BE27F11F5C}"/>
+              </a:ext>
+            </a:extLst>
+          </p:cNvPr>
+          <p:cNvPicPr>
+            <a:picLocks noChangeAspect="1"/>
+          </p:cNvPicPr>
+          <p:nvPr/>
+        </p:nvPicPr>
+        <p:blipFill>
+          <a:blip r:embed="rId2">
+            <a:extLst>
+              <a:ext uri="{28A0092B-C50C-407E-A947-70E740481C1C}">
+                <a14:useLocalDpi xmlns:a14="http://schemas.microsoft.com/office/drawing/2010/main" val="0"/>
+              </a:ext>
+            </a:extLst>
+          </a:blip>
+          <a:stretch>
+            <a:fillRect/>
+          </a:stretch>
+        </p:blipFill>
+        <p:spPr>
+          <a:xfrm>
+            <a:off x="6781800" y="877179"/>
+            <a:ext cx="3276600" cy="2170821"/>
+          </a:xfrm>
+          <a:prstGeom prst="rect">
+            <a:avLst/>
+          </a:prstGeom>
+        </p:spPr>
+      </p:pic>
+      <p:pic>
+        <p:nvPicPr>
+          <p:cNvPr id="13" name="Picture 12">
+            <a:extLst>
+              <a:ext uri="{FF2B5EF4-FFF2-40B4-BE49-F238E27FC236}">
+                <a16:creationId xmlns:a16="http://schemas.microsoft.com/office/drawing/2014/main" id="{D88C3B45-B9BC-E201-B2FA-546931CCAEAF}"/>
+              </a:ext>
+            </a:extLst>
+          </p:cNvPr>
+          <p:cNvPicPr>
+            <a:picLocks noChangeAspect="1"/>
+          </p:cNvPicPr>
+          <p:nvPr/>
+        </p:nvPicPr>
+        <p:blipFill>
+          <a:blip r:embed="rId3">
+            <a:extLst>
+              <a:ext uri="{28A0092B-C50C-407E-A947-70E740481C1C}">
+                <a14:useLocalDpi xmlns:a14="http://schemas.microsoft.com/office/drawing/2010/main" val="0"/>
+              </a:ext>
+            </a:extLst>
+          </a:blip>
+          <a:stretch>
+            <a:fillRect/>
+          </a:stretch>
+        </p:blipFill>
+        <p:spPr>
+          <a:xfrm>
+            <a:off x="1261318" y="766454"/>
+            <a:ext cx="2415332" cy="1824346"/>
+          </a:xfrm>
+          <a:prstGeom prst="rect">
+            <a:avLst/>
+          </a:prstGeom>
+        </p:spPr>
+      </p:pic>
+    </p:spTree>
+    <p:extLst>
+      <p:ext uri="{BB962C8B-B14F-4D97-AF65-F5344CB8AC3E}">
+        <p14:creationId xmlns:p14="http://schemas.microsoft.com/office/powerpoint/2010/main" val="1881749533"/>
+      </p:ext>
+    </p:extLst>
+  </p:cSld>
+  <p:clrMapOvr>
+    <a:masterClrMapping/>
+  </p:clrMapOvr>
+  <p:transition>
+    <p:fade/>
+  </p:transition>
+</p:sld>
+</file>
+
+<file path=ppt/slides/slide4.xml><?xml version="1.0" encoding="utf-8"?>
+<p:sld xmlns:a="http://schemas.openxmlformats.org/drawingml/2006/main" xmlns:r="http://schemas.openxmlformats.org/officeDocument/2006/relationships" xmlns:p="http://schemas.openxmlformats.org/presentationml/2006/main">
+  <p:cSld>
+    <p:bg>
+      <p:bgPr>
+        <a:solidFill>
+          <a:srgbClr val="D9D9D9"/>
+        </a:solidFill>
+        <a:effectLst/>
+      </p:bgPr>
+    </p:bg>
+    <p:spTree>
+      <p:nvGrpSpPr>
+        <p:cNvPr id="1" name=""/>
+        <p:cNvGrpSpPr/>
+        <p:nvPr/>
+      </p:nvGrpSpPr>
+      <p:grpSpPr>
+        <a:xfrm>
+          <a:off x="0" y="0"/>
+          <a:ext cx="0" cy="0"/>
+          <a:chOff x="0" y="0"/>
+          <a:chExt cx="0" cy="0"/>
+        </a:xfrm>
+      </p:grpSpPr>
+      <p:sp>
+        <p:nvSpPr>
+          <p:cNvPr id="8" name="TextBox 7">
+            <a:extLst>
+              <a:ext uri="{FF2B5EF4-FFF2-40B4-BE49-F238E27FC236}">
+                <a16:creationId xmlns:a16="http://schemas.microsoft.com/office/drawing/2014/main" id="{353E4F0D-BFFE-6C18-B38E-8C617031EC35}"/>
+              </a:ext>
+            </a:extLst>
+          </p:cNvPr>
+          <p:cNvSpPr txBox="1"/>
+          <p:nvPr/>
+        </p:nvSpPr>
+        <p:spPr>
+          <a:xfrm>
+            <a:off x="3146996" y="762000"/>
+            <a:ext cx="4776681" cy="1569660"/>
+          </a:xfrm>
+          <a:prstGeom prst="rect">
+            <a:avLst/>
+          </a:prstGeom>
+          <a:noFill/>
+        </p:spPr>
+        <p:txBody>
+          <a:bodyPr wrap="square" rtlCol="0">
+            <a:spAutoFit/>
+          </a:bodyPr>
+          <a:lstStyle/>
+          <a:p>
+            <a:r>
+              <a:rPr lang="en-US" sz="9600" b="1">
+                <a:solidFill>
+                  <a:schemeClr val="accent3">
+                    <a:lumMod val="20000"/>
+                    <a:lumOff val="80000"/>
+                  </a:schemeClr>
+                </a:solidFill>
+              </a:rPr>
+              <a:t>Console</a:t>
+            </a:r>
+            <a:endParaRPr lang="en-US" sz="7200" b="1">
+              <a:solidFill>
+                <a:schemeClr val="accent3">
+                  <a:lumMod val="20000"/>
+                  <a:lumOff val="80000"/>
+                </a:schemeClr>
+              </a:solidFill>
+            </a:endParaRPr>
+          </a:p>
+        </p:txBody>
+      </p:sp>
+      <p:sp>
+        <p:nvSpPr>
+          <p:cNvPr id="7" name="TextBox 6">
+            <a:extLst>
+              <a:ext uri="{FF2B5EF4-FFF2-40B4-BE49-F238E27FC236}">
+                <a16:creationId xmlns:a16="http://schemas.microsoft.com/office/drawing/2014/main" id="{50102003-AB3D-F1A7-B8D1-C16B59A8E312}"/>
+              </a:ext>
+            </a:extLst>
+          </p:cNvPr>
+          <p:cNvSpPr txBox="1"/>
+          <p:nvPr/>
+        </p:nvSpPr>
+        <p:spPr>
+          <a:xfrm>
+            <a:off x="1300620" y="1437759"/>
+            <a:ext cx="1989647" cy="769441"/>
+          </a:xfrm>
+          <a:prstGeom prst="rect">
+            <a:avLst/>
+          </a:prstGeom>
+          <a:noFill/>
+        </p:spPr>
+        <p:txBody>
+          <a:bodyPr wrap="none" rtlCol="0">
+            <a:spAutoFit/>
+          </a:bodyPr>
+          <a:lstStyle/>
+          <a:p>
+            <a:r>
+              <a:rPr lang="en-US" sz="4400" b="1">
+                <a:solidFill>
+                  <a:sysClr val="windowText" lastClr="000000"/>
+                </a:solidFill>
+              </a:rPr>
+              <a:t>Gaming</a:t>
+            </a:r>
+            <a:endParaRPr lang="en-US" sz="6600" b="1">
+              <a:solidFill>
+                <a:sysClr val="windowText" lastClr="000000"/>
+              </a:solidFill>
+            </a:endParaRPr>
+          </a:p>
+        </p:txBody>
+      </p:sp>
+      <p:sp>
+        <p:nvSpPr>
+          <p:cNvPr id="6" name="TextBox 5">
+            <a:extLst>
+              <a:ext uri="{FF2B5EF4-FFF2-40B4-BE49-F238E27FC236}">
+                <a16:creationId xmlns:a16="http://schemas.microsoft.com/office/drawing/2014/main" id="{386F93B7-8598-88AC-AC80-7B9180BE846C}"/>
+              </a:ext>
+            </a:extLst>
+          </p:cNvPr>
+          <p:cNvSpPr txBox="1"/>
+          <p:nvPr/>
+        </p:nvSpPr>
+        <p:spPr>
+          <a:xfrm>
+            <a:off x="1362157" y="1145371"/>
+            <a:ext cx="923843" cy="584775"/>
+          </a:xfrm>
+          <a:prstGeom prst="rect">
+            <a:avLst/>
+          </a:prstGeom>
+          <a:noFill/>
+        </p:spPr>
+        <p:txBody>
+          <a:bodyPr wrap="none" rtlCol="0">
+            <a:spAutoFit/>
+          </a:bodyPr>
+          <a:lstStyle/>
+          <a:p>
+            <a:r>
+              <a:rPr lang="en-US" sz="3200" b="1">
+                <a:solidFill>
+                  <a:sysClr val="windowText" lastClr="000000"/>
+                </a:solidFill>
+              </a:rPr>
+              <a:t>Best</a:t>
+            </a:r>
+            <a:endParaRPr lang="en-US" sz="4400" b="1">
+              <a:solidFill>
+                <a:sysClr val="windowText" lastClr="000000"/>
+              </a:solidFill>
+            </a:endParaRPr>
+          </a:p>
+        </p:txBody>
+      </p:sp>
+      <p:sp>
+        <p:nvSpPr>
+          <p:cNvPr id="4" name="Rectangle 3">
+            <a:extLst>
+              <a:ext uri="{FF2B5EF4-FFF2-40B4-BE49-F238E27FC236}">
+                <a16:creationId xmlns:a16="http://schemas.microsoft.com/office/drawing/2014/main" id="{6B1146AE-003A-4DF7-D65A-C995D09D51C9}"/>
+              </a:ext>
+            </a:extLst>
+          </p:cNvPr>
+          <p:cNvSpPr/>
+          <p:nvPr/>
+        </p:nvSpPr>
+        <p:spPr>
+          <a:xfrm>
+            <a:off x="4648200" y="6172200"/>
+            <a:ext cx="3518195" cy="896788"/>
+          </a:xfrm>
+          <a:prstGeom prst="rect">
+            <a:avLst/>
+          </a:prstGeom>
+        </p:spPr>
+        <p:style>
+          <a:lnRef idx="2">
+            <a:schemeClr val="accent1">
+              <a:shade val="15000"/>
+            </a:schemeClr>
+          </a:lnRef>
+          <a:fillRef idx="1">
+            <a:schemeClr val="accent1"/>
+          </a:fillRef>
+          <a:effectRef idx="0">
+            <a:schemeClr val="accent1"/>
+          </a:effectRef>
+          <a:fontRef idx="minor">
+            <a:schemeClr val="lt1"/>
+          </a:fontRef>
+        </p:style>
+        <p:txBody>
+          <a:bodyPr rtlCol="0" anchor="ctr"/>
+          <a:lstStyle/>
+          <a:p>
+            <a:pPr algn="ctr"/>
+            <a:endParaRPr lang="en-US"/>
+          </a:p>
+        </p:txBody>
+      </p:sp>
+      <p:sp>
+        <p:nvSpPr>
+          <p:cNvPr id="9" name="Rectangle 8">
+            <a:extLst>
+              <a:ext uri="{FF2B5EF4-FFF2-40B4-BE49-F238E27FC236}">
+                <a16:creationId xmlns:a16="http://schemas.microsoft.com/office/drawing/2014/main" id="{D07B64A4-683D-918E-1344-22DFF1F000F1}"/>
+              </a:ext>
+            </a:extLst>
+          </p:cNvPr>
+          <p:cNvSpPr/>
+          <p:nvPr/>
+        </p:nvSpPr>
+        <p:spPr>
+          <a:xfrm>
+            <a:off x="4641702" y="-403767"/>
+            <a:ext cx="3518195" cy="896788"/>
+          </a:xfrm>
+          <a:prstGeom prst="rect">
+            <a:avLst/>
+          </a:prstGeom>
+        </p:spPr>
+        <p:style>
+          <a:lnRef idx="2">
+            <a:schemeClr val="accent1">
+              <a:shade val="15000"/>
+            </a:schemeClr>
+          </a:lnRef>
+          <a:fillRef idx="1">
+            <a:schemeClr val="accent1"/>
+          </a:fillRef>
+          <a:effectRef idx="0">
+            <a:schemeClr val="accent1"/>
+          </a:effectRef>
+          <a:fontRef idx="minor">
+            <a:schemeClr val="lt1"/>
+          </a:fontRef>
+        </p:style>
+        <p:txBody>
+          <a:bodyPr rtlCol="0" anchor="ctr"/>
+          <a:lstStyle/>
+          <a:p>
+            <a:pPr algn="ctr"/>
+            <a:endParaRPr lang="en-US"/>
+          </a:p>
+        </p:txBody>
+      </p:sp>
+      <p:pic>
+        <p:nvPicPr>
+          <p:cNvPr id="5" name="Picture 4">
+            <a:extLst>
+              <a:ext uri="{FF2B5EF4-FFF2-40B4-BE49-F238E27FC236}">
+                <a16:creationId xmlns:a16="http://schemas.microsoft.com/office/drawing/2014/main" id="{DCF18345-BBA4-A07F-3D27-A0C879AF0A71}"/>
+              </a:ext>
+            </a:extLst>
+          </p:cNvPr>
+          <p:cNvPicPr>
+            <a:picLocks noChangeAspect="1"/>
+          </p:cNvPicPr>
+          <p:nvPr/>
+        </p:nvPicPr>
+        <p:blipFill>
+          <a:blip r:embed="rId2">
+            <a:extLst>
+              <a:ext uri="{28A0092B-C50C-407E-A947-70E740481C1C}">
+                <a14:useLocalDpi xmlns:a14="http://schemas.microsoft.com/office/drawing/2010/main" val="0"/>
+              </a:ext>
+            </a:extLst>
+          </a:blip>
+          <a:stretch>
+            <a:fillRect/>
+          </a:stretch>
+        </p:blipFill>
+        <p:spPr>
+          <a:xfrm>
+            <a:off x="8077200" y="1124536"/>
+            <a:ext cx="1837247" cy="2165327"/>
+          </a:xfrm>
+          <a:prstGeom prst="rect">
+            <a:avLst/>
+          </a:prstGeom>
+        </p:spPr>
+      </p:pic>
+    </p:spTree>
+    <p:extLst>
+      <p:ext uri="{BB962C8B-B14F-4D97-AF65-F5344CB8AC3E}">
+        <p14:creationId xmlns:p14="http://schemas.microsoft.com/office/powerpoint/2010/main" val="3503517702"/>
+      </p:ext>
+    </p:extLst>
+  </p:cSld>
+  <p:clrMapOvr>
+    <a:masterClrMapping/>
+  </p:clrMapOvr>
+  <p:transition>
+    <p:fade/>
+  </p:transition>
+</p:sld>
+</file>
+
+<file path=ppt/slides/slide5.xml><?xml version="1.0" encoding="utf-8"?>
+<p:sld xmlns:a="http://schemas.openxmlformats.org/drawingml/2006/main" xmlns:r="http://schemas.openxmlformats.org/officeDocument/2006/relationships" xmlns:p="http://schemas.openxmlformats.org/presentationml/2006/main">
+  <p:cSld>
+    <p:bg>
+      <p:bgPr>
+        <a:solidFill>
+          <a:srgbClr val="2ECE70"/>
+        </a:solidFill>
+        <a:effectLst/>
+      </p:bgPr>
+    </p:bg>
+    <p:spTree>
+      <p:nvGrpSpPr>
+        <p:cNvPr id="1" name=""/>
+        <p:cNvGrpSpPr/>
+        <p:nvPr/>
+      </p:nvGrpSpPr>
+      <p:grpSpPr>
+        <a:xfrm>
+          <a:off x="0" y="0"/>
+          <a:ext cx="0" cy="0"/>
+          <a:chOff x="0" y="0"/>
+          <a:chExt cx="0" cy="0"/>
+        </a:xfrm>
+      </p:grpSpPr>
+      <p:sp>
+        <p:nvSpPr>
+          <p:cNvPr id="8" name="TextBox 7">
+            <a:extLst>
+              <a:ext uri="{FF2B5EF4-FFF2-40B4-BE49-F238E27FC236}">
+                <a16:creationId xmlns:a16="http://schemas.microsoft.com/office/drawing/2014/main" id="{353E4F0D-BFFE-6C18-B38E-8C617031EC35}"/>
+              </a:ext>
+            </a:extLst>
+          </p:cNvPr>
+          <p:cNvSpPr txBox="1"/>
+          <p:nvPr/>
+        </p:nvSpPr>
+        <p:spPr>
+          <a:xfrm>
+            <a:off x="4641702" y="457200"/>
+            <a:ext cx="2228495" cy="2215991"/>
+          </a:xfrm>
+          <a:prstGeom prst="rect">
+            <a:avLst/>
+          </a:prstGeom>
+          <a:noFill/>
+        </p:spPr>
+        <p:txBody>
+          <a:bodyPr wrap="none" rtlCol="0">
+            <a:spAutoFit/>
+          </a:bodyPr>
+          <a:lstStyle/>
+          <a:p>
+            <a:r>
+              <a:rPr lang="en-US" sz="13800" b="1">
+                <a:solidFill>
+                  <a:srgbClr val="B1EDC9"/>
+                </a:solidFill>
+              </a:rPr>
+              <a:t>VR</a:t>
+            </a:r>
+          </a:p>
+        </p:txBody>
+      </p:sp>
+      <p:sp>
+        <p:nvSpPr>
+          <p:cNvPr id="7" name="TextBox 6">
+            <a:extLst>
+              <a:ext uri="{FF2B5EF4-FFF2-40B4-BE49-F238E27FC236}">
+                <a16:creationId xmlns:a16="http://schemas.microsoft.com/office/drawing/2014/main" id="{50102003-AB3D-F1A7-B8D1-C16B59A8E312}"/>
+              </a:ext>
+            </a:extLst>
+          </p:cNvPr>
+          <p:cNvSpPr txBox="1"/>
+          <p:nvPr/>
+        </p:nvSpPr>
+        <p:spPr>
+          <a:xfrm rot="5400000">
+            <a:off x="2311111" y="2275567"/>
+            <a:ext cx="3793026" cy="1862048"/>
+          </a:xfrm>
+          <a:prstGeom prst="rect">
+            <a:avLst/>
+          </a:prstGeom>
+          <a:noFill/>
+        </p:spPr>
+        <p:txBody>
+          <a:bodyPr wrap="none" rtlCol="0">
+            <a:spAutoFit/>
+          </a:bodyPr>
+          <a:lstStyle/>
+          <a:p>
+            <a:r>
+              <a:rPr lang="en-US" sz="11500" b="1">
+                <a:solidFill>
+                  <a:srgbClr val="155F33"/>
+                </a:solidFill>
+              </a:rPr>
+              <a:t>Game</a:t>
+            </a:r>
+            <a:endParaRPr lang="en-US" sz="16600" b="1">
+              <a:solidFill>
+                <a:srgbClr val="155F33"/>
+              </a:solidFill>
+            </a:endParaRPr>
+          </a:p>
+        </p:txBody>
+      </p:sp>
+      <p:sp>
+        <p:nvSpPr>
+          <p:cNvPr id="6" name="TextBox 5">
+            <a:extLst>
+              <a:ext uri="{FF2B5EF4-FFF2-40B4-BE49-F238E27FC236}">
+                <a16:creationId xmlns:a16="http://schemas.microsoft.com/office/drawing/2014/main" id="{386F93B7-8598-88AC-AC80-7B9180BE846C}"/>
+              </a:ext>
+            </a:extLst>
+          </p:cNvPr>
+          <p:cNvSpPr txBox="1"/>
+          <p:nvPr/>
+        </p:nvSpPr>
+        <p:spPr>
+          <a:xfrm>
+            <a:off x="3562479" y="719554"/>
+            <a:ext cx="1161921" cy="769441"/>
+          </a:xfrm>
+          <a:prstGeom prst="rect">
+            <a:avLst/>
+          </a:prstGeom>
+          <a:noFill/>
+        </p:spPr>
+        <p:txBody>
+          <a:bodyPr wrap="none" rtlCol="0">
+            <a:spAutoFit/>
+          </a:bodyPr>
+          <a:lstStyle/>
+          <a:p>
+            <a:r>
+              <a:rPr lang="en-US" sz="4400" b="1">
+                <a:solidFill>
+                  <a:schemeClr val="bg1"/>
+                </a:solidFill>
+              </a:rPr>
+              <a:t>play</a:t>
+            </a:r>
+          </a:p>
+        </p:txBody>
+      </p:sp>
+      <p:sp>
+        <p:nvSpPr>
+          <p:cNvPr id="4" name="Rectangle 3">
+            <a:extLst>
+              <a:ext uri="{FF2B5EF4-FFF2-40B4-BE49-F238E27FC236}">
+                <a16:creationId xmlns:a16="http://schemas.microsoft.com/office/drawing/2014/main" id="{6B1146AE-003A-4DF7-D65A-C995D09D51C9}"/>
+              </a:ext>
+            </a:extLst>
+          </p:cNvPr>
+          <p:cNvSpPr/>
+          <p:nvPr/>
+        </p:nvSpPr>
+        <p:spPr>
+          <a:xfrm>
+            <a:off x="4648200" y="6172200"/>
+            <a:ext cx="3518195" cy="896788"/>
+          </a:xfrm>
+          <a:prstGeom prst="rect">
+            <a:avLst/>
+          </a:prstGeom>
+        </p:spPr>
+        <p:style>
+          <a:lnRef idx="2">
+            <a:schemeClr val="accent1">
+              <a:shade val="15000"/>
+            </a:schemeClr>
+          </a:lnRef>
+          <a:fillRef idx="1">
+            <a:schemeClr val="accent1"/>
+          </a:fillRef>
+          <a:effectRef idx="0">
+            <a:schemeClr val="accent1"/>
+          </a:effectRef>
+          <a:fontRef idx="minor">
+            <a:schemeClr val="lt1"/>
+          </a:fontRef>
+        </p:style>
+        <p:txBody>
+          <a:bodyPr rtlCol="0" anchor="ctr"/>
+          <a:lstStyle/>
+          <a:p>
+            <a:pPr algn="ctr"/>
+            <a:endParaRPr lang="en-US"/>
+          </a:p>
+        </p:txBody>
+      </p:sp>
+      <p:sp>
+        <p:nvSpPr>
+          <p:cNvPr id="9" name="Rectangle 8">
+            <a:extLst>
+              <a:ext uri="{FF2B5EF4-FFF2-40B4-BE49-F238E27FC236}">
+                <a16:creationId xmlns:a16="http://schemas.microsoft.com/office/drawing/2014/main" id="{D07B64A4-683D-918E-1344-22DFF1F000F1}"/>
+              </a:ext>
+            </a:extLst>
+          </p:cNvPr>
+          <p:cNvSpPr/>
+          <p:nvPr/>
+        </p:nvSpPr>
+        <p:spPr>
+          <a:xfrm>
+            <a:off x="4641702" y="-403767"/>
+            <a:ext cx="3518195" cy="896788"/>
+          </a:xfrm>
+          <a:prstGeom prst="rect">
+            <a:avLst/>
+          </a:prstGeom>
+        </p:spPr>
+        <p:style>
+          <a:lnRef idx="2">
+            <a:schemeClr val="accent1">
+              <a:shade val="15000"/>
+            </a:schemeClr>
+          </a:lnRef>
+          <a:fillRef idx="1">
+            <a:schemeClr val="accent1"/>
+          </a:fillRef>
+          <a:effectRef idx="0">
+            <a:schemeClr val="accent1"/>
+          </a:effectRef>
+          <a:fontRef idx="minor">
+            <a:schemeClr val="lt1"/>
+          </a:fontRef>
+        </p:style>
+        <p:txBody>
+          <a:bodyPr rtlCol="0" anchor="ctr"/>
+          <a:lstStyle/>
+          <a:p>
+            <a:pPr algn="ctr"/>
+            <a:endParaRPr lang="en-US"/>
+          </a:p>
+        </p:txBody>
+      </p:sp>
+      <p:pic>
+        <p:nvPicPr>
+          <p:cNvPr id="10" name="Picture 9">
+            <a:extLst>
+              <a:ext uri="{FF2B5EF4-FFF2-40B4-BE49-F238E27FC236}">
+                <a16:creationId xmlns:a16="http://schemas.microsoft.com/office/drawing/2014/main" id="{9717C789-B87E-E805-A0B4-556E8448D35F}"/>
+              </a:ext>
+            </a:extLst>
+          </p:cNvPr>
+          <p:cNvPicPr>
+            <a:picLocks noChangeAspect="1"/>
+          </p:cNvPicPr>
+          <p:nvPr/>
+        </p:nvPicPr>
+        <p:blipFill>
+          <a:blip r:embed="rId2">
+            <a:extLst>
+              <a:ext uri="{28A0092B-C50C-407E-A947-70E740481C1C}">
+                <a14:useLocalDpi xmlns:a14="http://schemas.microsoft.com/office/drawing/2010/main" val="0"/>
+              </a:ext>
+            </a:extLst>
+          </a:blip>
+          <a:stretch>
+            <a:fillRect/>
+          </a:stretch>
+        </p:blipFill>
+        <p:spPr>
+          <a:xfrm>
+            <a:off x="4494540" y="2438400"/>
+            <a:ext cx="4941997" cy="3276600"/>
+          </a:xfrm>
+          <a:prstGeom prst="rect">
+            <a:avLst/>
+          </a:prstGeom>
+        </p:spPr>
+      </p:pic>
+    </p:spTree>
+    <p:extLst>
+      <p:ext uri="{BB962C8B-B14F-4D97-AF65-F5344CB8AC3E}">
+        <p14:creationId xmlns:p14="http://schemas.microsoft.com/office/powerpoint/2010/main" val="2579745969"/>
+      </p:ext>
+    </p:extLst>
+  </p:cSld>
+  <p:clrMapOvr>
+    <a:masterClrMapping/>
+  </p:clrMapOvr>
+  <p:transition>
+    <p:fade/>
+  </p:transition>
+</p:sld>
+</file>
+
+<file path=ppt/slides/slide6.xml><?xml version="1.0" encoding="utf-8"?>
+<p:sld xmlns:a="http://schemas.openxmlformats.org/drawingml/2006/main" xmlns:r="http://schemas.openxmlformats.org/officeDocument/2006/relationships" xmlns:p="http://schemas.openxmlformats.org/presentationml/2006/main">
+  <p:cSld>
+    <p:bg>
+      <p:bgPr>
+        <a:solidFill>
+          <a:srgbClr val="157CFF"/>
+        </a:solidFill>
+        <a:effectLst/>
+      </p:bgPr>
+    </p:bg>
+    <p:spTree>
+      <p:nvGrpSpPr>
+        <p:cNvPr id="1" name=""/>
+        <p:cNvGrpSpPr/>
+        <p:nvPr/>
+      </p:nvGrpSpPr>
+      <p:grpSpPr>
+        <a:xfrm>
+          <a:off x="0" y="0"/>
+          <a:ext cx="0" cy="0"/>
+          <a:chOff x="0" y="0"/>
+          <a:chExt cx="0" cy="0"/>
+        </a:xfrm>
+      </p:grpSpPr>
+      <p:sp>
+        <p:nvSpPr>
+          <p:cNvPr id="8" name="TextBox 7">
+            <a:extLst>
+              <a:ext uri="{FF2B5EF4-FFF2-40B4-BE49-F238E27FC236}">
+                <a16:creationId xmlns:a16="http://schemas.microsoft.com/office/drawing/2014/main" id="{353E4F0D-BFFE-6C18-B38E-8C617031EC35}"/>
+              </a:ext>
+            </a:extLst>
+          </p:cNvPr>
+          <p:cNvSpPr txBox="1"/>
+          <p:nvPr/>
+        </p:nvSpPr>
+        <p:spPr>
+          <a:xfrm>
+            <a:off x="4641702" y="457200"/>
+            <a:ext cx="2510624" cy="2215991"/>
+          </a:xfrm>
+          <a:prstGeom prst="rect">
+            <a:avLst/>
+          </a:prstGeom>
+          <a:noFill/>
+        </p:spPr>
+        <p:txBody>
+          <a:bodyPr wrap="none" rtlCol="0">
+            <a:spAutoFit/>
+          </a:bodyPr>
+          <a:lstStyle/>
+          <a:p>
+            <a:r>
+              <a:rPr lang="en-US" sz="13800" b="1">
+                <a:solidFill>
+                  <a:schemeClr val="accent5">
+                    <a:lumMod val="20000"/>
+                    <a:lumOff val="80000"/>
+                  </a:schemeClr>
+                </a:solidFill>
+              </a:rPr>
+              <a:t>JBL</a:t>
+            </a:r>
+          </a:p>
+        </p:txBody>
+      </p:sp>
+      <p:sp>
+        <p:nvSpPr>
+          <p:cNvPr id="7" name="TextBox 6">
+            <a:extLst>
+              <a:ext uri="{FF2B5EF4-FFF2-40B4-BE49-F238E27FC236}">
+                <a16:creationId xmlns:a16="http://schemas.microsoft.com/office/drawing/2014/main" id="{50102003-AB3D-F1A7-B8D1-C16B59A8E312}"/>
+              </a:ext>
+            </a:extLst>
+          </p:cNvPr>
+          <p:cNvSpPr txBox="1"/>
+          <p:nvPr/>
+        </p:nvSpPr>
+        <p:spPr>
+          <a:xfrm>
+            <a:off x="3436293" y="1847309"/>
+            <a:ext cx="5618461" cy="1862048"/>
+          </a:xfrm>
+          <a:prstGeom prst="rect">
+            <a:avLst/>
+          </a:prstGeom>
+          <a:noFill/>
+        </p:spPr>
+        <p:txBody>
+          <a:bodyPr wrap="none" rtlCol="0">
+            <a:spAutoFit/>
+          </a:bodyPr>
+          <a:lstStyle/>
+          <a:p>
+            <a:r>
+              <a:rPr lang="en-US" sz="11500" b="1">
+                <a:solidFill>
+                  <a:srgbClr val="8FBFFF"/>
+                </a:solidFill>
+              </a:rPr>
+              <a:t>SPEAKER</a:t>
+            </a:r>
+            <a:endParaRPr lang="en-US" sz="16600" b="1">
+              <a:solidFill>
+                <a:srgbClr val="8FBFFF"/>
+              </a:solidFill>
+            </a:endParaRPr>
+          </a:p>
+        </p:txBody>
+      </p:sp>
+      <p:sp>
+        <p:nvSpPr>
+          <p:cNvPr id="6" name="TextBox 5">
+            <a:extLst>
+              <a:ext uri="{FF2B5EF4-FFF2-40B4-BE49-F238E27FC236}">
+                <a16:creationId xmlns:a16="http://schemas.microsoft.com/office/drawing/2014/main" id="{386F93B7-8598-88AC-AC80-7B9180BE846C}"/>
+              </a:ext>
+            </a:extLst>
+          </p:cNvPr>
+          <p:cNvSpPr txBox="1"/>
+          <p:nvPr/>
+        </p:nvSpPr>
+        <p:spPr>
+          <a:xfrm>
+            <a:off x="3513621" y="1565195"/>
+            <a:ext cx="1278427" cy="769441"/>
+          </a:xfrm>
+          <a:prstGeom prst="rect">
+            <a:avLst/>
+          </a:prstGeom>
+          <a:noFill/>
+        </p:spPr>
+        <p:txBody>
+          <a:bodyPr wrap="none" rtlCol="0">
+            <a:spAutoFit/>
+          </a:bodyPr>
+          <a:lstStyle/>
+          <a:p>
+            <a:r>
+              <a:rPr lang="en-US" sz="4400" b="1">
+                <a:solidFill>
+                  <a:schemeClr val="bg1"/>
+                </a:solidFill>
+              </a:rPr>
+              <a:t>Now</a:t>
+            </a:r>
+          </a:p>
+        </p:txBody>
+      </p:sp>
+      <p:sp>
+        <p:nvSpPr>
+          <p:cNvPr id="4" name="Rectangle 3">
+            <a:extLst>
+              <a:ext uri="{FF2B5EF4-FFF2-40B4-BE49-F238E27FC236}">
+                <a16:creationId xmlns:a16="http://schemas.microsoft.com/office/drawing/2014/main" id="{6B1146AE-003A-4DF7-D65A-C995D09D51C9}"/>
+              </a:ext>
+            </a:extLst>
+          </p:cNvPr>
+          <p:cNvSpPr/>
+          <p:nvPr/>
+        </p:nvSpPr>
+        <p:spPr>
+          <a:xfrm>
+            <a:off x="4648200" y="6418412"/>
+            <a:ext cx="3518195" cy="896788"/>
+          </a:xfrm>
+          <a:prstGeom prst="rect">
+            <a:avLst/>
+          </a:prstGeom>
+        </p:spPr>
+        <p:style>
+          <a:lnRef idx="2">
+            <a:schemeClr val="accent1">
+              <a:shade val="15000"/>
+            </a:schemeClr>
+          </a:lnRef>
+          <a:fillRef idx="1">
+            <a:schemeClr val="accent1"/>
+          </a:fillRef>
+          <a:effectRef idx="0">
+            <a:schemeClr val="accent1"/>
+          </a:effectRef>
+          <a:fontRef idx="minor">
+            <a:schemeClr val="lt1"/>
+          </a:fontRef>
+        </p:style>
+        <p:txBody>
+          <a:bodyPr rtlCol="0" anchor="ctr"/>
+          <a:lstStyle/>
+          <a:p>
+            <a:pPr algn="ctr"/>
+            <a:endParaRPr lang="en-US"/>
+          </a:p>
+        </p:txBody>
+      </p:sp>
+      <p:sp>
+        <p:nvSpPr>
+          <p:cNvPr id="9" name="Rectangle 8">
+            <a:extLst>
+              <a:ext uri="{FF2B5EF4-FFF2-40B4-BE49-F238E27FC236}">
+                <a16:creationId xmlns:a16="http://schemas.microsoft.com/office/drawing/2014/main" id="{D07B64A4-683D-918E-1344-22DFF1F000F1}"/>
+              </a:ext>
+            </a:extLst>
+          </p:cNvPr>
+          <p:cNvSpPr/>
+          <p:nvPr/>
+        </p:nvSpPr>
+        <p:spPr>
+          <a:xfrm>
+            <a:off x="4641702" y="-403767"/>
+            <a:ext cx="3518195" cy="896788"/>
+          </a:xfrm>
+          <a:prstGeom prst="rect">
+            <a:avLst/>
+          </a:prstGeom>
+        </p:spPr>
+        <p:style>
+          <a:lnRef idx="2">
+            <a:schemeClr val="accent1">
+              <a:shade val="15000"/>
+            </a:schemeClr>
+          </a:lnRef>
+          <a:fillRef idx="1">
+            <a:schemeClr val="accent1"/>
+          </a:fillRef>
+          <a:effectRef idx="0">
+            <a:schemeClr val="accent1"/>
+          </a:effectRef>
+          <a:fontRef idx="minor">
+            <a:schemeClr val="lt1"/>
+          </a:fontRef>
+        </p:style>
+        <p:txBody>
+          <a:bodyPr rtlCol="0" anchor="ctr"/>
+          <a:lstStyle/>
+          <a:p>
+            <a:pPr algn="ctr"/>
+            <a:endParaRPr lang="en-US"/>
+          </a:p>
+        </p:txBody>
+      </p:sp>
+      <p:pic>
+        <p:nvPicPr>
+          <p:cNvPr id="2" name="Picture 1">
+            <a:extLst>
+              <a:ext uri="{FF2B5EF4-FFF2-40B4-BE49-F238E27FC236}">
+                <a16:creationId xmlns:a16="http://schemas.microsoft.com/office/drawing/2014/main" id="{1CC19AAE-B14A-F82D-4D4A-85D28E20DD8D}"/>
+              </a:ext>
+            </a:extLst>
+          </p:cNvPr>
+          <p:cNvPicPr>
+            <a:picLocks noChangeAspect="1"/>
+          </p:cNvPicPr>
+          <p:nvPr/>
+        </p:nvPicPr>
+        <p:blipFill>
+          <a:blip r:embed="rId2">
+            <a:extLst>
+              <a:ext uri="{BEBA8EAE-BF5A-486C-A8C5-ECC9F3942E4B}">
+                <a14:imgProps xmlns:a14="http://schemas.microsoft.com/office/drawing/2010/main">
+                  <a14:imgLayer r:embed="rId3">
+                    <a14:imgEffect>
+                      <a14:backgroundRemoval t="4348" b="89043" l="1905" r="92925">
+                        <a14:foregroundMark x1="5442" y1="32348" x2="8571" y2="53391"/>
+                        <a14:foregroundMark x1="8571" y1="53391" x2="8707" y2="53565"/>
+                        <a14:foregroundMark x1="6803" y1="48696" x2="63810" y2="17043"/>
+                        <a14:foregroundMark x1="64898" y1="17043" x2="87483" y2="29043"/>
+                        <a14:foregroundMark x1="87483" y1="30087" x2="88571" y2="37565"/>
+                        <a14:foregroundMark x1="79048" y1="34261" x2="76735" y2="36000"/>
+                        <a14:foregroundMark x1="78639" y1="39304" x2="79592" y2="38261"/>
+                        <a14:foregroundMark x1="87891" y1="29217" x2="92245" y2="32696"/>
+                        <a14:foregroundMark x1="93197" y1="27826" x2="91837" y2="36870"/>
+                        <a14:foregroundMark x1="46803" y1="9391" x2="77823" y2="4348"/>
+                        <a14:foregroundMark x1="80000" y1="4696" x2="45850" y2="12696"/>
+                        <a14:foregroundMark x1="45850" y1="12696" x2="45714" y2="13217"/>
+                        <a14:foregroundMark x1="66395" y1="6609" x2="63673" y2="11304"/>
+                        <a14:foregroundMark x1="41361" y1="22609" x2="29388" y2="34957"/>
+                        <a14:foregroundMark x1="36599" y1="40000" x2="56054" y2="44870"/>
+                        <a14:foregroundMark x1="32381" y1="44522" x2="30204" y2="45043"/>
+                        <a14:foregroundMark x1="3129" y1="37739" x2="1905" y2="52000"/>
+                      </a14:backgroundRemoval>
+                    </a14:imgEffect>
+                  </a14:imgLayer>
+                </a14:imgProps>
+              </a:ext>
+            </a:extLst>
+          </a:blip>
+          <a:srcRect b="24956"/>
+          <a:stretch/>
+        </p:blipFill>
+        <p:spPr>
+          <a:xfrm rot="19836989">
+            <a:off x="5407501" y="3160467"/>
+            <a:ext cx="3489650" cy="2048686"/>
+          </a:xfrm>
+          <a:prstGeom prst="rect">
+            <a:avLst/>
+          </a:prstGeom>
+        </p:spPr>
+      </p:pic>
+    </p:spTree>
+    <p:extLst>
+      <p:ext uri="{BB962C8B-B14F-4D97-AF65-F5344CB8AC3E}">
+        <p14:creationId xmlns:p14="http://schemas.microsoft.com/office/powerpoint/2010/main" val="3413669615"/>
+      </p:ext>
+    </p:extLst>
+  </p:cSld>
+  <p:clrMapOvr>
+    <a:masterClrMapping/>
+  </p:clrMapOvr>
+  <p:transition>
+    <p:fade/>
+  </p:transition>
+</p:sld>
+</file>
+
+<file path=ppt/slides/slide7.xml><?xml version="1.0" encoding="utf-8"?>
+<p:sld xmlns:a="http://schemas.openxmlformats.org/drawingml/2006/main" xmlns:r="http://schemas.openxmlformats.org/officeDocument/2006/relationships" xmlns:p="http://schemas.openxmlformats.org/presentationml/2006/main">
+  <p:cSld>
+    <p:bg>
+      <p:bgPr>
+        <a:solidFill>
+          <a:srgbClr val="F1F1F1"/>
+        </a:solidFill>
+        <a:effectLst/>
+      </p:bgPr>
+    </p:bg>
+    <p:spTree>
+      <p:nvGrpSpPr>
+        <p:cNvPr id="1" name=""/>
+        <p:cNvGrpSpPr/>
+        <p:nvPr/>
+      </p:nvGrpSpPr>
+      <p:grpSpPr>
+        <a:xfrm>
+          <a:off x="0" y="0"/>
+          <a:ext cx="0" cy="0"/>
+          <a:chOff x="0" y="0"/>
+          <a:chExt cx="0" cy="0"/>
+        </a:xfrm>
+      </p:grpSpPr>
+      <p:pic>
+        <p:nvPicPr>
+          <p:cNvPr id="3" name="Picture 2">
+            <a:extLst>
+              <a:ext uri="{FF2B5EF4-FFF2-40B4-BE49-F238E27FC236}">
+                <a16:creationId xmlns:a16="http://schemas.microsoft.com/office/drawing/2014/main" id="{E6E44495-8731-93A8-AB0D-F8B4FA507DD1}"/>
+              </a:ext>
+            </a:extLst>
+          </p:cNvPr>
+          <p:cNvPicPr>
+            <a:picLocks noChangeAspect="1"/>
+          </p:cNvPicPr>
+          <p:nvPr/>
+        </p:nvPicPr>
+        <p:blipFill>
+          <a:blip r:embed="rId2"/>
+          <a:stretch>
+            <a:fillRect/>
+          </a:stretch>
+        </p:blipFill>
+        <p:spPr>
+          <a:xfrm>
+            <a:off x="3414712" y="1652587"/>
+            <a:ext cx="5362575" cy="3552825"/>
+          </a:xfrm>
+          <a:prstGeom prst="rect">
+            <a:avLst/>
+          </a:prstGeom>
+        </p:spPr>
+      </p:pic>
+      <p:sp>
+        <p:nvSpPr>
+          <p:cNvPr id="5" name="Rectangle 4">
+            <a:extLst>
+              <a:ext uri="{FF2B5EF4-FFF2-40B4-BE49-F238E27FC236}">
+                <a16:creationId xmlns:a16="http://schemas.microsoft.com/office/drawing/2014/main" id="{ADFF3A91-4295-9C52-3061-E78CAA08800E}"/>
+              </a:ext>
+            </a:extLst>
+          </p:cNvPr>
+          <p:cNvSpPr/>
+          <p:nvPr/>
+        </p:nvSpPr>
+        <p:spPr>
+          <a:xfrm>
+            <a:off x="2590800" y="1167769"/>
+            <a:ext cx="6377306" cy="4623431"/>
+          </a:xfrm>
+          <a:prstGeom prst="rect">
+            <a:avLst/>
+          </a:prstGeom>
+          <a:noFill/>
+          <a:ln w="57150"/>
+        </p:spPr>
+        <p:style>
+          <a:lnRef idx="2">
+            <a:schemeClr val="accent1">
+              <a:shade val="15000"/>
+            </a:schemeClr>
+          </a:lnRef>
+          <a:fillRef idx="1">
+            <a:schemeClr val="accent1"/>
+          </a:fillRef>
+          <a:effectRef idx="0">
+            <a:schemeClr val="accent1"/>
+          </a:effectRef>
+          <a:fontRef idx="minor">
+            <a:schemeClr val="lt1"/>
+          </a:fontRef>
+        </p:style>
+        <p:txBody>
+          <a:bodyPr rtlCol="0" anchor="ctr"/>
+          <a:lstStyle/>
+          <a:p>
+            <a:pPr algn="ctr"/>
+            <a:endParaRPr lang="en-US"/>
+          </a:p>
+        </p:txBody>
+      </p:sp>
+    </p:spTree>
+    <p:extLst>
+      <p:ext uri="{BB962C8B-B14F-4D97-AF65-F5344CB8AC3E}">
+        <p14:creationId xmlns:p14="http://schemas.microsoft.com/office/powerpoint/2010/main" val="1373490809"/>
+      </p:ext>
+    </p:extLst>
+  </p:cSld>
+  <p:clrMapOvr>
+    <a:masterClrMapping/>
+  </p:clrMapOvr>
+  <p:transition>
+    <p:fade/>
+  </p:transition>
+</p:sld>
+</file>
+
+<file path=ppt/slides/slide8.xml><?xml version="1.0" encoding="utf-8"?>
+<p:sld xmlns:a="http://schemas.openxmlformats.org/drawingml/2006/main" xmlns:r="http://schemas.openxmlformats.org/officeDocument/2006/relationships" xmlns:p="http://schemas.openxmlformats.org/presentationml/2006/main">
+  <p:cSld>
+    <p:bg>
+      <p:bgPr>
+        <a:solidFill>
+          <a:srgbClr val="F8F8F8"/>
+        </a:solidFill>
+        <a:effectLst/>
+      </p:bgPr>
+    </p:bg>
+    <p:spTree>
+      <p:nvGrpSpPr>
+        <p:cNvPr id="1" name=""/>
+        <p:cNvGrpSpPr/>
+        <p:nvPr/>
+      </p:nvGrpSpPr>
+      <p:grpSpPr>
+        <a:xfrm>
+          <a:off x="0" y="0"/>
+          <a:ext cx="0" cy="0"/>
+          <a:chOff x="0" y="0"/>
+          <a:chExt cx="0" cy="0"/>
+        </a:xfrm>
+      </p:grpSpPr>
+      <p:sp>
+        <p:nvSpPr>
+          <p:cNvPr id="5" name="Rectangle 4">
+            <a:extLst>
+              <a:ext uri="{FF2B5EF4-FFF2-40B4-BE49-F238E27FC236}">
+                <a16:creationId xmlns:a16="http://schemas.microsoft.com/office/drawing/2014/main" id="{ADFF3A91-4295-9C52-3061-E78CAA08800E}"/>
+              </a:ext>
+            </a:extLst>
+          </p:cNvPr>
+          <p:cNvSpPr/>
+          <p:nvPr/>
+        </p:nvSpPr>
+        <p:spPr>
+          <a:xfrm>
+            <a:off x="2590800" y="1167769"/>
+            <a:ext cx="6377306" cy="4623431"/>
+          </a:xfrm>
+          <a:prstGeom prst="rect">
+            <a:avLst/>
+          </a:prstGeom>
+          <a:noFill/>
+          <a:ln w="57150"/>
+        </p:spPr>
+        <p:style>
+          <a:lnRef idx="2">
+            <a:schemeClr val="accent1">
+              <a:shade val="15000"/>
+            </a:schemeClr>
+          </a:lnRef>
+          <a:fillRef idx="1">
+            <a:schemeClr val="accent1"/>
+          </a:fillRef>
+          <a:effectRef idx="0">
+            <a:schemeClr val="accent1"/>
+          </a:effectRef>
+          <a:fontRef idx="minor">
+            <a:schemeClr val="lt1"/>
+          </a:fontRef>
+        </p:style>
+        <p:txBody>
+          <a:bodyPr rtlCol="0" anchor="ctr"/>
+          <a:lstStyle/>
+          <a:p>
+            <a:pPr algn="ctr"/>
+            <a:endParaRPr lang="en-US"/>
+          </a:p>
+        </p:txBody>
+      </p:sp>
+      <p:pic>
+        <p:nvPicPr>
+          <p:cNvPr id="1026" name="Picture 2">
+            <a:extLst>
+              <a:ext uri="{FF2B5EF4-FFF2-40B4-BE49-F238E27FC236}">
+                <a16:creationId xmlns:a16="http://schemas.microsoft.com/office/drawing/2014/main" id="{5168C581-D69C-5F41-8134-A4C4ABE2BEB5}"/>
+              </a:ext>
+            </a:extLst>
+          </p:cNvPr>
+          <p:cNvPicPr>
+            <a:picLocks noChangeAspect="1" noChangeArrowheads="1"/>
+          </p:cNvPicPr>
+          <p:nvPr/>
+        </p:nvPicPr>
+        <p:blipFill>
+          <a:blip r:embed="rId2">
+            <a:extLst>
+              <a:ext uri="{28A0092B-C50C-407E-A947-70E740481C1C}">
+                <a14:useLocalDpi xmlns:a14="http://schemas.microsoft.com/office/drawing/2010/main" val="0"/>
+              </a:ext>
+            </a:extLst>
+          </a:blip>
+          <a:srcRect/>
+          <a:stretch>
+            <a:fillRect/>
+          </a:stretch>
+        </p:blipFill>
+        <p:spPr bwMode="auto">
+          <a:xfrm>
+            <a:off x="3093403" y="1633537"/>
+            <a:ext cx="5372100" cy="3590925"/>
+          </a:xfrm>
+          <a:prstGeom prst="rect">
+            <a:avLst/>
+          </a:prstGeom>
+          <a:noFill/>
+          <a:extLst>
+            <a:ext uri="{909E8E84-426E-40DD-AFC4-6F175D3DCCD1}">
+              <a14:hiddenFill xmlns:a14="http://schemas.microsoft.com/office/drawing/2010/main">
+                <a:solidFill>
+                  <a:srgbClr val="FFFFFF"/>
+                </a:solidFill>
+              </a14:hiddenFill>
+            </a:ext>
+          </a:extLst>
+        </p:spPr>
+      </p:pic>
+    </p:spTree>
+    <p:extLst>
+      <p:ext uri="{BB962C8B-B14F-4D97-AF65-F5344CB8AC3E}">
+        <p14:creationId xmlns:p14="http://schemas.microsoft.com/office/powerpoint/2010/main" val="94104684"/>
+      </p:ext>
+    </p:extLst>
+  </p:cSld>
+  <p:clrMapOvr>
+    <a:masterClrMapping/>
+  </p:clrMapOvr>
+  <p:transition>
+    <p:fade/>
+  </p:transition>
+</p:sld>
+</file>
+
+<file path=ppt/slides/slide9.xml><?xml version="1.0" encoding="utf-8"?>
+<p:sld xmlns:a="http://schemas.openxmlformats.org/drawingml/2006/main" xmlns:r="http://schemas.openxmlformats.org/officeDocument/2006/relationships" xmlns:p="http://schemas.openxmlformats.org/presentationml/2006/main">
+  <p:cSld>
+    <p:bg>
+      <p:bgPr>
+        <a:solidFill>
+          <a:srgbClr val="FFFFFF"/>
+        </a:solidFill>
+        <a:effectLst/>
+      </p:bgPr>
+    </p:bg>
+    <p:spTree>
+      <p:nvGrpSpPr>
+        <p:cNvPr id="1" name=""/>
+        <p:cNvGrpSpPr/>
+        <p:nvPr/>
+      </p:nvGrpSpPr>
+      <p:grpSpPr>
+        <a:xfrm>
+          <a:off x="0" y="0"/>
+          <a:ext cx="0" cy="0"/>
+          <a:chOff x="0" y="0"/>
+          <a:chExt cx="0" cy="0"/>
+        </a:xfrm>
+      </p:grpSpPr>
+      <p:sp>
+        <p:nvSpPr>
+          <p:cNvPr id="5" name="Rectangle 4">
+            <a:extLst>
+              <a:ext uri="{FF2B5EF4-FFF2-40B4-BE49-F238E27FC236}">
+                <a16:creationId xmlns:a16="http://schemas.microsoft.com/office/drawing/2014/main" id="{ADFF3A91-4295-9C52-3061-E78CAA08800E}"/>
+              </a:ext>
+            </a:extLst>
+          </p:cNvPr>
+          <p:cNvSpPr/>
+          <p:nvPr/>
+        </p:nvSpPr>
+        <p:spPr>
+          <a:xfrm>
+            <a:off x="2590800" y="1167769"/>
+            <a:ext cx="6377306" cy="4623431"/>
+          </a:xfrm>
+          <a:prstGeom prst="rect">
+            <a:avLst/>
+          </a:prstGeom>
+          <a:noFill/>
+          <a:ln w="57150"/>
+        </p:spPr>
+        <p:style>
+          <a:lnRef idx="2">
+            <a:schemeClr val="accent1">
+              <a:shade val="15000"/>
+            </a:schemeClr>
+          </a:lnRef>
+          <a:fillRef idx="1">
+            <a:schemeClr val="accent1"/>
+          </a:fillRef>
+          <a:effectRef idx="0">
+            <a:schemeClr val="accent1"/>
+          </a:effectRef>
+          <a:fontRef idx="minor">
+            <a:schemeClr val="lt1"/>
+          </a:fontRef>
+        </p:style>
+        <p:txBody>
+          <a:bodyPr rtlCol="0" anchor="ctr"/>
+          <a:lstStyle/>
+          <a:p>
+            <a:pPr algn="ctr"/>
+            <a:endParaRPr lang="en-US"/>
+          </a:p>
+        </p:txBody>
+      </p:sp>
+      <p:pic>
+        <p:nvPicPr>
+          <p:cNvPr id="1028" name="Picture 4">
+            <a:extLst>
+              <a:ext uri="{FF2B5EF4-FFF2-40B4-BE49-F238E27FC236}">
+                <a16:creationId xmlns:a16="http://schemas.microsoft.com/office/drawing/2014/main" id="{8D3464C3-2E60-4307-6390-D34FEFFBA4D2}"/>
+              </a:ext>
+            </a:extLst>
+          </p:cNvPr>
+          <p:cNvPicPr>
+            <a:picLocks noChangeAspect="1" noChangeArrowheads="1"/>
+          </p:cNvPicPr>
+          <p:nvPr/>
+        </p:nvPicPr>
+        <p:blipFill>
+          <a:blip r:embed="rId2">
+            <a:extLst>
+              <a:ext uri="{28A0092B-C50C-407E-A947-70E740481C1C}">
+                <a14:useLocalDpi xmlns:a14="http://schemas.microsoft.com/office/drawing/2010/main" val="0"/>
+              </a:ext>
+            </a:extLst>
+          </a:blip>
+          <a:srcRect/>
+          <a:stretch>
+            <a:fillRect/>
+          </a:stretch>
+        </p:blipFill>
+        <p:spPr bwMode="auto">
+          <a:xfrm>
+            <a:off x="3917130" y="1386839"/>
+            <a:ext cx="3724645" cy="4084321"/>
+          </a:xfrm>
+          <a:prstGeom prst="rect">
+            <a:avLst/>
+          </a:prstGeom>
+          <a:noFill/>
+          <a:extLst>
+            <a:ext uri="{909E8E84-426E-40DD-AFC4-6F175D3DCCD1}">
+              <a14:hiddenFill xmlns:a14="http://schemas.microsoft.com/office/drawing/2010/main">
+                <a:solidFill>
+                  <a:srgbClr val="FFFFFF"/>
+                </a:solidFill>
+              </a14:hiddenFill>
+            </a:ext>
+          </a:extLst>
+        </p:spPr>
+      </p:pic>
+    </p:spTree>
+    <p:extLst>
+      <p:ext uri="{BB962C8B-B14F-4D97-AF65-F5344CB8AC3E}">
+        <p14:creationId xmlns:p14="http://schemas.microsoft.com/office/powerpoint/2010/main" val="3333527449"/>
       </p:ext>
     </p:extLst>
   </p:cSld>

</xml_diff>

<commit_message>
Eleventh Commit - BE
Add new from  FE
</commit_message>
<xml_diff>
--- a/src/main/webapp/asset/descriptionfor web/TechZone.pptx
+++ b/src/main/webapp/asset/descriptionfor web/TechZone.pptx
@@ -15,6 +15,7 @@
     <p:sldId id="263" r:id="rId9"/>
     <p:sldId id="265" r:id="rId10"/>
     <p:sldId id="264" r:id="rId11"/>
+    <p:sldId id="266" r:id="rId12"/>
   </p:sldIdLst>
   <p:sldSz cx="12192000" cy="6858000"/>
   <p:notesSz cx="6858000" cy="9144000"/>
@@ -268,7 +269,7 @@
           <a:p>
             <a:fld id="{B9911F21-AB9B-4E47-BFED-F9E6E1164517}" type="datetimeFigureOut">
               <a:rPr lang="en-US" smtClean="0"/>
-              <a:t>18/9/2024</a:t>
+              <a:t>24/9/2024</a:t>
             </a:fld>
             <a:endParaRPr lang="en-US"/>
           </a:p>
@@ -466,7 +467,7 @@
           <a:p>
             <a:fld id="{B9911F21-AB9B-4E47-BFED-F9E6E1164517}" type="datetimeFigureOut">
               <a:rPr lang="en-US" smtClean="0"/>
-              <a:t>18/9/2024</a:t>
+              <a:t>24/9/2024</a:t>
             </a:fld>
             <a:endParaRPr lang="en-US"/>
           </a:p>
@@ -674,7 +675,7 @@
           <a:p>
             <a:fld id="{B9911F21-AB9B-4E47-BFED-F9E6E1164517}" type="datetimeFigureOut">
               <a:rPr lang="en-US" smtClean="0"/>
-              <a:t>18/9/2024</a:t>
+              <a:t>24/9/2024</a:t>
             </a:fld>
             <a:endParaRPr lang="en-US"/>
           </a:p>
@@ -872,7 +873,7 @@
           <a:p>
             <a:fld id="{B9911F21-AB9B-4E47-BFED-F9E6E1164517}" type="datetimeFigureOut">
               <a:rPr lang="en-US" smtClean="0"/>
-              <a:t>18/9/2024</a:t>
+              <a:t>24/9/2024</a:t>
             </a:fld>
             <a:endParaRPr lang="en-US"/>
           </a:p>
@@ -1147,7 +1148,7 @@
           <a:p>
             <a:fld id="{B9911F21-AB9B-4E47-BFED-F9E6E1164517}" type="datetimeFigureOut">
               <a:rPr lang="en-US" smtClean="0"/>
-              <a:t>18/9/2024</a:t>
+              <a:t>24/9/2024</a:t>
             </a:fld>
             <a:endParaRPr lang="en-US"/>
           </a:p>
@@ -1412,7 +1413,7 @@
           <a:p>
             <a:fld id="{B9911F21-AB9B-4E47-BFED-F9E6E1164517}" type="datetimeFigureOut">
               <a:rPr lang="en-US" smtClean="0"/>
-              <a:t>18/9/2024</a:t>
+              <a:t>24/9/2024</a:t>
             </a:fld>
             <a:endParaRPr lang="en-US"/>
           </a:p>
@@ -1824,7 +1825,7 @@
           <a:p>
             <a:fld id="{B9911F21-AB9B-4E47-BFED-F9E6E1164517}" type="datetimeFigureOut">
               <a:rPr lang="en-US" smtClean="0"/>
-              <a:t>18/9/2024</a:t>
+              <a:t>24/9/2024</a:t>
             </a:fld>
             <a:endParaRPr lang="en-US"/>
           </a:p>
@@ -1965,7 +1966,7 @@
           <a:p>
             <a:fld id="{B9911F21-AB9B-4E47-BFED-F9E6E1164517}" type="datetimeFigureOut">
               <a:rPr lang="en-US" smtClean="0"/>
-              <a:t>18/9/2024</a:t>
+              <a:t>24/9/2024</a:t>
             </a:fld>
             <a:endParaRPr lang="en-US"/>
           </a:p>
@@ -2078,7 +2079,7 @@
           <a:p>
             <a:fld id="{B9911F21-AB9B-4E47-BFED-F9E6E1164517}" type="datetimeFigureOut">
               <a:rPr lang="en-US" smtClean="0"/>
-              <a:t>18/9/2024</a:t>
+              <a:t>24/9/2024</a:t>
             </a:fld>
             <a:endParaRPr lang="en-US"/>
           </a:p>
@@ -2389,7 +2390,7 @@
           <a:p>
             <a:fld id="{B9911F21-AB9B-4E47-BFED-F9E6E1164517}" type="datetimeFigureOut">
               <a:rPr lang="en-US" smtClean="0"/>
-              <a:t>18/9/2024</a:t>
+              <a:t>24/9/2024</a:t>
             </a:fld>
             <a:endParaRPr lang="en-US"/>
           </a:p>
@@ -2677,7 +2678,7 @@
           <a:p>
             <a:fld id="{B9911F21-AB9B-4E47-BFED-F9E6E1164517}" type="datetimeFigureOut">
               <a:rPr lang="en-US" smtClean="0"/>
-              <a:t>18/9/2024</a:t>
+              <a:t>24/9/2024</a:t>
             </a:fld>
             <a:endParaRPr lang="en-US"/>
           </a:p>
@@ -2774,10 +2775,10 @@
       </p:grpSpPr>
       <p:sp>
         <p:nvSpPr>
-          <p:cNvPr id="8" name="9Slide.vn - 2019">
-            <a:extLst>
-              <a:ext uri="{FF2B5EF4-FFF2-40B4-BE49-F238E27FC236}">
-                <a16:creationId xmlns:a16="http://schemas.microsoft.com/office/drawing/2014/main" id="{6AE071FF-2697-5DB1-11A4-C7EFA658BA0D}"/>
+          <p:cNvPr id="7" name="9Slide.vn - 2019">
+            <a:extLst>
+              <a:ext uri="{FF2B5EF4-FFF2-40B4-BE49-F238E27FC236}">
+                <a16:creationId xmlns:a16="http://schemas.microsoft.com/office/drawing/2014/main" id="{9FA44BD2-39A3-636C-4356-BC497357BF63}"/>
               </a:ext>
             </a:extLst>
           </p:cNvPr>
@@ -2958,7 +2959,7 @@
           <a:p>
             <a:fld id="{B9911F21-AB9B-4E47-BFED-F9E6E1164517}" type="datetimeFigureOut">
               <a:rPr lang="en-US" smtClean="0"/>
-              <a:t>18/9/2024</a:t>
+              <a:t>24/9/2024</a:t>
             </a:fld>
             <a:endParaRPr lang="en-US"/>
           </a:p>
@@ -3941,6 +3942,122 @@
 </p:sld>
 </file>
 
+<file path=ppt/slides/slide11.xml><?xml version="1.0" encoding="utf-8"?>
+<p:sld xmlns:a="http://schemas.openxmlformats.org/drawingml/2006/main" xmlns:r="http://schemas.openxmlformats.org/officeDocument/2006/relationships" xmlns:p="http://schemas.openxmlformats.org/presentationml/2006/main">
+  <p:cSld>
+    <p:bg>
+      <p:bgPr>
+        <a:solidFill>
+          <a:srgbClr val="FDC62E"/>
+        </a:solidFill>
+        <a:effectLst/>
+      </p:bgPr>
+    </p:bg>
+    <p:spTree>
+      <p:nvGrpSpPr>
+        <p:cNvPr id="1" name=""/>
+        <p:cNvGrpSpPr/>
+        <p:nvPr/>
+      </p:nvGrpSpPr>
+      <p:grpSpPr>
+        <a:xfrm>
+          <a:off x="0" y="0"/>
+          <a:ext cx="0" cy="0"/>
+          <a:chOff x="0" y="0"/>
+          <a:chExt cx="0" cy="0"/>
+        </a:xfrm>
+      </p:grpSpPr>
+      <p:pic>
+        <p:nvPicPr>
+          <p:cNvPr id="5" name="Picture 4">
+            <a:extLst>
+              <a:ext uri="{FF2B5EF4-FFF2-40B4-BE49-F238E27FC236}">
+                <a16:creationId xmlns:a16="http://schemas.microsoft.com/office/drawing/2014/main" id="{A9D239A5-1D77-8E35-D0B5-A82050BF0AAF}"/>
+              </a:ext>
+            </a:extLst>
+          </p:cNvPr>
+          <p:cNvPicPr>
+            <a:picLocks noChangeAspect="1"/>
+          </p:cNvPicPr>
+          <p:nvPr/>
+        </p:nvPicPr>
+        <p:blipFill>
+          <a:blip r:embed="rId2"/>
+          <a:stretch>
+            <a:fillRect/>
+          </a:stretch>
+        </p:blipFill>
+        <p:spPr>
+          <a:xfrm>
+            <a:off x="5562599" y="2286000"/>
+            <a:ext cx="1485900" cy="1485900"/>
+          </a:xfrm>
+          <a:prstGeom prst="rect">
+            <a:avLst/>
+          </a:prstGeom>
+          <a:effectLst>
+            <a:outerShdw blurRad="152400" dist="38100" dir="4500000" sx="107000" sy="107000" algn="tr" rotWithShape="0">
+              <a:prstClr val="black">
+                <a:alpha val="44000"/>
+              </a:prstClr>
+            </a:outerShdw>
+          </a:effectLst>
+        </p:spPr>
+      </p:pic>
+      <p:sp>
+        <p:nvSpPr>
+          <p:cNvPr id="6" name="TextBox 5">
+            <a:extLst>
+              <a:ext uri="{FF2B5EF4-FFF2-40B4-BE49-F238E27FC236}">
+                <a16:creationId xmlns:a16="http://schemas.microsoft.com/office/drawing/2014/main" id="{B500C2EE-712B-8601-423D-8D464AC6A977}"/>
+              </a:ext>
+            </a:extLst>
+          </p:cNvPr>
+          <p:cNvSpPr txBox="1"/>
+          <p:nvPr/>
+        </p:nvSpPr>
+        <p:spPr>
+          <a:xfrm>
+            <a:off x="4131268" y="3771900"/>
+            <a:ext cx="4348563" cy="646331"/>
+          </a:xfrm>
+          <a:prstGeom prst="rect">
+            <a:avLst/>
+          </a:prstGeom>
+          <a:noFill/>
+        </p:spPr>
+        <p:txBody>
+          <a:bodyPr wrap="none" rtlCol="0">
+            <a:spAutoFit/>
+          </a:bodyPr>
+          <a:lstStyle/>
+          <a:p>
+            <a:r>
+              <a:rPr lang="en-US" sz="3600">
+                <a:latin typeface="#9Slide03 AmpleSoft" panose="02000000000000000000" pitchFamily="2" charset="0"/>
+                <a:cs typeface="#9Slide03 Arima Madurai Bold" panose="00000800000000000000" pitchFamily="2" charset="0"/>
+              </a:rPr>
+              <a:t>Empty Shopping Cart</a:t>
+            </a:r>
+          </a:p>
+        </p:txBody>
+      </p:sp>
+    </p:spTree>
+    <p:extLst>
+      <p:ext uri="{BB962C8B-B14F-4D97-AF65-F5344CB8AC3E}">
+        <p14:creationId xmlns:p14="http://schemas.microsoft.com/office/powerpoint/2010/main" val="631568266"/>
+      </p:ext>
+    </p:extLst>
+  </p:cSld>
+  <p:clrMapOvr>
+    <a:masterClrMapping/>
+  </p:clrMapOvr>
+  <p:transition>
+    <p:fade/>
+  </p:transition>
+</p:sld>
+</file>
+
 <file path=ppt/slides/slide2.xml><?xml version="1.0" encoding="utf-8"?>
 <p:sld xmlns:a="http://schemas.openxmlformats.org/drawingml/2006/main" xmlns:r="http://schemas.openxmlformats.org/officeDocument/2006/relationships" xmlns:p="http://schemas.openxmlformats.org/presentationml/2006/main">
   <p:cSld>

</xml_diff>

<commit_message>
Twentieth - Commit BE
Add data for user_product
</commit_message>
<xml_diff>
--- a/src/main/webapp/asset/descriptionfor web/TechZone.pptx
+++ b/src/main/webapp/asset/descriptionfor web/TechZone.pptx
@@ -269,7 +269,7 @@
           <a:p>
             <a:fld id="{B9911F21-AB9B-4E47-BFED-F9E6E1164517}" type="datetimeFigureOut">
               <a:rPr lang="en-US" smtClean="0"/>
-              <a:t>24/9/2024</a:t>
+              <a:t>30/9/2024</a:t>
             </a:fld>
             <a:endParaRPr lang="en-US"/>
           </a:p>
@@ -467,7 +467,7 @@
           <a:p>
             <a:fld id="{B9911F21-AB9B-4E47-BFED-F9E6E1164517}" type="datetimeFigureOut">
               <a:rPr lang="en-US" smtClean="0"/>
-              <a:t>24/9/2024</a:t>
+              <a:t>30/9/2024</a:t>
             </a:fld>
             <a:endParaRPr lang="en-US"/>
           </a:p>
@@ -675,7 +675,7 @@
           <a:p>
             <a:fld id="{B9911F21-AB9B-4E47-BFED-F9E6E1164517}" type="datetimeFigureOut">
               <a:rPr lang="en-US" smtClean="0"/>
-              <a:t>24/9/2024</a:t>
+              <a:t>30/9/2024</a:t>
             </a:fld>
             <a:endParaRPr lang="en-US"/>
           </a:p>
@@ -873,7 +873,7 @@
           <a:p>
             <a:fld id="{B9911F21-AB9B-4E47-BFED-F9E6E1164517}" type="datetimeFigureOut">
               <a:rPr lang="en-US" smtClean="0"/>
-              <a:t>24/9/2024</a:t>
+              <a:t>30/9/2024</a:t>
             </a:fld>
             <a:endParaRPr lang="en-US"/>
           </a:p>
@@ -1148,7 +1148,7 @@
           <a:p>
             <a:fld id="{B9911F21-AB9B-4E47-BFED-F9E6E1164517}" type="datetimeFigureOut">
               <a:rPr lang="en-US" smtClean="0"/>
-              <a:t>24/9/2024</a:t>
+              <a:t>30/9/2024</a:t>
             </a:fld>
             <a:endParaRPr lang="en-US"/>
           </a:p>
@@ -1413,7 +1413,7 @@
           <a:p>
             <a:fld id="{B9911F21-AB9B-4E47-BFED-F9E6E1164517}" type="datetimeFigureOut">
               <a:rPr lang="en-US" smtClean="0"/>
-              <a:t>24/9/2024</a:t>
+              <a:t>30/9/2024</a:t>
             </a:fld>
             <a:endParaRPr lang="en-US"/>
           </a:p>
@@ -1825,7 +1825,7 @@
           <a:p>
             <a:fld id="{B9911F21-AB9B-4E47-BFED-F9E6E1164517}" type="datetimeFigureOut">
               <a:rPr lang="en-US" smtClean="0"/>
-              <a:t>24/9/2024</a:t>
+              <a:t>30/9/2024</a:t>
             </a:fld>
             <a:endParaRPr lang="en-US"/>
           </a:p>
@@ -1966,7 +1966,7 @@
           <a:p>
             <a:fld id="{B9911F21-AB9B-4E47-BFED-F9E6E1164517}" type="datetimeFigureOut">
               <a:rPr lang="en-US" smtClean="0"/>
-              <a:t>24/9/2024</a:t>
+              <a:t>30/9/2024</a:t>
             </a:fld>
             <a:endParaRPr lang="en-US"/>
           </a:p>
@@ -2079,7 +2079,7 @@
           <a:p>
             <a:fld id="{B9911F21-AB9B-4E47-BFED-F9E6E1164517}" type="datetimeFigureOut">
               <a:rPr lang="en-US" smtClean="0"/>
-              <a:t>24/9/2024</a:t>
+              <a:t>30/9/2024</a:t>
             </a:fld>
             <a:endParaRPr lang="en-US"/>
           </a:p>
@@ -2390,7 +2390,7 @@
           <a:p>
             <a:fld id="{B9911F21-AB9B-4E47-BFED-F9E6E1164517}" type="datetimeFigureOut">
               <a:rPr lang="en-US" smtClean="0"/>
-              <a:t>24/9/2024</a:t>
+              <a:t>30/9/2024</a:t>
             </a:fld>
             <a:endParaRPr lang="en-US"/>
           </a:p>
@@ -2678,7 +2678,7 @@
           <a:p>
             <a:fld id="{B9911F21-AB9B-4E47-BFED-F9E6E1164517}" type="datetimeFigureOut">
               <a:rPr lang="en-US" smtClean="0"/>
-              <a:t>24/9/2024</a:t>
+              <a:t>30/9/2024</a:t>
             </a:fld>
             <a:endParaRPr lang="en-US"/>
           </a:p>
@@ -2775,10 +2775,10 @@
       </p:grpSpPr>
       <p:sp>
         <p:nvSpPr>
-          <p:cNvPr id="7" name="9Slide.vn - 2019">
-            <a:extLst>
-              <a:ext uri="{FF2B5EF4-FFF2-40B4-BE49-F238E27FC236}">
-                <a16:creationId xmlns:a16="http://schemas.microsoft.com/office/drawing/2014/main" id="{9FA44BD2-39A3-636C-4356-BC497357BF63}"/>
+          <p:cNvPr id="8" name="9Slide.vn - 2019">
+            <a:extLst>
+              <a:ext uri="{FF2B5EF4-FFF2-40B4-BE49-F238E27FC236}">
+                <a16:creationId xmlns:a16="http://schemas.microsoft.com/office/drawing/2014/main" id="{5E799EFA-052D-CCE1-0B17-84345AA1F8C6}"/>
               </a:ext>
             </a:extLst>
           </p:cNvPr>
@@ -2959,7 +2959,7 @@
           <a:p>
             <a:fld id="{B9911F21-AB9B-4E47-BFED-F9E6E1164517}" type="datetimeFigureOut">
               <a:rPr lang="en-US" smtClean="0"/>
-              <a:t>24/9/2024</a:t>
+              <a:t>30/9/2024</a:t>
             </a:fld>
             <a:endParaRPr lang="en-US"/>
           </a:p>

</xml_diff>

<commit_message>
Twenty-first - Commit BE
Add only 6 data for product section of index page
</commit_message>
<xml_diff>
--- a/src/main/webapp/asset/descriptionfor web/TechZone.pptx
+++ b/src/main/webapp/asset/descriptionfor web/TechZone.pptx
@@ -14,8 +14,12 @@
     <p:sldId id="262" r:id="rId8"/>
     <p:sldId id="263" r:id="rId9"/>
     <p:sldId id="265" r:id="rId10"/>
-    <p:sldId id="264" r:id="rId11"/>
-    <p:sldId id="266" r:id="rId12"/>
+    <p:sldId id="267" r:id="rId11"/>
+    <p:sldId id="268" r:id="rId12"/>
+    <p:sldId id="269" r:id="rId13"/>
+    <p:sldId id="270" r:id="rId14"/>
+    <p:sldId id="264" r:id="rId15"/>
+    <p:sldId id="266" r:id="rId16"/>
   </p:sldIdLst>
   <p:sldSz cx="12192000" cy="6858000"/>
   <p:notesSz cx="6858000" cy="9144000"/>
@@ -269,7 +273,7 @@
           <a:p>
             <a:fld id="{B9911F21-AB9B-4E47-BFED-F9E6E1164517}" type="datetimeFigureOut">
               <a:rPr lang="en-US" smtClean="0"/>
-              <a:t>30/9/2024</a:t>
+              <a:t>1/10/2024</a:t>
             </a:fld>
             <a:endParaRPr lang="en-US"/>
           </a:p>
@@ -467,7 +471,7 @@
           <a:p>
             <a:fld id="{B9911F21-AB9B-4E47-BFED-F9E6E1164517}" type="datetimeFigureOut">
               <a:rPr lang="en-US" smtClean="0"/>
-              <a:t>30/9/2024</a:t>
+              <a:t>1/10/2024</a:t>
             </a:fld>
             <a:endParaRPr lang="en-US"/>
           </a:p>
@@ -675,7 +679,7 @@
           <a:p>
             <a:fld id="{B9911F21-AB9B-4E47-BFED-F9E6E1164517}" type="datetimeFigureOut">
               <a:rPr lang="en-US" smtClean="0"/>
-              <a:t>30/9/2024</a:t>
+              <a:t>1/10/2024</a:t>
             </a:fld>
             <a:endParaRPr lang="en-US"/>
           </a:p>
@@ -873,7 +877,7 @@
           <a:p>
             <a:fld id="{B9911F21-AB9B-4E47-BFED-F9E6E1164517}" type="datetimeFigureOut">
               <a:rPr lang="en-US" smtClean="0"/>
-              <a:t>30/9/2024</a:t>
+              <a:t>1/10/2024</a:t>
             </a:fld>
             <a:endParaRPr lang="en-US"/>
           </a:p>
@@ -1148,7 +1152,7 @@
           <a:p>
             <a:fld id="{B9911F21-AB9B-4E47-BFED-F9E6E1164517}" type="datetimeFigureOut">
               <a:rPr lang="en-US" smtClean="0"/>
-              <a:t>30/9/2024</a:t>
+              <a:t>1/10/2024</a:t>
             </a:fld>
             <a:endParaRPr lang="en-US"/>
           </a:p>
@@ -1413,7 +1417,7 @@
           <a:p>
             <a:fld id="{B9911F21-AB9B-4E47-BFED-F9E6E1164517}" type="datetimeFigureOut">
               <a:rPr lang="en-US" smtClean="0"/>
-              <a:t>30/9/2024</a:t>
+              <a:t>1/10/2024</a:t>
             </a:fld>
             <a:endParaRPr lang="en-US"/>
           </a:p>
@@ -1825,7 +1829,7 @@
           <a:p>
             <a:fld id="{B9911F21-AB9B-4E47-BFED-F9E6E1164517}" type="datetimeFigureOut">
               <a:rPr lang="en-US" smtClean="0"/>
-              <a:t>30/9/2024</a:t>
+              <a:t>1/10/2024</a:t>
             </a:fld>
             <a:endParaRPr lang="en-US"/>
           </a:p>
@@ -1966,7 +1970,7 @@
           <a:p>
             <a:fld id="{B9911F21-AB9B-4E47-BFED-F9E6E1164517}" type="datetimeFigureOut">
               <a:rPr lang="en-US" smtClean="0"/>
-              <a:t>30/9/2024</a:t>
+              <a:t>1/10/2024</a:t>
             </a:fld>
             <a:endParaRPr lang="en-US"/>
           </a:p>
@@ -2079,7 +2083,7 @@
           <a:p>
             <a:fld id="{B9911F21-AB9B-4E47-BFED-F9E6E1164517}" type="datetimeFigureOut">
               <a:rPr lang="en-US" smtClean="0"/>
-              <a:t>30/9/2024</a:t>
+              <a:t>1/10/2024</a:t>
             </a:fld>
             <a:endParaRPr lang="en-US"/>
           </a:p>
@@ -2390,7 +2394,7 @@
           <a:p>
             <a:fld id="{B9911F21-AB9B-4E47-BFED-F9E6E1164517}" type="datetimeFigureOut">
               <a:rPr lang="en-US" smtClean="0"/>
-              <a:t>30/9/2024</a:t>
+              <a:t>1/10/2024</a:t>
             </a:fld>
             <a:endParaRPr lang="en-US"/>
           </a:p>
@@ -2678,7 +2682,7 @@
           <a:p>
             <a:fld id="{B9911F21-AB9B-4E47-BFED-F9E6E1164517}" type="datetimeFigureOut">
               <a:rPr lang="en-US" smtClean="0"/>
-              <a:t>30/9/2024</a:t>
+              <a:t>1/10/2024</a:t>
             </a:fld>
             <a:endParaRPr lang="en-US"/>
           </a:p>
@@ -2775,10 +2779,10 @@
       </p:grpSpPr>
       <p:sp>
         <p:nvSpPr>
-          <p:cNvPr id="8" name="9Slide.vn - 2019">
-            <a:extLst>
-              <a:ext uri="{FF2B5EF4-FFF2-40B4-BE49-F238E27FC236}">
-                <a16:creationId xmlns:a16="http://schemas.microsoft.com/office/drawing/2014/main" id="{5E799EFA-052D-CCE1-0B17-84345AA1F8C6}"/>
+          <p:cNvPr id="11" name="9Slide.vn - 2019">
+            <a:extLst>
+              <a:ext uri="{FF2B5EF4-FFF2-40B4-BE49-F238E27FC236}">
+                <a16:creationId xmlns:a16="http://schemas.microsoft.com/office/drawing/2014/main" id="{47D0B1E8-57A3-C36A-2EAB-84757362F501}"/>
               </a:ext>
             </a:extLst>
           </p:cNvPr>
@@ -2959,7 +2963,7 @@
           <a:p>
             <a:fld id="{B9911F21-AB9B-4E47-BFED-F9E6E1164517}" type="datetimeFigureOut">
               <a:rPr lang="en-US" smtClean="0"/>
-              <a:t>30/9/2024</a:t>
+              <a:t>1/10/2024</a:t>
             </a:fld>
             <a:endParaRPr lang="en-US"/>
           </a:p>
@@ -3619,6 +3623,546 @@
     <p:bg>
       <p:bgPr>
         <a:solidFill>
+          <a:srgbClr val="F6F6F8"/>
+        </a:solidFill>
+        <a:effectLst/>
+      </p:bgPr>
+    </p:bg>
+    <p:spTree>
+      <p:nvGrpSpPr>
+        <p:cNvPr id="1" name=""/>
+        <p:cNvGrpSpPr/>
+        <p:nvPr/>
+      </p:nvGrpSpPr>
+      <p:grpSpPr>
+        <a:xfrm>
+          <a:off x="0" y="0"/>
+          <a:ext cx="0" cy="0"/>
+          <a:chOff x="0" y="0"/>
+          <a:chExt cx="0" cy="0"/>
+        </a:xfrm>
+      </p:grpSpPr>
+      <p:sp>
+        <p:nvSpPr>
+          <p:cNvPr id="5" name="Rectangle 4">
+            <a:extLst>
+              <a:ext uri="{FF2B5EF4-FFF2-40B4-BE49-F238E27FC236}">
+                <a16:creationId xmlns:a16="http://schemas.microsoft.com/office/drawing/2014/main" id="{ADFF3A91-4295-9C52-3061-E78CAA08800E}"/>
+              </a:ext>
+            </a:extLst>
+          </p:cNvPr>
+          <p:cNvSpPr/>
+          <p:nvPr/>
+        </p:nvSpPr>
+        <p:spPr>
+          <a:xfrm>
+            <a:off x="2590800" y="1167769"/>
+            <a:ext cx="6377306" cy="4623431"/>
+          </a:xfrm>
+          <a:prstGeom prst="rect">
+            <a:avLst/>
+          </a:prstGeom>
+          <a:noFill/>
+          <a:ln w="57150"/>
+        </p:spPr>
+        <p:style>
+          <a:lnRef idx="2">
+            <a:schemeClr val="accent1">
+              <a:shade val="15000"/>
+            </a:schemeClr>
+          </a:lnRef>
+          <a:fillRef idx="1">
+            <a:schemeClr val="accent1"/>
+          </a:fillRef>
+          <a:effectRef idx="0">
+            <a:schemeClr val="accent1"/>
+          </a:effectRef>
+          <a:fontRef idx="minor">
+            <a:schemeClr val="lt1"/>
+          </a:fontRef>
+        </p:style>
+        <p:txBody>
+          <a:bodyPr rtlCol="0" anchor="ctr"/>
+          <a:lstStyle/>
+          <a:p>
+            <a:pPr algn="ctr"/>
+            <a:endParaRPr lang="en-US"/>
+          </a:p>
+        </p:txBody>
+      </p:sp>
+      <p:pic>
+        <p:nvPicPr>
+          <p:cNvPr id="1026" name="Picture 2">
+            <a:extLst>
+              <a:ext uri="{FF2B5EF4-FFF2-40B4-BE49-F238E27FC236}">
+                <a16:creationId xmlns:a16="http://schemas.microsoft.com/office/drawing/2014/main" id="{6D545DBE-8E21-7D03-E187-FCAF846C5B05}"/>
+              </a:ext>
+            </a:extLst>
+          </p:cNvPr>
+          <p:cNvPicPr>
+            <a:picLocks noChangeAspect="1" noChangeArrowheads="1"/>
+          </p:cNvPicPr>
+          <p:nvPr/>
+        </p:nvPicPr>
+        <p:blipFill rotWithShape="1">
+          <a:blip r:embed="rId2">
+            <a:extLst>
+              <a:ext uri="{28A0092B-C50C-407E-A947-70E740481C1C}">
+                <a14:useLocalDpi xmlns:a14="http://schemas.microsoft.com/office/drawing/2010/main" val="0"/>
+              </a:ext>
+            </a:extLst>
+          </a:blip>
+          <a:srcRect t="13771" b="14761"/>
+          <a:stretch/>
+        </p:blipFill>
+        <p:spPr bwMode="auto">
+          <a:xfrm>
+            <a:off x="3417253" y="1327783"/>
+            <a:ext cx="4724400" cy="4202433"/>
+          </a:xfrm>
+          <a:prstGeom prst="rect">
+            <a:avLst/>
+          </a:prstGeom>
+          <a:noFill/>
+          <a:extLst>
+            <a:ext uri="{909E8E84-426E-40DD-AFC4-6F175D3DCCD1}">
+              <a14:hiddenFill xmlns:a14="http://schemas.microsoft.com/office/drawing/2010/main">
+                <a:solidFill>
+                  <a:srgbClr val="FFFFFF"/>
+                </a:solidFill>
+              </a14:hiddenFill>
+            </a:ext>
+          </a:extLst>
+        </p:spPr>
+      </p:pic>
+    </p:spTree>
+    <p:extLst>
+      <p:ext uri="{BB962C8B-B14F-4D97-AF65-F5344CB8AC3E}">
+        <p14:creationId xmlns:p14="http://schemas.microsoft.com/office/powerpoint/2010/main" val="3496787043"/>
+      </p:ext>
+    </p:extLst>
+  </p:cSld>
+  <p:clrMapOvr>
+    <a:masterClrMapping/>
+  </p:clrMapOvr>
+  <p:transition>
+    <p:fade/>
+  </p:transition>
+</p:sld>
+</file>
+
+<file path=ppt/slides/slide11.xml><?xml version="1.0" encoding="utf-8"?>
+<p:sld xmlns:a="http://schemas.openxmlformats.org/drawingml/2006/main" xmlns:r="http://schemas.openxmlformats.org/officeDocument/2006/relationships" xmlns:p="http://schemas.openxmlformats.org/presentationml/2006/main">
+  <p:cSld>
+    <p:bg>
+      <p:bgPr>
+        <a:solidFill>
+          <a:srgbClr val="FFFFFF"/>
+        </a:solidFill>
+        <a:effectLst/>
+      </p:bgPr>
+    </p:bg>
+    <p:spTree>
+      <p:nvGrpSpPr>
+        <p:cNvPr id="1" name=""/>
+        <p:cNvGrpSpPr/>
+        <p:nvPr/>
+      </p:nvGrpSpPr>
+      <p:grpSpPr>
+        <a:xfrm>
+          <a:off x="0" y="0"/>
+          <a:ext cx="0" cy="0"/>
+          <a:chOff x="0" y="0"/>
+          <a:chExt cx="0" cy="0"/>
+        </a:xfrm>
+      </p:grpSpPr>
+      <p:sp>
+        <p:nvSpPr>
+          <p:cNvPr id="5" name="Rectangle 4">
+            <a:extLst>
+              <a:ext uri="{FF2B5EF4-FFF2-40B4-BE49-F238E27FC236}">
+                <a16:creationId xmlns:a16="http://schemas.microsoft.com/office/drawing/2014/main" id="{ADFF3A91-4295-9C52-3061-E78CAA08800E}"/>
+              </a:ext>
+            </a:extLst>
+          </p:cNvPr>
+          <p:cNvSpPr/>
+          <p:nvPr/>
+        </p:nvSpPr>
+        <p:spPr>
+          <a:xfrm>
+            <a:off x="2590800" y="1167769"/>
+            <a:ext cx="6377306" cy="4623431"/>
+          </a:xfrm>
+          <a:prstGeom prst="rect">
+            <a:avLst/>
+          </a:prstGeom>
+          <a:noFill/>
+          <a:ln w="57150"/>
+        </p:spPr>
+        <p:style>
+          <a:lnRef idx="2">
+            <a:schemeClr val="accent1">
+              <a:shade val="15000"/>
+            </a:schemeClr>
+          </a:lnRef>
+          <a:fillRef idx="1">
+            <a:schemeClr val="accent1"/>
+          </a:fillRef>
+          <a:effectRef idx="0">
+            <a:schemeClr val="accent1"/>
+          </a:effectRef>
+          <a:fontRef idx="minor">
+            <a:schemeClr val="lt1"/>
+          </a:fontRef>
+        </p:style>
+        <p:txBody>
+          <a:bodyPr rtlCol="0" anchor="ctr"/>
+          <a:lstStyle/>
+          <a:p>
+            <a:pPr algn="ctr"/>
+            <a:endParaRPr lang="en-US"/>
+          </a:p>
+        </p:txBody>
+      </p:sp>
+      <p:pic>
+        <p:nvPicPr>
+          <p:cNvPr id="2" name="Picture 2">
+            <a:extLst>
+              <a:ext uri="{FF2B5EF4-FFF2-40B4-BE49-F238E27FC236}">
+                <a16:creationId xmlns:a16="http://schemas.microsoft.com/office/drawing/2014/main" id="{0592BA04-470B-6F8D-B8A2-9A5F41BC11E4}"/>
+              </a:ext>
+            </a:extLst>
+          </p:cNvPr>
+          <p:cNvPicPr>
+            <a:picLocks noChangeAspect="1" noChangeArrowheads="1"/>
+          </p:cNvPicPr>
+          <p:nvPr/>
+        </p:nvPicPr>
+        <p:blipFill>
+          <a:blip r:embed="rId2">
+            <a:extLst>
+              <a:ext uri="{28A0092B-C50C-407E-A947-70E740481C1C}">
+                <a14:useLocalDpi xmlns:a14="http://schemas.microsoft.com/office/drawing/2010/main" val="0"/>
+              </a:ext>
+            </a:extLst>
+          </a:blip>
+          <a:srcRect/>
+          <a:stretch>
+            <a:fillRect/>
+          </a:stretch>
+        </p:blipFill>
+        <p:spPr bwMode="auto">
+          <a:xfrm>
+            <a:off x="3674428" y="1480181"/>
+            <a:ext cx="4210050" cy="4210050"/>
+          </a:xfrm>
+          <a:prstGeom prst="rect">
+            <a:avLst/>
+          </a:prstGeom>
+          <a:noFill/>
+          <a:extLst>
+            <a:ext uri="{909E8E84-426E-40DD-AFC4-6F175D3DCCD1}">
+              <a14:hiddenFill xmlns:a14="http://schemas.microsoft.com/office/drawing/2010/main">
+                <a:solidFill>
+                  <a:srgbClr val="FFFFFF"/>
+                </a:solidFill>
+              </a14:hiddenFill>
+            </a:ext>
+          </a:extLst>
+        </p:spPr>
+      </p:pic>
+    </p:spTree>
+    <p:extLst>
+      <p:ext uri="{BB962C8B-B14F-4D97-AF65-F5344CB8AC3E}">
+        <p14:creationId xmlns:p14="http://schemas.microsoft.com/office/powerpoint/2010/main" val="1359039513"/>
+      </p:ext>
+    </p:extLst>
+  </p:cSld>
+  <p:clrMapOvr>
+    <a:masterClrMapping/>
+  </p:clrMapOvr>
+  <p:transition>
+    <p:fade/>
+  </p:transition>
+</p:sld>
+</file>
+
+<file path=ppt/slides/slide12.xml><?xml version="1.0" encoding="utf-8"?>
+<p:sld xmlns:a="http://schemas.openxmlformats.org/drawingml/2006/main" xmlns:r="http://schemas.openxmlformats.org/officeDocument/2006/relationships" xmlns:p="http://schemas.openxmlformats.org/presentationml/2006/main">
+  <p:cSld>
+    <p:bg>
+      <p:bgPr>
+        <a:solidFill>
+          <a:srgbClr val="F7F7F7"/>
+        </a:solidFill>
+        <a:effectLst/>
+      </p:bgPr>
+    </p:bg>
+    <p:spTree>
+      <p:nvGrpSpPr>
+        <p:cNvPr id="1" name=""/>
+        <p:cNvGrpSpPr/>
+        <p:nvPr/>
+      </p:nvGrpSpPr>
+      <p:grpSpPr>
+        <a:xfrm>
+          <a:off x="0" y="0"/>
+          <a:ext cx="0" cy="0"/>
+          <a:chOff x="0" y="0"/>
+          <a:chExt cx="0" cy="0"/>
+        </a:xfrm>
+      </p:grpSpPr>
+      <p:sp>
+        <p:nvSpPr>
+          <p:cNvPr id="5" name="Rectangle 4">
+            <a:extLst>
+              <a:ext uri="{FF2B5EF4-FFF2-40B4-BE49-F238E27FC236}">
+                <a16:creationId xmlns:a16="http://schemas.microsoft.com/office/drawing/2014/main" id="{ADFF3A91-4295-9C52-3061-E78CAA08800E}"/>
+              </a:ext>
+            </a:extLst>
+          </p:cNvPr>
+          <p:cNvSpPr/>
+          <p:nvPr/>
+        </p:nvSpPr>
+        <p:spPr>
+          <a:xfrm>
+            <a:off x="2590800" y="1167769"/>
+            <a:ext cx="6377306" cy="4623431"/>
+          </a:xfrm>
+          <a:prstGeom prst="rect">
+            <a:avLst/>
+          </a:prstGeom>
+          <a:noFill/>
+          <a:ln w="57150"/>
+        </p:spPr>
+        <p:style>
+          <a:lnRef idx="2">
+            <a:schemeClr val="accent1">
+              <a:shade val="15000"/>
+            </a:schemeClr>
+          </a:lnRef>
+          <a:fillRef idx="1">
+            <a:schemeClr val="accent1"/>
+          </a:fillRef>
+          <a:effectRef idx="0">
+            <a:schemeClr val="accent1"/>
+          </a:effectRef>
+          <a:fontRef idx="minor">
+            <a:schemeClr val="lt1"/>
+          </a:fontRef>
+        </p:style>
+        <p:txBody>
+          <a:bodyPr rtlCol="0" anchor="ctr"/>
+          <a:lstStyle/>
+          <a:p>
+            <a:pPr algn="ctr"/>
+            <a:endParaRPr lang="en-US"/>
+          </a:p>
+        </p:txBody>
+      </p:sp>
+      <p:pic>
+        <p:nvPicPr>
+          <p:cNvPr id="1026" name="Picture 2">
+            <a:extLst>
+              <a:ext uri="{FF2B5EF4-FFF2-40B4-BE49-F238E27FC236}">
+                <a16:creationId xmlns:a16="http://schemas.microsoft.com/office/drawing/2014/main" id="{934F7AB0-0173-F060-714E-3AD2DC0740BB}"/>
+              </a:ext>
+            </a:extLst>
+          </p:cNvPr>
+          <p:cNvPicPr>
+            <a:picLocks noChangeAspect="1" noChangeArrowheads="1"/>
+          </p:cNvPicPr>
+          <p:nvPr/>
+        </p:nvPicPr>
+        <p:blipFill rotWithShape="1">
+          <a:blip r:embed="rId2">
+            <a:extLst>
+              <a:ext uri="{28A0092B-C50C-407E-A947-70E740481C1C}">
+                <a14:useLocalDpi xmlns:a14="http://schemas.microsoft.com/office/drawing/2010/main" val="0"/>
+              </a:ext>
+            </a:extLst>
+          </a:blip>
+          <a:srcRect l="8518" t="26667" r="10001" b="5916"/>
+          <a:stretch/>
+        </p:blipFill>
+        <p:spPr bwMode="auto">
+          <a:xfrm>
+            <a:off x="3810000" y="1320800"/>
+            <a:ext cx="3960757" cy="4369431"/>
+          </a:xfrm>
+          <a:prstGeom prst="rect">
+            <a:avLst/>
+          </a:prstGeom>
+          <a:noFill/>
+          <a:extLst>
+            <a:ext uri="{909E8E84-426E-40DD-AFC4-6F175D3DCCD1}">
+              <a14:hiddenFill xmlns:a14="http://schemas.microsoft.com/office/drawing/2010/main">
+                <a:solidFill>
+                  <a:srgbClr val="FFFFFF"/>
+                </a:solidFill>
+              </a14:hiddenFill>
+            </a:ext>
+          </a:extLst>
+        </p:spPr>
+      </p:pic>
+    </p:spTree>
+    <p:extLst>
+      <p:ext uri="{BB962C8B-B14F-4D97-AF65-F5344CB8AC3E}">
+        <p14:creationId xmlns:p14="http://schemas.microsoft.com/office/powerpoint/2010/main" val="2958606512"/>
+      </p:ext>
+    </p:extLst>
+  </p:cSld>
+  <p:clrMapOvr>
+    <a:masterClrMapping/>
+  </p:clrMapOvr>
+  <p:transition>
+    <p:fade/>
+  </p:transition>
+</p:sld>
+</file>
+
+<file path=ppt/slides/slide13.xml><?xml version="1.0" encoding="utf-8"?>
+<p:sld xmlns:a="http://schemas.openxmlformats.org/drawingml/2006/main" xmlns:r="http://schemas.openxmlformats.org/officeDocument/2006/relationships" xmlns:p="http://schemas.openxmlformats.org/presentationml/2006/main">
+  <p:cSld>
+    <p:bg>
+      <p:bgPr>
+        <a:solidFill>
+          <a:srgbClr val="FFFFFF"/>
+        </a:solidFill>
+        <a:effectLst/>
+      </p:bgPr>
+    </p:bg>
+    <p:spTree>
+      <p:nvGrpSpPr>
+        <p:cNvPr id="1" name=""/>
+        <p:cNvGrpSpPr/>
+        <p:nvPr/>
+      </p:nvGrpSpPr>
+      <p:grpSpPr>
+        <a:xfrm>
+          <a:off x="0" y="0"/>
+          <a:ext cx="0" cy="0"/>
+          <a:chOff x="0" y="0"/>
+          <a:chExt cx="0" cy="0"/>
+        </a:xfrm>
+      </p:grpSpPr>
+      <p:sp>
+        <p:nvSpPr>
+          <p:cNvPr id="5" name="Rectangle 4">
+            <a:extLst>
+              <a:ext uri="{FF2B5EF4-FFF2-40B4-BE49-F238E27FC236}">
+                <a16:creationId xmlns:a16="http://schemas.microsoft.com/office/drawing/2014/main" id="{ADFF3A91-4295-9C52-3061-E78CAA08800E}"/>
+              </a:ext>
+            </a:extLst>
+          </p:cNvPr>
+          <p:cNvSpPr/>
+          <p:nvPr/>
+        </p:nvSpPr>
+        <p:spPr>
+          <a:xfrm>
+            <a:off x="2590800" y="1167769"/>
+            <a:ext cx="6377306" cy="4623431"/>
+          </a:xfrm>
+          <a:prstGeom prst="rect">
+            <a:avLst/>
+          </a:prstGeom>
+          <a:noFill/>
+          <a:ln w="57150"/>
+        </p:spPr>
+        <p:style>
+          <a:lnRef idx="2">
+            <a:schemeClr val="accent1">
+              <a:shade val="15000"/>
+            </a:schemeClr>
+          </a:lnRef>
+          <a:fillRef idx="1">
+            <a:schemeClr val="accent1"/>
+          </a:fillRef>
+          <a:effectRef idx="0">
+            <a:schemeClr val="accent1"/>
+          </a:effectRef>
+          <a:fontRef idx="minor">
+            <a:schemeClr val="lt1"/>
+          </a:fontRef>
+        </p:style>
+        <p:txBody>
+          <a:bodyPr rtlCol="0" anchor="ctr"/>
+          <a:lstStyle/>
+          <a:p>
+            <a:pPr algn="ctr"/>
+            <a:endParaRPr lang="en-US"/>
+          </a:p>
+        </p:txBody>
+      </p:sp>
+      <p:pic>
+        <p:nvPicPr>
+          <p:cNvPr id="2050" name="Picture 2">
+            <a:extLst>
+              <a:ext uri="{FF2B5EF4-FFF2-40B4-BE49-F238E27FC236}">
+                <a16:creationId xmlns:a16="http://schemas.microsoft.com/office/drawing/2014/main" id="{5E520565-87E2-FF99-956D-81B53ED2B87A}"/>
+              </a:ext>
+            </a:extLst>
+          </p:cNvPr>
+          <p:cNvPicPr>
+            <a:picLocks noChangeAspect="1" noChangeArrowheads="1"/>
+          </p:cNvPicPr>
+          <p:nvPr/>
+        </p:nvPicPr>
+        <p:blipFill>
+          <a:blip r:embed="rId2">
+            <a:extLst>
+              <a:ext uri="{28A0092B-C50C-407E-A947-70E740481C1C}">
+                <a14:useLocalDpi xmlns:a14="http://schemas.microsoft.com/office/drawing/2010/main" val="0"/>
+              </a:ext>
+            </a:extLst>
+          </a:blip>
+          <a:srcRect/>
+          <a:stretch>
+            <a:fillRect/>
+          </a:stretch>
+        </p:blipFill>
+        <p:spPr bwMode="auto">
+          <a:xfrm>
+            <a:off x="3581400" y="1247775"/>
+            <a:ext cx="4362450" cy="4362450"/>
+          </a:xfrm>
+          <a:prstGeom prst="rect">
+            <a:avLst/>
+          </a:prstGeom>
+          <a:noFill/>
+          <a:extLst>
+            <a:ext uri="{909E8E84-426E-40DD-AFC4-6F175D3DCCD1}">
+              <a14:hiddenFill xmlns:a14="http://schemas.microsoft.com/office/drawing/2010/main">
+                <a:solidFill>
+                  <a:srgbClr val="FFFFFF"/>
+                </a:solidFill>
+              </a14:hiddenFill>
+            </a:ext>
+          </a:extLst>
+        </p:spPr>
+      </p:pic>
+    </p:spTree>
+    <p:extLst>
+      <p:ext uri="{BB962C8B-B14F-4D97-AF65-F5344CB8AC3E}">
+        <p14:creationId xmlns:p14="http://schemas.microsoft.com/office/powerpoint/2010/main" val="1081452130"/>
+      </p:ext>
+    </p:extLst>
+  </p:cSld>
+  <p:clrMapOvr>
+    <a:masterClrMapping/>
+  </p:clrMapOvr>
+  <p:transition>
+    <p:fade/>
+  </p:transition>
+</p:sld>
+</file>
+
+<file path=ppt/slides/slide14.xml><?xml version="1.0" encoding="utf-8"?>
+<p:sld xmlns:a="http://schemas.openxmlformats.org/drawingml/2006/main" xmlns:r="http://schemas.openxmlformats.org/officeDocument/2006/relationships" xmlns:p="http://schemas.openxmlformats.org/presentationml/2006/main">
+  <p:cSld>
+    <p:bg>
+      <p:bgPr>
+        <a:solidFill>
           <a:schemeClr val="bg1"/>
         </a:solidFill>
         <a:effectLst/>
@@ -3942,7 +4486,7 @@
 </p:sld>
 </file>
 
-<file path=ppt/slides/slide11.xml><?xml version="1.0" encoding="utf-8"?>
+<file path=ppt/slides/slide15.xml><?xml version="1.0" encoding="utf-8"?>
 <p:sld xmlns:a="http://schemas.openxmlformats.org/drawingml/2006/main" xmlns:r="http://schemas.openxmlformats.org/officeDocument/2006/relationships" xmlns:p="http://schemas.openxmlformats.org/presentationml/2006/main">
   <p:cSld>
     <p:bg>

</xml_diff>

<commit_message>
Twenty-fifth - Commit BE
Divide print all product to  sale and not sale product
</commit_message>
<xml_diff>
--- a/src/main/webapp/asset/descriptionfor web/TechZone.pptx
+++ b/src/main/webapp/asset/descriptionfor web/TechZone.pptx
@@ -12,14 +12,18 @@
     <p:sldId id="260" r:id="rId6"/>
     <p:sldId id="261" r:id="rId7"/>
     <p:sldId id="262" r:id="rId8"/>
-    <p:sldId id="263" r:id="rId9"/>
-    <p:sldId id="265" r:id="rId10"/>
-    <p:sldId id="267" r:id="rId11"/>
-    <p:sldId id="268" r:id="rId12"/>
-    <p:sldId id="269" r:id="rId13"/>
-    <p:sldId id="270" r:id="rId14"/>
-    <p:sldId id="264" r:id="rId15"/>
-    <p:sldId id="266" r:id="rId16"/>
+    <p:sldId id="273" r:id="rId9"/>
+    <p:sldId id="263" r:id="rId10"/>
+    <p:sldId id="265" r:id="rId11"/>
+    <p:sldId id="267" r:id="rId12"/>
+    <p:sldId id="275" r:id="rId13"/>
+    <p:sldId id="268" r:id="rId14"/>
+    <p:sldId id="269" r:id="rId15"/>
+    <p:sldId id="274" r:id="rId16"/>
+    <p:sldId id="270" r:id="rId17"/>
+    <p:sldId id="272" r:id="rId18"/>
+    <p:sldId id="264" r:id="rId19"/>
+    <p:sldId id="266" r:id="rId20"/>
   </p:sldIdLst>
   <p:sldSz cx="12192000" cy="6858000"/>
   <p:notesSz cx="6858000" cy="9144000"/>
@@ -273,7 +277,7 @@
           <a:p>
             <a:fld id="{B9911F21-AB9B-4E47-BFED-F9E6E1164517}" type="datetimeFigureOut">
               <a:rPr lang="en-US" smtClean="0"/>
-              <a:t>1/10/2024</a:t>
+              <a:t>3/10/2024</a:t>
             </a:fld>
             <a:endParaRPr lang="en-US"/>
           </a:p>
@@ -471,7 +475,7 @@
           <a:p>
             <a:fld id="{B9911F21-AB9B-4E47-BFED-F9E6E1164517}" type="datetimeFigureOut">
               <a:rPr lang="en-US" smtClean="0"/>
-              <a:t>1/10/2024</a:t>
+              <a:t>3/10/2024</a:t>
             </a:fld>
             <a:endParaRPr lang="en-US"/>
           </a:p>
@@ -679,7 +683,7 @@
           <a:p>
             <a:fld id="{B9911F21-AB9B-4E47-BFED-F9E6E1164517}" type="datetimeFigureOut">
               <a:rPr lang="en-US" smtClean="0"/>
-              <a:t>1/10/2024</a:t>
+              <a:t>3/10/2024</a:t>
             </a:fld>
             <a:endParaRPr lang="en-US"/>
           </a:p>
@@ -877,7 +881,7 @@
           <a:p>
             <a:fld id="{B9911F21-AB9B-4E47-BFED-F9E6E1164517}" type="datetimeFigureOut">
               <a:rPr lang="en-US" smtClean="0"/>
-              <a:t>1/10/2024</a:t>
+              <a:t>3/10/2024</a:t>
             </a:fld>
             <a:endParaRPr lang="en-US"/>
           </a:p>
@@ -1152,7 +1156,7 @@
           <a:p>
             <a:fld id="{B9911F21-AB9B-4E47-BFED-F9E6E1164517}" type="datetimeFigureOut">
               <a:rPr lang="en-US" smtClean="0"/>
-              <a:t>1/10/2024</a:t>
+              <a:t>3/10/2024</a:t>
             </a:fld>
             <a:endParaRPr lang="en-US"/>
           </a:p>
@@ -1417,7 +1421,7 @@
           <a:p>
             <a:fld id="{B9911F21-AB9B-4E47-BFED-F9E6E1164517}" type="datetimeFigureOut">
               <a:rPr lang="en-US" smtClean="0"/>
-              <a:t>1/10/2024</a:t>
+              <a:t>3/10/2024</a:t>
             </a:fld>
             <a:endParaRPr lang="en-US"/>
           </a:p>
@@ -1829,7 +1833,7 @@
           <a:p>
             <a:fld id="{B9911F21-AB9B-4E47-BFED-F9E6E1164517}" type="datetimeFigureOut">
               <a:rPr lang="en-US" smtClean="0"/>
-              <a:t>1/10/2024</a:t>
+              <a:t>3/10/2024</a:t>
             </a:fld>
             <a:endParaRPr lang="en-US"/>
           </a:p>
@@ -1970,7 +1974,7 @@
           <a:p>
             <a:fld id="{B9911F21-AB9B-4E47-BFED-F9E6E1164517}" type="datetimeFigureOut">
               <a:rPr lang="en-US" smtClean="0"/>
-              <a:t>1/10/2024</a:t>
+              <a:t>3/10/2024</a:t>
             </a:fld>
             <a:endParaRPr lang="en-US"/>
           </a:p>
@@ -2083,7 +2087,7 @@
           <a:p>
             <a:fld id="{B9911F21-AB9B-4E47-BFED-F9E6E1164517}" type="datetimeFigureOut">
               <a:rPr lang="en-US" smtClean="0"/>
-              <a:t>1/10/2024</a:t>
+              <a:t>3/10/2024</a:t>
             </a:fld>
             <a:endParaRPr lang="en-US"/>
           </a:p>
@@ -2394,7 +2398,7 @@
           <a:p>
             <a:fld id="{B9911F21-AB9B-4E47-BFED-F9E6E1164517}" type="datetimeFigureOut">
               <a:rPr lang="en-US" smtClean="0"/>
-              <a:t>1/10/2024</a:t>
+              <a:t>3/10/2024</a:t>
             </a:fld>
             <a:endParaRPr lang="en-US"/>
           </a:p>
@@ -2682,7 +2686,7 @@
           <a:p>
             <a:fld id="{B9911F21-AB9B-4E47-BFED-F9E6E1164517}" type="datetimeFigureOut">
               <a:rPr lang="en-US" smtClean="0"/>
-              <a:t>1/10/2024</a:t>
+              <a:t>3/10/2024</a:t>
             </a:fld>
             <a:endParaRPr lang="en-US"/>
           </a:p>
@@ -2782,7 +2786,7 @@
           <p:cNvPr id="11" name="9Slide.vn - 2019">
             <a:extLst>
               <a:ext uri="{FF2B5EF4-FFF2-40B4-BE49-F238E27FC236}">
-                <a16:creationId xmlns:a16="http://schemas.microsoft.com/office/drawing/2014/main" id="{47D0B1E8-57A3-C36A-2EAB-84757362F501}"/>
+                <a16:creationId xmlns:a16="http://schemas.microsoft.com/office/drawing/2014/main" id="{7C448EB3-E52A-5767-EEA6-6BFF1E8A813E}"/>
               </a:ext>
             </a:extLst>
           </p:cNvPr>
@@ -2963,7 +2967,7 @@
           <a:p>
             <a:fld id="{B9911F21-AB9B-4E47-BFED-F9E6E1164517}" type="datetimeFigureOut">
               <a:rPr lang="en-US" smtClean="0"/>
-              <a:t>1/10/2024</a:t>
+              <a:t>3/10/2024</a:t>
             </a:fld>
             <a:endParaRPr lang="en-US"/>
           </a:p>
@@ -3623,6 +3627,142 @@
     <p:bg>
       <p:bgPr>
         <a:solidFill>
+          <a:srgbClr val="FFFFFF"/>
+        </a:solidFill>
+        <a:effectLst/>
+      </p:bgPr>
+    </p:bg>
+    <p:spTree>
+      <p:nvGrpSpPr>
+        <p:cNvPr id="1" name=""/>
+        <p:cNvGrpSpPr/>
+        <p:nvPr/>
+      </p:nvGrpSpPr>
+      <p:grpSpPr>
+        <a:xfrm>
+          <a:off x="0" y="0"/>
+          <a:ext cx="0" cy="0"/>
+          <a:chOff x="0" y="0"/>
+          <a:chExt cx="0" cy="0"/>
+        </a:xfrm>
+      </p:grpSpPr>
+      <p:sp>
+        <p:nvSpPr>
+          <p:cNvPr id="5" name="Rectangle 4">
+            <a:extLst>
+              <a:ext uri="{FF2B5EF4-FFF2-40B4-BE49-F238E27FC236}">
+                <a16:creationId xmlns:a16="http://schemas.microsoft.com/office/drawing/2014/main" id="{ADFF3A91-4295-9C52-3061-E78CAA08800E}"/>
+              </a:ext>
+            </a:extLst>
+          </p:cNvPr>
+          <p:cNvSpPr/>
+          <p:nvPr/>
+        </p:nvSpPr>
+        <p:spPr>
+          <a:xfrm>
+            <a:off x="2590800" y="1167769"/>
+            <a:ext cx="6377306" cy="4623431"/>
+          </a:xfrm>
+          <a:prstGeom prst="rect">
+            <a:avLst/>
+          </a:prstGeom>
+          <a:noFill/>
+          <a:ln w="57150"/>
+        </p:spPr>
+        <p:style>
+          <a:lnRef idx="2">
+            <a:schemeClr val="accent1">
+              <a:shade val="15000"/>
+            </a:schemeClr>
+          </a:lnRef>
+          <a:fillRef idx="1">
+            <a:schemeClr val="accent1"/>
+          </a:fillRef>
+          <a:effectRef idx="0">
+            <a:schemeClr val="accent1"/>
+          </a:effectRef>
+          <a:fontRef idx="minor">
+            <a:schemeClr val="lt1"/>
+          </a:fontRef>
+        </p:style>
+        <p:txBody>
+          <a:bodyPr rtlCol="0" anchor="ctr"/>
+          <a:lstStyle/>
+          <a:p>
+            <a:pPr algn="ctr"/>
+            <a:endParaRPr lang="en-US"/>
+          </a:p>
+        </p:txBody>
+      </p:sp>
+      <p:pic>
+        <p:nvPicPr>
+          <p:cNvPr id="1028" name="Picture 4">
+            <a:extLst>
+              <a:ext uri="{FF2B5EF4-FFF2-40B4-BE49-F238E27FC236}">
+                <a16:creationId xmlns:a16="http://schemas.microsoft.com/office/drawing/2014/main" id="{8D3464C3-2E60-4307-6390-D34FEFFBA4D2}"/>
+              </a:ext>
+            </a:extLst>
+          </p:cNvPr>
+          <p:cNvPicPr>
+            <a:picLocks noChangeAspect="1" noChangeArrowheads="1"/>
+          </p:cNvPicPr>
+          <p:nvPr/>
+        </p:nvPicPr>
+        <p:blipFill>
+          <a:blip r:embed="rId2">
+            <a:extLst>
+              <a:ext uri="{28A0092B-C50C-407E-A947-70E740481C1C}">
+                <a14:useLocalDpi xmlns:a14="http://schemas.microsoft.com/office/drawing/2010/main" val="0"/>
+              </a:ext>
+            </a:extLst>
+          </a:blip>
+          <a:srcRect/>
+          <a:stretch>
+            <a:fillRect/>
+          </a:stretch>
+        </p:blipFill>
+        <p:spPr bwMode="auto">
+          <a:xfrm>
+            <a:off x="3917130" y="1386839"/>
+            <a:ext cx="3724645" cy="4084321"/>
+          </a:xfrm>
+          <a:prstGeom prst="rect">
+            <a:avLst/>
+          </a:prstGeom>
+          <a:noFill/>
+          <a:extLst>
+            <a:ext uri="{909E8E84-426E-40DD-AFC4-6F175D3DCCD1}">
+              <a14:hiddenFill xmlns:a14="http://schemas.microsoft.com/office/drawing/2010/main">
+                <a:solidFill>
+                  <a:srgbClr val="FFFFFF"/>
+                </a:solidFill>
+              </a14:hiddenFill>
+            </a:ext>
+          </a:extLst>
+        </p:spPr>
+      </p:pic>
+    </p:spTree>
+    <p:extLst>
+      <p:ext uri="{BB962C8B-B14F-4D97-AF65-F5344CB8AC3E}">
+        <p14:creationId xmlns:p14="http://schemas.microsoft.com/office/powerpoint/2010/main" val="3333527449"/>
+      </p:ext>
+    </p:extLst>
+  </p:cSld>
+  <p:clrMapOvr>
+    <a:masterClrMapping/>
+  </p:clrMapOvr>
+  <p:transition>
+    <p:fade/>
+  </p:transition>
+</p:sld>
+</file>
+
+<file path=ppt/slides/slide11.xml><?xml version="1.0" encoding="utf-8"?>
+<p:sld xmlns:a="http://schemas.openxmlformats.org/drawingml/2006/main" xmlns:r="http://schemas.openxmlformats.org/officeDocument/2006/relationships" xmlns:p="http://schemas.openxmlformats.org/presentationml/2006/main">
+  <p:cSld>
+    <p:bg>
+      <p:bgPr>
+        <a:solidFill>
           <a:srgbClr val="F6F6F8"/>
         </a:solidFill>
         <a:effectLst/>
@@ -3751,7 +3891,7 @@
 </p:sld>
 </file>
 
-<file path=ppt/slides/slide11.xml><?xml version="1.0" encoding="utf-8"?>
+<file path=ppt/slides/slide12.xml><?xml version="1.0" encoding="utf-8"?>
 <p:sld xmlns:a="http://schemas.openxmlformats.org/drawingml/2006/main" xmlns:r="http://schemas.openxmlformats.org/officeDocument/2006/relationships" xmlns:p="http://schemas.openxmlformats.org/presentationml/2006/main">
   <p:cSld>
     <p:bg>
@@ -3826,189 +3966,37 @@
       </p:sp>
       <p:pic>
         <p:nvPicPr>
-          <p:cNvPr id="2" name="Picture 2">
-            <a:extLst>
-              <a:ext uri="{FF2B5EF4-FFF2-40B4-BE49-F238E27FC236}">
-                <a16:creationId xmlns:a16="http://schemas.microsoft.com/office/drawing/2014/main" id="{0592BA04-470B-6F8D-B8A2-9A5F41BC11E4}"/>
+          <p:cNvPr id="2" name="Picture 1">
+            <a:extLst>
+              <a:ext uri="{FF2B5EF4-FFF2-40B4-BE49-F238E27FC236}">
+                <a16:creationId xmlns:a16="http://schemas.microsoft.com/office/drawing/2014/main" id="{95D4009D-8416-B584-2271-18DA7D580339}"/>
               </a:ext>
             </a:extLst>
           </p:cNvPr>
           <p:cNvPicPr>
-            <a:picLocks noChangeAspect="1" noChangeArrowheads="1"/>
+            <a:picLocks noChangeAspect="1"/>
           </p:cNvPicPr>
           <p:nvPr/>
         </p:nvPicPr>
         <p:blipFill>
-          <a:blip r:embed="rId2">
-            <a:extLst>
-              <a:ext uri="{28A0092B-C50C-407E-A947-70E740481C1C}">
-                <a14:useLocalDpi xmlns:a14="http://schemas.microsoft.com/office/drawing/2010/main" val="0"/>
-              </a:ext>
-            </a:extLst>
-          </a:blip>
-          <a:srcRect/>
-          <a:stretch>
-            <a:fillRect/>
-          </a:stretch>
+          <a:blip r:embed="rId2"/>
+          <a:srcRect t="12000" b="12000"/>
+          <a:stretch/>
         </p:blipFill>
-        <p:spPr bwMode="auto">
-          <a:xfrm>
-            <a:off x="3674428" y="1480181"/>
-            <a:ext cx="4210050" cy="4210050"/>
+        <p:spPr>
+          <a:xfrm>
+            <a:off x="4038600" y="1849477"/>
+            <a:ext cx="3218212" cy="3260013"/>
           </a:xfrm>
           <a:prstGeom prst="rect">
             <a:avLst/>
           </a:prstGeom>
-          <a:noFill/>
-          <a:extLst>
-            <a:ext uri="{909E8E84-426E-40DD-AFC4-6F175D3DCCD1}">
-              <a14:hiddenFill xmlns:a14="http://schemas.microsoft.com/office/drawing/2010/main">
-                <a:solidFill>
-                  <a:srgbClr val="FFFFFF"/>
-                </a:solidFill>
-              </a14:hiddenFill>
-            </a:ext>
-          </a:extLst>
         </p:spPr>
       </p:pic>
     </p:spTree>
     <p:extLst>
       <p:ext uri="{BB962C8B-B14F-4D97-AF65-F5344CB8AC3E}">
-        <p14:creationId xmlns:p14="http://schemas.microsoft.com/office/powerpoint/2010/main" val="1359039513"/>
-      </p:ext>
-    </p:extLst>
-  </p:cSld>
-  <p:clrMapOvr>
-    <a:masterClrMapping/>
-  </p:clrMapOvr>
-  <p:transition>
-    <p:fade/>
-  </p:transition>
-</p:sld>
-</file>
-
-<file path=ppt/slides/slide12.xml><?xml version="1.0" encoding="utf-8"?>
-<p:sld xmlns:a="http://schemas.openxmlformats.org/drawingml/2006/main" xmlns:r="http://schemas.openxmlformats.org/officeDocument/2006/relationships" xmlns:p="http://schemas.openxmlformats.org/presentationml/2006/main">
-  <p:cSld>
-    <p:bg>
-      <p:bgPr>
-        <a:solidFill>
-          <a:srgbClr val="F7F7F7"/>
-        </a:solidFill>
-        <a:effectLst/>
-      </p:bgPr>
-    </p:bg>
-    <p:spTree>
-      <p:nvGrpSpPr>
-        <p:cNvPr id="1" name=""/>
-        <p:cNvGrpSpPr/>
-        <p:nvPr/>
-      </p:nvGrpSpPr>
-      <p:grpSpPr>
-        <a:xfrm>
-          <a:off x="0" y="0"/>
-          <a:ext cx="0" cy="0"/>
-          <a:chOff x="0" y="0"/>
-          <a:chExt cx="0" cy="0"/>
-        </a:xfrm>
-      </p:grpSpPr>
-      <p:sp>
-        <p:nvSpPr>
-          <p:cNvPr id="5" name="Rectangle 4">
-            <a:extLst>
-              <a:ext uri="{FF2B5EF4-FFF2-40B4-BE49-F238E27FC236}">
-                <a16:creationId xmlns:a16="http://schemas.microsoft.com/office/drawing/2014/main" id="{ADFF3A91-4295-9C52-3061-E78CAA08800E}"/>
-              </a:ext>
-            </a:extLst>
-          </p:cNvPr>
-          <p:cNvSpPr/>
-          <p:nvPr/>
-        </p:nvSpPr>
-        <p:spPr>
-          <a:xfrm>
-            <a:off x="2590800" y="1167769"/>
-            <a:ext cx="6377306" cy="4623431"/>
-          </a:xfrm>
-          <a:prstGeom prst="rect">
-            <a:avLst/>
-          </a:prstGeom>
-          <a:noFill/>
-          <a:ln w="57150"/>
-        </p:spPr>
-        <p:style>
-          <a:lnRef idx="2">
-            <a:schemeClr val="accent1">
-              <a:shade val="15000"/>
-            </a:schemeClr>
-          </a:lnRef>
-          <a:fillRef idx="1">
-            <a:schemeClr val="accent1"/>
-          </a:fillRef>
-          <a:effectRef idx="0">
-            <a:schemeClr val="accent1"/>
-          </a:effectRef>
-          <a:fontRef idx="minor">
-            <a:schemeClr val="lt1"/>
-          </a:fontRef>
-        </p:style>
-        <p:txBody>
-          <a:bodyPr rtlCol="0" anchor="ctr"/>
-          <a:lstStyle/>
-          <a:p>
-            <a:pPr algn="ctr"/>
-            <a:endParaRPr lang="en-US"/>
-          </a:p>
-        </p:txBody>
-      </p:sp>
-      <p:pic>
-        <p:nvPicPr>
-          <p:cNvPr id="1026" name="Picture 2">
-            <a:extLst>
-              <a:ext uri="{FF2B5EF4-FFF2-40B4-BE49-F238E27FC236}">
-                <a16:creationId xmlns:a16="http://schemas.microsoft.com/office/drawing/2014/main" id="{934F7AB0-0173-F060-714E-3AD2DC0740BB}"/>
-              </a:ext>
-            </a:extLst>
-          </p:cNvPr>
-          <p:cNvPicPr>
-            <a:picLocks noChangeAspect="1" noChangeArrowheads="1"/>
-          </p:cNvPicPr>
-          <p:nvPr/>
-        </p:nvPicPr>
-        <p:blipFill rotWithShape="1">
-          <a:blip r:embed="rId2">
-            <a:extLst>
-              <a:ext uri="{28A0092B-C50C-407E-A947-70E740481C1C}">
-                <a14:useLocalDpi xmlns:a14="http://schemas.microsoft.com/office/drawing/2010/main" val="0"/>
-              </a:ext>
-            </a:extLst>
-          </a:blip>
-          <a:srcRect l="8518" t="26667" r="10001" b="5916"/>
-          <a:stretch/>
-        </p:blipFill>
-        <p:spPr bwMode="auto">
-          <a:xfrm>
-            <a:off x="3810000" y="1320800"/>
-            <a:ext cx="3960757" cy="4369431"/>
-          </a:xfrm>
-          <a:prstGeom prst="rect">
-            <a:avLst/>
-          </a:prstGeom>
-          <a:noFill/>
-          <a:extLst>
-            <a:ext uri="{909E8E84-426E-40DD-AFC4-6F175D3DCCD1}">
-              <a14:hiddenFill xmlns:a14="http://schemas.microsoft.com/office/drawing/2010/main">
-                <a:solidFill>
-                  <a:srgbClr val="FFFFFF"/>
-                </a:solidFill>
-              </a14:hiddenFill>
-            </a:ext>
-          </a:extLst>
-        </p:spPr>
-      </p:pic>
-    </p:spTree>
-    <p:extLst>
-      <p:ext uri="{BB962C8B-B14F-4D97-AF65-F5344CB8AC3E}">
-        <p14:creationId xmlns:p14="http://schemas.microsoft.com/office/powerpoint/2010/main" val="2958606512"/>
+        <p14:creationId xmlns:p14="http://schemas.microsoft.com/office/powerpoint/2010/main" val="2775950881"/>
       </p:ext>
     </p:extLst>
   </p:cSld>
@@ -4096,6 +4084,412 @@
       </p:sp>
       <p:pic>
         <p:nvPicPr>
+          <p:cNvPr id="2" name="Picture 2">
+            <a:extLst>
+              <a:ext uri="{FF2B5EF4-FFF2-40B4-BE49-F238E27FC236}">
+                <a16:creationId xmlns:a16="http://schemas.microsoft.com/office/drawing/2014/main" id="{0592BA04-470B-6F8D-B8A2-9A5F41BC11E4}"/>
+              </a:ext>
+            </a:extLst>
+          </p:cNvPr>
+          <p:cNvPicPr>
+            <a:picLocks noChangeAspect="1" noChangeArrowheads="1"/>
+          </p:cNvPicPr>
+          <p:nvPr/>
+        </p:nvPicPr>
+        <p:blipFill>
+          <a:blip r:embed="rId2">
+            <a:extLst>
+              <a:ext uri="{28A0092B-C50C-407E-A947-70E740481C1C}">
+                <a14:useLocalDpi xmlns:a14="http://schemas.microsoft.com/office/drawing/2010/main" val="0"/>
+              </a:ext>
+            </a:extLst>
+          </a:blip>
+          <a:srcRect/>
+          <a:stretch>
+            <a:fillRect/>
+          </a:stretch>
+        </p:blipFill>
+        <p:spPr bwMode="auto">
+          <a:xfrm>
+            <a:off x="3674428" y="1480181"/>
+            <a:ext cx="4210050" cy="4210050"/>
+          </a:xfrm>
+          <a:prstGeom prst="rect">
+            <a:avLst/>
+          </a:prstGeom>
+          <a:noFill/>
+          <a:extLst>
+            <a:ext uri="{909E8E84-426E-40DD-AFC4-6F175D3DCCD1}">
+              <a14:hiddenFill xmlns:a14="http://schemas.microsoft.com/office/drawing/2010/main">
+                <a:solidFill>
+                  <a:srgbClr val="FFFFFF"/>
+                </a:solidFill>
+              </a14:hiddenFill>
+            </a:ext>
+          </a:extLst>
+        </p:spPr>
+      </p:pic>
+    </p:spTree>
+    <p:extLst>
+      <p:ext uri="{BB962C8B-B14F-4D97-AF65-F5344CB8AC3E}">
+        <p14:creationId xmlns:p14="http://schemas.microsoft.com/office/powerpoint/2010/main" val="1359039513"/>
+      </p:ext>
+    </p:extLst>
+  </p:cSld>
+  <p:clrMapOvr>
+    <a:masterClrMapping/>
+  </p:clrMapOvr>
+  <p:transition>
+    <p:fade/>
+  </p:transition>
+</p:sld>
+</file>
+
+<file path=ppt/slides/slide14.xml><?xml version="1.0" encoding="utf-8"?>
+<p:sld xmlns:a="http://schemas.openxmlformats.org/drawingml/2006/main" xmlns:r="http://schemas.openxmlformats.org/officeDocument/2006/relationships" xmlns:p="http://schemas.openxmlformats.org/presentationml/2006/main">
+  <p:cSld>
+    <p:bg>
+      <p:bgPr>
+        <a:solidFill>
+          <a:srgbClr val="F7F7F7"/>
+        </a:solidFill>
+        <a:effectLst/>
+      </p:bgPr>
+    </p:bg>
+    <p:spTree>
+      <p:nvGrpSpPr>
+        <p:cNvPr id="1" name=""/>
+        <p:cNvGrpSpPr/>
+        <p:nvPr/>
+      </p:nvGrpSpPr>
+      <p:grpSpPr>
+        <a:xfrm>
+          <a:off x="0" y="0"/>
+          <a:ext cx="0" cy="0"/>
+          <a:chOff x="0" y="0"/>
+          <a:chExt cx="0" cy="0"/>
+        </a:xfrm>
+      </p:grpSpPr>
+      <p:sp>
+        <p:nvSpPr>
+          <p:cNvPr id="5" name="Rectangle 4">
+            <a:extLst>
+              <a:ext uri="{FF2B5EF4-FFF2-40B4-BE49-F238E27FC236}">
+                <a16:creationId xmlns:a16="http://schemas.microsoft.com/office/drawing/2014/main" id="{ADFF3A91-4295-9C52-3061-E78CAA08800E}"/>
+              </a:ext>
+            </a:extLst>
+          </p:cNvPr>
+          <p:cNvSpPr/>
+          <p:nvPr/>
+        </p:nvSpPr>
+        <p:spPr>
+          <a:xfrm>
+            <a:off x="2590800" y="1167769"/>
+            <a:ext cx="6377306" cy="4623431"/>
+          </a:xfrm>
+          <a:prstGeom prst="rect">
+            <a:avLst/>
+          </a:prstGeom>
+          <a:noFill/>
+          <a:ln w="57150"/>
+        </p:spPr>
+        <p:style>
+          <a:lnRef idx="2">
+            <a:schemeClr val="accent1">
+              <a:shade val="15000"/>
+            </a:schemeClr>
+          </a:lnRef>
+          <a:fillRef idx="1">
+            <a:schemeClr val="accent1"/>
+          </a:fillRef>
+          <a:effectRef idx="0">
+            <a:schemeClr val="accent1"/>
+          </a:effectRef>
+          <a:fontRef idx="minor">
+            <a:schemeClr val="lt1"/>
+          </a:fontRef>
+        </p:style>
+        <p:txBody>
+          <a:bodyPr rtlCol="0" anchor="ctr"/>
+          <a:lstStyle/>
+          <a:p>
+            <a:pPr algn="ctr"/>
+            <a:endParaRPr lang="en-US"/>
+          </a:p>
+        </p:txBody>
+      </p:sp>
+      <p:pic>
+        <p:nvPicPr>
+          <p:cNvPr id="1026" name="Picture 2">
+            <a:extLst>
+              <a:ext uri="{FF2B5EF4-FFF2-40B4-BE49-F238E27FC236}">
+                <a16:creationId xmlns:a16="http://schemas.microsoft.com/office/drawing/2014/main" id="{934F7AB0-0173-F060-714E-3AD2DC0740BB}"/>
+              </a:ext>
+            </a:extLst>
+          </p:cNvPr>
+          <p:cNvPicPr>
+            <a:picLocks noChangeAspect="1" noChangeArrowheads="1"/>
+          </p:cNvPicPr>
+          <p:nvPr/>
+        </p:nvPicPr>
+        <p:blipFill rotWithShape="1">
+          <a:blip r:embed="rId2">
+            <a:extLst>
+              <a:ext uri="{28A0092B-C50C-407E-A947-70E740481C1C}">
+                <a14:useLocalDpi xmlns:a14="http://schemas.microsoft.com/office/drawing/2010/main" val="0"/>
+              </a:ext>
+            </a:extLst>
+          </a:blip>
+          <a:srcRect l="8518" t="26667" r="10001" b="5916"/>
+          <a:stretch/>
+        </p:blipFill>
+        <p:spPr bwMode="auto">
+          <a:xfrm>
+            <a:off x="3810000" y="1320800"/>
+            <a:ext cx="3960757" cy="4369431"/>
+          </a:xfrm>
+          <a:prstGeom prst="rect">
+            <a:avLst/>
+          </a:prstGeom>
+          <a:noFill/>
+          <a:extLst>
+            <a:ext uri="{909E8E84-426E-40DD-AFC4-6F175D3DCCD1}">
+              <a14:hiddenFill xmlns:a14="http://schemas.microsoft.com/office/drawing/2010/main">
+                <a:solidFill>
+                  <a:srgbClr val="FFFFFF"/>
+                </a:solidFill>
+              </a14:hiddenFill>
+            </a:ext>
+          </a:extLst>
+        </p:spPr>
+      </p:pic>
+    </p:spTree>
+    <p:extLst>
+      <p:ext uri="{BB962C8B-B14F-4D97-AF65-F5344CB8AC3E}">
+        <p14:creationId xmlns:p14="http://schemas.microsoft.com/office/powerpoint/2010/main" val="2958606512"/>
+      </p:ext>
+    </p:extLst>
+  </p:cSld>
+  <p:clrMapOvr>
+    <a:masterClrMapping/>
+  </p:clrMapOvr>
+  <p:transition>
+    <p:fade/>
+  </p:transition>
+</p:sld>
+</file>
+
+<file path=ppt/slides/slide15.xml><?xml version="1.0" encoding="utf-8"?>
+<p:sld xmlns:a="http://schemas.openxmlformats.org/drawingml/2006/main" xmlns:r="http://schemas.openxmlformats.org/officeDocument/2006/relationships" xmlns:p="http://schemas.openxmlformats.org/presentationml/2006/main">
+  <p:cSld>
+    <p:bg>
+      <p:bgPr>
+        <a:solidFill>
+          <a:srgbClr val="F7F7F7"/>
+        </a:solidFill>
+        <a:effectLst/>
+      </p:bgPr>
+    </p:bg>
+    <p:spTree>
+      <p:nvGrpSpPr>
+        <p:cNvPr id="1" name=""/>
+        <p:cNvGrpSpPr/>
+        <p:nvPr/>
+      </p:nvGrpSpPr>
+      <p:grpSpPr>
+        <a:xfrm>
+          <a:off x="0" y="0"/>
+          <a:ext cx="0" cy="0"/>
+          <a:chOff x="0" y="0"/>
+          <a:chExt cx="0" cy="0"/>
+        </a:xfrm>
+      </p:grpSpPr>
+      <p:sp>
+        <p:nvSpPr>
+          <p:cNvPr id="5" name="Rectangle 4">
+            <a:extLst>
+              <a:ext uri="{FF2B5EF4-FFF2-40B4-BE49-F238E27FC236}">
+                <a16:creationId xmlns:a16="http://schemas.microsoft.com/office/drawing/2014/main" id="{ADFF3A91-4295-9C52-3061-E78CAA08800E}"/>
+              </a:ext>
+            </a:extLst>
+          </p:cNvPr>
+          <p:cNvSpPr/>
+          <p:nvPr/>
+        </p:nvSpPr>
+        <p:spPr>
+          <a:xfrm>
+            <a:off x="2590800" y="1167769"/>
+            <a:ext cx="6377306" cy="4623431"/>
+          </a:xfrm>
+          <a:prstGeom prst="rect">
+            <a:avLst/>
+          </a:prstGeom>
+          <a:noFill/>
+          <a:ln w="57150"/>
+        </p:spPr>
+        <p:style>
+          <a:lnRef idx="2">
+            <a:schemeClr val="accent1">
+              <a:shade val="15000"/>
+            </a:schemeClr>
+          </a:lnRef>
+          <a:fillRef idx="1">
+            <a:schemeClr val="accent1"/>
+          </a:fillRef>
+          <a:effectRef idx="0">
+            <a:schemeClr val="accent1"/>
+          </a:effectRef>
+          <a:fontRef idx="minor">
+            <a:schemeClr val="lt1"/>
+          </a:fontRef>
+        </p:style>
+        <p:txBody>
+          <a:bodyPr rtlCol="0" anchor="ctr"/>
+          <a:lstStyle/>
+          <a:p>
+            <a:pPr algn="ctr"/>
+            <a:endParaRPr lang="en-US"/>
+          </a:p>
+        </p:txBody>
+      </p:sp>
+      <p:pic>
+        <p:nvPicPr>
+          <p:cNvPr id="1028" name="Picture 4">
+            <a:extLst>
+              <a:ext uri="{FF2B5EF4-FFF2-40B4-BE49-F238E27FC236}">
+                <a16:creationId xmlns:a16="http://schemas.microsoft.com/office/drawing/2014/main" id="{039425E3-36BB-C2CB-B3A4-1CC7A72C6022}"/>
+              </a:ext>
+            </a:extLst>
+          </p:cNvPr>
+          <p:cNvPicPr>
+            <a:picLocks noChangeAspect="1" noChangeArrowheads="1"/>
+          </p:cNvPicPr>
+          <p:nvPr/>
+        </p:nvPicPr>
+        <p:blipFill>
+          <a:blip r:embed="rId2">
+            <a:extLst>
+              <a:ext uri="{28A0092B-C50C-407E-A947-70E740481C1C}">
+                <a14:useLocalDpi xmlns:a14="http://schemas.microsoft.com/office/drawing/2010/main" val="0"/>
+              </a:ext>
+            </a:extLst>
+          </a:blip>
+          <a:srcRect/>
+          <a:stretch>
+            <a:fillRect/>
+          </a:stretch>
+        </p:blipFill>
+        <p:spPr bwMode="auto">
+          <a:xfrm>
+            <a:off x="3369627" y="1803320"/>
+            <a:ext cx="4707573" cy="3530680"/>
+          </a:xfrm>
+          <a:prstGeom prst="rect">
+            <a:avLst/>
+          </a:prstGeom>
+          <a:noFill/>
+          <a:extLst>
+            <a:ext uri="{909E8E84-426E-40DD-AFC4-6F175D3DCCD1}">
+              <a14:hiddenFill xmlns:a14="http://schemas.microsoft.com/office/drawing/2010/main">
+                <a:solidFill>
+                  <a:srgbClr val="FFFFFF"/>
+                </a:solidFill>
+              </a14:hiddenFill>
+            </a:ext>
+          </a:extLst>
+        </p:spPr>
+      </p:pic>
+    </p:spTree>
+    <p:extLst>
+      <p:ext uri="{BB962C8B-B14F-4D97-AF65-F5344CB8AC3E}">
+        <p14:creationId xmlns:p14="http://schemas.microsoft.com/office/powerpoint/2010/main" val="2524836890"/>
+      </p:ext>
+    </p:extLst>
+  </p:cSld>
+  <p:clrMapOvr>
+    <a:masterClrMapping/>
+  </p:clrMapOvr>
+  <p:transition>
+    <p:fade/>
+  </p:transition>
+</p:sld>
+</file>
+
+<file path=ppt/slides/slide16.xml><?xml version="1.0" encoding="utf-8"?>
+<p:sld xmlns:a="http://schemas.openxmlformats.org/drawingml/2006/main" xmlns:r="http://schemas.openxmlformats.org/officeDocument/2006/relationships" xmlns:p="http://schemas.openxmlformats.org/presentationml/2006/main">
+  <p:cSld>
+    <p:bg>
+      <p:bgPr>
+        <a:solidFill>
+          <a:srgbClr val="FFFFFF"/>
+        </a:solidFill>
+        <a:effectLst/>
+      </p:bgPr>
+    </p:bg>
+    <p:spTree>
+      <p:nvGrpSpPr>
+        <p:cNvPr id="1" name=""/>
+        <p:cNvGrpSpPr/>
+        <p:nvPr/>
+      </p:nvGrpSpPr>
+      <p:grpSpPr>
+        <a:xfrm>
+          <a:off x="0" y="0"/>
+          <a:ext cx="0" cy="0"/>
+          <a:chOff x="0" y="0"/>
+          <a:chExt cx="0" cy="0"/>
+        </a:xfrm>
+      </p:grpSpPr>
+      <p:sp>
+        <p:nvSpPr>
+          <p:cNvPr id="5" name="Rectangle 4">
+            <a:extLst>
+              <a:ext uri="{FF2B5EF4-FFF2-40B4-BE49-F238E27FC236}">
+                <a16:creationId xmlns:a16="http://schemas.microsoft.com/office/drawing/2014/main" id="{ADFF3A91-4295-9C52-3061-E78CAA08800E}"/>
+              </a:ext>
+            </a:extLst>
+          </p:cNvPr>
+          <p:cNvSpPr/>
+          <p:nvPr/>
+        </p:nvSpPr>
+        <p:spPr>
+          <a:xfrm>
+            <a:off x="2590800" y="1167769"/>
+            <a:ext cx="6377306" cy="4623431"/>
+          </a:xfrm>
+          <a:prstGeom prst="rect">
+            <a:avLst/>
+          </a:prstGeom>
+          <a:noFill/>
+          <a:ln w="57150"/>
+        </p:spPr>
+        <p:style>
+          <a:lnRef idx="2">
+            <a:schemeClr val="accent1">
+              <a:shade val="15000"/>
+            </a:schemeClr>
+          </a:lnRef>
+          <a:fillRef idx="1">
+            <a:schemeClr val="accent1"/>
+          </a:fillRef>
+          <a:effectRef idx="0">
+            <a:schemeClr val="accent1"/>
+          </a:effectRef>
+          <a:fontRef idx="minor">
+            <a:schemeClr val="lt1"/>
+          </a:fontRef>
+        </p:style>
+        <p:txBody>
+          <a:bodyPr rtlCol="0" anchor="ctr"/>
+          <a:lstStyle/>
+          <a:p>
+            <a:pPr algn="ctr"/>
+            <a:endParaRPr lang="en-US"/>
+          </a:p>
+        </p:txBody>
+      </p:sp>
+      <p:pic>
+        <p:nvPicPr>
           <p:cNvPr id="2050" name="Picture 2">
             <a:extLst>
               <a:ext uri="{FF2B5EF4-FFF2-40B4-BE49-F238E27FC236}">
@@ -4157,7 +4551,143 @@
 </p:sld>
 </file>
 
-<file path=ppt/slides/slide14.xml><?xml version="1.0" encoding="utf-8"?>
+<file path=ppt/slides/slide17.xml><?xml version="1.0" encoding="utf-8"?>
+<p:sld xmlns:a="http://schemas.openxmlformats.org/drawingml/2006/main" xmlns:r="http://schemas.openxmlformats.org/officeDocument/2006/relationships" xmlns:p="http://schemas.openxmlformats.org/presentationml/2006/main">
+  <p:cSld>
+    <p:bg>
+      <p:bgPr>
+        <a:solidFill>
+          <a:srgbClr val="FFFFFF"/>
+        </a:solidFill>
+        <a:effectLst/>
+      </p:bgPr>
+    </p:bg>
+    <p:spTree>
+      <p:nvGrpSpPr>
+        <p:cNvPr id="1" name=""/>
+        <p:cNvGrpSpPr/>
+        <p:nvPr/>
+      </p:nvGrpSpPr>
+      <p:grpSpPr>
+        <a:xfrm>
+          <a:off x="0" y="0"/>
+          <a:ext cx="0" cy="0"/>
+          <a:chOff x="0" y="0"/>
+          <a:chExt cx="0" cy="0"/>
+        </a:xfrm>
+      </p:grpSpPr>
+      <p:sp>
+        <p:nvSpPr>
+          <p:cNvPr id="5" name="Rectangle 4">
+            <a:extLst>
+              <a:ext uri="{FF2B5EF4-FFF2-40B4-BE49-F238E27FC236}">
+                <a16:creationId xmlns:a16="http://schemas.microsoft.com/office/drawing/2014/main" id="{ADFF3A91-4295-9C52-3061-E78CAA08800E}"/>
+              </a:ext>
+            </a:extLst>
+          </p:cNvPr>
+          <p:cNvSpPr/>
+          <p:nvPr/>
+        </p:nvSpPr>
+        <p:spPr>
+          <a:xfrm>
+            <a:off x="2590800" y="1167769"/>
+            <a:ext cx="6377306" cy="4623431"/>
+          </a:xfrm>
+          <a:prstGeom prst="rect">
+            <a:avLst/>
+          </a:prstGeom>
+          <a:noFill/>
+          <a:ln w="57150"/>
+        </p:spPr>
+        <p:style>
+          <a:lnRef idx="2">
+            <a:schemeClr val="accent1">
+              <a:shade val="15000"/>
+            </a:schemeClr>
+          </a:lnRef>
+          <a:fillRef idx="1">
+            <a:schemeClr val="accent1"/>
+          </a:fillRef>
+          <a:effectRef idx="0">
+            <a:schemeClr val="accent1"/>
+          </a:effectRef>
+          <a:fontRef idx="minor">
+            <a:schemeClr val="lt1"/>
+          </a:fontRef>
+        </p:style>
+        <p:txBody>
+          <a:bodyPr rtlCol="0" anchor="ctr"/>
+          <a:lstStyle/>
+          <a:p>
+            <a:pPr algn="ctr"/>
+            <a:endParaRPr lang="en-US"/>
+          </a:p>
+        </p:txBody>
+      </p:sp>
+      <p:pic>
+        <p:nvPicPr>
+          <p:cNvPr id="2050" name="Picture 2">
+            <a:extLst>
+              <a:ext uri="{FF2B5EF4-FFF2-40B4-BE49-F238E27FC236}">
+                <a16:creationId xmlns:a16="http://schemas.microsoft.com/office/drawing/2014/main" id="{5E520565-87E2-FF99-956D-81B53ED2B87A}"/>
+              </a:ext>
+            </a:extLst>
+          </p:cNvPr>
+          <p:cNvPicPr>
+            <a:picLocks noChangeAspect="1" noChangeArrowheads="1"/>
+          </p:cNvPicPr>
+          <p:nvPr/>
+        </p:nvPicPr>
+        <p:blipFill>
+          <a:blip r:embed="rId2">
+            <a:extLst>
+              <a:ext uri="{28A0092B-C50C-407E-A947-70E740481C1C}">
+                <a14:useLocalDpi xmlns:a14="http://schemas.microsoft.com/office/drawing/2010/main" val="0"/>
+              </a:ext>
+            </a:extLst>
+          </a:blip>
+          <a:srcRect/>
+          <a:stretch>
+            <a:fillRect/>
+          </a:stretch>
+        </p:blipFill>
+        <p:spPr bwMode="auto">
+          <a:xfrm>
+            <a:off x="3581400" y="1247775"/>
+            <a:ext cx="4362450" cy="4362450"/>
+          </a:xfrm>
+          <a:prstGeom prst="rect">
+            <a:avLst/>
+          </a:prstGeom>
+          <a:noFill/>
+          <a:extLst>
+            <a:ext uri="{909E8E84-426E-40DD-AFC4-6F175D3DCCD1}">
+              <a14:hiddenFill xmlns:a14="http://schemas.microsoft.com/office/drawing/2010/main">
+                <a:solidFill>
+                  <a:srgbClr val="FFFFFF"/>
+                </a:solidFill>
+              </a14:hiddenFill>
+            </a:ext>
+          </a:extLst>
+        </p:spPr>
+      </p:pic>
+    </p:spTree>
+    <p:extLst>
+      <p:ext uri="{BB962C8B-B14F-4D97-AF65-F5344CB8AC3E}">
+        <p14:creationId xmlns:p14="http://schemas.microsoft.com/office/powerpoint/2010/main" val="985274810"/>
+      </p:ext>
+    </p:extLst>
+  </p:cSld>
+  <p:clrMapOvr>
+    <a:masterClrMapping/>
+  </p:clrMapOvr>
+  <p:transition>
+    <p:fade/>
+  </p:transition>
+</p:sld>
+</file>
+
+<file path=ppt/slides/slide18.xml><?xml version="1.0" encoding="utf-8"?>
 <p:sld xmlns:a="http://schemas.openxmlformats.org/drawingml/2006/main" xmlns:r="http://schemas.openxmlformats.org/officeDocument/2006/relationships" xmlns:p="http://schemas.openxmlformats.org/presentationml/2006/main">
   <p:cSld>
     <p:bg>
@@ -4486,7 +5016,7 @@
 </p:sld>
 </file>
 
-<file path=ppt/slides/slide15.xml><?xml version="1.0" encoding="utf-8"?>
+<file path=ppt/slides/slide19.xml><?xml version="1.0" encoding="utf-8"?>
 <p:sld xmlns:a="http://schemas.openxmlformats.org/drawingml/2006/main" xmlns:r="http://schemas.openxmlformats.org/officeDocument/2006/relationships" xmlns:p="http://schemas.openxmlformats.org/presentationml/2006/main">
   <p:cSld>
     <p:bg>
@@ -6283,6 +6813,130 @@
     <p:bg>
       <p:bgPr>
         <a:solidFill>
+          <a:srgbClr val="FFFFFF"/>
+        </a:solidFill>
+        <a:effectLst/>
+      </p:bgPr>
+    </p:bg>
+    <p:spTree>
+      <p:nvGrpSpPr>
+        <p:cNvPr id="1" name=""/>
+        <p:cNvGrpSpPr/>
+        <p:nvPr/>
+      </p:nvGrpSpPr>
+      <p:grpSpPr>
+        <a:xfrm>
+          <a:off x="0" y="0"/>
+          <a:ext cx="0" cy="0"/>
+          <a:chOff x="0" y="0"/>
+          <a:chExt cx="0" cy="0"/>
+        </a:xfrm>
+      </p:grpSpPr>
+      <p:pic>
+        <p:nvPicPr>
+          <p:cNvPr id="3" name="Picture 2">
+            <a:extLst>
+              <a:ext uri="{FF2B5EF4-FFF2-40B4-BE49-F238E27FC236}">
+                <a16:creationId xmlns:a16="http://schemas.microsoft.com/office/drawing/2014/main" id="{E6E44495-8731-93A8-AB0D-F8B4FA507DD1}"/>
+              </a:ext>
+            </a:extLst>
+          </p:cNvPr>
+          <p:cNvPicPr>
+            <a:picLocks noChangeAspect="1"/>
+          </p:cNvPicPr>
+          <p:nvPr/>
+        </p:nvPicPr>
+        <p:blipFill>
+          <a:blip r:embed="rId2">
+            <a:extLst>
+              <a:ext uri="{28A0092B-C50C-407E-A947-70E740481C1C}">
+                <a14:useLocalDpi xmlns:a14="http://schemas.microsoft.com/office/drawing/2010/main" val="0"/>
+              </a:ext>
+            </a:extLst>
+          </a:blip>
+          <a:srcRect/>
+          <a:stretch/>
+        </p:blipFill>
+        <p:spPr>
+          <a:xfrm>
+            <a:off x="3505200" y="1219200"/>
+            <a:ext cx="4533900" cy="4533900"/>
+          </a:xfrm>
+          <a:prstGeom prst="rect">
+            <a:avLst/>
+          </a:prstGeom>
+        </p:spPr>
+      </p:pic>
+      <p:sp>
+        <p:nvSpPr>
+          <p:cNvPr id="5" name="Rectangle 4">
+            <a:extLst>
+              <a:ext uri="{FF2B5EF4-FFF2-40B4-BE49-F238E27FC236}">
+                <a16:creationId xmlns:a16="http://schemas.microsoft.com/office/drawing/2014/main" id="{ADFF3A91-4295-9C52-3061-E78CAA08800E}"/>
+              </a:ext>
+            </a:extLst>
+          </p:cNvPr>
+          <p:cNvSpPr/>
+          <p:nvPr/>
+        </p:nvSpPr>
+        <p:spPr>
+          <a:xfrm>
+            <a:off x="2590800" y="1167769"/>
+            <a:ext cx="6377306" cy="4623431"/>
+          </a:xfrm>
+          <a:prstGeom prst="rect">
+            <a:avLst/>
+          </a:prstGeom>
+          <a:noFill/>
+          <a:ln w="57150"/>
+        </p:spPr>
+        <p:style>
+          <a:lnRef idx="2">
+            <a:schemeClr val="accent1">
+              <a:shade val="15000"/>
+            </a:schemeClr>
+          </a:lnRef>
+          <a:fillRef idx="1">
+            <a:schemeClr val="accent1"/>
+          </a:fillRef>
+          <a:effectRef idx="0">
+            <a:schemeClr val="accent1"/>
+          </a:effectRef>
+          <a:fontRef idx="minor">
+            <a:schemeClr val="lt1"/>
+          </a:fontRef>
+        </p:style>
+        <p:txBody>
+          <a:bodyPr rtlCol="0" anchor="ctr"/>
+          <a:lstStyle/>
+          <a:p>
+            <a:pPr algn="ctr"/>
+            <a:endParaRPr lang="en-US"/>
+          </a:p>
+        </p:txBody>
+      </p:sp>
+    </p:spTree>
+    <p:extLst>
+      <p:ext uri="{BB962C8B-B14F-4D97-AF65-F5344CB8AC3E}">
+        <p14:creationId xmlns:p14="http://schemas.microsoft.com/office/powerpoint/2010/main" val="3138096965"/>
+      </p:ext>
+    </p:extLst>
+  </p:cSld>
+  <p:clrMapOvr>
+    <a:masterClrMapping/>
+  </p:clrMapOvr>
+  <p:transition>
+    <p:fade/>
+  </p:transition>
+</p:sld>
+</file>
+
+<file path=ppt/slides/slide9.xml><?xml version="1.0" encoding="utf-8"?>
+<p:sld xmlns:a="http://schemas.openxmlformats.org/drawingml/2006/main" xmlns:r="http://schemas.openxmlformats.org/officeDocument/2006/relationships" xmlns:p="http://schemas.openxmlformats.org/presentationml/2006/main">
+  <p:cSld>
+    <p:bg>
+      <p:bgPr>
+        <a:solidFill>
           <a:srgbClr val="F8F8F8"/>
         </a:solidFill>
         <a:effectLst/>
@@ -6401,142 +7055,6 @@
     <p:extLst>
       <p:ext uri="{BB962C8B-B14F-4D97-AF65-F5344CB8AC3E}">
         <p14:creationId xmlns:p14="http://schemas.microsoft.com/office/powerpoint/2010/main" val="94104684"/>
-      </p:ext>
-    </p:extLst>
-  </p:cSld>
-  <p:clrMapOvr>
-    <a:masterClrMapping/>
-  </p:clrMapOvr>
-  <p:transition>
-    <p:fade/>
-  </p:transition>
-</p:sld>
-</file>
-
-<file path=ppt/slides/slide9.xml><?xml version="1.0" encoding="utf-8"?>
-<p:sld xmlns:a="http://schemas.openxmlformats.org/drawingml/2006/main" xmlns:r="http://schemas.openxmlformats.org/officeDocument/2006/relationships" xmlns:p="http://schemas.openxmlformats.org/presentationml/2006/main">
-  <p:cSld>
-    <p:bg>
-      <p:bgPr>
-        <a:solidFill>
-          <a:srgbClr val="FFFFFF"/>
-        </a:solidFill>
-        <a:effectLst/>
-      </p:bgPr>
-    </p:bg>
-    <p:spTree>
-      <p:nvGrpSpPr>
-        <p:cNvPr id="1" name=""/>
-        <p:cNvGrpSpPr/>
-        <p:nvPr/>
-      </p:nvGrpSpPr>
-      <p:grpSpPr>
-        <a:xfrm>
-          <a:off x="0" y="0"/>
-          <a:ext cx="0" cy="0"/>
-          <a:chOff x="0" y="0"/>
-          <a:chExt cx="0" cy="0"/>
-        </a:xfrm>
-      </p:grpSpPr>
-      <p:sp>
-        <p:nvSpPr>
-          <p:cNvPr id="5" name="Rectangle 4">
-            <a:extLst>
-              <a:ext uri="{FF2B5EF4-FFF2-40B4-BE49-F238E27FC236}">
-                <a16:creationId xmlns:a16="http://schemas.microsoft.com/office/drawing/2014/main" id="{ADFF3A91-4295-9C52-3061-E78CAA08800E}"/>
-              </a:ext>
-            </a:extLst>
-          </p:cNvPr>
-          <p:cNvSpPr/>
-          <p:nvPr/>
-        </p:nvSpPr>
-        <p:spPr>
-          <a:xfrm>
-            <a:off x="2590800" y="1167769"/>
-            <a:ext cx="6377306" cy="4623431"/>
-          </a:xfrm>
-          <a:prstGeom prst="rect">
-            <a:avLst/>
-          </a:prstGeom>
-          <a:noFill/>
-          <a:ln w="57150"/>
-        </p:spPr>
-        <p:style>
-          <a:lnRef idx="2">
-            <a:schemeClr val="accent1">
-              <a:shade val="15000"/>
-            </a:schemeClr>
-          </a:lnRef>
-          <a:fillRef idx="1">
-            <a:schemeClr val="accent1"/>
-          </a:fillRef>
-          <a:effectRef idx="0">
-            <a:schemeClr val="accent1"/>
-          </a:effectRef>
-          <a:fontRef idx="minor">
-            <a:schemeClr val="lt1"/>
-          </a:fontRef>
-        </p:style>
-        <p:txBody>
-          <a:bodyPr rtlCol="0" anchor="ctr"/>
-          <a:lstStyle/>
-          <a:p>
-            <a:pPr algn="ctr"/>
-            <a:endParaRPr lang="en-US"/>
-          </a:p>
-        </p:txBody>
-      </p:sp>
-      <p:pic>
-        <p:nvPicPr>
-          <p:cNvPr id="1028" name="Picture 4">
-            <a:extLst>
-              <a:ext uri="{FF2B5EF4-FFF2-40B4-BE49-F238E27FC236}">
-                <a16:creationId xmlns:a16="http://schemas.microsoft.com/office/drawing/2014/main" id="{8D3464C3-2E60-4307-6390-D34FEFFBA4D2}"/>
-              </a:ext>
-            </a:extLst>
-          </p:cNvPr>
-          <p:cNvPicPr>
-            <a:picLocks noChangeAspect="1" noChangeArrowheads="1"/>
-          </p:cNvPicPr>
-          <p:nvPr/>
-        </p:nvPicPr>
-        <p:blipFill>
-          <a:blip r:embed="rId2">
-            <a:extLst>
-              <a:ext uri="{28A0092B-C50C-407E-A947-70E740481C1C}">
-                <a14:useLocalDpi xmlns:a14="http://schemas.microsoft.com/office/drawing/2010/main" val="0"/>
-              </a:ext>
-            </a:extLst>
-          </a:blip>
-          <a:srcRect/>
-          <a:stretch>
-            <a:fillRect/>
-          </a:stretch>
-        </p:blipFill>
-        <p:spPr bwMode="auto">
-          <a:xfrm>
-            <a:off x="3917130" y="1386839"/>
-            <a:ext cx="3724645" cy="4084321"/>
-          </a:xfrm>
-          <a:prstGeom prst="rect">
-            <a:avLst/>
-          </a:prstGeom>
-          <a:noFill/>
-          <a:extLst>
-            <a:ext uri="{909E8E84-426E-40DD-AFC4-6F175D3DCCD1}">
-              <a14:hiddenFill xmlns:a14="http://schemas.microsoft.com/office/drawing/2010/main">
-                <a:solidFill>
-                  <a:srgbClr val="FFFFFF"/>
-                </a:solidFill>
-              </a14:hiddenFill>
-            </a:ext>
-          </a:extLst>
-        </p:spPr>
-      </p:pic>
-    </p:spTree>
-    <p:extLst>
-      <p:ext uri="{BB962C8B-B14F-4D97-AF65-F5344CB8AC3E}">
-        <p14:creationId xmlns:p14="http://schemas.microsoft.com/office/powerpoint/2010/main" val="3333527449"/>
       </p:ext>
     </p:extLst>
   </p:cSld>

</xml_diff>

<commit_message>
Twenty-eight- Commit BE Beta
Add more data and product can go down in row of user_category page
</commit_message>
<xml_diff>
--- a/src/main/webapp/asset/descriptionfor web/TechZone.pptx
+++ b/src/main/webapp/asset/descriptionfor web/TechZone.pptx
@@ -13,17 +13,24 @@
     <p:sldId id="261" r:id="rId7"/>
     <p:sldId id="262" r:id="rId8"/>
     <p:sldId id="273" r:id="rId9"/>
-    <p:sldId id="263" r:id="rId10"/>
-    <p:sldId id="265" r:id="rId11"/>
-    <p:sldId id="267" r:id="rId12"/>
-    <p:sldId id="275" r:id="rId13"/>
-    <p:sldId id="268" r:id="rId14"/>
-    <p:sldId id="269" r:id="rId15"/>
-    <p:sldId id="274" r:id="rId16"/>
-    <p:sldId id="270" r:id="rId17"/>
-    <p:sldId id="272" r:id="rId18"/>
-    <p:sldId id="264" r:id="rId19"/>
-    <p:sldId id="266" r:id="rId20"/>
+    <p:sldId id="277" r:id="rId10"/>
+    <p:sldId id="278" r:id="rId11"/>
+    <p:sldId id="263" r:id="rId12"/>
+    <p:sldId id="282" r:id="rId13"/>
+    <p:sldId id="265" r:id="rId14"/>
+    <p:sldId id="281" r:id="rId15"/>
+    <p:sldId id="267" r:id="rId16"/>
+    <p:sldId id="275" r:id="rId17"/>
+    <p:sldId id="268" r:id="rId18"/>
+    <p:sldId id="279" r:id="rId19"/>
+    <p:sldId id="280" r:id="rId20"/>
+    <p:sldId id="269" r:id="rId21"/>
+    <p:sldId id="274" r:id="rId22"/>
+    <p:sldId id="270" r:id="rId23"/>
+    <p:sldId id="272" r:id="rId24"/>
+    <p:sldId id="276" r:id="rId25"/>
+    <p:sldId id="264" r:id="rId26"/>
+    <p:sldId id="266" r:id="rId27"/>
   </p:sldIdLst>
   <p:sldSz cx="12192000" cy="6858000"/>
   <p:notesSz cx="6858000" cy="9144000"/>
@@ -277,7 +284,7 @@
           <a:p>
             <a:fld id="{B9911F21-AB9B-4E47-BFED-F9E6E1164517}" type="datetimeFigureOut">
               <a:rPr lang="en-US" smtClean="0"/>
-              <a:t>3/10/2024</a:t>
+              <a:t>6/10/2024</a:t>
             </a:fld>
             <a:endParaRPr lang="en-US"/>
           </a:p>
@@ -475,7 +482,7 @@
           <a:p>
             <a:fld id="{B9911F21-AB9B-4E47-BFED-F9E6E1164517}" type="datetimeFigureOut">
               <a:rPr lang="en-US" smtClean="0"/>
-              <a:t>3/10/2024</a:t>
+              <a:t>6/10/2024</a:t>
             </a:fld>
             <a:endParaRPr lang="en-US"/>
           </a:p>
@@ -683,7 +690,7 @@
           <a:p>
             <a:fld id="{B9911F21-AB9B-4E47-BFED-F9E6E1164517}" type="datetimeFigureOut">
               <a:rPr lang="en-US" smtClean="0"/>
-              <a:t>3/10/2024</a:t>
+              <a:t>6/10/2024</a:t>
             </a:fld>
             <a:endParaRPr lang="en-US"/>
           </a:p>
@@ -881,7 +888,7 @@
           <a:p>
             <a:fld id="{B9911F21-AB9B-4E47-BFED-F9E6E1164517}" type="datetimeFigureOut">
               <a:rPr lang="en-US" smtClean="0"/>
-              <a:t>3/10/2024</a:t>
+              <a:t>6/10/2024</a:t>
             </a:fld>
             <a:endParaRPr lang="en-US"/>
           </a:p>
@@ -1156,7 +1163,7 @@
           <a:p>
             <a:fld id="{B9911F21-AB9B-4E47-BFED-F9E6E1164517}" type="datetimeFigureOut">
               <a:rPr lang="en-US" smtClean="0"/>
-              <a:t>3/10/2024</a:t>
+              <a:t>6/10/2024</a:t>
             </a:fld>
             <a:endParaRPr lang="en-US"/>
           </a:p>
@@ -1421,7 +1428,7 @@
           <a:p>
             <a:fld id="{B9911F21-AB9B-4E47-BFED-F9E6E1164517}" type="datetimeFigureOut">
               <a:rPr lang="en-US" smtClean="0"/>
-              <a:t>3/10/2024</a:t>
+              <a:t>6/10/2024</a:t>
             </a:fld>
             <a:endParaRPr lang="en-US"/>
           </a:p>
@@ -1833,7 +1840,7 @@
           <a:p>
             <a:fld id="{B9911F21-AB9B-4E47-BFED-F9E6E1164517}" type="datetimeFigureOut">
               <a:rPr lang="en-US" smtClean="0"/>
-              <a:t>3/10/2024</a:t>
+              <a:t>6/10/2024</a:t>
             </a:fld>
             <a:endParaRPr lang="en-US"/>
           </a:p>
@@ -1974,7 +1981,7 @@
           <a:p>
             <a:fld id="{B9911F21-AB9B-4E47-BFED-F9E6E1164517}" type="datetimeFigureOut">
               <a:rPr lang="en-US" smtClean="0"/>
-              <a:t>3/10/2024</a:t>
+              <a:t>6/10/2024</a:t>
             </a:fld>
             <a:endParaRPr lang="en-US"/>
           </a:p>
@@ -2087,7 +2094,7 @@
           <a:p>
             <a:fld id="{B9911F21-AB9B-4E47-BFED-F9E6E1164517}" type="datetimeFigureOut">
               <a:rPr lang="en-US" smtClean="0"/>
-              <a:t>3/10/2024</a:t>
+              <a:t>6/10/2024</a:t>
             </a:fld>
             <a:endParaRPr lang="en-US"/>
           </a:p>
@@ -2398,7 +2405,7 @@
           <a:p>
             <a:fld id="{B9911F21-AB9B-4E47-BFED-F9E6E1164517}" type="datetimeFigureOut">
               <a:rPr lang="en-US" smtClean="0"/>
-              <a:t>3/10/2024</a:t>
+              <a:t>6/10/2024</a:t>
             </a:fld>
             <a:endParaRPr lang="en-US"/>
           </a:p>
@@ -2686,7 +2693,7 @@
           <a:p>
             <a:fld id="{B9911F21-AB9B-4E47-BFED-F9E6E1164517}" type="datetimeFigureOut">
               <a:rPr lang="en-US" smtClean="0"/>
-              <a:t>3/10/2024</a:t>
+              <a:t>6/10/2024</a:t>
             </a:fld>
             <a:endParaRPr lang="en-US"/>
           </a:p>
@@ -2783,10 +2790,10 @@
       </p:grpSpPr>
       <p:sp>
         <p:nvSpPr>
-          <p:cNvPr id="11" name="9Slide.vn - 2019">
-            <a:extLst>
-              <a:ext uri="{FF2B5EF4-FFF2-40B4-BE49-F238E27FC236}">
-                <a16:creationId xmlns:a16="http://schemas.microsoft.com/office/drawing/2014/main" id="{7C448EB3-E52A-5767-EEA6-6BFF1E8A813E}"/>
+          <p:cNvPr id="7" name="9Slide.vn - 2019">
+            <a:extLst>
+              <a:ext uri="{FF2B5EF4-FFF2-40B4-BE49-F238E27FC236}">
+                <a16:creationId xmlns:a16="http://schemas.microsoft.com/office/drawing/2014/main" id="{5AED49C6-E925-2AD7-2CB5-23FC98303AFD}"/>
               </a:ext>
             </a:extLst>
           </p:cNvPr>
@@ -2967,7 +2974,7 @@
           <a:p>
             <a:fld id="{B9911F21-AB9B-4E47-BFED-F9E6E1164517}" type="datetimeFigureOut">
               <a:rPr lang="en-US" smtClean="0"/>
-              <a:t>3/10/2024</a:t>
+              <a:t>6/10/2024</a:t>
             </a:fld>
             <a:endParaRPr lang="en-US"/>
           </a:p>
@@ -3646,6 +3653,41 @@
           <a:chExt cx="0" cy="0"/>
         </a:xfrm>
       </p:grpSpPr>
+      <p:pic>
+        <p:nvPicPr>
+          <p:cNvPr id="3" name="Picture 2">
+            <a:extLst>
+              <a:ext uri="{FF2B5EF4-FFF2-40B4-BE49-F238E27FC236}">
+                <a16:creationId xmlns:a16="http://schemas.microsoft.com/office/drawing/2014/main" id="{E6E44495-8731-93A8-AB0D-F8B4FA507DD1}"/>
+              </a:ext>
+            </a:extLst>
+          </p:cNvPr>
+          <p:cNvPicPr>
+            <a:picLocks noChangeAspect="1"/>
+          </p:cNvPicPr>
+          <p:nvPr/>
+        </p:nvPicPr>
+        <p:blipFill>
+          <a:blip r:embed="rId2">
+            <a:extLst>
+              <a:ext uri="{28A0092B-C50C-407E-A947-70E740481C1C}">
+                <a14:useLocalDpi xmlns:a14="http://schemas.microsoft.com/office/drawing/2010/main" val="0"/>
+              </a:ext>
+            </a:extLst>
+          </a:blip>
+          <a:srcRect/>
+          <a:stretch/>
+        </p:blipFill>
+        <p:spPr>
+          <a:xfrm>
+            <a:off x="3360103" y="1394725"/>
+            <a:ext cx="4838700" cy="4169517"/>
+          </a:xfrm>
+          <a:prstGeom prst="rect">
+            <a:avLst/>
+          </a:prstGeom>
+        </p:spPr>
+      </p:pic>
       <p:sp>
         <p:nvSpPr>
           <p:cNvPr id="5" name="Rectangle 4">
@@ -3694,57 +3736,10 @@
           </a:p>
         </p:txBody>
       </p:sp>
-      <p:pic>
-        <p:nvPicPr>
-          <p:cNvPr id="1028" name="Picture 4">
-            <a:extLst>
-              <a:ext uri="{FF2B5EF4-FFF2-40B4-BE49-F238E27FC236}">
-                <a16:creationId xmlns:a16="http://schemas.microsoft.com/office/drawing/2014/main" id="{8D3464C3-2E60-4307-6390-D34FEFFBA4D2}"/>
-              </a:ext>
-            </a:extLst>
-          </p:cNvPr>
-          <p:cNvPicPr>
-            <a:picLocks noChangeAspect="1" noChangeArrowheads="1"/>
-          </p:cNvPicPr>
-          <p:nvPr/>
-        </p:nvPicPr>
-        <p:blipFill>
-          <a:blip r:embed="rId2">
-            <a:extLst>
-              <a:ext uri="{28A0092B-C50C-407E-A947-70E740481C1C}">
-                <a14:useLocalDpi xmlns:a14="http://schemas.microsoft.com/office/drawing/2010/main" val="0"/>
-              </a:ext>
-            </a:extLst>
-          </a:blip>
-          <a:srcRect/>
-          <a:stretch>
-            <a:fillRect/>
-          </a:stretch>
-        </p:blipFill>
-        <p:spPr bwMode="auto">
-          <a:xfrm>
-            <a:off x="3917130" y="1386839"/>
-            <a:ext cx="3724645" cy="4084321"/>
-          </a:xfrm>
-          <a:prstGeom prst="rect">
-            <a:avLst/>
-          </a:prstGeom>
-          <a:noFill/>
-          <a:extLst>
-            <a:ext uri="{909E8E84-426E-40DD-AFC4-6F175D3DCCD1}">
-              <a14:hiddenFill xmlns:a14="http://schemas.microsoft.com/office/drawing/2010/main">
-                <a:solidFill>
-                  <a:srgbClr val="FFFFFF"/>
-                </a:solidFill>
-              </a14:hiddenFill>
-            </a:ext>
-          </a:extLst>
-        </p:spPr>
-      </p:pic>
     </p:spTree>
     <p:extLst>
       <p:ext uri="{BB962C8B-B14F-4D97-AF65-F5344CB8AC3E}">
-        <p14:creationId xmlns:p14="http://schemas.microsoft.com/office/powerpoint/2010/main" val="3333527449"/>
+        <p14:creationId xmlns:p14="http://schemas.microsoft.com/office/powerpoint/2010/main" val="3407651324"/>
       </p:ext>
     </p:extLst>
   </p:cSld>
@@ -3763,7 +3758,7 @@
     <p:bg>
       <p:bgPr>
         <a:solidFill>
-          <a:srgbClr val="F6F6F8"/>
+          <a:srgbClr val="F8F8F8"/>
         </a:solidFill>
         <a:effectLst/>
       </p:bgPr>
@@ -3835,7 +3830,7 @@
           <p:cNvPr id="1026" name="Picture 2">
             <a:extLst>
               <a:ext uri="{FF2B5EF4-FFF2-40B4-BE49-F238E27FC236}">
-                <a16:creationId xmlns:a16="http://schemas.microsoft.com/office/drawing/2014/main" id="{6D545DBE-8E21-7D03-E187-FCAF846C5B05}"/>
+                <a16:creationId xmlns:a16="http://schemas.microsoft.com/office/drawing/2014/main" id="{5168C581-D69C-5F41-8134-A4C4ABE2BEB5}"/>
               </a:ext>
             </a:extLst>
           </p:cNvPr>
@@ -3844,7 +3839,7 @@
           </p:cNvPicPr>
           <p:nvPr/>
         </p:nvPicPr>
-        <p:blipFill rotWithShape="1">
+        <p:blipFill>
           <a:blip r:embed="rId2">
             <a:extLst>
               <a:ext uri="{28A0092B-C50C-407E-A947-70E740481C1C}">
@@ -3852,13 +3847,15 @@
               </a:ext>
             </a:extLst>
           </a:blip>
-          <a:srcRect t="13771" b="14761"/>
-          <a:stretch/>
+          <a:srcRect/>
+          <a:stretch>
+            <a:fillRect/>
+          </a:stretch>
         </p:blipFill>
         <p:spPr bwMode="auto">
           <a:xfrm>
-            <a:off x="3417253" y="1327783"/>
-            <a:ext cx="4724400" cy="4202433"/>
+            <a:off x="3093403" y="1633537"/>
+            <a:ext cx="5372100" cy="3590925"/>
           </a:xfrm>
           <a:prstGeom prst="rect">
             <a:avLst/>
@@ -3878,7 +3875,7 @@
     </p:spTree>
     <p:extLst>
       <p:ext uri="{BB962C8B-B14F-4D97-AF65-F5344CB8AC3E}">
-        <p14:creationId xmlns:p14="http://schemas.microsoft.com/office/powerpoint/2010/main" val="3496787043"/>
+        <p14:creationId xmlns:p14="http://schemas.microsoft.com/office/powerpoint/2010/main" val="94104684"/>
       </p:ext>
     </p:extLst>
   </p:cSld>
@@ -3966,37 +3963,53 @@
       </p:sp>
       <p:pic>
         <p:nvPicPr>
-          <p:cNvPr id="2" name="Picture 1">
-            <a:extLst>
-              <a:ext uri="{FF2B5EF4-FFF2-40B4-BE49-F238E27FC236}">
-                <a16:creationId xmlns:a16="http://schemas.microsoft.com/office/drawing/2014/main" id="{95D4009D-8416-B584-2271-18DA7D580339}"/>
+          <p:cNvPr id="1026" name="Picture 2">
+            <a:extLst>
+              <a:ext uri="{FF2B5EF4-FFF2-40B4-BE49-F238E27FC236}">
+                <a16:creationId xmlns:a16="http://schemas.microsoft.com/office/drawing/2014/main" id="{5168C581-D69C-5F41-8134-A4C4ABE2BEB5}"/>
               </a:ext>
             </a:extLst>
           </p:cNvPr>
           <p:cNvPicPr>
-            <a:picLocks noChangeAspect="1"/>
+            <a:picLocks noChangeAspect="1" noChangeArrowheads="1"/>
           </p:cNvPicPr>
           <p:nvPr/>
         </p:nvPicPr>
         <p:blipFill>
-          <a:blip r:embed="rId2"/>
-          <a:srcRect t="12000" b="12000"/>
+          <a:blip r:embed="rId2">
+            <a:extLst>
+              <a:ext uri="{28A0092B-C50C-407E-A947-70E740481C1C}">
+                <a14:useLocalDpi xmlns:a14="http://schemas.microsoft.com/office/drawing/2010/main" val="0"/>
+              </a:ext>
+            </a:extLst>
+          </a:blip>
+          <a:srcRect/>
           <a:stretch/>
         </p:blipFill>
-        <p:spPr>
-          <a:xfrm>
-            <a:off x="4038600" y="1849477"/>
-            <a:ext cx="3218212" cy="3260013"/>
+        <p:spPr bwMode="auto">
+          <a:xfrm>
+            <a:off x="3581400" y="1242379"/>
+            <a:ext cx="4474210" cy="4474210"/>
           </a:xfrm>
           <a:prstGeom prst="rect">
             <a:avLst/>
           </a:prstGeom>
+          <a:noFill/>
+          <a:extLst>
+            <a:ext uri="{909E8E84-426E-40DD-AFC4-6F175D3DCCD1}">
+              <a14:hiddenFill xmlns:a14="http://schemas.microsoft.com/office/drawing/2010/main">
+                <a:solidFill>
+                  <a:srgbClr val="FFFFFF"/>
+                </a:solidFill>
+              </a14:hiddenFill>
+            </a:ext>
+          </a:extLst>
         </p:spPr>
       </p:pic>
     </p:spTree>
     <p:extLst>
       <p:ext uri="{BB962C8B-B14F-4D97-AF65-F5344CB8AC3E}">
-        <p14:creationId xmlns:p14="http://schemas.microsoft.com/office/powerpoint/2010/main" val="2775950881"/>
+        <p14:creationId xmlns:p14="http://schemas.microsoft.com/office/powerpoint/2010/main" val="3851090959"/>
       </p:ext>
     </p:extLst>
   </p:cSld>
@@ -4084,10 +4097,10 @@
       </p:sp>
       <p:pic>
         <p:nvPicPr>
-          <p:cNvPr id="2" name="Picture 2">
-            <a:extLst>
-              <a:ext uri="{FF2B5EF4-FFF2-40B4-BE49-F238E27FC236}">
-                <a16:creationId xmlns:a16="http://schemas.microsoft.com/office/drawing/2014/main" id="{0592BA04-470B-6F8D-B8A2-9A5F41BC11E4}"/>
+          <p:cNvPr id="1028" name="Picture 4">
+            <a:extLst>
+              <a:ext uri="{FF2B5EF4-FFF2-40B4-BE49-F238E27FC236}">
+                <a16:creationId xmlns:a16="http://schemas.microsoft.com/office/drawing/2014/main" id="{8D3464C3-2E60-4307-6390-D34FEFFBA4D2}"/>
               </a:ext>
             </a:extLst>
           </p:cNvPr>
@@ -4111,8 +4124,8 @@
         </p:blipFill>
         <p:spPr bwMode="auto">
           <a:xfrm>
-            <a:off x="3674428" y="1480181"/>
-            <a:ext cx="4210050" cy="4210050"/>
+            <a:off x="3917130" y="1386839"/>
+            <a:ext cx="3724645" cy="4084321"/>
           </a:xfrm>
           <a:prstGeom prst="rect">
             <a:avLst/>
@@ -4132,7 +4145,7 @@
     </p:spTree>
     <p:extLst>
       <p:ext uri="{BB962C8B-B14F-4D97-AF65-F5344CB8AC3E}">
-        <p14:creationId xmlns:p14="http://schemas.microsoft.com/office/powerpoint/2010/main" val="1359039513"/>
+        <p14:creationId xmlns:p14="http://schemas.microsoft.com/office/powerpoint/2010/main" val="3333527449"/>
       </p:ext>
     </p:extLst>
   </p:cSld>
@@ -4151,7 +4164,7 @@
     <p:bg>
       <p:bgPr>
         <a:solidFill>
-          <a:srgbClr val="F7F7F7"/>
+          <a:srgbClr val="FFFFFF"/>
         </a:solidFill>
         <a:effectLst/>
       </p:bgPr>
@@ -4220,10 +4233,10 @@
       </p:sp>
       <p:pic>
         <p:nvPicPr>
-          <p:cNvPr id="1026" name="Picture 2">
-            <a:extLst>
-              <a:ext uri="{FF2B5EF4-FFF2-40B4-BE49-F238E27FC236}">
-                <a16:creationId xmlns:a16="http://schemas.microsoft.com/office/drawing/2014/main" id="{934F7AB0-0173-F060-714E-3AD2DC0740BB}"/>
+          <p:cNvPr id="1028" name="Picture 4">
+            <a:extLst>
+              <a:ext uri="{FF2B5EF4-FFF2-40B4-BE49-F238E27FC236}">
+                <a16:creationId xmlns:a16="http://schemas.microsoft.com/office/drawing/2014/main" id="{8D3464C3-2E60-4307-6390-D34FEFFBA4D2}"/>
               </a:ext>
             </a:extLst>
           </p:cNvPr>
@@ -4232,7 +4245,7 @@
           </p:cNvPicPr>
           <p:nvPr/>
         </p:nvPicPr>
-        <p:blipFill rotWithShape="1">
+        <p:blipFill>
           <a:blip r:embed="rId2">
             <a:extLst>
               <a:ext uri="{28A0092B-C50C-407E-A947-70E740481C1C}">
@@ -4240,13 +4253,13 @@
               </a:ext>
             </a:extLst>
           </a:blip>
-          <a:srcRect l="8518" t="26667" r="10001" b="5916"/>
+          <a:srcRect/>
           <a:stretch/>
         </p:blipFill>
         <p:spPr bwMode="auto">
           <a:xfrm>
-            <a:off x="3810000" y="1320800"/>
-            <a:ext cx="3960757" cy="4369431"/>
+            <a:off x="3917130" y="1553446"/>
+            <a:ext cx="3724645" cy="3751107"/>
           </a:xfrm>
           <a:prstGeom prst="rect">
             <a:avLst/>
@@ -4266,7 +4279,7 @@
     </p:spTree>
     <p:extLst>
       <p:ext uri="{BB962C8B-B14F-4D97-AF65-F5344CB8AC3E}">
-        <p14:creationId xmlns:p14="http://schemas.microsoft.com/office/powerpoint/2010/main" val="2958606512"/>
+        <p14:creationId xmlns:p14="http://schemas.microsoft.com/office/powerpoint/2010/main" val="1630762396"/>
       </p:ext>
     </p:extLst>
   </p:cSld>
@@ -4285,7 +4298,7 @@
     <p:bg>
       <p:bgPr>
         <a:solidFill>
-          <a:srgbClr val="F7F7F7"/>
+          <a:srgbClr val="F6F6F8"/>
         </a:solidFill>
         <a:effectLst/>
       </p:bgPr>
@@ -4354,10 +4367,10 @@
       </p:sp>
       <p:pic>
         <p:nvPicPr>
-          <p:cNvPr id="1028" name="Picture 4">
-            <a:extLst>
-              <a:ext uri="{FF2B5EF4-FFF2-40B4-BE49-F238E27FC236}">
-                <a16:creationId xmlns:a16="http://schemas.microsoft.com/office/drawing/2014/main" id="{039425E3-36BB-C2CB-B3A4-1CC7A72C6022}"/>
+          <p:cNvPr id="1026" name="Picture 2">
+            <a:extLst>
+              <a:ext uri="{FF2B5EF4-FFF2-40B4-BE49-F238E27FC236}">
+                <a16:creationId xmlns:a16="http://schemas.microsoft.com/office/drawing/2014/main" id="{6D545DBE-8E21-7D03-E187-FCAF846C5B05}"/>
               </a:ext>
             </a:extLst>
           </p:cNvPr>
@@ -4366,7 +4379,7 @@
           </p:cNvPicPr>
           <p:nvPr/>
         </p:nvPicPr>
-        <p:blipFill>
+        <p:blipFill rotWithShape="1">
           <a:blip r:embed="rId2">
             <a:extLst>
               <a:ext uri="{28A0092B-C50C-407E-A947-70E740481C1C}">
@@ -4374,15 +4387,13 @@
               </a:ext>
             </a:extLst>
           </a:blip>
-          <a:srcRect/>
-          <a:stretch>
-            <a:fillRect/>
-          </a:stretch>
+          <a:srcRect t="13771" b="14761"/>
+          <a:stretch/>
         </p:blipFill>
         <p:spPr bwMode="auto">
           <a:xfrm>
-            <a:off x="3369627" y="1803320"/>
-            <a:ext cx="4707573" cy="3530680"/>
+            <a:off x="3417253" y="1327783"/>
+            <a:ext cx="4724400" cy="4202433"/>
           </a:xfrm>
           <a:prstGeom prst="rect">
             <a:avLst/>
@@ -4402,7 +4413,7 @@
     </p:spTree>
     <p:extLst>
       <p:ext uri="{BB962C8B-B14F-4D97-AF65-F5344CB8AC3E}">
-        <p14:creationId xmlns:p14="http://schemas.microsoft.com/office/powerpoint/2010/main" val="2524836890"/>
+        <p14:creationId xmlns:p14="http://schemas.microsoft.com/office/powerpoint/2010/main" val="3496787043"/>
       </p:ext>
     </p:extLst>
   </p:cSld>
@@ -4490,55 +4501,37 @@
       </p:sp>
       <p:pic>
         <p:nvPicPr>
-          <p:cNvPr id="2050" name="Picture 2">
-            <a:extLst>
-              <a:ext uri="{FF2B5EF4-FFF2-40B4-BE49-F238E27FC236}">
-                <a16:creationId xmlns:a16="http://schemas.microsoft.com/office/drawing/2014/main" id="{5E520565-87E2-FF99-956D-81B53ED2B87A}"/>
+          <p:cNvPr id="2" name="Picture 1">
+            <a:extLst>
+              <a:ext uri="{FF2B5EF4-FFF2-40B4-BE49-F238E27FC236}">
+                <a16:creationId xmlns:a16="http://schemas.microsoft.com/office/drawing/2014/main" id="{95D4009D-8416-B584-2271-18DA7D580339}"/>
               </a:ext>
             </a:extLst>
           </p:cNvPr>
           <p:cNvPicPr>
-            <a:picLocks noChangeAspect="1" noChangeArrowheads="1"/>
+            <a:picLocks noChangeAspect="1"/>
           </p:cNvPicPr>
           <p:nvPr/>
         </p:nvPicPr>
         <p:blipFill>
-          <a:blip r:embed="rId2">
-            <a:extLst>
-              <a:ext uri="{28A0092B-C50C-407E-A947-70E740481C1C}">
-                <a14:useLocalDpi xmlns:a14="http://schemas.microsoft.com/office/drawing/2010/main" val="0"/>
-              </a:ext>
-            </a:extLst>
-          </a:blip>
-          <a:srcRect/>
-          <a:stretch>
-            <a:fillRect/>
-          </a:stretch>
+          <a:blip r:embed="rId2"/>
+          <a:srcRect t="12000" b="12000"/>
+          <a:stretch/>
         </p:blipFill>
-        <p:spPr bwMode="auto">
-          <a:xfrm>
-            <a:off x="3581400" y="1247775"/>
-            <a:ext cx="4362450" cy="4362450"/>
+        <p:spPr>
+          <a:xfrm>
+            <a:off x="4038600" y="1849477"/>
+            <a:ext cx="3218212" cy="3260013"/>
           </a:xfrm>
           <a:prstGeom prst="rect">
             <a:avLst/>
           </a:prstGeom>
-          <a:noFill/>
-          <a:extLst>
-            <a:ext uri="{909E8E84-426E-40DD-AFC4-6F175D3DCCD1}">
-              <a14:hiddenFill xmlns:a14="http://schemas.microsoft.com/office/drawing/2010/main">
-                <a:solidFill>
-                  <a:srgbClr val="FFFFFF"/>
-                </a:solidFill>
-              </a14:hiddenFill>
-            </a:ext>
-          </a:extLst>
         </p:spPr>
       </p:pic>
     </p:spTree>
     <p:extLst>
       <p:ext uri="{BB962C8B-B14F-4D97-AF65-F5344CB8AC3E}">
-        <p14:creationId xmlns:p14="http://schemas.microsoft.com/office/powerpoint/2010/main" val="1081452130"/>
+        <p14:creationId xmlns:p14="http://schemas.microsoft.com/office/powerpoint/2010/main" val="2775950881"/>
       </p:ext>
     </p:extLst>
   </p:cSld>
@@ -4626,10 +4619,10 @@
       </p:sp>
       <p:pic>
         <p:nvPicPr>
-          <p:cNvPr id="2050" name="Picture 2">
-            <a:extLst>
-              <a:ext uri="{FF2B5EF4-FFF2-40B4-BE49-F238E27FC236}">
-                <a16:creationId xmlns:a16="http://schemas.microsoft.com/office/drawing/2014/main" id="{5E520565-87E2-FF99-956D-81B53ED2B87A}"/>
+          <p:cNvPr id="2" name="Picture 2">
+            <a:extLst>
+              <a:ext uri="{FF2B5EF4-FFF2-40B4-BE49-F238E27FC236}">
+                <a16:creationId xmlns:a16="http://schemas.microsoft.com/office/drawing/2014/main" id="{0592BA04-470B-6F8D-B8A2-9A5F41BC11E4}"/>
               </a:ext>
             </a:extLst>
           </p:cNvPr>
@@ -4653,8 +4646,1122 @@
         </p:blipFill>
         <p:spPr bwMode="auto">
           <a:xfrm>
+            <a:off x="3674428" y="1480181"/>
+            <a:ext cx="4210050" cy="4210050"/>
+          </a:xfrm>
+          <a:prstGeom prst="rect">
+            <a:avLst/>
+          </a:prstGeom>
+          <a:noFill/>
+          <a:extLst>
+            <a:ext uri="{909E8E84-426E-40DD-AFC4-6F175D3DCCD1}">
+              <a14:hiddenFill xmlns:a14="http://schemas.microsoft.com/office/drawing/2010/main">
+                <a:solidFill>
+                  <a:srgbClr val="FFFFFF"/>
+                </a:solidFill>
+              </a14:hiddenFill>
+            </a:ext>
+          </a:extLst>
+        </p:spPr>
+      </p:pic>
+    </p:spTree>
+    <p:extLst>
+      <p:ext uri="{BB962C8B-B14F-4D97-AF65-F5344CB8AC3E}">
+        <p14:creationId xmlns:p14="http://schemas.microsoft.com/office/powerpoint/2010/main" val="1359039513"/>
+      </p:ext>
+    </p:extLst>
+  </p:cSld>
+  <p:clrMapOvr>
+    <a:masterClrMapping/>
+  </p:clrMapOvr>
+  <p:transition>
+    <p:fade/>
+  </p:transition>
+</p:sld>
+</file>
+
+<file path=ppt/slides/slide18.xml><?xml version="1.0" encoding="utf-8"?>
+<p:sld xmlns:a="http://schemas.openxmlformats.org/drawingml/2006/main" xmlns:r="http://schemas.openxmlformats.org/officeDocument/2006/relationships" xmlns:p="http://schemas.openxmlformats.org/presentationml/2006/main">
+  <p:cSld>
+    <p:bg>
+      <p:bgPr>
+        <a:solidFill>
+          <a:srgbClr val="FFFFFF"/>
+        </a:solidFill>
+        <a:effectLst/>
+      </p:bgPr>
+    </p:bg>
+    <p:spTree>
+      <p:nvGrpSpPr>
+        <p:cNvPr id="1" name=""/>
+        <p:cNvGrpSpPr/>
+        <p:nvPr/>
+      </p:nvGrpSpPr>
+      <p:grpSpPr>
+        <a:xfrm>
+          <a:off x="0" y="0"/>
+          <a:ext cx="0" cy="0"/>
+          <a:chOff x="0" y="0"/>
+          <a:chExt cx="0" cy="0"/>
+        </a:xfrm>
+      </p:grpSpPr>
+      <p:sp>
+        <p:nvSpPr>
+          <p:cNvPr id="5" name="Rectangle 4">
+            <a:extLst>
+              <a:ext uri="{FF2B5EF4-FFF2-40B4-BE49-F238E27FC236}">
+                <a16:creationId xmlns:a16="http://schemas.microsoft.com/office/drawing/2014/main" id="{ADFF3A91-4295-9C52-3061-E78CAA08800E}"/>
+              </a:ext>
+            </a:extLst>
+          </p:cNvPr>
+          <p:cNvSpPr/>
+          <p:nvPr/>
+        </p:nvSpPr>
+        <p:spPr>
+          <a:xfrm>
+            <a:off x="2590800" y="1167769"/>
+            <a:ext cx="6377306" cy="4623431"/>
+          </a:xfrm>
+          <a:prstGeom prst="rect">
+            <a:avLst/>
+          </a:prstGeom>
+          <a:noFill/>
+          <a:ln w="57150"/>
+        </p:spPr>
+        <p:style>
+          <a:lnRef idx="2">
+            <a:schemeClr val="accent1">
+              <a:shade val="15000"/>
+            </a:schemeClr>
+          </a:lnRef>
+          <a:fillRef idx="1">
+            <a:schemeClr val="accent1"/>
+          </a:fillRef>
+          <a:effectRef idx="0">
+            <a:schemeClr val="accent1"/>
+          </a:effectRef>
+          <a:fontRef idx="minor">
+            <a:schemeClr val="lt1"/>
+          </a:fontRef>
+        </p:style>
+        <p:txBody>
+          <a:bodyPr rtlCol="0" anchor="ctr"/>
+          <a:lstStyle/>
+          <a:p>
+            <a:pPr algn="ctr"/>
+            <a:endParaRPr lang="en-US"/>
+          </a:p>
+        </p:txBody>
+      </p:sp>
+      <p:pic>
+        <p:nvPicPr>
+          <p:cNvPr id="2" name="Picture 2">
+            <a:extLst>
+              <a:ext uri="{FF2B5EF4-FFF2-40B4-BE49-F238E27FC236}">
+                <a16:creationId xmlns:a16="http://schemas.microsoft.com/office/drawing/2014/main" id="{0592BA04-470B-6F8D-B8A2-9A5F41BC11E4}"/>
+              </a:ext>
+            </a:extLst>
+          </p:cNvPr>
+          <p:cNvPicPr>
+            <a:picLocks noChangeAspect="1" noChangeArrowheads="1"/>
+          </p:cNvPicPr>
+          <p:nvPr/>
+        </p:nvPicPr>
+        <p:blipFill>
+          <a:blip r:embed="rId2">
+            <a:extLst>
+              <a:ext uri="{28A0092B-C50C-407E-A947-70E740481C1C}">
+                <a14:useLocalDpi xmlns:a14="http://schemas.microsoft.com/office/drawing/2010/main" val="0"/>
+              </a:ext>
+            </a:extLst>
+          </a:blip>
+          <a:srcRect/>
+          <a:stretch/>
+        </p:blipFill>
+        <p:spPr bwMode="auto">
+          <a:xfrm>
+            <a:off x="3733800" y="1277461"/>
+            <a:ext cx="4303078" cy="4303078"/>
+          </a:xfrm>
+          <a:prstGeom prst="rect">
+            <a:avLst/>
+          </a:prstGeom>
+          <a:noFill/>
+          <a:extLst>
+            <a:ext uri="{909E8E84-426E-40DD-AFC4-6F175D3DCCD1}">
+              <a14:hiddenFill xmlns:a14="http://schemas.microsoft.com/office/drawing/2010/main">
+                <a:solidFill>
+                  <a:srgbClr val="FFFFFF"/>
+                </a:solidFill>
+              </a14:hiddenFill>
+            </a:ext>
+          </a:extLst>
+        </p:spPr>
+      </p:pic>
+    </p:spTree>
+    <p:extLst>
+      <p:ext uri="{BB962C8B-B14F-4D97-AF65-F5344CB8AC3E}">
+        <p14:creationId xmlns:p14="http://schemas.microsoft.com/office/powerpoint/2010/main" val="3734963796"/>
+      </p:ext>
+    </p:extLst>
+  </p:cSld>
+  <p:clrMapOvr>
+    <a:masterClrMapping/>
+  </p:clrMapOvr>
+  <p:transition>
+    <p:fade/>
+  </p:transition>
+</p:sld>
+</file>
+
+<file path=ppt/slides/slide19.xml><?xml version="1.0" encoding="utf-8"?>
+<p:sld xmlns:a="http://schemas.openxmlformats.org/drawingml/2006/main" xmlns:r="http://schemas.openxmlformats.org/officeDocument/2006/relationships" xmlns:p="http://schemas.openxmlformats.org/presentationml/2006/main">
+  <p:cSld>
+    <p:bg>
+      <p:bgPr>
+        <a:solidFill>
+          <a:srgbClr val="FFFFFF"/>
+        </a:solidFill>
+        <a:effectLst/>
+      </p:bgPr>
+    </p:bg>
+    <p:spTree>
+      <p:nvGrpSpPr>
+        <p:cNvPr id="1" name=""/>
+        <p:cNvGrpSpPr/>
+        <p:nvPr/>
+      </p:nvGrpSpPr>
+      <p:grpSpPr>
+        <a:xfrm>
+          <a:off x="0" y="0"/>
+          <a:ext cx="0" cy="0"/>
+          <a:chOff x="0" y="0"/>
+          <a:chExt cx="0" cy="0"/>
+        </a:xfrm>
+      </p:grpSpPr>
+      <p:sp>
+        <p:nvSpPr>
+          <p:cNvPr id="5" name="Rectangle 4">
+            <a:extLst>
+              <a:ext uri="{FF2B5EF4-FFF2-40B4-BE49-F238E27FC236}">
+                <a16:creationId xmlns:a16="http://schemas.microsoft.com/office/drawing/2014/main" id="{ADFF3A91-4295-9C52-3061-E78CAA08800E}"/>
+              </a:ext>
+            </a:extLst>
+          </p:cNvPr>
+          <p:cNvSpPr/>
+          <p:nvPr/>
+        </p:nvSpPr>
+        <p:spPr>
+          <a:xfrm>
+            <a:off x="2590800" y="1167769"/>
+            <a:ext cx="6377306" cy="4623431"/>
+          </a:xfrm>
+          <a:prstGeom prst="rect">
+            <a:avLst/>
+          </a:prstGeom>
+          <a:noFill/>
+          <a:ln w="57150"/>
+        </p:spPr>
+        <p:style>
+          <a:lnRef idx="2">
+            <a:schemeClr val="accent1">
+              <a:shade val="15000"/>
+            </a:schemeClr>
+          </a:lnRef>
+          <a:fillRef idx="1">
+            <a:schemeClr val="accent1"/>
+          </a:fillRef>
+          <a:effectRef idx="0">
+            <a:schemeClr val="accent1"/>
+          </a:effectRef>
+          <a:fontRef idx="minor">
+            <a:schemeClr val="lt1"/>
+          </a:fontRef>
+        </p:style>
+        <p:txBody>
+          <a:bodyPr rtlCol="0" anchor="ctr"/>
+          <a:lstStyle/>
+          <a:p>
+            <a:pPr algn="ctr"/>
+            <a:endParaRPr lang="en-US"/>
+          </a:p>
+        </p:txBody>
+      </p:sp>
+      <p:pic>
+        <p:nvPicPr>
+          <p:cNvPr id="2" name="Picture 2">
+            <a:extLst>
+              <a:ext uri="{FF2B5EF4-FFF2-40B4-BE49-F238E27FC236}">
+                <a16:creationId xmlns:a16="http://schemas.microsoft.com/office/drawing/2014/main" id="{0592BA04-470B-6F8D-B8A2-9A5F41BC11E4}"/>
+              </a:ext>
+            </a:extLst>
+          </p:cNvPr>
+          <p:cNvPicPr>
+            <a:picLocks noChangeAspect="1" noChangeArrowheads="1"/>
+          </p:cNvPicPr>
+          <p:nvPr/>
+        </p:nvPicPr>
+        <p:blipFill>
+          <a:blip r:embed="rId2">
+            <a:extLst>
+              <a:ext uri="{28A0092B-C50C-407E-A947-70E740481C1C}">
+                <a14:useLocalDpi xmlns:a14="http://schemas.microsoft.com/office/drawing/2010/main" val="0"/>
+              </a:ext>
+            </a:extLst>
+          </a:blip>
+          <a:srcRect/>
+          <a:stretch/>
+        </p:blipFill>
+        <p:spPr bwMode="auto">
+          <a:xfrm>
+            <a:off x="3733800" y="1277461"/>
+            <a:ext cx="4303078" cy="4303078"/>
+          </a:xfrm>
+          <a:prstGeom prst="rect">
+            <a:avLst/>
+          </a:prstGeom>
+          <a:noFill/>
+          <a:extLst>
+            <a:ext uri="{909E8E84-426E-40DD-AFC4-6F175D3DCCD1}">
+              <a14:hiddenFill xmlns:a14="http://schemas.microsoft.com/office/drawing/2010/main">
+                <a:solidFill>
+                  <a:srgbClr val="FFFFFF"/>
+                </a:solidFill>
+              </a14:hiddenFill>
+            </a:ext>
+          </a:extLst>
+        </p:spPr>
+      </p:pic>
+    </p:spTree>
+    <p:extLst>
+      <p:ext uri="{BB962C8B-B14F-4D97-AF65-F5344CB8AC3E}">
+        <p14:creationId xmlns:p14="http://schemas.microsoft.com/office/powerpoint/2010/main" val="3839021385"/>
+      </p:ext>
+    </p:extLst>
+  </p:cSld>
+  <p:clrMapOvr>
+    <a:masterClrMapping/>
+  </p:clrMapOvr>
+  <p:transition>
+    <p:fade/>
+  </p:transition>
+</p:sld>
+</file>
+
+<file path=ppt/slides/slide2.xml><?xml version="1.0" encoding="utf-8"?>
+<p:sld xmlns:a="http://schemas.openxmlformats.org/drawingml/2006/main" xmlns:r="http://schemas.openxmlformats.org/officeDocument/2006/relationships" xmlns:p="http://schemas.openxmlformats.org/presentationml/2006/main">
+  <p:cSld>
+    <p:bg>
+      <p:bgPr>
+        <a:solidFill>
+          <a:srgbClr val="FDC62E"/>
+        </a:solidFill>
+        <a:effectLst/>
+      </p:bgPr>
+    </p:bg>
+    <p:spTree>
+      <p:nvGrpSpPr>
+        <p:cNvPr id="1" name=""/>
+        <p:cNvGrpSpPr/>
+        <p:nvPr/>
+      </p:nvGrpSpPr>
+      <p:grpSpPr>
+        <a:xfrm>
+          <a:off x="0" y="0"/>
+          <a:ext cx="0" cy="0"/>
+          <a:chOff x="0" y="0"/>
+          <a:chExt cx="0" cy="0"/>
+        </a:xfrm>
+      </p:grpSpPr>
+      <p:sp>
+        <p:nvSpPr>
+          <p:cNvPr id="8" name="TextBox 7">
+            <a:extLst>
+              <a:ext uri="{FF2B5EF4-FFF2-40B4-BE49-F238E27FC236}">
+                <a16:creationId xmlns:a16="http://schemas.microsoft.com/office/drawing/2014/main" id="{353E4F0D-BFFE-6C18-B38E-8C617031EC35}"/>
+              </a:ext>
+            </a:extLst>
+          </p:cNvPr>
+          <p:cNvSpPr txBox="1"/>
+          <p:nvPr/>
+        </p:nvSpPr>
+        <p:spPr>
+          <a:xfrm>
+            <a:off x="3504623" y="2791361"/>
+            <a:ext cx="2896177" cy="1323439"/>
+          </a:xfrm>
+          <a:prstGeom prst="rect">
+            <a:avLst/>
+          </a:prstGeom>
+          <a:noFill/>
+        </p:spPr>
+        <p:txBody>
+          <a:bodyPr wrap="none" rtlCol="0">
+            <a:spAutoFit/>
+          </a:bodyPr>
+          <a:lstStyle/>
+          <a:p>
+            <a:r>
+              <a:rPr lang="en-US" sz="8000" b="1">
+                <a:solidFill>
+                  <a:schemeClr val="accent4">
+                    <a:lumMod val="50000"/>
+                  </a:schemeClr>
+                </a:solidFill>
+              </a:rPr>
+              <a:t>Watch</a:t>
+            </a:r>
+          </a:p>
+        </p:txBody>
+      </p:sp>
+      <p:sp>
+        <p:nvSpPr>
+          <p:cNvPr id="7" name="TextBox 6">
+            <a:extLst>
+              <a:ext uri="{FF2B5EF4-FFF2-40B4-BE49-F238E27FC236}">
+                <a16:creationId xmlns:a16="http://schemas.microsoft.com/office/drawing/2014/main" id="{50102003-AB3D-F1A7-B8D1-C16B59A8E312}"/>
+              </a:ext>
+            </a:extLst>
+          </p:cNvPr>
+          <p:cNvSpPr txBox="1"/>
+          <p:nvPr/>
+        </p:nvSpPr>
+        <p:spPr>
+          <a:xfrm>
+            <a:off x="3998796" y="2110773"/>
+            <a:ext cx="2237279" cy="1200329"/>
+          </a:xfrm>
+          <a:prstGeom prst="rect">
+            <a:avLst/>
+          </a:prstGeom>
+          <a:noFill/>
+        </p:spPr>
+        <p:txBody>
+          <a:bodyPr wrap="none" rtlCol="0">
+            <a:spAutoFit/>
+          </a:bodyPr>
+          <a:lstStyle/>
+          <a:p>
+            <a:r>
+              <a:rPr lang="en-US" sz="7200" b="1">
+                <a:solidFill>
+                  <a:schemeClr val="accent4">
+                    <a:lumMod val="20000"/>
+                    <a:lumOff val="80000"/>
+                  </a:schemeClr>
+                </a:solidFill>
+              </a:rPr>
+              <a:t>Wear</a:t>
+            </a:r>
+            <a:endParaRPr lang="en-US" sz="8800" b="1">
+              <a:solidFill>
+                <a:schemeClr val="accent4">
+                  <a:lumMod val="20000"/>
+                  <a:lumOff val="80000"/>
+                </a:schemeClr>
+              </a:solidFill>
+            </a:endParaRPr>
+          </a:p>
+        </p:txBody>
+      </p:sp>
+      <p:sp>
+        <p:nvSpPr>
+          <p:cNvPr id="6" name="TextBox 5">
+            <a:extLst>
+              <a:ext uri="{FF2B5EF4-FFF2-40B4-BE49-F238E27FC236}">
+                <a16:creationId xmlns:a16="http://schemas.microsoft.com/office/drawing/2014/main" id="{386F93B7-8598-88AC-AC80-7B9180BE846C}"/>
+              </a:ext>
+            </a:extLst>
+          </p:cNvPr>
+          <p:cNvSpPr txBox="1"/>
+          <p:nvPr/>
+        </p:nvSpPr>
+        <p:spPr>
+          <a:xfrm>
+            <a:off x="4351707" y="1600200"/>
+            <a:ext cx="1802738" cy="1015663"/>
+          </a:xfrm>
+          <a:prstGeom prst="rect">
+            <a:avLst/>
+          </a:prstGeom>
+          <a:noFill/>
+        </p:spPr>
+        <p:txBody>
+          <a:bodyPr wrap="none" rtlCol="0">
+            <a:spAutoFit/>
+          </a:bodyPr>
+          <a:lstStyle/>
+          <a:p>
+            <a:r>
+              <a:rPr lang="en-US" sz="6000" b="1">
+                <a:solidFill>
+                  <a:schemeClr val="bg1"/>
+                </a:solidFill>
+              </a:rPr>
+              <a:t>want</a:t>
+            </a:r>
+            <a:endParaRPr lang="en-US" sz="5400" b="1">
+              <a:solidFill>
+                <a:schemeClr val="bg1"/>
+              </a:solidFill>
+            </a:endParaRPr>
+          </a:p>
+        </p:txBody>
+      </p:sp>
+      <p:pic>
+        <p:nvPicPr>
+          <p:cNvPr id="3" name="Picture 2">
+            <a:extLst>
+              <a:ext uri="{FF2B5EF4-FFF2-40B4-BE49-F238E27FC236}">
+                <a16:creationId xmlns:a16="http://schemas.microsoft.com/office/drawing/2014/main" id="{3C414805-8991-6485-D786-B1183421DAF0}"/>
+              </a:ext>
+            </a:extLst>
+          </p:cNvPr>
+          <p:cNvPicPr>
+            <a:picLocks noChangeAspect="1"/>
+          </p:cNvPicPr>
+          <p:nvPr/>
+        </p:nvPicPr>
+        <p:blipFill>
+          <a:blip r:embed="rId2">
+            <a:extLst>
+              <a:ext uri="{28A0092B-C50C-407E-A947-70E740481C1C}">
+                <a14:useLocalDpi xmlns:a14="http://schemas.microsoft.com/office/drawing/2010/main" val="0"/>
+              </a:ext>
+            </a:extLst>
+          </a:blip>
+          <a:stretch>
+            <a:fillRect/>
+          </a:stretch>
+        </p:blipFill>
+        <p:spPr>
+          <a:xfrm>
+            <a:off x="5943600" y="1022730"/>
+            <a:ext cx="2742011" cy="3662362"/>
+          </a:xfrm>
+          <a:prstGeom prst="rect">
+            <a:avLst/>
+          </a:prstGeom>
+        </p:spPr>
+      </p:pic>
+      <p:sp>
+        <p:nvSpPr>
+          <p:cNvPr id="4" name="Rectangle 3">
+            <a:extLst>
+              <a:ext uri="{FF2B5EF4-FFF2-40B4-BE49-F238E27FC236}">
+                <a16:creationId xmlns:a16="http://schemas.microsoft.com/office/drawing/2014/main" id="{6B1146AE-003A-4DF7-D65A-C995D09D51C9}"/>
+              </a:ext>
+            </a:extLst>
+          </p:cNvPr>
+          <p:cNvSpPr/>
+          <p:nvPr/>
+        </p:nvSpPr>
+        <p:spPr>
+          <a:xfrm>
+            <a:off x="4648200" y="6172200"/>
+            <a:ext cx="3518195" cy="896788"/>
+          </a:xfrm>
+          <a:prstGeom prst="rect">
+            <a:avLst/>
+          </a:prstGeom>
+        </p:spPr>
+        <p:style>
+          <a:lnRef idx="2">
+            <a:schemeClr val="accent1">
+              <a:shade val="15000"/>
+            </a:schemeClr>
+          </a:lnRef>
+          <a:fillRef idx="1">
+            <a:schemeClr val="accent1"/>
+          </a:fillRef>
+          <a:effectRef idx="0">
+            <a:schemeClr val="accent1"/>
+          </a:effectRef>
+          <a:fontRef idx="minor">
+            <a:schemeClr val="lt1"/>
+          </a:fontRef>
+        </p:style>
+        <p:txBody>
+          <a:bodyPr rtlCol="0" anchor="ctr"/>
+          <a:lstStyle/>
+          <a:p>
+            <a:pPr algn="ctr"/>
+            <a:endParaRPr lang="en-US"/>
+          </a:p>
+        </p:txBody>
+      </p:sp>
+      <p:sp>
+        <p:nvSpPr>
+          <p:cNvPr id="9" name="Rectangle 8">
+            <a:extLst>
+              <a:ext uri="{FF2B5EF4-FFF2-40B4-BE49-F238E27FC236}">
+                <a16:creationId xmlns:a16="http://schemas.microsoft.com/office/drawing/2014/main" id="{D07B64A4-683D-918E-1344-22DFF1F000F1}"/>
+              </a:ext>
+            </a:extLst>
+          </p:cNvPr>
+          <p:cNvSpPr/>
+          <p:nvPr/>
+        </p:nvSpPr>
+        <p:spPr>
+          <a:xfrm>
+            <a:off x="4641702" y="-403767"/>
+            <a:ext cx="3518195" cy="896788"/>
+          </a:xfrm>
+          <a:prstGeom prst="rect">
+            <a:avLst/>
+          </a:prstGeom>
+        </p:spPr>
+        <p:style>
+          <a:lnRef idx="2">
+            <a:schemeClr val="accent1">
+              <a:shade val="15000"/>
+            </a:schemeClr>
+          </a:lnRef>
+          <a:fillRef idx="1">
+            <a:schemeClr val="accent1"/>
+          </a:fillRef>
+          <a:effectRef idx="0">
+            <a:schemeClr val="accent1"/>
+          </a:effectRef>
+          <a:fontRef idx="minor">
+            <a:schemeClr val="lt1"/>
+          </a:fontRef>
+        </p:style>
+        <p:txBody>
+          <a:bodyPr rtlCol="0" anchor="ctr"/>
+          <a:lstStyle/>
+          <a:p>
+            <a:pPr algn="ctr"/>
+            <a:endParaRPr lang="en-US"/>
+          </a:p>
+        </p:txBody>
+      </p:sp>
+    </p:spTree>
+    <p:extLst>
+      <p:ext uri="{BB962C8B-B14F-4D97-AF65-F5344CB8AC3E}">
+        <p14:creationId xmlns:p14="http://schemas.microsoft.com/office/powerpoint/2010/main" val="1756301127"/>
+      </p:ext>
+    </p:extLst>
+  </p:cSld>
+  <p:clrMapOvr>
+    <a:masterClrMapping/>
+  </p:clrMapOvr>
+  <p:transition>
+    <p:fade/>
+  </p:transition>
+</p:sld>
+</file>
+
+<file path=ppt/slides/slide20.xml><?xml version="1.0" encoding="utf-8"?>
+<p:sld xmlns:a="http://schemas.openxmlformats.org/drawingml/2006/main" xmlns:r="http://schemas.openxmlformats.org/officeDocument/2006/relationships" xmlns:p="http://schemas.openxmlformats.org/presentationml/2006/main">
+  <p:cSld>
+    <p:bg>
+      <p:bgPr>
+        <a:solidFill>
+          <a:srgbClr val="F7F7F7"/>
+        </a:solidFill>
+        <a:effectLst/>
+      </p:bgPr>
+    </p:bg>
+    <p:spTree>
+      <p:nvGrpSpPr>
+        <p:cNvPr id="1" name=""/>
+        <p:cNvGrpSpPr/>
+        <p:nvPr/>
+      </p:nvGrpSpPr>
+      <p:grpSpPr>
+        <a:xfrm>
+          <a:off x="0" y="0"/>
+          <a:ext cx="0" cy="0"/>
+          <a:chOff x="0" y="0"/>
+          <a:chExt cx="0" cy="0"/>
+        </a:xfrm>
+      </p:grpSpPr>
+      <p:sp>
+        <p:nvSpPr>
+          <p:cNvPr id="5" name="Rectangle 4">
+            <a:extLst>
+              <a:ext uri="{FF2B5EF4-FFF2-40B4-BE49-F238E27FC236}">
+                <a16:creationId xmlns:a16="http://schemas.microsoft.com/office/drawing/2014/main" id="{ADFF3A91-4295-9C52-3061-E78CAA08800E}"/>
+              </a:ext>
+            </a:extLst>
+          </p:cNvPr>
+          <p:cNvSpPr/>
+          <p:nvPr/>
+        </p:nvSpPr>
+        <p:spPr>
+          <a:xfrm>
+            <a:off x="2590800" y="1167769"/>
+            <a:ext cx="6377306" cy="4623431"/>
+          </a:xfrm>
+          <a:prstGeom prst="rect">
+            <a:avLst/>
+          </a:prstGeom>
+          <a:noFill/>
+          <a:ln w="57150"/>
+        </p:spPr>
+        <p:style>
+          <a:lnRef idx="2">
+            <a:schemeClr val="accent1">
+              <a:shade val="15000"/>
+            </a:schemeClr>
+          </a:lnRef>
+          <a:fillRef idx="1">
+            <a:schemeClr val="accent1"/>
+          </a:fillRef>
+          <a:effectRef idx="0">
+            <a:schemeClr val="accent1"/>
+          </a:effectRef>
+          <a:fontRef idx="minor">
+            <a:schemeClr val="lt1"/>
+          </a:fontRef>
+        </p:style>
+        <p:txBody>
+          <a:bodyPr rtlCol="0" anchor="ctr"/>
+          <a:lstStyle/>
+          <a:p>
+            <a:pPr algn="ctr"/>
+            <a:endParaRPr lang="en-US"/>
+          </a:p>
+        </p:txBody>
+      </p:sp>
+      <p:pic>
+        <p:nvPicPr>
+          <p:cNvPr id="1026" name="Picture 2">
+            <a:extLst>
+              <a:ext uri="{FF2B5EF4-FFF2-40B4-BE49-F238E27FC236}">
+                <a16:creationId xmlns:a16="http://schemas.microsoft.com/office/drawing/2014/main" id="{934F7AB0-0173-F060-714E-3AD2DC0740BB}"/>
+              </a:ext>
+            </a:extLst>
+          </p:cNvPr>
+          <p:cNvPicPr>
+            <a:picLocks noChangeAspect="1" noChangeArrowheads="1"/>
+          </p:cNvPicPr>
+          <p:nvPr/>
+        </p:nvPicPr>
+        <p:blipFill rotWithShape="1">
+          <a:blip r:embed="rId2">
+            <a:extLst>
+              <a:ext uri="{28A0092B-C50C-407E-A947-70E740481C1C}">
+                <a14:useLocalDpi xmlns:a14="http://schemas.microsoft.com/office/drawing/2010/main" val="0"/>
+              </a:ext>
+            </a:extLst>
+          </a:blip>
+          <a:srcRect l="8518" t="26667" r="10001" b="5916"/>
+          <a:stretch/>
+        </p:blipFill>
+        <p:spPr bwMode="auto">
+          <a:xfrm>
+            <a:off x="3810000" y="1320800"/>
+            <a:ext cx="3960757" cy="4369431"/>
+          </a:xfrm>
+          <a:prstGeom prst="rect">
+            <a:avLst/>
+          </a:prstGeom>
+          <a:noFill/>
+          <a:extLst>
+            <a:ext uri="{909E8E84-426E-40DD-AFC4-6F175D3DCCD1}">
+              <a14:hiddenFill xmlns:a14="http://schemas.microsoft.com/office/drawing/2010/main">
+                <a:solidFill>
+                  <a:srgbClr val="FFFFFF"/>
+                </a:solidFill>
+              </a14:hiddenFill>
+            </a:ext>
+          </a:extLst>
+        </p:spPr>
+      </p:pic>
+    </p:spTree>
+    <p:extLst>
+      <p:ext uri="{BB962C8B-B14F-4D97-AF65-F5344CB8AC3E}">
+        <p14:creationId xmlns:p14="http://schemas.microsoft.com/office/powerpoint/2010/main" val="2958606512"/>
+      </p:ext>
+    </p:extLst>
+  </p:cSld>
+  <p:clrMapOvr>
+    <a:masterClrMapping/>
+  </p:clrMapOvr>
+  <p:transition>
+    <p:fade/>
+  </p:transition>
+</p:sld>
+</file>
+
+<file path=ppt/slides/slide21.xml><?xml version="1.0" encoding="utf-8"?>
+<p:sld xmlns:a="http://schemas.openxmlformats.org/drawingml/2006/main" xmlns:r="http://schemas.openxmlformats.org/officeDocument/2006/relationships" xmlns:p="http://schemas.openxmlformats.org/presentationml/2006/main">
+  <p:cSld>
+    <p:bg>
+      <p:bgPr>
+        <a:solidFill>
+          <a:srgbClr val="F7F7F7"/>
+        </a:solidFill>
+        <a:effectLst/>
+      </p:bgPr>
+    </p:bg>
+    <p:spTree>
+      <p:nvGrpSpPr>
+        <p:cNvPr id="1" name=""/>
+        <p:cNvGrpSpPr/>
+        <p:nvPr/>
+      </p:nvGrpSpPr>
+      <p:grpSpPr>
+        <a:xfrm>
+          <a:off x="0" y="0"/>
+          <a:ext cx="0" cy="0"/>
+          <a:chOff x="0" y="0"/>
+          <a:chExt cx="0" cy="0"/>
+        </a:xfrm>
+      </p:grpSpPr>
+      <p:sp>
+        <p:nvSpPr>
+          <p:cNvPr id="5" name="Rectangle 4">
+            <a:extLst>
+              <a:ext uri="{FF2B5EF4-FFF2-40B4-BE49-F238E27FC236}">
+                <a16:creationId xmlns:a16="http://schemas.microsoft.com/office/drawing/2014/main" id="{ADFF3A91-4295-9C52-3061-E78CAA08800E}"/>
+              </a:ext>
+            </a:extLst>
+          </p:cNvPr>
+          <p:cNvSpPr/>
+          <p:nvPr/>
+        </p:nvSpPr>
+        <p:spPr>
+          <a:xfrm>
+            <a:off x="2590800" y="1167769"/>
+            <a:ext cx="6377306" cy="4623431"/>
+          </a:xfrm>
+          <a:prstGeom prst="rect">
+            <a:avLst/>
+          </a:prstGeom>
+          <a:noFill/>
+          <a:ln w="57150"/>
+        </p:spPr>
+        <p:style>
+          <a:lnRef idx="2">
+            <a:schemeClr val="accent1">
+              <a:shade val="15000"/>
+            </a:schemeClr>
+          </a:lnRef>
+          <a:fillRef idx="1">
+            <a:schemeClr val="accent1"/>
+          </a:fillRef>
+          <a:effectRef idx="0">
+            <a:schemeClr val="accent1"/>
+          </a:effectRef>
+          <a:fontRef idx="minor">
+            <a:schemeClr val="lt1"/>
+          </a:fontRef>
+        </p:style>
+        <p:txBody>
+          <a:bodyPr rtlCol="0" anchor="ctr"/>
+          <a:lstStyle/>
+          <a:p>
+            <a:pPr algn="ctr"/>
+            <a:endParaRPr lang="en-US"/>
+          </a:p>
+        </p:txBody>
+      </p:sp>
+      <p:pic>
+        <p:nvPicPr>
+          <p:cNvPr id="1028" name="Picture 4">
+            <a:extLst>
+              <a:ext uri="{FF2B5EF4-FFF2-40B4-BE49-F238E27FC236}">
+                <a16:creationId xmlns:a16="http://schemas.microsoft.com/office/drawing/2014/main" id="{039425E3-36BB-C2CB-B3A4-1CC7A72C6022}"/>
+              </a:ext>
+            </a:extLst>
+          </p:cNvPr>
+          <p:cNvPicPr>
+            <a:picLocks noChangeAspect="1" noChangeArrowheads="1"/>
+          </p:cNvPicPr>
+          <p:nvPr/>
+        </p:nvPicPr>
+        <p:blipFill>
+          <a:blip r:embed="rId2">
+            <a:extLst>
+              <a:ext uri="{28A0092B-C50C-407E-A947-70E740481C1C}">
+                <a14:useLocalDpi xmlns:a14="http://schemas.microsoft.com/office/drawing/2010/main" val="0"/>
+              </a:ext>
+            </a:extLst>
+          </a:blip>
+          <a:srcRect/>
+          <a:stretch>
+            <a:fillRect/>
+          </a:stretch>
+        </p:blipFill>
+        <p:spPr bwMode="auto">
+          <a:xfrm>
+            <a:off x="3369627" y="1803320"/>
+            <a:ext cx="4707573" cy="3530680"/>
+          </a:xfrm>
+          <a:prstGeom prst="rect">
+            <a:avLst/>
+          </a:prstGeom>
+          <a:noFill/>
+          <a:extLst>
+            <a:ext uri="{909E8E84-426E-40DD-AFC4-6F175D3DCCD1}">
+              <a14:hiddenFill xmlns:a14="http://schemas.microsoft.com/office/drawing/2010/main">
+                <a:solidFill>
+                  <a:srgbClr val="FFFFFF"/>
+                </a:solidFill>
+              </a14:hiddenFill>
+            </a:ext>
+          </a:extLst>
+        </p:spPr>
+      </p:pic>
+    </p:spTree>
+    <p:extLst>
+      <p:ext uri="{BB962C8B-B14F-4D97-AF65-F5344CB8AC3E}">
+        <p14:creationId xmlns:p14="http://schemas.microsoft.com/office/powerpoint/2010/main" val="2524836890"/>
+      </p:ext>
+    </p:extLst>
+  </p:cSld>
+  <p:clrMapOvr>
+    <a:masterClrMapping/>
+  </p:clrMapOvr>
+  <p:transition>
+    <p:fade/>
+  </p:transition>
+</p:sld>
+</file>
+
+<file path=ppt/slides/slide22.xml><?xml version="1.0" encoding="utf-8"?>
+<p:sld xmlns:a="http://schemas.openxmlformats.org/drawingml/2006/main" xmlns:r="http://schemas.openxmlformats.org/officeDocument/2006/relationships" xmlns:p="http://schemas.openxmlformats.org/presentationml/2006/main">
+  <p:cSld>
+    <p:bg>
+      <p:bgPr>
+        <a:solidFill>
+          <a:srgbClr val="FFFFFF"/>
+        </a:solidFill>
+        <a:effectLst/>
+      </p:bgPr>
+    </p:bg>
+    <p:spTree>
+      <p:nvGrpSpPr>
+        <p:cNvPr id="1" name=""/>
+        <p:cNvGrpSpPr/>
+        <p:nvPr/>
+      </p:nvGrpSpPr>
+      <p:grpSpPr>
+        <a:xfrm>
+          <a:off x="0" y="0"/>
+          <a:ext cx="0" cy="0"/>
+          <a:chOff x="0" y="0"/>
+          <a:chExt cx="0" cy="0"/>
+        </a:xfrm>
+      </p:grpSpPr>
+      <p:sp>
+        <p:nvSpPr>
+          <p:cNvPr id="5" name="Rectangle 4">
+            <a:extLst>
+              <a:ext uri="{FF2B5EF4-FFF2-40B4-BE49-F238E27FC236}">
+                <a16:creationId xmlns:a16="http://schemas.microsoft.com/office/drawing/2014/main" id="{ADFF3A91-4295-9C52-3061-E78CAA08800E}"/>
+              </a:ext>
+            </a:extLst>
+          </p:cNvPr>
+          <p:cNvSpPr/>
+          <p:nvPr/>
+        </p:nvSpPr>
+        <p:spPr>
+          <a:xfrm>
+            <a:off x="2590800" y="1167769"/>
+            <a:ext cx="6377306" cy="4623431"/>
+          </a:xfrm>
+          <a:prstGeom prst="rect">
+            <a:avLst/>
+          </a:prstGeom>
+          <a:noFill/>
+          <a:ln w="57150"/>
+        </p:spPr>
+        <p:style>
+          <a:lnRef idx="2">
+            <a:schemeClr val="accent1">
+              <a:shade val="15000"/>
+            </a:schemeClr>
+          </a:lnRef>
+          <a:fillRef idx="1">
+            <a:schemeClr val="accent1"/>
+          </a:fillRef>
+          <a:effectRef idx="0">
+            <a:schemeClr val="accent1"/>
+          </a:effectRef>
+          <a:fontRef idx="minor">
+            <a:schemeClr val="lt1"/>
+          </a:fontRef>
+        </p:style>
+        <p:txBody>
+          <a:bodyPr rtlCol="0" anchor="ctr"/>
+          <a:lstStyle/>
+          <a:p>
+            <a:pPr algn="ctr"/>
+            <a:endParaRPr lang="en-US"/>
+          </a:p>
+        </p:txBody>
+      </p:sp>
+      <p:pic>
+        <p:nvPicPr>
+          <p:cNvPr id="2050" name="Picture 2">
+            <a:extLst>
+              <a:ext uri="{FF2B5EF4-FFF2-40B4-BE49-F238E27FC236}">
+                <a16:creationId xmlns:a16="http://schemas.microsoft.com/office/drawing/2014/main" id="{5E520565-87E2-FF99-956D-81B53ED2B87A}"/>
+              </a:ext>
+            </a:extLst>
+          </p:cNvPr>
+          <p:cNvPicPr>
+            <a:picLocks noChangeAspect="1" noChangeArrowheads="1"/>
+          </p:cNvPicPr>
+          <p:nvPr/>
+        </p:nvPicPr>
+        <p:blipFill>
+          <a:blip r:embed="rId2">
+            <a:extLst>
+              <a:ext uri="{28A0092B-C50C-407E-A947-70E740481C1C}">
+                <a14:useLocalDpi xmlns:a14="http://schemas.microsoft.com/office/drawing/2010/main" val="0"/>
+              </a:ext>
+            </a:extLst>
+          </a:blip>
+          <a:srcRect/>
+          <a:stretch>
+            <a:fillRect/>
+          </a:stretch>
+        </p:blipFill>
+        <p:spPr bwMode="auto">
+          <a:xfrm>
             <a:off x="3581400" y="1247775"/>
             <a:ext cx="4362450" cy="4362450"/>
+          </a:xfrm>
+          <a:prstGeom prst="rect">
+            <a:avLst/>
+          </a:prstGeom>
+          <a:noFill/>
+          <a:extLst>
+            <a:ext uri="{909E8E84-426E-40DD-AFC4-6F175D3DCCD1}">
+              <a14:hiddenFill xmlns:a14="http://schemas.microsoft.com/office/drawing/2010/main">
+                <a:solidFill>
+                  <a:srgbClr val="FFFFFF"/>
+                </a:solidFill>
+              </a14:hiddenFill>
+            </a:ext>
+          </a:extLst>
+        </p:spPr>
+      </p:pic>
+    </p:spTree>
+    <p:extLst>
+      <p:ext uri="{BB962C8B-B14F-4D97-AF65-F5344CB8AC3E}">
+        <p14:creationId xmlns:p14="http://schemas.microsoft.com/office/powerpoint/2010/main" val="1081452130"/>
+      </p:ext>
+    </p:extLst>
+  </p:cSld>
+  <p:clrMapOvr>
+    <a:masterClrMapping/>
+  </p:clrMapOvr>
+  <p:transition>
+    <p:fade/>
+  </p:transition>
+</p:sld>
+</file>
+
+<file path=ppt/slides/slide23.xml><?xml version="1.0" encoding="utf-8"?>
+<p:sld xmlns:a="http://schemas.openxmlformats.org/drawingml/2006/main" xmlns:r="http://schemas.openxmlformats.org/officeDocument/2006/relationships" xmlns:p="http://schemas.openxmlformats.org/presentationml/2006/main">
+  <p:cSld>
+    <p:bg>
+      <p:bgPr>
+        <a:solidFill>
+          <a:srgbClr val="FFFFFF"/>
+        </a:solidFill>
+        <a:effectLst/>
+      </p:bgPr>
+    </p:bg>
+    <p:spTree>
+      <p:nvGrpSpPr>
+        <p:cNvPr id="1" name=""/>
+        <p:cNvGrpSpPr/>
+        <p:nvPr/>
+      </p:nvGrpSpPr>
+      <p:grpSpPr>
+        <a:xfrm>
+          <a:off x="0" y="0"/>
+          <a:ext cx="0" cy="0"/>
+          <a:chOff x="0" y="0"/>
+          <a:chExt cx="0" cy="0"/>
+        </a:xfrm>
+      </p:grpSpPr>
+      <p:sp>
+        <p:nvSpPr>
+          <p:cNvPr id="5" name="Rectangle 4">
+            <a:extLst>
+              <a:ext uri="{FF2B5EF4-FFF2-40B4-BE49-F238E27FC236}">
+                <a16:creationId xmlns:a16="http://schemas.microsoft.com/office/drawing/2014/main" id="{ADFF3A91-4295-9C52-3061-E78CAA08800E}"/>
+              </a:ext>
+            </a:extLst>
+          </p:cNvPr>
+          <p:cNvSpPr/>
+          <p:nvPr/>
+        </p:nvSpPr>
+        <p:spPr>
+          <a:xfrm>
+            <a:off x="2590800" y="1167769"/>
+            <a:ext cx="6377306" cy="4623431"/>
+          </a:xfrm>
+          <a:prstGeom prst="rect">
+            <a:avLst/>
+          </a:prstGeom>
+          <a:noFill/>
+          <a:ln w="57150"/>
+        </p:spPr>
+        <p:style>
+          <a:lnRef idx="2">
+            <a:schemeClr val="accent1">
+              <a:shade val="15000"/>
+            </a:schemeClr>
+          </a:lnRef>
+          <a:fillRef idx="1">
+            <a:schemeClr val="accent1"/>
+          </a:fillRef>
+          <a:effectRef idx="0">
+            <a:schemeClr val="accent1"/>
+          </a:effectRef>
+          <a:fontRef idx="minor">
+            <a:schemeClr val="lt1"/>
+          </a:fontRef>
+        </p:style>
+        <p:txBody>
+          <a:bodyPr rtlCol="0" anchor="ctr"/>
+          <a:lstStyle/>
+          <a:p>
+            <a:pPr algn="ctr"/>
+            <a:endParaRPr lang="en-US"/>
+          </a:p>
+        </p:txBody>
+      </p:sp>
+      <p:pic>
+        <p:nvPicPr>
+          <p:cNvPr id="1026" name="Picture 2">
+            <a:extLst>
+              <a:ext uri="{FF2B5EF4-FFF2-40B4-BE49-F238E27FC236}">
+                <a16:creationId xmlns:a16="http://schemas.microsoft.com/office/drawing/2014/main" id="{C72877C5-3D72-91CF-A6EA-DCA3979C8E44}"/>
+              </a:ext>
+            </a:extLst>
+          </p:cNvPr>
+          <p:cNvPicPr>
+            <a:picLocks noChangeAspect="1" noChangeArrowheads="1"/>
+          </p:cNvPicPr>
+          <p:nvPr/>
+        </p:nvPicPr>
+        <p:blipFill>
+          <a:blip r:embed="rId2">
+            <a:extLst>
+              <a:ext uri="{28A0092B-C50C-407E-A947-70E740481C1C}">
+                <a14:useLocalDpi xmlns:a14="http://schemas.microsoft.com/office/drawing/2010/main" val="0"/>
+              </a:ext>
+            </a:extLst>
+          </a:blip>
+          <a:srcRect/>
+          <a:stretch>
+            <a:fillRect/>
+          </a:stretch>
+        </p:blipFill>
+        <p:spPr bwMode="auto">
+          <a:xfrm>
+            <a:off x="3645853" y="1295400"/>
+            <a:ext cx="4267200" cy="4267200"/>
           </a:xfrm>
           <a:prstGeom prst="rect">
             <a:avLst/>
@@ -4687,7 +5794,141 @@
 </p:sld>
 </file>
 
-<file path=ppt/slides/slide18.xml><?xml version="1.0" encoding="utf-8"?>
+<file path=ppt/slides/slide24.xml><?xml version="1.0" encoding="utf-8"?>
+<p:sld xmlns:a="http://schemas.openxmlformats.org/drawingml/2006/main" xmlns:r="http://schemas.openxmlformats.org/officeDocument/2006/relationships" xmlns:p="http://schemas.openxmlformats.org/presentationml/2006/main">
+  <p:cSld>
+    <p:bg>
+      <p:bgPr>
+        <a:solidFill>
+          <a:srgbClr val="FFFFFF"/>
+        </a:solidFill>
+        <a:effectLst/>
+      </p:bgPr>
+    </p:bg>
+    <p:spTree>
+      <p:nvGrpSpPr>
+        <p:cNvPr id="1" name=""/>
+        <p:cNvGrpSpPr/>
+        <p:nvPr/>
+      </p:nvGrpSpPr>
+      <p:grpSpPr>
+        <a:xfrm>
+          <a:off x="0" y="0"/>
+          <a:ext cx="0" cy="0"/>
+          <a:chOff x="0" y="0"/>
+          <a:chExt cx="0" cy="0"/>
+        </a:xfrm>
+      </p:grpSpPr>
+      <p:sp>
+        <p:nvSpPr>
+          <p:cNvPr id="5" name="Rectangle 4">
+            <a:extLst>
+              <a:ext uri="{FF2B5EF4-FFF2-40B4-BE49-F238E27FC236}">
+                <a16:creationId xmlns:a16="http://schemas.microsoft.com/office/drawing/2014/main" id="{ADFF3A91-4295-9C52-3061-E78CAA08800E}"/>
+              </a:ext>
+            </a:extLst>
+          </p:cNvPr>
+          <p:cNvSpPr/>
+          <p:nvPr/>
+        </p:nvSpPr>
+        <p:spPr>
+          <a:xfrm>
+            <a:off x="2590800" y="1167769"/>
+            <a:ext cx="6377306" cy="4623431"/>
+          </a:xfrm>
+          <a:prstGeom prst="rect">
+            <a:avLst/>
+          </a:prstGeom>
+          <a:noFill/>
+          <a:ln w="57150"/>
+        </p:spPr>
+        <p:style>
+          <a:lnRef idx="2">
+            <a:schemeClr val="accent1">
+              <a:shade val="15000"/>
+            </a:schemeClr>
+          </a:lnRef>
+          <a:fillRef idx="1">
+            <a:schemeClr val="accent1"/>
+          </a:fillRef>
+          <a:effectRef idx="0">
+            <a:schemeClr val="accent1"/>
+          </a:effectRef>
+          <a:fontRef idx="minor">
+            <a:schemeClr val="lt1"/>
+          </a:fontRef>
+        </p:style>
+        <p:txBody>
+          <a:bodyPr rtlCol="0" anchor="ctr"/>
+          <a:lstStyle/>
+          <a:p>
+            <a:pPr algn="ctr"/>
+            <a:endParaRPr lang="en-US"/>
+          </a:p>
+        </p:txBody>
+      </p:sp>
+      <p:pic>
+        <p:nvPicPr>
+          <p:cNvPr id="1026" name="Picture 2">
+            <a:extLst>
+              <a:ext uri="{FF2B5EF4-FFF2-40B4-BE49-F238E27FC236}">
+                <a16:creationId xmlns:a16="http://schemas.microsoft.com/office/drawing/2014/main" id="{C72877C5-3D72-91CF-A6EA-DCA3979C8E44}"/>
+              </a:ext>
+            </a:extLst>
+          </p:cNvPr>
+          <p:cNvPicPr>
+            <a:picLocks noChangeAspect="1" noChangeArrowheads="1"/>
+          </p:cNvPicPr>
+          <p:nvPr/>
+        </p:nvPicPr>
+        <p:blipFill rotWithShape="1">
+          <a:blip r:embed="rId2">
+            <a:extLst>
+              <a:ext uri="{28A0092B-C50C-407E-A947-70E740481C1C}">
+                <a14:useLocalDpi xmlns:a14="http://schemas.microsoft.com/office/drawing/2010/main" val="0"/>
+              </a:ext>
+            </a:extLst>
+          </a:blip>
+          <a:srcRect l="20717" t="14286" r="19885" b="19643"/>
+          <a:stretch/>
+        </p:blipFill>
+        <p:spPr bwMode="auto">
+          <a:xfrm>
+            <a:off x="4572000" y="1352288"/>
+            <a:ext cx="2469603" cy="4153424"/>
+          </a:xfrm>
+          <a:prstGeom prst="rect">
+            <a:avLst/>
+          </a:prstGeom>
+          <a:noFill/>
+          <a:extLst>
+            <a:ext uri="{909E8E84-426E-40DD-AFC4-6F175D3DCCD1}">
+              <a14:hiddenFill xmlns:a14="http://schemas.microsoft.com/office/drawing/2010/main">
+                <a:solidFill>
+                  <a:srgbClr val="FFFFFF"/>
+                </a:solidFill>
+              </a14:hiddenFill>
+            </a:ext>
+          </a:extLst>
+        </p:spPr>
+      </p:pic>
+    </p:spTree>
+    <p:extLst>
+      <p:ext uri="{BB962C8B-B14F-4D97-AF65-F5344CB8AC3E}">
+        <p14:creationId xmlns:p14="http://schemas.microsoft.com/office/powerpoint/2010/main" val="540306366"/>
+      </p:ext>
+    </p:extLst>
+  </p:cSld>
+  <p:clrMapOvr>
+    <a:masterClrMapping/>
+  </p:clrMapOvr>
+  <p:transition>
+    <p:fade/>
+  </p:transition>
+</p:sld>
+</file>
+
+<file path=ppt/slides/slide25.xml><?xml version="1.0" encoding="utf-8"?>
 <p:sld xmlns:a="http://schemas.openxmlformats.org/drawingml/2006/main" xmlns:r="http://schemas.openxmlformats.org/officeDocument/2006/relationships" xmlns:p="http://schemas.openxmlformats.org/presentationml/2006/main">
   <p:cSld>
     <p:bg>
@@ -5016,7 +6257,7 @@
 </p:sld>
 </file>
 
-<file path=ppt/slides/slide19.xml><?xml version="1.0" encoding="utf-8"?>
+<file path=ppt/slides/slide26.xml><?xml version="1.0" encoding="utf-8"?>
 <p:sld xmlns:a="http://schemas.openxmlformats.org/drawingml/2006/main" xmlns:r="http://schemas.openxmlformats.org/officeDocument/2006/relationships" xmlns:p="http://schemas.openxmlformats.org/presentationml/2006/main">
   <p:cSld>
     <p:bg>
@@ -5120,310 +6361,6 @@
     <p:extLst>
       <p:ext uri="{BB962C8B-B14F-4D97-AF65-F5344CB8AC3E}">
         <p14:creationId xmlns:p14="http://schemas.microsoft.com/office/powerpoint/2010/main" val="631568266"/>
-      </p:ext>
-    </p:extLst>
-  </p:cSld>
-  <p:clrMapOvr>
-    <a:masterClrMapping/>
-  </p:clrMapOvr>
-  <p:transition>
-    <p:fade/>
-  </p:transition>
-</p:sld>
-</file>
-
-<file path=ppt/slides/slide2.xml><?xml version="1.0" encoding="utf-8"?>
-<p:sld xmlns:a="http://schemas.openxmlformats.org/drawingml/2006/main" xmlns:r="http://schemas.openxmlformats.org/officeDocument/2006/relationships" xmlns:p="http://schemas.openxmlformats.org/presentationml/2006/main">
-  <p:cSld>
-    <p:bg>
-      <p:bgPr>
-        <a:solidFill>
-          <a:srgbClr val="FDC62E"/>
-        </a:solidFill>
-        <a:effectLst/>
-      </p:bgPr>
-    </p:bg>
-    <p:spTree>
-      <p:nvGrpSpPr>
-        <p:cNvPr id="1" name=""/>
-        <p:cNvGrpSpPr/>
-        <p:nvPr/>
-      </p:nvGrpSpPr>
-      <p:grpSpPr>
-        <a:xfrm>
-          <a:off x="0" y="0"/>
-          <a:ext cx="0" cy="0"/>
-          <a:chOff x="0" y="0"/>
-          <a:chExt cx="0" cy="0"/>
-        </a:xfrm>
-      </p:grpSpPr>
-      <p:sp>
-        <p:nvSpPr>
-          <p:cNvPr id="8" name="TextBox 7">
-            <a:extLst>
-              <a:ext uri="{FF2B5EF4-FFF2-40B4-BE49-F238E27FC236}">
-                <a16:creationId xmlns:a16="http://schemas.microsoft.com/office/drawing/2014/main" id="{353E4F0D-BFFE-6C18-B38E-8C617031EC35}"/>
-              </a:ext>
-            </a:extLst>
-          </p:cNvPr>
-          <p:cNvSpPr txBox="1"/>
-          <p:nvPr/>
-        </p:nvSpPr>
-        <p:spPr>
-          <a:xfrm>
-            <a:off x="3504623" y="2791361"/>
-            <a:ext cx="2896177" cy="1323439"/>
-          </a:xfrm>
-          <a:prstGeom prst="rect">
-            <a:avLst/>
-          </a:prstGeom>
-          <a:noFill/>
-        </p:spPr>
-        <p:txBody>
-          <a:bodyPr wrap="none" rtlCol="0">
-            <a:spAutoFit/>
-          </a:bodyPr>
-          <a:lstStyle/>
-          <a:p>
-            <a:r>
-              <a:rPr lang="en-US" sz="8000" b="1">
-                <a:solidFill>
-                  <a:schemeClr val="accent4">
-                    <a:lumMod val="50000"/>
-                  </a:schemeClr>
-                </a:solidFill>
-              </a:rPr>
-              <a:t>Watch</a:t>
-            </a:r>
-          </a:p>
-        </p:txBody>
-      </p:sp>
-      <p:sp>
-        <p:nvSpPr>
-          <p:cNvPr id="7" name="TextBox 6">
-            <a:extLst>
-              <a:ext uri="{FF2B5EF4-FFF2-40B4-BE49-F238E27FC236}">
-                <a16:creationId xmlns:a16="http://schemas.microsoft.com/office/drawing/2014/main" id="{50102003-AB3D-F1A7-B8D1-C16B59A8E312}"/>
-              </a:ext>
-            </a:extLst>
-          </p:cNvPr>
-          <p:cNvSpPr txBox="1"/>
-          <p:nvPr/>
-        </p:nvSpPr>
-        <p:spPr>
-          <a:xfrm>
-            <a:off x="3998796" y="2110773"/>
-            <a:ext cx="2237279" cy="1200329"/>
-          </a:xfrm>
-          <a:prstGeom prst="rect">
-            <a:avLst/>
-          </a:prstGeom>
-          <a:noFill/>
-        </p:spPr>
-        <p:txBody>
-          <a:bodyPr wrap="none" rtlCol="0">
-            <a:spAutoFit/>
-          </a:bodyPr>
-          <a:lstStyle/>
-          <a:p>
-            <a:r>
-              <a:rPr lang="en-US" sz="7200" b="1">
-                <a:solidFill>
-                  <a:schemeClr val="accent4">
-                    <a:lumMod val="20000"/>
-                    <a:lumOff val="80000"/>
-                  </a:schemeClr>
-                </a:solidFill>
-              </a:rPr>
-              <a:t>Wear</a:t>
-            </a:r>
-            <a:endParaRPr lang="en-US" sz="8800" b="1">
-              <a:solidFill>
-                <a:schemeClr val="accent4">
-                  <a:lumMod val="20000"/>
-                  <a:lumOff val="80000"/>
-                </a:schemeClr>
-              </a:solidFill>
-            </a:endParaRPr>
-          </a:p>
-        </p:txBody>
-      </p:sp>
-      <p:sp>
-        <p:nvSpPr>
-          <p:cNvPr id="6" name="TextBox 5">
-            <a:extLst>
-              <a:ext uri="{FF2B5EF4-FFF2-40B4-BE49-F238E27FC236}">
-                <a16:creationId xmlns:a16="http://schemas.microsoft.com/office/drawing/2014/main" id="{386F93B7-8598-88AC-AC80-7B9180BE846C}"/>
-              </a:ext>
-            </a:extLst>
-          </p:cNvPr>
-          <p:cNvSpPr txBox="1"/>
-          <p:nvPr/>
-        </p:nvSpPr>
-        <p:spPr>
-          <a:xfrm>
-            <a:off x="4351707" y="1600200"/>
-            <a:ext cx="1802738" cy="1015663"/>
-          </a:xfrm>
-          <a:prstGeom prst="rect">
-            <a:avLst/>
-          </a:prstGeom>
-          <a:noFill/>
-        </p:spPr>
-        <p:txBody>
-          <a:bodyPr wrap="none" rtlCol="0">
-            <a:spAutoFit/>
-          </a:bodyPr>
-          <a:lstStyle/>
-          <a:p>
-            <a:r>
-              <a:rPr lang="en-US" sz="6000" b="1">
-                <a:solidFill>
-                  <a:schemeClr val="bg1"/>
-                </a:solidFill>
-              </a:rPr>
-              <a:t>want</a:t>
-            </a:r>
-            <a:endParaRPr lang="en-US" sz="5400" b="1">
-              <a:solidFill>
-                <a:schemeClr val="bg1"/>
-              </a:solidFill>
-            </a:endParaRPr>
-          </a:p>
-        </p:txBody>
-      </p:sp>
-      <p:pic>
-        <p:nvPicPr>
-          <p:cNvPr id="3" name="Picture 2">
-            <a:extLst>
-              <a:ext uri="{FF2B5EF4-FFF2-40B4-BE49-F238E27FC236}">
-                <a16:creationId xmlns:a16="http://schemas.microsoft.com/office/drawing/2014/main" id="{3C414805-8991-6485-D786-B1183421DAF0}"/>
-              </a:ext>
-            </a:extLst>
-          </p:cNvPr>
-          <p:cNvPicPr>
-            <a:picLocks noChangeAspect="1"/>
-          </p:cNvPicPr>
-          <p:nvPr/>
-        </p:nvPicPr>
-        <p:blipFill>
-          <a:blip r:embed="rId2">
-            <a:extLst>
-              <a:ext uri="{28A0092B-C50C-407E-A947-70E740481C1C}">
-                <a14:useLocalDpi xmlns:a14="http://schemas.microsoft.com/office/drawing/2010/main" val="0"/>
-              </a:ext>
-            </a:extLst>
-          </a:blip>
-          <a:stretch>
-            <a:fillRect/>
-          </a:stretch>
-        </p:blipFill>
-        <p:spPr>
-          <a:xfrm>
-            <a:off x="5943600" y="1022730"/>
-            <a:ext cx="2742011" cy="3662362"/>
-          </a:xfrm>
-          <a:prstGeom prst="rect">
-            <a:avLst/>
-          </a:prstGeom>
-        </p:spPr>
-      </p:pic>
-      <p:sp>
-        <p:nvSpPr>
-          <p:cNvPr id="4" name="Rectangle 3">
-            <a:extLst>
-              <a:ext uri="{FF2B5EF4-FFF2-40B4-BE49-F238E27FC236}">
-                <a16:creationId xmlns:a16="http://schemas.microsoft.com/office/drawing/2014/main" id="{6B1146AE-003A-4DF7-D65A-C995D09D51C9}"/>
-              </a:ext>
-            </a:extLst>
-          </p:cNvPr>
-          <p:cNvSpPr/>
-          <p:nvPr/>
-        </p:nvSpPr>
-        <p:spPr>
-          <a:xfrm>
-            <a:off x="4648200" y="6172200"/>
-            <a:ext cx="3518195" cy="896788"/>
-          </a:xfrm>
-          <a:prstGeom prst="rect">
-            <a:avLst/>
-          </a:prstGeom>
-        </p:spPr>
-        <p:style>
-          <a:lnRef idx="2">
-            <a:schemeClr val="accent1">
-              <a:shade val="15000"/>
-            </a:schemeClr>
-          </a:lnRef>
-          <a:fillRef idx="1">
-            <a:schemeClr val="accent1"/>
-          </a:fillRef>
-          <a:effectRef idx="0">
-            <a:schemeClr val="accent1"/>
-          </a:effectRef>
-          <a:fontRef idx="minor">
-            <a:schemeClr val="lt1"/>
-          </a:fontRef>
-        </p:style>
-        <p:txBody>
-          <a:bodyPr rtlCol="0" anchor="ctr"/>
-          <a:lstStyle/>
-          <a:p>
-            <a:pPr algn="ctr"/>
-            <a:endParaRPr lang="en-US"/>
-          </a:p>
-        </p:txBody>
-      </p:sp>
-      <p:sp>
-        <p:nvSpPr>
-          <p:cNvPr id="9" name="Rectangle 8">
-            <a:extLst>
-              <a:ext uri="{FF2B5EF4-FFF2-40B4-BE49-F238E27FC236}">
-                <a16:creationId xmlns:a16="http://schemas.microsoft.com/office/drawing/2014/main" id="{D07B64A4-683D-918E-1344-22DFF1F000F1}"/>
-              </a:ext>
-            </a:extLst>
-          </p:cNvPr>
-          <p:cNvSpPr/>
-          <p:nvPr/>
-        </p:nvSpPr>
-        <p:spPr>
-          <a:xfrm>
-            <a:off x="4641702" y="-403767"/>
-            <a:ext cx="3518195" cy="896788"/>
-          </a:xfrm>
-          <a:prstGeom prst="rect">
-            <a:avLst/>
-          </a:prstGeom>
-        </p:spPr>
-        <p:style>
-          <a:lnRef idx="2">
-            <a:schemeClr val="accent1">
-              <a:shade val="15000"/>
-            </a:schemeClr>
-          </a:lnRef>
-          <a:fillRef idx="1">
-            <a:schemeClr val="accent1"/>
-          </a:fillRef>
-          <a:effectRef idx="0">
-            <a:schemeClr val="accent1"/>
-          </a:effectRef>
-          <a:fontRef idx="minor">
-            <a:schemeClr val="lt1"/>
-          </a:fontRef>
-        </p:style>
-        <p:txBody>
-          <a:bodyPr rtlCol="0" anchor="ctr"/>
-          <a:lstStyle/>
-          <a:p>
-            <a:pPr algn="ctr"/>
-            <a:endParaRPr lang="en-US"/>
-          </a:p>
-        </p:txBody>
-      </p:sp>
-    </p:spTree>
-    <p:extLst>
-      <p:ext uri="{BB962C8B-B14F-4D97-AF65-F5344CB8AC3E}">
-        <p14:creationId xmlns:p14="http://schemas.microsoft.com/office/powerpoint/2010/main" val="1756301127"/>
       </p:ext>
     </p:extLst>
   </p:cSld>
@@ -6937,7 +7874,7 @@
     <p:bg>
       <p:bgPr>
         <a:solidFill>
-          <a:srgbClr val="F8F8F8"/>
+          <a:srgbClr val="FFFFFF"/>
         </a:solidFill>
         <a:effectLst/>
       </p:bgPr>
@@ -6956,6 +7893,41 @@
           <a:chExt cx="0" cy="0"/>
         </a:xfrm>
       </p:grpSpPr>
+      <p:pic>
+        <p:nvPicPr>
+          <p:cNvPr id="3" name="Picture 2">
+            <a:extLst>
+              <a:ext uri="{FF2B5EF4-FFF2-40B4-BE49-F238E27FC236}">
+                <a16:creationId xmlns:a16="http://schemas.microsoft.com/office/drawing/2014/main" id="{E6E44495-8731-93A8-AB0D-F8B4FA507DD1}"/>
+              </a:ext>
+            </a:extLst>
+          </p:cNvPr>
+          <p:cNvPicPr>
+            <a:picLocks noChangeAspect="1"/>
+          </p:cNvPicPr>
+          <p:nvPr/>
+        </p:nvPicPr>
+        <p:blipFill>
+          <a:blip r:embed="rId2">
+            <a:extLst>
+              <a:ext uri="{28A0092B-C50C-407E-A947-70E740481C1C}">
+                <a14:useLocalDpi xmlns:a14="http://schemas.microsoft.com/office/drawing/2010/main" val="0"/>
+              </a:ext>
+            </a:extLst>
+          </a:blip>
+          <a:srcRect l="14634" t="9037" r="12195" b="20411"/>
+          <a:stretch/>
+        </p:blipFill>
+        <p:spPr>
+          <a:xfrm>
+            <a:off x="3581400" y="1380913"/>
+            <a:ext cx="4495800" cy="4096173"/>
+          </a:xfrm>
+          <a:prstGeom prst="rect">
+            <a:avLst/>
+          </a:prstGeom>
+        </p:spPr>
+      </p:pic>
       <p:sp>
         <p:nvSpPr>
           <p:cNvPr id="5" name="Rectangle 4">
@@ -7004,57 +7976,10 @@
           </a:p>
         </p:txBody>
       </p:sp>
-      <p:pic>
-        <p:nvPicPr>
-          <p:cNvPr id="1026" name="Picture 2">
-            <a:extLst>
-              <a:ext uri="{FF2B5EF4-FFF2-40B4-BE49-F238E27FC236}">
-                <a16:creationId xmlns:a16="http://schemas.microsoft.com/office/drawing/2014/main" id="{5168C581-D69C-5F41-8134-A4C4ABE2BEB5}"/>
-              </a:ext>
-            </a:extLst>
-          </p:cNvPr>
-          <p:cNvPicPr>
-            <a:picLocks noChangeAspect="1" noChangeArrowheads="1"/>
-          </p:cNvPicPr>
-          <p:nvPr/>
-        </p:nvPicPr>
-        <p:blipFill>
-          <a:blip r:embed="rId2">
-            <a:extLst>
-              <a:ext uri="{28A0092B-C50C-407E-A947-70E740481C1C}">
-                <a14:useLocalDpi xmlns:a14="http://schemas.microsoft.com/office/drawing/2010/main" val="0"/>
-              </a:ext>
-            </a:extLst>
-          </a:blip>
-          <a:srcRect/>
-          <a:stretch>
-            <a:fillRect/>
-          </a:stretch>
-        </p:blipFill>
-        <p:spPr bwMode="auto">
-          <a:xfrm>
-            <a:off x="3093403" y="1633537"/>
-            <a:ext cx="5372100" cy="3590925"/>
-          </a:xfrm>
-          <a:prstGeom prst="rect">
-            <a:avLst/>
-          </a:prstGeom>
-          <a:noFill/>
-          <a:extLst>
-            <a:ext uri="{909E8E84-426E-40DD-AFC4-6F175D3DCCD1}">
-              <a14:hiddenFill xmlns:a14="http://schemas.microsoft.com/office/drawing/2010/main">
-                <a:solidFill>
-                  <a:srgbClr val="FFFFFF"/>
-                </a:solidFill>
-              </a14:hiddenFill>
-            </a:ext>
-          </a:extLst>
-        </p:spPr>
-      </p:pic>
     </p:spTree>
     <p:extLst>
       <p:ext uri="{BB962C8B-B14F-4D97-AF65-F5344CB8AC3E}">
-        <p14:creationId xmlns:p14="http://schemas.microsoft.com/office/powerpoint/2010/main" val="94104684"/>
+        <p14:creationId xmlns:p14="http://schemas.microsoft.com/office/powerpoint/2010/main" val="1398677119"/>
       </p:ext>
     </p:extLst>
   </p:cSld>

</xml_diff>